<commit_message>
[Doc] Enhance architecture diagram
</commit_message>
<xml_diff>
--- a/examples/architecture.pptx
+++ b/examples/architecture.pptx
@@ -267,7 +267,7 @@
           <a:p>
             <a:fld id="{C6D5F118-0C7E-4BDD-BBA0-7F61C0FBD2C0}" type="datetimeFigureOut">
               <a:rPr lang="en-US" smtClean="0"/>
-              <a:t>07/20/2023</a:t>
+              <a:t>07/21/2023</a:t>
             </a:fld>
             <a:endParaRPr lang="en-US"/>
           </a:p>
@@ -465,7 +465,7 @@
           <a:p>
             <a:fld id="{C6D5F118-0C7E-4BDD-BBA0-7F61C0FBD2C0}" type="datetimeFigureOut">
               <a:rPr lang="en-US" smtClean="0"/>
-              <a:t>07/20/2023</a:t>
+              <a:t>07/21/2023</a:t>
             </a:fld>
             <a:endParaRPr lang="en-US"/>
           </a:p>
@@ -673,7 +673,7 @@
           <a:p>
             <a:fld id="{C6D5F118-0C7E-4BDD-BBA0-7F61C0FBD2C0}" type="datetimeFigureOut">
               <a:rPr lang="en-US" smtClean="0"/>
-              <a:t>07/20/2023</a:t>
+              <a:t>07/21/2023</a:t>
             </a:fld>
             <a:endParaRPr lang="en-US"/>
           </a:p>
@@ -871,7 +871,7 @@
           <a:p>
             <a:fld id="{C6D5F118-0C7E-4BDD-BBA0-7F61C0FBD2C0}" type="datetimeFigureOut">
               <a:rPr lang="en-US" smtClean="0"/>
-              <a:t>07/20/2023</a:t>
+              <a:t>07/21/2023</a:t>
             </a:fld>
             <a:endParaRPr lang="en-US"/>
           </a:p>
@@ -1146,7 +1146,7 @@
           <a:p>
             <a:fld id="{C6D5F118-0C7E-4BDD-BBA0-7F61C0FBD2C0}" type="datetimeFigureOut">
               <a:rPr lang="en-US" smtClean="0"/>
-              <a:t>07/20/2023</a:t>
+              <a:t>07/21/2023</a:t>
             </a:fld>
             <a:endParaRPr lang="en-US"/>
           </a:p>
@@ -1411,7 +1411,7 @@
           <a:p>
             <a:fld id="{C6D5F118-0C7E-4BDD-BBA0-7F61C0FBD2C0}" type="datetimeFigureOut">
               <a:rPr lang="en-US" smtClean="0"/>
-              <a:t>07/20/2023</a:t>
+              <a:t>07/21/2023</a:t>
             </a:fld>
             <a:endParaRPr lang="en-US"/>
           </a:p>
@@ -1823,7 +1823,7 @@
           <a:p>
             <a:fld id="{C6D5F118-0C7E-4BDD-BBA0-7F61C0FBD2C0}" type="datetimeFigureOut">
               <a:rPr lang="en-US" smtClean="0"/>
-              <a:t>07/20/2023</a:t>
+              <a:t>07/21/2023</a:t>
             </a:fld>
             <a:endParaRPr lang="en-US"/>
           </a:p>
@@ -1964,7 +1964,7 @@
           <a:p>
             <a:fld id="{C6D5F118-0C7E-4BDD-BBA0-7F61C0FBD2C0}" type="datetimeFigureOut">
               <a:rPr lang="en-US" smtClean="0"/>
-              <a:t>07/20/2023</a:t>
+              <a:t>07/21/2023</a:t>
             </a:fld>
             <a:endParaRPr lang="en-US"/>
           </a:p>
@@ -2077,7 +2077,7 @@
           <a:p>
             <a:fld id="{C6D5F118-0C7E-4BDD-BBA0-7F61C0FBD2C0}" type="datetimeFigureOut">
               <a:rPr lang="en-US" smtClean="0"/>
-              <a:t>07/20/2023</a:t>
+              <a:t>07/21/2023</a:t>
             </a:fld>
             <a:endParaRPr lang="en-US"/>
           </a:p>
@@ -2388,7 +2388,7 @@
           <a:p>
             <a:fld id="{C6D5F118-0C7E-4BDD-BBA0-7F61C0FBD2C0}" type="datetimeFigureOut">
               <a:rPr lang="en-US" smtClean="0"/>
-              <a:t>07/20/2023</a:t>
+              <a:t>07/21/2023</a:t>
             </a:fld>
             <a:endParaRPr lang="en-US"/>
           </a:p>
@@ -2676,7 +2676,7 @@
           <a:p>
             <a:fld id="{C6D5F118-0C7E-4BDD-BBA0-7F61C0FBD2C0}" type="datetimeFigureOut">
               <a:rPr lang="en-US" smtClean="0"/>
-              <a:t>07/20/2023</a:t>
+              <a:t>07/21/2023</a:t>
             </a:fld>
             <a:endParaRPr lang="en-US"/>
           </a:p>
@@ -2917,7 +2917,7 @@
           <a:p>
             <a:fld id="{C6D5F118-0C7E-4BDD-BBA0-7F61C0FBD2C0}" type="datetimeFigureOut">
               <a:rPr lang="en-US" smtClean="0"/>
-              <a:t>07/20/2023</a:t>
+              <a:t>07/21/2023</a:t>
             </a:fld>
             <a:endParaRPr lang="en-US"/>
           </a:p>
@@ -3348,14 +3348,105 @@
         </p:nvSpPr>
         <p:spPr>
           <a:xfrm>
-            <a:off x="6215447" y="1655804"/>
-            <a:ext cx="4839733" cy="3286897"/>
+            <a:off x="5635723" y="984597"/>
+            <a:ext cx="2782575" cy="1886465"/>
           </a:xfrm>
           <a:prstGeom prst="rect">
             <a:avLst/>
           </a:prstGeom>
           <a:solidFill>
             <a:schemeClr val="accent6">
+              <a:lumMod val="20000"/>
+              <a:lumOff val="80000"/>
+            </a:schemeClr>
+          </a:solidFill>
+          <a:ln>
+            <a:solidFill>
+              <a:schemeClr val="tx1"/>
+            </a:solidFill>
+          </a:ln>
+          <a:effectLst>
+            <a:glow rad="101600">
+              <a:schemeClr val="accent3">
+                <a:satMod val="175000"/>
+                <a:alpha val="40000"/>
+              </a:schemeClr>
+            </a:glow>
+          </a:effectLst>
+        </p:spPr>
+        <p:style>
+          <a:lnRef idx="2">
+            <a:schemeClr val="accent1">
+              <a:shade val="50000"/>
+            </a:schemeClr>
+          </a:lnRef>
+          <a:fillRef idx="1">
+            <a:schemeClr val="accent1"/>
+          </a:fillRef>
+          <a:effectRef idx="0">
+            <a:schemeClr val="accent1"/>
+          </a:effectRef>
+          <a:fontRef idx="minor">
+            <a:schemeClr val="lt1"/>
+          </a:fontRef>
+        </p:style>
+        <p:txBody>
+          <a:bodyPr rtlCol="0" anchor="b" anchorCtr="1"/>
+          <a:lstStyle/>
+          <a:p>
+            <a:pPr algn="ctr"/>
+            <a:r>
+              <a:rPr lang="en-US" sz="1600" b="1" dirty="0">
+                <a:solidFill>
+                  <a:schemeClr val="tx1"/>
+                </a:solidFill>
+                <a:latin typeface="LXGW WenKai" panose="02020500000000000000" pitchFamily="18" charset="-120"/>
+                <a:ea typeface="LXGW WenKai" panose="02020500000000000000" pitchFamily="18" charset="-120"/>
+              </a:rPr>
+              <a:t>GPT-</a:t>
+            </a:r>
+            <a:r>
+              <a:rPr lang="en-US" sz="1600" b="1" dirty="0" err="1">
+                <a:solidFill>
+                  <a:schemeClr val="tx1"/>
+                </a:solidFill>
+                <a:latin typeface="LXGW WenKai" panose="02020500000000000000" pitchFamily="18" charset="-120"/>
+                <a:ea typeface="LXGW WenKai" panose="02020500000000000000" pitchFamily="18" charset="-120"/>
+              </a:rPr>
+              <a:t>WebUI</a:t>
+            </a:r>
+            <a:endParaRPr lang="en-US" sz="1600" b="1" dirty="0">
+              <a:solidFill>
+                <a:schemeClr val="tx1"/>
+              </a:solidFill>
+              <a:latin typeface="LXGW WenKai" panose="02020500000000000000" pitchFamily="18" charset="-120"/>
+              <a:ea typeface="LXGW WenKai" panose="02020500000000000000" pitchFamily="18" charset="-120"/>
+            </a:endParaRPr>
+          </a:p>
+        </p:txBody>
+      </p:sp>
+      <p:sp>
+        <p:nvSpPr>
+          <p:cNvPr id="5" name="Rectangle 4">
+            <a:extLst>
+              <a:ext uri="{FF2B5EF4-FFF2-40B4-BE49-F238E27FC236}">
+                <a16:creationId xmlns:a16="http://schemas.microsoft.com/office/drawing/2014/main" id="{FF77AFFD-02EA-55C9-3130-364189EAE9BD}"/>
+              </a:ext>
+            </a:extLst>
+          </p:cNvPr>
+          <p:cNvSpPr/>
+          <p:nvPr/>
+        </p:nvSpPr>
+        <p:spPr>
+          <a:xfrm>
+            <a:off x="7165929" y="1695110"/>
+            <a:ext cx="1075038" cy="465437"/>
+          </a:xfrm>
+          <a:prstGeom prst="rect">
+            <a:avLst/>
+          </a:prstGeom>
+          <a:solidFill>
+            <a:schemeClr val="accent2">
               <a:lumMod val="20000"/>
               <a:lumOff val="80000"/>
             </a:schemeClr>
@@ -3383,46 +3474,95 @@
           </a:fontRef>
         </p:style>
         <p:txBody>
-          <a:bodyPr rtlCol="0" anchor="b" anchorCtr="1"/>
+          <a:bodyPr rtlCol="0" anchor="ctr" anchorCtr="1"/>
           <a:lstStyle/>
           <a:p>
             <a:pPr algn="ctr"/>
             <a:r>
-              <a:rPr lang="en-US" dirty="0">
+              <a:rPr lang="en-US" sz="1400" dirty="0">
                 <a:solidFill>
                   <a:schemeClr val="tx1"/>
                 </a:solidFill>
                 <a:latin typeface="LXGW WenKai" panose="02020500000000000000" pitchFamily="18" charset="-120"/>
                 <a:ea typeface="LXGW WenKai" panose="02020500000000000000" pitchFamily="18" charset="-120"/>
               </a:rPr>
-              <a:t>GPT-</a:t>
-            </a:r>
-            <a:r>
-              <a:rPr lang="en-US" dirty="0" err="1">
+              <a:t>Vue</a:t>
+            </a:r>
+          </a:p>
+        </p:txBody>
+      </p:sp>
+      <p:sp>
+        <p:nvSpPr>
+          <p:cNvPr id="6" name="Rectangle 5">
+            <a:extLst>
+              <a:ext uri="{FF2B5EF4-FFF2-40B4-BE49-F238E27FC236}">
+                <a16:creationId xmlns:a16="http://schemas.microsoft.com/office/drawing/2014/main" id="{5E659578-CF78-BB7C-E460-38ADFE97CC4D}"/>
+              </a:ext>
+            </a:extLst>
+          </p:cNvPr>
+          <p:cNvSpPr/>
+          <p:nvPr/>
+        </p:nvSpPr>
+        <p:spPr>
+          <a:xfrm>
+            <a:off x="5799951" y="1695108"/>
+            <a:ext cx="1075037" cy="465437"/>
+          </a:xfrm>
+          <a:prstGeom prst="rect">
+            <a:avLst/>
+          </a:prstGeom>
+          <a:solidFill>
+            <a:schemeClr val="accent2">
+              <a:lumMod val="20000"/>
+              <a:lumOff val="80000"/>
+            </a:schemeClr>
+          </a:solidFill>
+          <a:ln>
+            <a:solidFill>
+              <a:schemeClr val="tx1"/>
+            </a:solidFill>
+          </a:ln>
+        </p:spPr>
+        <p:style>
+          <a:lnRef idx="2">
+            <a:schemeClr val="accent1">
+              <a:shade val="50000"/>
+            </a:schemeClr>
+          </a:lnRef>
+          <a:fillRef idx="1">
+            <a:schemeClr val="accent1"/>
+          </a:fillRef>
+          <a:effectRef idx="0">
+            <a:schemeClr val="accent1"/>
+          </a:effectRef>
+          <a:fontRef idx="minor">
+            <a:schemeClr val="lt1"/>
+          </a:fontRef>
+        </p:style>
+        <p:txBody>
+          <a:bodyPr rtlCol="0" anchor="ctr" anchorCtr="1"/>
+          <a:lstStyle/>
+          <a:p>
+            <a:pPr algn="ctr"/>
+            <a:r>
+              <a:rPr lang="en-US" sz="1400" dirty="0">
                 <a:solidFill>
                   <a:schemeClr val="tx1"/>
                 </a:solidFill>
                 <a:latin typeface="LXGW WenKai" panose="02020500000000000000" pitchFamily="18" charset="-120"/>
                 <a:ea typeface="LXGW WenKai" panose="02020500000000000000" pitchFamily="18" charset="-120"/>
               </a:rPr>
-              <a:t>WebUI</a:t>
-            </a:r>
-            <a:endParaRPr lang="en-US" dirty="0">
-              <a:solidFill>
-                <a:schemeClr val="tx1"/>
-              </a:solidFill>
-              <a:latin typeface="LXGW WenKai" panose="02020500000000000000" pitchFamily="18" charset="-120"/>
-              <a:ea typeface="LXGW WenKai" panose="02020500000000000000" pitchFamily="18" charset="-120"/>
-            </a:endParaRPr>
-          </a:p>
-        </p:txBody>
-      </p:sp>
-      <p:sp>
-        <p:nvSpPr>
-          <p:cNvPr id="5" name="Rectangle 4">
-            <a:extLst>
-              <a:ext uri="{FF2B5EF4-FFF2-40B4-BE49-F238E27FC236}">
-                <a16:creationId xmlns:a16="http://schemas.microsoft.com/office/drawing/2014/main" id="{FF77AFFD-02EA-55C9-3130-364189EAE9BD}"/>
+              <a:t>Flask</a:t>
+            </a:r>
+          </a:p>
+        </p:txBody>
+      </p:sp>
+      <p:sp>
+        <p:nvSpPr>
+          <p:cNvPr id="2" name="Rectangle 1">
+            <a:extLst>
+              <a:ext uri="{FF2B5EF4-FFF2-40B4-BE49-F238E27FC236}">
+                <a16:creationId xmlns:a16="http://schemas.microsoft.com/office/drawing/2014/main" id="{92EFFECB-9FD4-0BB7-95C1-A18D6CADACAA}"/>
               </a:ext>
             </a:extLst>
           </p:cNvPr>
@@ -3431,8 +3571,288 @@
         </p:nvSpPr>
         <p:spPr>
           <a:xfrm>
-            <a:off x="8717120" y="2656703"/>
-            <a:ext cx="2117125" cy="914400"/>
+            <a:off x="1116630" y="984597"/>
+            <a:ext cx="2886436" cy="2628900"/>
+          </a:xfrm>
+          <a:prstGeom prst="rect">
+            <a:avLst/>
+          </a:prstGeom>
+          <a:solidFill>
+            <a:schemeClr val="accent6">
+              <a:lumMod val="20000"/>
+              <a:lumOff val="80000"/>
+            </a:schemeClr>
+          </a:solidFill>
+          <a:ln>
+            <a:solidFill>
+              <a:schemeClr val="tx1"/>
+            </a:solidFill>
+          </a:ln>
+          <a:effectLst>
+            <a:glow rad="101600">
+              <a:schemeClr val="accent3">
+                <a:satMod val="175000"/>
+                <a:alpha val="40000"/>
+              </a:schemeClr>
+            </a:glow>
+          </a:effectLst>
+        </p:spPr>
+        <p:style>
+          <a:lnRef idx="2">
+            <a:schemeClr val="accent1">
+              <a:shade val="50000"/>
+            </a:schemeClr>
+          </a:lnRef>
+          <a:fillRef idx="1">
+            <a:schemeClr val="accent1"/>
+          </a:fillRef>
+          <a:effectRef idx="0">
+            <a:schemeClr val="accent1"/>
+          </a:effectRef>
+          <a:fontRef idx="minor">
+            <a:schemeClr val="lt1"/>
+          </a:fontRef>
+        </p:style>
+        <p:txBody>
+          <a:bodyPr rtlCol="0" anchor="b" anchorCtr="1"/>
+          <a:lstStyle/>
+          <a:p>
+            <a:pPr algn="ctr"/>
+            <a:r>
+              <a:rPr lang="en-US" sz="1600" b="1" dirty="0">
+                <a:solidFill>
+                  <a:schemeClr val="tx1"/>
+                </a:solidFill>
+                <a:latin typeface="LXGW WenKai" panose="02020500000000000000" pitchFamily="18" charset="-120"/>
+                <a:ea typeface="LXGW WenKai" panose="02020500000000000000" pitchFamily="18" charset="-120"/>
+              </a:rPr>
+              <a:t>GPT-Agents</a:t>
+            </a:r>
+          </a:p>
+        </p:txBody>
+      </p:sp>
+      <p:sp>
+        <p:nvSpPr>
+          <p:cNvPr id="3" name="Rectangle 2">
+            <a:extLst>
+              <a:ext uri="{FF2B5EF4-FFF2-40B4-BE49-F238E27FC236}">
+                <a16:creationId xmlns:a16="http://schemas.microsoft.com/office/drawing/2014/main" id="{2684CDCD-7EDE-2E5C-79B4-30ED22B0FA59}"/>
+              </a:ext>
+            </a:extLst>
+          </p:cNvPr>
+          <p:cNvSpPr/>
+          <p:nvPr/>
+        </p:nvSpPr>
+        <p:spPr>
+          <a:xfrm>
+            <a:off x="4348265" y="3557081"/>
+            <a:ext cx="4070034" cy="2576452"/>
+          </a:xfrm>
+          <a:prstGeom prst="rect">
+            <a:avLst/>
+          </a:prstGeom>
+          <a:solidFill>
+            <a:schemeClr val="accent6">
+              <a:lumMod val="20000"/>
+              <a:lumOff val="80000"/>
+            </a:schemeClr>
+          </a:solidFill>
+          <a:ln>
+            <a:solidFill>
+              <a:schemeClr val="tx1"/>
+            </a:solidFill>
+          </a:ln>
+          <a:effectLst>
+            <a:glow rad="101600">
+              <a:schemeClr val="accent3">
+                <a:satMod val="175000"/>
+                <a:alpha val="40000"/>
+              </a:schemeClr>
+            </a:glow>
+          </a:effectLst>
+        </p:spPr>
+        <p:style>
+          <a:lnRef idx="2">
+            <a:schemeClr val="accent1">
+              <a:shade val="50000"/>
+            </a:schemeClr>
+          </a:lnRef>
+          <a:fillRef idx="1">
+            <a:schemeClr val="accent1"/>
+          </a:fillRef>
+          <a:effectRef idx="0">
+            <a:schemeClr val="accent1"/>
+          </a:effectRef>
+          <a:fontRef idx="minor">
+            <a:schemeClr val="lt1"/>
+          </a:fontRef>
+        </p:style>
+        <p:txBody>
+          <a:bodyPr rtlCol="0" anchor="b" anchorCtr="1"/>
+          <a:lstStyle/>
+          <a:p>
+            <a:pPr algn="ctr"/>
+            <a:r>
+              <a:rPr lang="en-US" sz="1600" b="1" dirty="0">
+                <a:solidFill>
+                  <a:schemeClr val="tx1"/>
+                </a:solidFill>
+                <a:latin typeface="LXGW WenKai" panose="02020500000000000000" pitchFamily="18" charset="-120"/>
+                <a:ea typeface="LXGW WenKai" panose="02020500000000000000" pitchFamily="18" charset="-120"/>
+              </a:rPr>
+              <a:t>MongoDB</a:t>
+            </a:r>
+          </a:p>
+        </p:txBody>
+      </p:sp>
+      <p:sp>
+        <p:nvSpPr>
+          <p:cNvPr id="4" name="Rectangle 3">
+            <a:extLst>
+              <a:ext uri="{FF2B5EF4-FFF2-40B4-BE49-F238E27FC236}">
+                <a16:creationId xmlns:a16="http://schemas.microsoft.com/office/drawing/2014/main" id="{D9806EAC-7DC2-FFAD-F565-90F93EC55137}"/>
+              </a:ext>
+            </a:extLst>
+          </p:cNvPr>
+          <p:cNvSpPr/>
+          <p:nvPr/>
+        </p:nvSpPr>
+        <p:spPr>
+          <a:xfrm>
+            <a:off x="5100716" y="3870929"/>
+            <a:ext cx="1196369" cy="457200"/>
+          </a:xfrm>
+          <a:prstGeom prst="rect">
+            <a:avLst/>
+          </a:prstGeom>
+          <a:solidFill>
+            <a:schemeClr val="accent4">
+              <a:lumMod val="40000"/>
+              <a:lumOff val="60000"/>
+            </a:schemeClr>
+          </a:solidFill>
+          <a:ln>
+            <a:solidFill>
+              <a:schemeClr val="tx1"/>
+            </a:solidFill>
+          </a:ln>
+        </p:spPr>
+        <p:style>
+          <a:lnRef idx="2">
+            <a:schemeClr val="accent1">
+              <a:shade val="50000"/>
+            </a:schemeClr>
+          </a:lnRef>
+          <a:fillRef idx="1">
+            <a:schemeClr val="accent1"/>
+          </a:fillRef>
+          <a:effectRef idx="0">
+            <a:schemeClr val="accent1"/>
+          </a:effectRef>
+          <a:fontRef idx="minor">
+            <a:schemeClr val="lt1"/>
+          </a:fontRef>
+        </p:style>
+        <p:txBody>
+          <a:bodyPr rtlCol="0" anchor="ctr" anchorCtr="1"/>
+          <a:lstStyle/>
+          <a:p>
+            <a:pPr algn="ctr"/>
+            <a:r>
+              <a:rPr lang="en-US" sz="1400" dirty="0">
+                <a:solidFill>
+                  <a:schemeClr val="tx1"/>
+                </a:solidFill>
+                <a:latin typeface="LXGW WenKai" panose="02020500000000000000" pitchFamily="18" charset="-120"/>
+                <a:ea typeface="LXGW WenKai" panose="02020500000000000000" pitchFamily="18" charset="-120"/>
+              </a:rPr>
+              <a:t>UI Configs</a:t>
+            </a:r>
+          </a:p>
+        </p:txBody>
+      </p:sp>
+      <p:sp>
+        <p:nvSpPr>
+          <p:cNvPr id="8" name="Rectangle 7">
+            <a:extLst>
+              <a:ext uri="{FF2B5EF4-FFF2-40B4-BE49-F238E27FC236}">
+                <a16:creationId xmlns:a16="http://schemas.microsoft.com/office/drawing/2014/main" id="{4DC41078-AFAF-45AD-5CA5-28463EEE9024}"/>
+              </a:ext>
+            </a:extLst>
+          </p:cNvPr>
+          <p:cNvSpPr/>
+          <p:nvPr/>
+        </p:nvSpPr>
+        <p:spPr>
+          <a:xfrm>
+            <a:off x="6404353" y="3870929"/>
+            <a:ext cx="1197864" cy="457200"/>
+          </a:xfrm>
+          <a:prstGeom prst="rect">
+            <a:avLst/>
+          </a:prstGeom>
+          <a:solidFill>
+            <a:schemeClr val="accent4">
+              <a:lumMod val="40000"/>
+              <a:lumOff val="60000"/>
+            </a:schemeClr>
+          </a:solidFill>
+          <a:ln>
+            <a:solidFill>
+              <a:schemeClr val="tx1"/>
+            </a:solidFill>
+          </a:ln>
+        </p:spPr>
+        <p:style>
+          <a:lnRef idx="2">
+            <a:schemeClr val="accent1">
+              <a:shade val="50000"/>
+            </a:schemeClr>
+          </a:lnRef>
+          <a:fillRef idx="1">
+            <a:schemeClr val="accent1"/>
+          </a:fillRef>
+          <a:effectRef idx="0">
+            <a:schemeClr val="accent1"/>
+          </a:effectRef>
+          <a:fontRef idx="minor">
+            <a:schemeClr val="lt1"/>
+          </a:fontRef>
+        </p:style>
+        <p:txBody>
+          <a:bodyPr rtlCol="0" anchor="ctr" anchorCtr="1"/>
+          <a:lstStyle/>
+          <a:p>
+            <a:pPr algn="ctr"/>
+            <a:r>
+              <a:rPr lang="en-US" sz="1400" dirty="0">
+                <a:solidFill>
+                  <a:schemeClr val="tx1"/>
+                </a:solidFill>
+                <a:latin typeface="LXGW WenKai" panose="02020500000000000000" pitchFamily="18" charset="-120"/>
+                <a:ea typeface="LXGW WenKai" panose="02020500000000000000" pitchFamily="18" charset="-120"/>
+              </a:rPr>
+              <a:t>Messages</a:t>
+            </a:r>
+          </a:p>
+        </p:txBody>
+      </p:sp>
+      <p:sp>
+        <p:nvSpPr>
+          <p:cNvPr id="9" name="Rectangle 8">
+            <a:extLst>
+              <a:ext uri="{FF2B5EF4-FFF2-40B4-BE49-F238E27FC236}">
+                <a16:creationId xmlns:a16="http://schemas.microsoft.com/office/drawing/2014/main" id="{56F4A4FE-1E8D-F949-D9CD-B3B0E98A42D0}"/>
+              </a:ext>
+            </a:extLst>
+          </p:cNvPr>
+          <p:cNvSpPr/>
+          <p:nvPr/>
+        </p:nvSpPr>
+        <p:spPr>
+          <a:xfrm>
+            <a:off x="6407343" y="4560846"/>
+            <a:ext cx="1196369" cy="457200"/>
           </a:xfrm>
           <a:prstGeom prst="rect">
             <a:avLst/>
@@ -3466,29 +3886,36 @@
           </a:fontRef>
         </p:style>
         <p:txBody>
-          <a:bodyPr rtlCol="0" anchor="b" anchorCtr="1"/>
+          <a:bodyPr rtlCol="0" anchor="ctr" anchorCtr="1"/>
           <a:lstStyle/>
           <a:p>
             <a:pPr algn="ctr"/>
             <a:r>
-              <a:rPr lang="en-US" dirty="0">
+              <a:rPr lang="en-US" sz="1400" dirty="0">
                 <a:solidFill>
                   <a:schemeClr val="tx1"/>
                 </a:solidFill>
                 <a:latin typeface="LXGW WenKai" panose="02020500000000000000" pitchFamily="18" charset="-120"/>
                 <a:ea typeface="LXGW WenKai" panose="02020500000000000000" pitchFamily="18" charset="-120"/>
               </a:rPr>
-              <a:t>Vue</a:t>
-            </a:r>
-          </a:p>
-        </p:txBody>
-      </p:sp>
-      <p:sp>
-        <p:nvSpPr>
-          <p:cNvPr id="6" name="Rectangle 5">
-            <a:extLst>
-              <a:ext uri="{FF2B5EF4-FFF2-40B4-BE49-F238E27FC236}">
-                <a16:creationId xmlns:a16="http://schemas.microsoft.com/office/drawing/2014/main" id="{5E659578-CF78-BB7C-E460-38ADFE97CC4D}"/>
+              <a:t>Knowledge</a:t>
+            </a:r>
+            <a:endParaRPr lang="en-US" sz="1600" dirty="0">
+              <a:solidFill>
+                <a:schemeClr val="tx1"/>
+              </a:solidFill>
+              <a:latin typeface="LXGW WenKai" panose="02020500000000000000" pitchFamily="18" charset="-120"/>
+              <a:ea typeface="LXGW WenKai" panose="02020500000000000000" pitchFamily="18" charset="-120"/>
+            </a:endParaRPr>
+          </a:p>
+        </p:txBody>
+      </p:sp>
+      <p:sp>
+        <p:nvSpPr>
+          <p:cNvPr id="10" name="Rectangle 9">
+            <a:extLst>
+              <a:ext uri="{FF2B5EF4-FFF2-40B4-BE49-F238E27FC236}">
+                <a16:creationId xmlns:a16="http://schemas.microsoft.com/office/drawing/2014/main" id="{DCA583BF-5F72-DDD0-2FD2-90E209D4DDC4}"/>
               </a:ext>
             </a:extLst>
           </p:cNvPr>
@@ -3497,8 +3924,586 @@
         </p:nvSpPr>
         <p:spPr>
           <a:xfrm>
-            <a:off x="6322540" y="2656703"/>
-            <a:ext cx="2117125" cy="914400"/>
+            <a:off x="2762533" y="1695107"/>
+            <a:ext cx="1075037" cy="465437"/>
+          </a:xfrm>
+          <a:prstGeom prst="rect">
+            <a:avLst/>
+          </a:prstGeom>
+          <a:solidFill>
+            <a:schemeClr val="accent2">
+              <a:lumMod val="20000"/>
+              <a:lumOff val="80000"/>
+            </a:schemeClr>
+          </a:solidFill>
+          <a:ln>
+            <a:solidFill>
+              <a:schemeClr val="tx1"/>
+            </a:solidFill>
+          </a:ln>
+        </p:spPr>
+        <p:style>
+          <a:lnRef idx="2">
+            <a:schemeClr val="accent1">
+              <a:shade val="50000"/>
+            </a:schemeClr>
+          </a:lnRef>
+          <a:fillRef idx="1">
+            <a:schemeClr val="accent1"/>
+          </a:fillRef>
+          <a:effectRef idx="0">
+            <a:schemeClr val="accent1"/>
+          </a:effectRef>
+          <a:fontRef idx="minor">
+            <a:schemeClr val="lt1"/>
+          </a:fontRef>
+        </p:style>
+        <p:txBody>
+          <a:bodyPr rtlCol="0" anchor="ctr" anchorCtr="1"/>
+          <a:lstStyle/>
+          <a:p>
+            <a:pPr algn="ctr"/>
+            <a:r>
+              <a:rPr lang="en-US" sz="1400" dirty="0">
+                <a:solidFill>
+                  <a:schemeClr val="tx1"/>
+                </a:solidFill>
+                <a:latin typeface="LXGW WenKai" panose="02020500000000000000" pitchFamily="18" charset="-120"/>
+                <a:ea typeface="LXGW WenKai" panose="02020500000000000000" pitchFamily="18" charset="-120"/>
+              </a:rPr>
+              <a:t>Flask</a:t>
+            </a:r>
+          </a:p>
+        </p:txBody>
+      </p:sp>
+      <p:sp>
+        <p:nvSpPr>
+          <p:cNvPr id="11" name="Rectangle 10">
+            <a:extLst>
+              <a:ext uri="{FF2B5EF4-FFF2-40B4-BE49-F238E27FC236}">
+                <a16:creationId xmlns:a16="http://schemas.microsoft.com/office/drawing/2014/main" id="{918EA8CC-D42E-95BE-5265-A530140CBE59}"/>
+              </a:ext>
+            </a:extLst>
+          </p:cNvPr>
+          <p:cNvSpPr/>
+          <p:nvPr/>
+        </p:nvSpPr>
+        <p:spPr>
+          <a:xfrm>
+            <a:off x="9207760" y="1616384"/>
+            <a:ext cx="1257285" cy="622889"/>
+          </a:xfrm>
+          <a:prstGeom prst="rect">
+            <a:avLst/>
+          </a:prstGeom>
+          <a:solidFill>
+            <a:schemeClr val="accent6">
+              <a:lumMod val="20000"/>
+              <a:lumOff val="80000"/>
+            </a:schemeClr>
+          </a:solidFill>
+          <a:ln>
+            <a:solidFill>
+              <a:schemeClr val="tx1"/>
+            </a:solidFill>
+          </a:ln>
+          <a:effectLst>
+            <a:glow rad="101600">
+              <a:schemeClr val="accent3">
+                <a:satMod val="175000"/>
+                <a:alpha val="40000"/>
+              </a:schemeClr>
+            </a:glow>
+          </a:effectLst>
+        </p:spPr>
+        <p:style>
+          <a:lnRef idx="2">
+            <a:schemeClr val="accent1">
+              <a:shade val="50000"/>
+            </a:schemeClr>
+          </a:lnRef>
+          <a:fillRef idx="1">
+            <a:schemeClr val="accent1"/>
+          </a:fillRef>
+          <a:effectRef idx="0">
+            <a:schemeClr val="accent1"/>
+          </a:effectRef>
+          <a:fontRef idx="minor">
+            <a:schemeClr val="lt1"/>
+          </a:fontRef>
+        </p:style>
+        <p:txBody>
+          <a:bodyPr rtlCol="0" anchor="ctr" anchorCtr="1"/>
+          <a:lstStyle/>
+          <a:p>
+            <a:pPr algn="ctr"/>
+            <a:r>
+              <a:rPr lang="en-US" sz="1400" b="1" dirty="0">
+                <a:solidFill>
+                  <a:schemeClr val="tx1"/>
+                </a:solidFill>
+                <a:latin typeface="LXGW WenKai" panose="02020500000000000000" pitchFamily="18" charset="-120"/>
+                <a:ea typeface="LXGW WenKai" panose="02020500000000000000" pitchFamily="18" charset="-120"/>
+              </a:rPr>
+              <a:t>User Input</a:t>
+            </a:r>
+          </a:p>
+        </p:txBody>
+      </p:sp>
+      <p:cxnSp>
+        <p:nvCxnSpPr>
+          <p:cNvPr id="13" name="Straight Arrow Connector 12">
+            <a:extLst>
+              <a:ext uri="{FF2B5EF4-FFF2-40B4-BE49-F238E27FC236}">
+                <a16:creationId xmlns:a16="http://schemas.microsoft.com/office/drawing/2014/main" id="{3E898761-6631-B050-B40B-4BCE784A5AA0}"/>
+              </a:ext>
+            </a:extLst>
+          </p:cNvPr>
+          <p:cNvCxnSpPr>
+            <a:cxnSpLocks/>
+            <a:stCxn id="11" idx="1"/>
+            <a:endCxn id="5" idx="3"/>
+          </p:cNvCxnSpPr>
+          <p:nvPr/>
+        </p:nvCxnSpPr>
+        <p:spPr>
+          <a:xfrm flipH="1">
+            <a:off x="8240967" y="1927829"/>
+            <a:ext cx="966793" cy="0"/>
+          </a:xfrm>
+          <a:prstGeom prst="straightConnector1">
+            <a:avLst/>
+          </a:prstGeom>
+          <a:ln w="9525">
+            <a:solidFill>
+              <a:schemeClr val="tx1"/>
+            </a:solidFill>
+            <a:tailEnd type="triangle"/>
+          </a:ln>
+          <a:effectLst>
+            <a:outerShdw blurRad="63500" sx="102000" sy="102000" algn="ctr" rotWithShape="0">
+              <a:prstClr val="black">
+                <a:alpha val="40000"/>
+              </a:prstClr>
+            </a:outerShdw>
+          </a:effectLst>
+        </p:spPr>
+        <p:style>
+          <a:lnRef idx="1">
+            <a:schemeClr val="accent1"/>
+          </a:lnRef>
+          <a:fillRef idx="0">
+            <a:schemeClr val="accent1"/>
+          </a:fillRef>
+          <a:effectRef idx="0">
+            <a:schemeClr val="accent1"/>
+          </a:effectRef>
+          <a:fontRef idx="minor">
+            <a:schemeClr val="tx1"/>
+          </a:fontRef>
+        </p:style>
+      </p:cxnSp>
+      <p:cxnSp>
+        <p:nvCxnSpPr>
+          <p:cNvPr id="15" name="Straight Arrow Connector 14">
+            <a:extLst>
+              <a:ext uri="{FF2B5EF4-FFF2-40B4-BE49-F238E27FC236}">
+                <a16:creationId xmlns:a16="http://schemas.microsoft.com/office/drawing/2014/main" id="{F206895B-E096-04B1-30EB-212F2AFF38FC}"/>
+              </a:ext>
+            </a:extLst>
+          </p:cNvPr>
+          <p:cNvCxnSpPr>
+            <a:cxnSpLocks/>
+            <a:stCxn id="5" idx="1"/>
+            <a:endCxn id="6" idx="3"/>
+          </p:cNvCxnSpPr>
+          <p:nvPr/>
+        </p:nvCxnSpPr>
+        <p:spPr>
+          <a:xfrm flipH="1" flipV="1">
+            <a:off x="6874988" y="1927827"/>
+            <a:ext cx="290941" cy="2"/>
+          </a:xfrm>
+          <a:prstGeom prst="straightConnector1">
+            <a:avLst/>
+          </a:prstGeom>
+          <a:ln w="9525">
+            <a:solidFill>
+              <a:schemeClr val="tx1"/>
+            </a:solidFill>
+            <a:headEnd type="triangle"/>
+            <a:tailEnd type="triangle"/>
+          </a:ln>
+          <a:effectLst>
+            <a:outerShdw blurRad="63500" sx="102000" sy="102000" algn="ctr" rotWithShape="0">
+              <a:prstClr val="black">
+                <a:alpha val="40000"/>
+              </a:prstClr>
+            </a:outerShdw>
+          </a:effectLst>
+        </p:spPr>
+        <p:style>
+          <a:lnRef idx="1">
+            <a:schemeClr val="accent1"/>
+          </a:lnRef>
+          <a:fillRef idx="0">
+            <a:schemeClr val="accent1"/>
+          </a:fillRef>
+          <a:effectRef idx="0">
+            <a:schemeClr val="accent1"/>
+          </a:effectRef>
+          <a:fontRef idx="minor">
+            <a:schemeClr val="tx1"/>
+          </a:fontRef>
+        </p:style>
+      </p:cxnSp>
+      <p:cxnSp>
+        <p:nvCxnSpPr>
+          <p:cNvPr id="26" name="Connector: Elbow 25">
+            <a:extLst>
+              <a:ext uri="{FF2B5EF4-FFF2-40B4-BE49-F238E27FC236}">
+                <a16:creationId xmlns:a16="http://schemas.microsoft.com/office/drawing/2014/main" id="{05698F9B-C43C-23EA-C5ED-DB4DFE760783}"/>
+              </a:ext>
+            </a:extLst>
+          </p:cNvPr>
+          <p:cNvCxnSpPr>
+            <a:cxnSpLocks/>
+            <a:stCxn id="6" idx="2"/>
+            <a:endCxn id="8" idx="0"/>
+          </p:cNvCxnSpPr>
+          <p:nvPr/>
+        </p:nvCxnSpPr>
+        <p:spPr>
+          <a:xfrm rot="16200000" flipH="1">
+            <a:off x="5815185" y="2682829"/>
+            <a:ext cx="1710384" cy="665815"/>
+          </a:xfrm>
+          <a:prstGeom prst="bentConnector3">
+            <a:avLst>
+              <a:gd name="adj1" fmla="val 50000"/>
+            </a:avLst>
+          </a:prstGeom>
+          <a:ln w="9525">
+            <a:solidFill>
+              <a:schemeClr val="tx1"/>
+            </a:solidFill>
+            <a:headEnd type="triangle"/>
+            <a:tailEnd type="triangle"/>
+          </a:ln>
+        </p:spPr>
+        <p:style>
+          <a:lnRef idx="1">
+            <a:schemeClr val="accent1"/>
+          </a:lnRef>
+          <a:fillRef idx="0">
+            <a:schemeClr val="accent1"/>
+          </a:fillRef>
+          <a:effectRef idx="0">
+            <a:schemeClr val="accent1"/>
+          </a:effectRef>
+          <a:fontRef idx="minor">
+            <a:schemeClr val="tx1"/>
+          </a:fontRef>
+        </p:style>
+      </p:cxnSp>
+      <p:cxnSp>
+        <p:nvCxnSpPr>
+          <p:cNvPr id="30" name="Connector: Elbow 29">
+            <a:extLst>
+              <a:ext uri="{FF2B5EF4-FFF2-40B4-BE49-F238E27FC236}">
+                <a16:creationId xmlns:a16="http://schemas.microsoft.com/office/drawing/2014/main" id="{7278F500-F0D3-1D1E-C466-570F500391A0}"/>
+              </a:ext>
+            </a:extLst>
+          </p:cNvPr>
+          <p:cNvCxnSpPr>
+            <a:cxnSpLocks/>
+            <a:stCxn id="6" idx="2"/>
+            <a:endCxn id="4" idx="0"/>
+          </p:cNvCxnSpPr>
+          <p:nvPr/>
+        </p:nvCxnSpPr>
+        <p:spPr>
+          <a:xfrm rot="5400000">
+            <a:off x="5162994" y="2696453"/>
+            <a:ext cx="1710384" cy="638569"/>
+          </a:xfrm>
+          <a:prstGeom prst="bentConnector3">
+            <a:avLst>
+              <a:gd name="adj1" fmla="val 50000"/>
+            </a:avLst>
+          </a:prstGeom>
+          <a:ln w="9525">
+            <a:solidFill>
+              <a:schemeClr val="tx1"/>
+            </a:solidFill>
+            <a:headEnd type="triangle"/>
+            <a:tailEnd type="triangle"/>
+          </a:ln>
+        </p:spPr>
+        <p:style>
+          <a:lnRef idx="1">
+            <a:schemeClr val="accent1"/>
+          </a:lnRef>
+          <a:fillRef idx="0">
+            <a:schemeClr val="accent1"/>
+          </a:fillRef>
+          <a:effectRef idx="0">
+            <a:schemeClr val="accent1"/>
+          </a:effectRef>
+          <a:fontRef idx="minor">
+            <a:schemeClr val="tx1"/>
+          </a:fontRef>
+        </p:style>
+      </p:cxnSp>
+      <p:sp>
+        <p:nvSpPr>
+          <p:cNvPr id="49" name="Rectangle 48">
+            <a:extLst>
+              <a:ext uri="{FF2B5EF4-FFF2-40B4-BE49-F238E27FC236}">
+                <a16:creationId xmlns:a16="http://schemas.microsoft.com/office/drawing/2014/main" id="{0900D2F3-9AD4-665C-2FF9-7C36D51D3EF0}"/>
+              </a:ext>
+            </a:extLst>
+          </p:cNvPr>
+          <p:cNvSpPr/>
+          <p:nvPr/>
+        </p:nvSpPr>
+        <p:spPr>
+          <a:xfrm>
+            <a:off x="1311160" y="1275659"/>
+            <a:ext cx="1075037" cy="465437"/>
+          </a:xfrm>
+          <a:prstGeom prst="rect">
+            <a:avLst/>
+          </a:prstGeom>
+          <a:solidFill>
+            <a:schemeClr val="accent2">
+              <a:lumMod val="40000"/>
+              <a:lumOff val="60000"/>
+            </a:schemeClr>
+          </a:solidFill>
+          <a:ln>
+            <a:solidFill>
+              <a:schemeClr val="tx1"/>
+            </a:solidFill>
+          </a:ln>
+        </p:spPr>
+        <p:style>
+          <a:lnRef idx="2">
+            <a:schemeClr val="accent1">
+              <a:shade val="50000"/>
+            </a:schemeClr>
+          </a:lnRef>
+          <a:fillRef idx="1">
+            <a:schemeClr val="accent1"/>
+          </a:fillRef>
+          <a:effectRef idx="0">
+            <a:schemeClr val="accent1"/>
+          </a:effectRef>
+          <a:fontRef idx="minor">
+            <a:schemeClr val="lt1"/>
+          </a:fontRef>
+        </p:style>
+        <p:txBody>
+          <a:bodyPr rtlCol="0" anchor="ctr" anchorCtr="1"/>
+          <a:lstStyle/>
+          <a:p>
+            <a:pPr algn="ctr"/>
+            <a:r>
+              <a:rPr lang="en-US" sz="1400" dirty="0">
+                <a:solidFill>
+                  <a:schemeClr val="tx1"/>
+                </a:solidFill>
+                <a:latin typeface="LXGW WenKai" panose="02020500000000000000" pitchFamily="18" charset="-120"/>
+                <a:ea typeface="LXGW WenKai" panose="02020500000000000000" pitchFamily="18" charset="-120"/>
+              </a:rPr>
+              <a:t>Managers</a:t>
+            </a:r>
+          </a:p>
+        </p:txBody>
+      </p:sp>
+      <p:sp>
+        <p:nvSpPr>
+          <p:cNvPr id="53" name="Rectangle 52">
+            <a:extLst>
+              <a:ext uri="{FF2B5EF4-FFF2-40B4-BE49-F238E27FC236}">
+                <a16:creationId xmlns:a16="http://schemas.microsoft.com/office/drawing/2014/main" id="{F899B14D-B54D-BDCA-ACEE-CFF7225092D0}"/>
+              </a:ext>
+            </a:extLst>
+          </p:cNvPr>
+          <p:cNvSpPr/>
+          <p:nvPr/>
+        </p:nvSpPr>
+        <p:spPr>
+          <a:xfrm>
+            <a:off x="1311158" y="2005045"/>
+            <a:ext cx="1075037" cy="465437"/>
+          </a:xfrm>
+          <a:prstGeom prst="rect">
+            <a:avLst/>
+          </a:prstGeom>
+          <a:solidFill>
+            <a:schemeClr val="accent2">
+              <a:lumMod val="40000"/>
+              <a:lumOff val="60000"/>
+            </a:schemeClr>
+          </a:solidFill>
+          <a:ln>
+            <a:solidFill>
+              <a:schemeClr val="tx1"/>
+            </a:solidFill>
+          </a:ln>
+        </p:spPr>
+        <p:style>
+          <a:lnRef idx="2">
+            <a:schemeClr val="accent1">
+              <a:shade val="50000"/>
+            </a:schemeClr>
+          </a:lnRef>
+          <a:fillRef idx="1">
+            <a:schemeClr val="accent1"/>
+          </a:fillRef>
+          <a:effectRef idx="0">
+            <a:schemeClr val="accent1"/>
+          </a:effectRef>
+          <a:fontRef idx="minor">
+            <a:schemeClr val="lt1"/>
+          </a:fontRef>
+        </p:style>
+        <p:txBody>
+          <a:bodyPr rtlCol="0" anchor="ctr" anchorCtr="1"/>
+          <a:lstStyle/>
+          <a:p>
+            <a:pPr algn="ctr"/>
+            <a:r>
+              <a:rPr lang="en-US" sz="1400" dirty="0">
+                <a:solidFill>
+                  <a:schemeClr val="tx1"/>
+                </a:solidFill>
+                <a:latin typeface="LXGW WenKai" panose="02020500000000000000" pitchFamily="18" charset="-120"/>
+                <a:ea typeface="LXGW WenKai" panose="02020500000000000000" pitchFamily="18" charset="-120"/>
+              </a:rPr>
+              <a:t>Agents</a:t>
+            </a:r>
+          </a:p>
+        </p:txBody>
+      </p:sp>
+      <p:cxnSp>
+        <p:nvCxnSpPr>
+          <p:cNvPr id="58" name="Straight Arrow Connector 57">
+            <a:extLst>
+              <a:ext uri="{FF2B5EF4-FFF2-40B4-BE49-F238E27FC236}">
+                <a16:creationId xmlns:a16="http://schemas.microsoft.com/office/drawing/2014/main" id="{8292F6D1-99B9-261E-A427-933A611650C2}"/>
+              </a:ext>
+            </a:extLst>
+          </p:cNvPr>
+          <p:cNvCxnSpPr>
+            <a:cxnSpLocks/>
+            <a:stCxn id="53" idx="0"/>
+            <a:endCxn id="49" idx="2"/>
+          </p:cNvCxnSpPr>
+          <p:nvPr/>
+        </p:nvCxnSpPr>
+        <p:spPr>
+          <a:xfrm flipV="1">
+            <a:off x="1848677" y="1741096"/>
+            <a:ext cx="2" cy="263949"/>
+          </a:xfrm>
+          <a:prstGeom prst="straightConnector1">
+            <a:avLst/>
+          </a:prstGeom>
+          <a:ln w="9525">
+            <a:solidFill>
+              <a:schemeClr val="tx1"/>
+            </a:solidFill>
+            <a:headEnd type="triangle"/>
+            <a:tailEnd type="triangle"/>
+          </a:ln>
+          <a:effectLst>
+            <a:outerShdw blurRad="63500" sx="102000" sy="102000" algn="ctr" rotWithShape="0">
+              <a:prstClr val="black">
+                <a:alpha val="40000"/>
+              </a:prstClr>
+            </a:outerShdw>
+          </a:effectLst>
+        </p:spPr>
+        <p:style>
+          <a:lnRef idx="1">
+            <a:schemeClr val="accent1"/>
+          </a:lnRef>
+          <a:fillRef idx="0">
+            <a:schemeClr val="accent1"/>
+          </a:fillRef>
+          <a:effectRef idx="0">
+            <a:schemeClr val="accent1"/>
+          </a:effectRef>
+          <a:fontRef idx="minor">
+            <a:schemeClr val="tx1"/>
+          </a:fontRef>
+        </p:style>
+      </p:cxnSp>
+      <p:cxnSp>
+        <p:nvCxnSpPr>
+          <p:cNvPr id="64" name="Connector: Elbow 63">
+            <a:extLst>
+              <a:ext uri="{FF2B5EF4-FFF2-40B4-BE49-F238E27FC236}">
+                <a16:creationId xmlns:a16="http://schemas.microsoft.com/office/drawing/2014/main" id="{772D2E1C-8856-B709-01CF-3A391A4451A3}"/>
+              </a:ext>
+            </a:extLst>
+          </p:cNvPr>
+          <p:cNvCxnSpPr>
+            <a:cxnSpLocks/>
+            <a:stCxn id="10" idx="0"/>
+            <a:endCxn id="49" idx="3"/>
+          </p:cNvCxnSpPr>
+          <p:nvPr/>
+        </p:nvCxnSpPr>
+        <p:spPr>
+          <a:xfrm rot="16200000" flipV="1">
+            <a:off x="2749761" y="1144815"/>
+            <a:ext cx="186729" cy="913855"/>
+          </a:xfrm>
+          <a:prstGeom prst="bentConnector2">
+            <a:avLst/>
+          </a:prstGeom>
+          <a:ln w="9525">
+            <a:solidFill>
+              <a:schemeClr val="tx1"/>
+            </a:solidFill>
+            <a:headEnd type="triangle"/>
+            <a:tailEnd type="triangle"/>
+          </a:ln>
+        </p:spPr>
+        <p:style>
+          <a:lnRef idx="1">
+            <a:schemeClr val="accent1"/>
+          </a:lnRef>
+          <a:fillRef idx="0">
+            <a:schemeClr val="accent1"/>
+          </a:fillRef>
+          <a:effectRef idx="0">
+            <a:schemeClr val="accent1"/>
+          </a:effectRef>
+          <a:fontRef idx="minor">
+            <a:schemeClr val="tx1"/>
+          </a:fontRef>
+        </p:style>
+      </p:cxnSp>
+      <p:sp>
+        <p:nvSpPr>
+          <p:cNvPr id="80" name="Rectangle 79">
+            <a:extLst>
+              <a:ext uri="{FF2B5EF4-FFF2-40B4-BE49-F238E27FC236}">
+                <a16:creationId xmlns:a16="http://schemas.microsoft.com/office/drawing/2014/main" id="{55E3340C-8A4D-29A5-5A0C-170E40347EC9}"/>
+              </a:ext>
+            </a:extLst>
+          </p:cNvPr>
+          <p:cNvSpPr/>
+          <p:nvPr/>
+        </p:nvSpPr>
+        <p:spPr>
+          <a:xfrm>
+            <a:off x="5100716" y="5250763"/>
+            <a:ext cx="1371600" cy="457200"/>
           </a:xfrm>
           <a:prstGeom prst="rect">
             <a:avLst/>
@@ -3532,29 +4537,83 @@
           </a:fontRef>
         </p:style>
         <p:txBody>
-          <a:bodyPr rtlCol="0" anchor="b" anchorCtr="1"/>
+          <a:bodyPr rtlCol="0" anchor="ctr" anchorCtr="1"/>
           <a:lstStyle/>
           <a:p>
             <a:pPr algn="ctr"/>
             <a:r>
-              <a:rPr lang="en-US" dirty="0">
+              <a:rPr lang="en-US" sz="1400" dirty="0">
                 <a:solidFill>
                   <a:schemeClr val="tx1"/>
                 </a:solidFill>
                 <a:latin typeface="LXGW WenKai" panose="02020500000000000000" pitchFamily="18" charset="-120"/>
                 <a:ea typeface="LXGW WenKai" panose="02020500000000000000" pitchFamily="18" charset="-120"/>
               </a:rPr>
-              <a:t>Flask</a:t>
-            </a:r>
-          </a:p>
-        </p:txBody>
-      </p:sp>
-      <p:sp>
-        <p:nvSpPr>
-          <p:cNvPr id="2" name="Rectangle 1">
-            <a:extLst>
-              <a:ext uri="{FF2B5EF4-FFF2-40B4-BE49-F238E27FC236}">
-                <a16:creationId xmlns:a16="http://schemas.microsoft.com/office/drawing/2014/main" id="{92EFFECB-9FD4-0BB7-95C1-A18D6CADACAA}"/>
+              <a:t>Agent Configs</a:t>
+            </a:r>
+            <a:endParaRPr lang="en-US" sz="1600" dirty="0">
+              <a:solidFill>
+                <a:schemeClr val="tx1"/>
+              </a:solidFill>
+              <a:latin typeface="LXGW WenKai" panose="02020500000000000000" pitchFamily="18" charset="-120"/>
+              <a:ea typeface="LXGW WenKai" panose="02020500000000000000" pitchFamily="18" charset="-120"/>
+            </a:endParaRPr>
+          </a:p>
+        </p:txBody>
+      </p:sp>
+      <p:cxnSp>
+        <p:nvCxnSpPr>
+          <p:cNvPr id="84" name="Connector: Elbow 83">
+            <a:extLst>
+              <a:ext uri="{FF2B5EF4-FFF2-40B4-BE49-F238E27FC236}">
+                <a16:creationId xmlns:a16="http://schemas.microsoft.com/office/drawing/2014/main" id="{0EA3BDB1-F2A4-5C02-333F-366299C1662B}"/>
+              </a:ext>
+            </a:extLst>
+          </p:cNvPr>
+          <p:cNvCxnSpPr>
+            <a:cxnSpLocks/>
+            <a:stCxn id="10" idx="2"/>
+            <a:endCxn id="96" idx="1"/>
+          </p:cNvCxnSpPr>
+          <p:nvPr/>
+        </p:nvCxnSpPr>
+        <p:spPr>
+          <a:xfrm rot="16200000" flipH="1">
+            <a:off x="2885933" y="2574663"/>
+            <a:ext cx="2628902" cy="1800664"/>
+          </a:xfrm>
+          <a:prstGeom prst="bentConnector2">
+            <a:avLst/>
+          </a:prstGeom>
+          <a:ln w="9525">
+            <a:solidFill>
+              <a:schemeClr val="tx1"/>
+            </a:solidFill>
+            <a:headEnd type="triangle"/>
+            <a:tailEnd type="triangle"/>
+          </a:ln>
+        </p:spPr>
+        <p:style>
+          <a:lnRef idx="1">
+            <a:schemeClr val="accent1"/>
+          </a:lnRef>
+          <a:fillRef idx="0">
+            <a:schemeClr val="accent1"/>
+          </a:fillRef>
+          <a:effectRef idx="0">
+            <a:schemeClr val="accent1"/>
+          </a:effectRef>
+          <a:fontRef idx="minor">
+            <a:schemeClr val="tx1"/>
+          </a:fontRef>
+        </p:style>
+      </p:cxnSp>
+      <p:sp>
+        <p:nvSpPr>
+          <p:cNvPr id="96" name="Rectangle 95">
+            <a:extLst>
+              <a:ext uri="{FF2B5EF4-FFF2-40B4-BE49-F238E27FC236}">
+                <a16:creationId xmlns:a16="http://schemas.microsoft.com/office/drawing/2014/main" id="{1A571AEA-B399-C4AC-3A18-2CA6BF7CEACD}"/>
               </a:ext>
             </a:extLst>
           </p:cNvPr>
@@ -3563,14 +4622,14 @@
         </p:nvSpPr>
         <p:spPr>
           <a:xfrm>
-            <a:off x="988539" y="1655804"/>
-            <a:ext cx="4839733" cy="3286897"/>
+            <a:off x="5100716" y="4560846"/>
+            <a:ext cx="1196369" cy="457200"/>
           </a:xfrm>
           <a:prstGeom prst="rect">
             <a:avLst/>
           </a:prstGeom>
           <a:solidFill>
-            <a:schemeClr val="accent6">
+            <a:schemeClr val="accent4">
               <a:lumMod val="20000"/>
               <a:lumOff val="80000"/>
             </a:schemeClr>
@@ -3598,23 +4657,290 @@
           </a:fontRef>
         </p:style>
         <p:txBody>
-          <a:bodyPr rtlCol="0" anchor="b" anchorCtr="1"/>
+          <a:bodyPr rtlCol="0" anchor="ctr" anchorCtr="1"/>
           <a:lstStyle/>
           <a:p>
             <a:pPr algn="ctr"/>
             <a:r>
-              <a:rPr lang="en-US" dirty="0">
+              <a:rPr lang="en-US" sz="1400" dirty="0">
                 <a:solidFill>
                   <a:schemeClr val="tx1"/>
                 </a:solidFill>
                 <a:latin typeface="LXGW WenKai" panose="02020500000000000000" pitchFamily="18" charset="-120"/>
                 <a:ea typeface="LXGW WenKai" panose="02020500000000000000" pitchFamily="18" charset="-120"/>
               </a:rPr>
-              <a:t>GPT-Agents</a:t>
-            </a:r>
-          </a:p>
-        </p:txBody>
-      </p:sp>
+              <a:t>Contexts</a:t>
+            </a:r>
+          </a:p>
+        </p:txBody>
+      </p:sp>
+      <p:cxnSp>
+        <p:nvCxnSpPr>
+          <p:cNvPr id="100" name="Connector: Elbow 99">
+            <a:extLst>
+              <a:ext uri="{FF2B5EF4-FFF2-40B4-BE49-F238E27FC236}">
+                <a16:creationId xmlns:a16="http://schemas.microsoft.com/office/drawing/2014/main" id="{3264145F-BEA8-B01C-6434-B36E905DE09F}"/>
+              </a:ext>
+            </a:extLst>
+          </p:cNvPr>
+          <p:cNvCxnSpPr>
+            <a:cxnSpLocks/>
+            <a:stCxn id="10" idx="2"/>
+            <a:endCxn id="80" idx="2"/>
+          </p:cNvCxnSpPr>
+          <p:nvPr/>
+        </p:nvCxnSpPr>
+        <p:spPr>
+          <a:xfrm rot="16200000" flipH="1">
+            <a:off x="2769575" y="2691021"/>
+            <a:ext cx="3547419" cy="2486464"/>
+          </a:xfrm>
+          <a:prstGeom prst="bentConnector3">
+            <a:avLst>
+              <a:gd name="adj1" fmla="val 106444"/>
+            </a:avLst>
+          </a:prstGeom>
+          <a:ln w="9525">
+            <a:solidFill>
+              <a:schemeClr val="tx1"/>
+            </a:solidFill>
+            <a:headEnd type="triangle"/>
+            <a:tailEnd type="triangle"/>
+          </a:ln>
+        </p:spPr>
+        <p:style>
+          <a:lnRef idx="1">
+            <a:schemeClr val="accent1"/>
+          </a:lnRef>
+          <a:fillRef idx="0">
+            <a:schemeClr val="accent1"/>
+          </a:fillRef>
+          <a:effectRef idx="0">
+            <a:schemeClr val="accent1"/>
+          </a:effectRef>
+          <a:fontRef idx="minor">
+            <a:schemeClr val="tx1"/>
+          </a:fontRef>
+        </p:style>
+      </p:cxnSp>
+      <p:cxnSp>
+        <p:nvCxnSpPr>
+          <p:cNvPr id="33" name="Connector: Elbow 32">
+            <a:extLst>
+              <a:ext uri="{FF2B5EF4-FFF2-40B4-BE49-F238E27FC236}">
+                <a16:creationId xmlns:a16="http://schemas.microsoft.com/office/drawing/2014/main" id="{FECD5B19-9ABD-FBE1-1881-23E52064E9EF}"/>
+              </a:ext>
+            </a:extLst>
+          </p:cNvPr>
+          <p:cNvCxnSpPr>
+            <a:cxnSpLocks/>
+            <a:stCxn id="10" idx="2"/>
+            <a:endCxn id="9" idx="2"/>
+          </p:cNvCxnSpPr>
+          <p:nvPr/>
+        </p:nvCxnSpPr>
+        <p:spPr>
+          <a:xfrm rot="16200000" flipH="1">
+            <a:off x="3724039" y="1736557"/>
+            <a:ext cx="2857502" cy="3705476"/>
+          </a:xfrm>
+          <a:prstGeom prst="bentConnector3">
+            <a:avLst>
+              <a:gd name="adj1" fmla="val 105617"/>
+            </a:avLst>
+          </a:prstGeom>
+          <a:ln w="9525">
+            <a:solidFill>
+              <a:schemeClr val="tx1"/>
+            </a:solidFill>
+            <a:headEnd type="triangle"/>
+            <a:tailEnd type="triangle"/>
+          </a:ln>
+        </p:spPr>
+        <p:style>
+          <a:lnRef idx="1">
+            <a:schemeClr val="accent1"/>
+          </a:lnRef>
+          <a:fillRef idx="0">
+            <a:schemeClr val="accent1"/>
+          </a:fillRef>
+          <a:effectRef idx="0">
+            <a:schemeClr val="accent1"/>
+          </a:effectRef>
+          <a:fontRef idx="minor">
+            <a:schemeClr val="tx1"/>
+          </a:fontRef>
+        </p:style>
+      </p:cxnSp>
+      <p:sp>
+        <p:nvSpPr>
+          <p:cNvPr id="160" name="Rectangle 159">
+            <a:extLst>
+              <a:ext uri="{FF2B5EF4-FFF2-40B4-BE49-F238E27FC236}">
+                <a16:creationId xmlns:a16="http://schemas.microsoft.com/office/drawing/2014/main" id="{2D663D7A-E75A-A89B-C125-37C84B176016}"/>
+              </a:ext>
+            </a:extLst>
+          </p:cNvPr>
+          <p:cNvSpPr/>
+          <p:nvPr/>
+        </p:nvSpPr>
+        <p:spPr>
+          <a:xfrm>
+            <a:off x="1311159" y="2734432"/>
+            <a:ext cx="1075037" cy="465437"/>
+          </a:xfrm>
+          <a:prstGeom prst="rect">
+            <a:avLst/>
+          </a:prstGeom>
+          <a:solidFill>
+            <a:schemeClr val="accent2">
+              <a:lumMod val="40000"/>
+              <a:lumOff val="60000"/>
+            </a:schemeClr>
+          </a:solidFill>
+          <a:ln>
+            <a:solidFill>
+              <a:schemeClr val="tx1"/>
+            </a:solidFill>
+          </a:ln>
+        </p:spPr>
+        <p:style>
+          <a:lnRef idx="2">
+            <a:schemeClr val="accent1">
+              <a:shade val="50000"/>
+            </a:schemeClr>
+          </a:lnRef>
+          <a:fillRef idx="1">
+            <a:schemeClr val="accent1"/>
+          </a:fillRef>
+          <a:effectRef idx="0">
+            <a:schemeClr val="accent1"/>
+          </a:effectRef>
+          <a:fontRef idx="minor">
+            <a:schemeClr val="lt1"/>
+          </a:fontRef>
+        </p:style>
+        <p:txBody>
+          <a:bodyPr rtlCol="0" anchor="ctr" anchorCtr="1"/>
+          <a:lstStyle/>
+          <a:p>
+            <a:pPr algn="ctr"/>
+            <a:r>
+              <a:rPr lang="en-US" sz="1400" dirty="0">
+                <a:solidFill>
+                  <a:schemeClr val="tx1"/>
+                </a:solidFill>
+                <a:latin typeface="LXGW WenKai" panose="02020500000000000000" pitchFamily="18" charset="-120"/>
+                <a:ea typeface="LXGW WenKai" panose="02020500000000000000" pitchFamily="18" charset="-120"/>
+              </a:rPr>
+              <a:t>LLMs</a:t>
+            </a:r>
+          </a:p>
+        </p:txBody>
+      </p:sp>
+      <p:cxnSp>
+        <p:nvCxnSpPr>
+          <p:cNvPr id="161" name="Straight Arrow Connector 160">
+            <a:extLst>
+              <a:ext uri="{FF2B5EF4-FFF2-40B4-BE49-F238E27FC236}">
+                <a16:creationId xmlns:a16="http://schemas.microsoft.com/office/drawing/2014/main" id="{59012971-918C-39E7-CE63-3FF569ECFDA2}"/>
+              </a:ext>
+            </a:extLst>
+          </p:cNvPr>
+          <p:cNvCxnSpPr>
+            <a:cxnSpLocks/>
+            <a:stCxn id="160" idx="0"/>
+            <a:endCxn id="53" idx="2"/>
+          </p:cNvCxnSpPr>
+          <p:nvPr/>
+        </p:nvCxnSpPr>
+        <p:spPr>
+          <a:xfrm flipH="1" flipV="1">
+            <a:off x="1848677" y="2470482"/>
+            <a:ext cx="1" cy="263950"/>
+          </a:xfrm>
+          <a:prstGeom prst="straightConnector1">
+            <a:avLst/>
+          </a:prstGeom>
+          <a:ln w="9525">
+            <a:solidFill>
+              <a:schemeClr val="tx1"/>
+            </a:solidFill>
+            <a:headEnd type="triangle"/>
+            <a:tailEnd type="triangle"/>
+          </a:ln>
+          <a:effectLst>
+            <a:outerShdw blurRad="63500" sx="102000" sy="102000" algn="ctr" rotWithShape="0">
+              <a:prstClr val="black">
+                <a:alpha val="40000"/>
+              </a:prstClr>
+            </a:outerShdw>
+          </a:effectLst>
+        </p:spPr>
+        <p:style>
+          <a:lnRef idx="1">
+            <a:schemeClr val="accent1"/>
+          </a:lnRef>
+          <a:fillRef idx="0">
+            <a:schemeClr val="accent1"/>
+          </a:fillRef>
+          <a:effectRef idx="0">
+            <a:schemeClr val="accent1"/>
+          </a:effectRef>
+          <a:fontRef idx="minor">
+            <a:schemeClr val="tx1"/>
+          </a:fontRef>
+        </p:style>
+      </p:cxnSp>
+      <p:cxnSp>
+        <p:nvCxnSpPr>
+          <p:cNvPr id="178" name="Connector: Elbow 177">
+            <a:extLst>
+              <a:ext uri="{FF2B5EF4-FFF2-40B4-BE49-F238E27FC236}">
+                <a16:creationId xmlns:a16="http://schemas.microsoft.com/office/drawing/2014/main" id="{26376437-534A-A16E-6711-D27AC44A27CC}"/>
+              </a:ext>
+            </a:extLst>
+          </p:cNvPr>
+          <p:cNvCxnSpPr>
+            <a:cxnSpLocks/>
+            <a:stCxn id="6" idx="1"/>
+            <a:endCxn id="10" idx="3"/>
+          </p:cNvCxnSpPr>
+          <p:nvPr/>
+        </p:nvCxnSpPr>
+        <p:spPr>
+          <a:xfrm rot="10800000">
+            <a:off x="3837571" y="1927827"/>
+            <a:ext cx="1962381" cy="1"/>
+          </a:xfrm>
+          <a:prstGeom prst="bentConnector3">
+            <a:avLst>
+              <a:gd name="adj1" fmla="val 50000"/>
+            </a:avLst>
+          </a:prstGeom>
+          <a:ln w="9525">
+            <a:solidFill>
+              <a:schemeClr val="tx1"/>
+            </a:solidFill>
+            <a:headEnd type="triangle"/>
+            <a:tailEnd type="triangle"/>
+          </a:ln>
+        </p:spPr>
+        <p:style>
+          <a:lnRef idx="1">
+            <a:schemeClr val="accent1"/>
+          </a:lnRef>
+          <a:fillRef idx="0">
+            <a:schemeClr val="accent1"/>
+          </a:fillRef>
+          <a:effectRef idx="0">
+            <a:schemeClr val="accent1"/>
+          </a:effectRef>
+          <a:fontRef idx="minor">
+            <a:schemeClr val="tx1"/>
+          </a:fontRef>
+        </p:style>
+      </p:cxnSp>
     </p:spTree>
     <p:extLst>
       <p:ext uri="{BB962C8B-B14F-4D97-AF65-F5344CB8AC3E}">
@@ -4159,20 +5485,20 @@
 </file>
 
 <file path=customXml/item2.xml><?xml version="1.0" encoding="utf-8"?>
+<p:properties xmlns:p="http://schemas.microsoft.com/office/2006/metadata/properties" xmlns:xsi="http://www.w3.org/2001/XMLSchema-instance" xmlns:pc="http://schemas.microsoft.com/office/infopath/2007/PartnerControls">
+  <documentManagement>
+    <_activity xmlns="b9c0df90-6177-490c-b060-567d6533c817" xsi:nil="true"/>
+  </documentManagement>
+</p:properties>
+</file>
+
+<file path=customXml/item3.xml><?xml version="1.0" encoding="utf-8"?>
 <?mso-contentType ?>
 <FormTemplates xmlns="http://schemas.microsoft.com/sharepoint/v3/contenttype/forms">
   <Display>DocumentLibraryForm</Display>
   <Edit>DocumentLibraryForm</Edit>
   <New>DocumentLibraryForm</New>
 </FormTemplates>
-</file>
-
-<file path=customXml/item3.xml><?xml version="1.0" encoding="utf-8"?>
-<p:properties xmlns:p="http://schemas.microsoft.com/office/2006/metadata/properties" xmlns:xsi="http://www.w3.org/2001/XMLSchema-instance" xmlns:pc="http://schemas.microsoft.com/office/infopath/2007/PartnerControls">
-  <documentManagement>
-    <_activity xmlns="b9c0df90-6177-490c-b060-567d6533c817" xsi:nil="true"/>
-  </documentManagement>
-</p:properties>
 </file>
 
 <file path=customXml/itemProps1.xml><?xml version="1.0" encoding="utf-8"?>
@@ -4195,14 +5521,6 @@
 </file>
 
 <file path=customXml/itemProps2.xml><?xml version="1.0" encoding="utf-8"?>
-<ds:datastoreItem xmlns:ds="http://schemas.openxmlformats.org/officeDocument/2006/customXml" ds:itemID="{86A9A6AE-A2D2-4466-B053-FEAA2AECCDAE}">
-  <ds:schemaRefs>
-    <ds:schemaRef ds:uri="http://schemas.microsoft.com/sharepoint/v3/contenttype/forms"/>
-  </ds:schemaRefs>
-</ds:datastoreItem>
-</file>
-
-<file path=customXml/itemProps3.xml><?xml version="1.0" encoding="utf-8"?>
 <ds:datastoreItem xmlns:ds="http://schemas.openxmlformats.org/officeDocument/2006/customXml" ds:itemID="{0988BE9C-0C90-420C-9DA9-636C0435E5D7}">
   <ds:schemaRefs>
     <ds:schemaRef ds:uri="http://schemas.microsoft.com/office/2006/documentManagement/types"/>
@@ -4219,6 +5537,14 @@
 </ds:datastoreItem>
 </file>
 
+<file path=customXml/itemProps3.xml><?xml version="1.0" encoding="utf-8"?>
+<ds:datastoreItem xmlns:ds="http://schemas.openxmlformats.org/officeDocument/2006/customXml" ds:itemID="{86A9A6AE-A2D2-4466-B053-FEAA2AECCDAE}">
+  <ds:schemaRefs>
+    <ds:schemaRef ds:uri="http://schemas.microsoft.com/sharepoint/v3/contenttype/forms"/>
+  </ds:schemaRefs>
+</ds:datastoreItem>
+</file>
+
 <file path=docMetadata/LabelInfo.xml><?xml version="1.0" encoding="utf-8"?>
 <clbl:labelList xmlns:clbl="http://schemas.microsoft.com/office/2020/mipLabelMetadata">
   <clbl:label id="{46c98d88-e344-4ed4-8496-4ed7712e255d}" enabled="0" method="" siteId="{46c98d88-e344-4ed4-8496-4ed7712e255d}" removed="1"/>

</xml_diff>

<commit_message>
[Doc] Add archtecture of GPT-Agents
</commit_message>
<xml_diff>
--- a/examples/architecture.pptx
+++ b/examples/architecture.pptx
@@ -4,8 +4,12 @@
   <p:sldMasterIdLst>
     <p:sldMasterId id="2147483648" r:id="rId4"/>
   </p:sldMasterIdLst>
+  <p:notesMasterIdLst>
+    <p:notesMasterId r:id="rId7"/>
+  </p:notesMasterIdLst>
   <p:sldIdLst>
     <p:sldId id="256" r:id="rId5"/>
+    <p:sldId id="257" r:id="rId6"/>
   </p:sldIdLst>
   <p:sldSz cx="12192000" cy="6858000"/>
   <p:notesSz cx="6858000" cy="9144000"/>
@@ -118,6 +122,537 @@
     <p1510:client id="{271FA621-A9EC-49AE-9150-8878CB3EDBD2}" v="3" dt="2023-07-20T13:15:05.981"/>
   </p1510:revLst>
 </p1510:revInfo>
+</file>
+
+<file path=ppt/notesMasters/notesMaster1.xml><?xml version="1.0" encoding="utf-8"?>
+<p:notesMaster xmlns:a="http://schemas.openxmlformats.org/drawingml/2006/main" xmlns:r="http://schemas.openxmlformats.org/officeDocument/2006/relationships" xmlns:p="http://schemas.openxmlformats.org/presentationml/2006/main">
+  <p:cSld>
+    <p:bg>
+      <p:bgRef idx="1001">
+        <a:schemeClr val="bg1"/>
+      </p:bgRef>
+    </p:bg>
+    <p:spTree>
+      <p:nvGrpSpPr>
+        <p:cNvPr id="1" name=""/>
+        <p:cNvGrpSpPr/>
+        <p:nvPr/>
+      </p:nvGrpSpPr>
+      <p:grpSpPr>
+        <a:xfrm>
+          <a:off x="0" y="0"/>
+          <a:ext cx="0" cy="0"/>
+          <a:chOff x="0" y="0"/>
+          <a:chExt cx="0" cy="0"/>
+        </a:xfrm>
+      </p:grpSpPr>
+      <p:sp>
+        <p:nvSpPr>
+          <p:cNvPr id="2" name="Header Placeholder 1"/>
+          <p:cNvSpPr>
+            <a:spLocks noGrp="1"/>
+          </p:cNvSpPr>
+          <p:nvPr>
+            <p:ph type="hdr" sz="quarter"/>
+          </p:nvPr>
+        </p:nvSpPr>
+        <p:spPr>
+          <a:xfrm>
+            <a:off x="0" y="0"/>
+            <a:ext cx="2971800" cy="458788"/>
+          </a:xfrm>
+          <a:prstGeom prst="rect">
+            <a:avLst/>
+          </a:prstGeom>
+        </p:spPr>
+        <p:txBody>
+          <a:bodyPr vert="horz" lIns="91440" tIns="45720" rIns="91440" bIns="45720" rtlCol="0"/>
+          <a:lstStyle>
+            <a:lvl1pPr algn="l">
+              <a:defRPr sz="1200"/>
+            </a:lvl1pPr>
+          </a:lstStyle>
+          <a:p>
+            <a:endParaRPr lang="en-US"/>
+          </a:p>
+        </p:txBody>
+      </p:sp>
+      <p:sp>
+        <p:nvSpPr>
+          <p:cNvPr id="3" name="Date Placeholder 2"/>
+          <p:cNvSpPr>
+            <a:spLocks noGrp="1"/>
+          </p:cNvSpPr>
+          <p:nvPr>
+            <p:ph type="dt" idx="1"/>
+          </p:nvPr>
+        </p:nvSpPr>
+        <p:spPr>
+          <a:xfrm>
+            <a:off x="3884613" y="0"/>
+            <a:ext cx="2971800" cy="458788"/>
+          </a:xfrm>
+          <a:prstGeom prst="rect">
+            <a:avLst/>
+          </a:prstGeom>
+        </p:spPr>
+        <p:txBody>
+          <a:bodyPr vert="horz" lIns="91440" tIns="45720" rIns="91440" bIns="45720" rtlCol="0"/>
+          <a:lstStyle>
+            <a:lvl1pPr algn="r">
+              <a:defRPr sz="1200"/>
+            </a:lvl1pPr>
+          </a:lstStyle>
+          <a:p>
+            <a:fld id="{4CD64836-4BF9-4E6C-A54C-E76D3002B5D8}" type="datetimeFigureOut">
+              <a:rPr lang="en-US" smtClean="0"/>
+              <a:t>07/21/2023</a:t>
+            </a:fld>
+            <a:endParaRPr lang="en-US"/>
+          </a:p>
+        </p:txBody>
+      </p:sp>
+      <p:sp>
+        <p:nvSpPr>
+          <p:cNvPr id="4" name="Slide Image Placeholder 3"/>
+          <p:cNvSpPr>
+            <a:spLocks noGrp="1" noRot="1" noChangeAspect="1"/>
+          </p:cNvSpPr>
+          <p:nvPr>
+            <p:ph type="sldImg" idx="2"/>
+          </p:nvPr>
+        </p:nvSpPr>
+        <p:spPr>
+          <a:xfrm>
+            <a:off x="685800" y="1143000"/>
+            <a:ext cx="5486400" cy="3086100"/>
+          </a:xfrm>
+          <a:prstGeom prst="rect">
+            <a:avLst/>
+          </a:prstGeom>
+          <a:noFill/>
+          <a:ln w="12700">
+            <a:solidFill>
+              <a:prstClr val="black"/>
+            </a:solidFill>
+          </a:ln>
+        </p:spPr>
+        <p:txBody>
+          <a:bodyPr vert="horz" lIns="91440" tIns="45720" rIns="91440" bIns="45720" rtlCol="0" anchor="ctr"/>
+          <a:lstStyle/>
+          <a:p>
+            <a:endParaRPr lang="en-US"/>
+          </a:p>
+        </p:txBody>
+      </p:sp>
+      <p:sp>
+        <p:nvSpPr>
+          <p:cNvPr id="5" name="Notes Placeholder 4"/>
+          <p:cNvSpPr>
+            <a:spLocks noGrp="1"/>
+          </p:cNvSpPr>
+          <p:nvPr>
+            <p:ph type="body" sz="quarter" idx="3"/>
+          </p:nvPr>
+        </p:nvSpPr>
+        <p:spPr>
+          <a:xfrm>
+            <a:off x="685800" y="4400550"/>
+            <a:ext cx="5486400" cy="3600450"/>
+          </a:xfrm>
+          <a:prstGeom prst="rect">
+            <a:avLst/>
+          </a:prstGeom>
+        </p:spPr>
+        <p:txBody>
+          <a:bodyPr vert="horz" lIns="91440" tIns="45720" rIns="91440" bIns="45720" rtlCol="0"/>
+          <a:lstStyle/>
+          <a:p>
+            <a:pPr lvl="0"/>
+            <a:r>
+              <a:rPr lang="en-US"/>
+              <a:t>Click to edit Master text styles</a:t>
+            </a:r>
+          </a:p>
+          <a:p>
+            <a:pPr lvl="1"/>
+            <a:r>
+              <a:rPr lang="en-US"/>
+              <a:t>Second level</a:t>
+            </a:r>
+          </a:p>
+          <a:p>
+            <a:pPr lvl="2"/>
+            <a:r>
+              <a:rPr lang="en-US"/>
+              <a:t>Third level</a:t>
+            </a:r>
+          </a:p>
+          <a:p>
+            <a:pPr lvl="3"/>
+            <a:r>
+              <a:rPr lang="en-US"/>
+              <a:t>Fourth level</a:t>
+            </a:r>
+          </a:p>
+          <a:p>
+            <a:pPr lvl="4"/>
+            <a:r>
+              <a:rPr lang="en-US"/>
+              <a:t>Fifth level</a:t>
+            </a:r>
+          </a:p>
+        </p:txBody>
+      </p:sp>
+      <p:sp>
+        <p:nvSpPr>
+          <p:cNvPr id="6" name="Footer Placeholder 5"/>
+          <p:cNvSpPr>
+            <a:spLocks noGrp="1"/>
+          </p:cNvSpPr>
+          <p:nvPr>
+            <p:ph type="ftr" sz="quarter" idx="4"/>
+          </p:nvPr>
+        </p:nvSpPr>
+        <p:spPr>
+          <a:xfrm>
+            <a:off x="0" y="8685213"/>
+            <a:ext cx="2971800" cy="458787"/>
+          </a:xfrm>
+          <a:prstGeom prst="rect">
+            <a:avLst/>
+          </a:prstGeom>
+        </p:spPr>
+        <p:txBody>
+          <a:bodyPr vert="horz" lIns="91440" tIns="45720" rIns="91440" bIns="45720" rtlCol="0" anchor="b"/>
+          <a:lstStyle>
+            <a:lvl1pPr algn="l">
+              <a:defRPr sz="1200"/>
+            </a:lvl1pPr>
+          </a:lstStyle>
+          <a:p>
+            <a:endParaRPr lang="en-US"/>
+          </a:p>
+        </p:txBody>
+      </p:sp>
+      <p:sp>
+        <p:nvSpPr>
+          <p:cNvPr id="7" name="Slide Number Placeholder 6"/>
+          <p:cNvSpPr>
+            <a:spLocks noGrp="1"/>
+          </p:cNvSpPr>
+          <p:nvPr>
+            <p:ph type="sldNum" sz="quarter" idx="5"/>
+          </p:nvPr>
+        </p:nvSpPr>
+        <p:spPr>
+          <a:xfrm>
+            <a:off x="3884613" y="8685213"/>
+            <a:ext cx="2971800" cy="458787"/>
+          </a:xfrm>
+          <a:prstGeom prst="rect">
+            <a:avLst/>
+          </a:prstGeom>
+        </p:spPr>
+        <p:txBody>
+          <a:bodyPr vert="horz" lIns="91440" tIns="45720" rIns="91440" bIns="45720" rtlCol="0" anchor="b"/>
+          <a:lstStyle>
+            <a:lvl1pPr algn="r">
+              <a:defRPr sz="1200"/>
+            </a:lvl1pPr>
+          </a:lstStyle>
+          <a:p>
+            <a:fld id="{D537CB0D-FD8F-437B-8EA1-4310BDC2B6BC}" type="slidenum">
+              <a:rPr lang="en-US" smtClean="0"/>
+              <a:t>‹#›</a:t>
+            </a:fld>
+            <a:endParaRPr lang="en-US"/>
+          </a:p>
+        </p:txBody>
+      </p:sp>
+    </p:spTree>
+    <p:extLst>
+      <p:ext uri="{BB962C8B-B14F-4D97-AF65-F5344CB8AC3E}">
+        <p14:creationId xmlns:p14="http://schemas.microsoft.com/office/powerpoint/2010/main" val="3205400777"/>
+      </p:ext>
+    </p:extLst>
+  </p:cSld>
+  <p:clrMap bg1="lt1" tx1="dk1" bg2="lt2" tx2="dk2" accent1="accent1" accent2="accent2" accent3="accent3" accent4="accent4" accent5="accent5" accent6="accent6" hlink="hlink" folHlink="folHlink"/>
+  <p:notesStyle>
+    <a:lvl1pPr marL="0" algn="l" defTabSz="914400" rtl="0" eaLnBrk="1" latinLnBrk="0" hangingPunct="1">
+      <a:defRPr sz="1200" kern="1200">
+        <a:solidFill>
+          <a:schemeClr val="tx1"/>
+        </a:solidFill>
+        <a:latin typeface="+mn-lt"/>
+        <a:ea typeface="+mn-ea"/>
+        <a:cs typeface="+mn-cs"/>
+      </a:defRPr>
+    </a:lvl1pPr>
+    <a:lvl2pPr marL="457200" algn="l" defTabSz="914400" rtl="0" eaLnBrk="1" latinLnBrk="0" hangingPunct="1">
+      <a:defRPr sz="1200" kern="1200">
+        <a:solidFill>
+          <a:schemeClr val="tx1"/>
+        </a:solidFill>
+        <a:latin typeface="+mn-lt"/>
+        <a:ea typeface="+mn-ea"/>
+        <a:cs typeface="+mn-cs"/>
+      </a:defRPr>
+    </a:lvl2pPr>
+    <a:lvl3pPr marL="914400" algn="l" defTabSz="914400" rtl="0" eaLnBrk="1" latinLnBrk="0" hangingPunct="1">
+      <a:defRPr sz="1200" kern="1200">
+        <a:solidFill>
+          <a:schemeClr val="tx1"/>
+        </a:solidFill>
+        <a:latin typeface="+mn-lt"/>
+        <a:ea typeface="+mn-ea"/>
+        <a:cs typeface="+mn-cs"/>
+      </a:defRPr>
+    </a:lvl3pPr>
+    <a:lvl4pPr marL="1371600" algn="l" defTabSz="914400" rtl="0" eaLnBrk="1" latinLnBrk="0" hangingPunct="1">
+      <a:defRPr sz="1200" kern="1200">
+        <a:solidFill>
+          <a:schemeClr val="tx1"/>
+        </a:solidFill>
+        <a:latin typeface="+mn-lt"/>
+        <a:ea typeface="+mn-ea"/>
+        <a:cs typeface="+mn-cs"/>
+      </a:defRPr>
+    </a:lvl4pPr>
+    <a:lvl5pPr marL="1828800" algn="l" defTabSz="914400" rtl="0" eaLnBrk="1" latinLnBrk="0" hangingPunct="1">
+      <a:defRPr sz="1200" kern="1200">
+        <a:solidFill>
+          <a:schemeClr val="tx1"/>
+        </a:solidFill>
+        <a:latin typeface="+mn-lt"/>
+        <a:ea typeface="+mn-ea"/>
+        <a:cs typeface="+mn-cs"/>
+      </a:defRPr>
+    </a:lvl5pPr>
+    <a:lvl6pPr marL="2286000" algn="l" defTabSz="914400" rtl="0" eaLnBrk="1" latinLnBrk="0" hangingPunct="1">
+      <a:defRPr sz="1200" kern="1200">
+        <a:solidFill>
+          <a:schemeClr val="tx1"/>
+        </a:solidFill>
+        <a:latin typeface="+mn-lt"/>
+        <a:ea typeface="+mn-ea"/>
+        <a:cs typeface="+mn-cs"/>
+      </a:defRPr>
+    </a:lvl6pPr>
+    <a:lvl7pPr marL="2743200" algn="l" defTabSz="914400" rtl="0" eaLnBrk="1" latinLnBrk="0" hangingPunct="1">
+      <a:defRPr sz="1200" kern="1200">
+        <a:solidFill>
+          <a:schemeClr val="tx1"/>
+        </a:solidFill>
+        <a:latin typeface="+mn-lt"/>
+        <a:ea typeface="+mn-ea"/>
+        <a:cs typeface="+mn-cs"/>
+      </a:defRPr>
+    </a:lvl7pPr>
+    <a:lvl8pPr marL="3200400" algn="l" defTabSz="914400" rtl="0" eaLnBrk="1" latinLnBrk="0" hangingPunct="1">
+      <a:defRPr sz="1200" kern="1200">
+        <a:solidFill>
+          <a:schemeClr val="tx1"/>
+        </a:solidFill>
+        <a:latin typeface="+mn-lt"/>
+        <a:ea typeface="+mn-ea"/>
+        <a:cs typeface="+mn-cs"/>
+      </a:defRPr>
+    </a:lvl8pPr>
+    <a:lvl9pPr marL="3657600" algn="l" defTabSz="914400" rtl="0" eaLnBrk="1" latinLnBrk="0" hangingPunct="1">
+      <a:defRPr sz="1200" kern="1200">
+        <a:solidFill>
+          <a:schemeClr val="tx1"/>
+        </a:solidFill>
+        <a:latin typeface="+mn-lt"/>
+        <a:ea typeface="+mn-ea"/>
+        <a:cs typeface="+mn-cs"/>
+      </a:defRPr>
+    </a:lvl9pPr>
+  </p:notesStyle>
+</p:notesMaster>
+</file>
+
+<file path=ppt/notesSlides/notesSlide1.xml><?xml version="1.0" encoding="utf-8"?>
+<p:notes xmlns:a="http://schemas.openxmlformats.org/drawingml/2006/main" xmlns:r="http://schemas.openxmlformats.org/officeDocument/2006/relationships" xmlns:p="http://schemas.openxmlformats.org/presentationml/2006/main">
+  <p:cSld>
+    <p:spTree>
+      <p:nvGrpSpPr>
+        <p:cNvPr id="1" name=""/>
+        <p:cNvGrpSpPr/>
+        <p:nvPr/>
+      </p:nvGrpSpPr>
+      <p:grpSpPr>
+        <a:xfrm>
+          <a:off x="0" y="0"/>
+          <a:ext cx="0" cy="0"/>
+          <a:chOff x="0" y="0"/>
+          <a:chExt cx="0" cy="0"/>
+        </a:xfrm>
+      </p:grpSpPr>
+      <p:sp>
+        <p:nvSpPr>
+          <p:cNvPr id="2" name="Slide Image Placeholder 1"/>
+          <p:cNvSpPr>
+            <a:spLocks noGrp="1" noRot="1" noChangeAspect="1"/>
+          </p:cNvSpPr>
+          <p:nvPr>
+            <p:ph type="sldImg"/>
+          </p:nvPr>
+        </p:nvSpPr>
+        <p:spPr/>
+      </p:sp>
+      <p:sp>
+        <p:nvSpPr>
+          <p:cNvPr id="3" name="Notes Placeholder 2"/>
+          <p:cNvSpPr>
+            <a:spLocks noGrp="1"/>
+          </p:cNvSpPr>
+          <p:nvPr>
+            <p:ph type="body" idx="1"/>
+          </p:nvPr>
+        </p:nvSpPr>
+        <p:spPr/>
+        <p:txBody>
+          <a:bodyPr/>
+          <a:lstStyle/>
+          <a:p>
+            <a:r>
+              <a:rPr lang="en-US" dirty="0"/>
+              <a:t>Architecture of GPT-</a:t>
+            </a:r>
+            <a:r>
+              <a:rPr lang="en-US" dirty="0" err="1"/>
+              <a:t>WebUI</a:t>
+            </a:r>
+            <a:r>
+              <a:rPr lang="en-US" dirty="0"/>
+              <a:t> + GPT-Agents + MongoDB</a:t>
+            </a:r>
+          </a:p>
+        </p:txBody>
+      </p:sp>
+      <p:sp>
+        <p:nvSpPr>
+          <p:cNvPr id="4" name="Slide Number Placeholder 3"/>
+          <p:cNvSpPr>
+            <a:spLocks noGrp="1"/>
+          </p:cNvSpPr>
+          <p:nvPr>
+            <p:ph type="sldNum" sz="quarter" idx="5"/>
+          </p:nvPr>
+        </p:nvSpPr>
+        <p:spPr/>
+        <p:txBody>
+          <a:bodyPr/>
+          <a:lstStyle/>
+          <a:p>
+            <a:fld id="{D537CB0D-FD8F-437B-8EA1-4310BDC2B6BC}" type="slidenum">
+              <a:rPr lang="en-US" smtClean="0"/>
+              <a:t>1</a:t>
+            </a:fld>
+            <a:endParaRPr lang="en-US"/>
+          </a:p>
+        </p:txBody>
+      </p:sp>
+    </p:spTree>
+    <p:extLst>
+      <p:ext uri="{BB962C8B-B14F-4D97-AF65-F5344CB8AC3E}">
+        <p14:creationId xmlns:p14="http://schemas.microsoft.com/office/powerpoint/2010/main" val="2085464243"/>
+      </p:ext>
+    </p:extLst>
+  </p:cSld>
+  <p:clrMapOvr>
+    <a:masterClrMapping/>
+  </p:clrMapOvr>
+</p:notes>
+</file>
+
+<file path=ppt/notesSlides/notesSlide2.xml><?xml version="1.0" encoding="utf-8"?>
+<p:notes xmlns:a="http://schemas.openxmlformats.org/drawingml/2006/main" xmlns:r="http://schemas.openxmlformats.org/officeDocument/2006/relationships" xmlns:p="http://schemas.openxmlformats.org/presentationml/2006/main">
+  <p:cSld>
+    <p:spTree>
+      <p:nvGrpSpPr>
+        <p:cNvPr id="1" name=""/>
+        <p:cNvGrpSpPr/>
+        <p:nvPr/>
+      </p:nvGrpSpPr>
+      <p:grpSpPr>
+        <a:xfrm>
+          <a:off x="0" y="0"/>
+          <a:ext cx="0" cy="0"/>
+          <a:chOff x="0" y="0"/>
+          <a:chExt cx="0" cy="0"/>
+        </a:xfrm>
+      </p:grpSpPr>
+      <p:sp>
+        <p:nvSpPr>
+          <p:cNvPr id="2" name="Slide Image Placeholder 1"/>
+          <p:cNvSpPr>
+            <a:spLocks noGrp="1" noRot="1" noChangeAspect="1"/>
+          </p:cNvSpPr>
+          <p:nvPr>
+            <p:ph type="sldImg"/>
+          </p:nvPr>
+        </p:nvSpPr>
+        <p:spPr/>
+      </p:sp>
+      <p:sp>
+        <p:nvSpPr>
+          <p:cNvPr id="3" name="Notes Placeholder 2"/>
+          <p:cNvSpPr>
+            <a:spLocks noGrp="1"/>
+          </p:cNvSpPr>
+          <p:nvPr>
+            <p:ph type="body" idx="1"/>
+          </p:nvPr>
+        </p:nvSpPr>
+        <p:spPr/>
+        <p:txBody>
+          <a:bodyPr/>
+          <a:lstStyle/>
+          <a:p>
+            <a:r>
+              <a:rPr lang="en-US" dirty="0"/>
+              <a:t>GPT-Agents</a:t>
+            </a:r>
+          </a:p>
+        </p:txBody>
+      </p:sp>
+      <p:sp>
+        <p:nvSpPr>
+          <p:cNvPr id="4" name="Slide Number Placeholder 3"/>
+          <p:cNvSpPr>
+            <a:spLocks noGrp="1"/>
+          </p:cNvSpPr>
+          <p:nvPr>
+            <p:ph type="sldNum" sz="quarter" idx="5"/>
+          </p:nvPr>
+        </p:nvSpPr>
+        <p:spPr/>
+        <p:txBody>
+          <a:bodyPr/>
+          <a:lstStyle/>
+          <a:p>
+            <a:fld id="{D537CB0D-FD8F-437B-8EA1-4310BDC2B6BC}" type="slidenum">
+              <a:rPr lang="en-US" smtClean="0"/>
+              <a:t>2</a:t>
+            </a:fld>
+            <a:endParaRPr lang="en-US"/>
+          </a:p>
+        </p:txBody>
+      </p:sp>
+    </p:spTree>
+    <p:extLst>
+      <p:ext uri="{BB962C8B-B14F-4D97-AF65-F5344CB8AC3E}">
+        <p14:creationId xmlns:p14="http://schemas.microsoft.com/office/powerpoint/2010/main" val="3235507340"/>
+      </p:ext>
+    </p:extLst>
+  </p:cSld>
+  <p:clrMapOvr>
+    <a:masterClrMapping/>
+  </p:clrMapOvr>
+</p:notes>
 </file>
 
 <file path=ppt/slideLayouts/slideLayout1.xml><?xml version="1.0" encoding="utf-8"?>
@@ -4954,7 +5489,1871 @@
 </p:sld>
 </file>
 
+<file path=ppt/slides/slide2.xml><?xml version="1.0" encoding="utf-8"?>
+<p:sld xmlns:a="http://schemas.openxmlformats.org/drawingml/2006/main" xmlns:r="http://schemas.openxmlformats.org/officeDocument/2006/relationships" xmlns:p="http://schemas.openxmlformats.org/presentationml/2006/main">
+  <p:cSld>
+    <p:spTree>
+      <p:nvGrpSpPr>
+        <p:cNvPr id="1" name=""/>
+        <p:cNvGrpSpPr/>
+        <p:nvPr/>
+      </p:nvGrpSpPr>
+      <p:grpSpPr>
+        <a:xfrm>
+          <a:off x="0" y="0"/>
+          <a:ext cx="0" cy="0"/>
+          <a:chOff x="0" y="0"/>
+          <a:chExt cx="0" cy="0"/>
+        </a:xfrm>
+      </p:grpSpPr>
+      <p:sp>
+        <p:nvSpPr>
+          <p:cNvPr id="4" name="Rectangle 3">
+            <a:extLst>
+              <a:ext uri="{FF2B5EF4-FFF2-40B4-BE49-F238E27FC236}">
+                <a16:creationId xmlns:a16="http://schemas.microsoft.com/office/drawing/2014/main" id="{44402ADA-9BD3-F8A5-3A13-F439AF70C28F}"/>
+              </a:ext>
+            </a:extLst>
+          </p:cNvPr>
+          <p:cNvSpPr/>
+          <p:nvPr/>
+        </p:nvSpPr>
+        <p:spPr>
+          <a:xfrm>
+            <a:off x="1324302" y="437981"/>
+            <a:ext cx="9006472" cy="5816904"/>
+          </a:xfrm>
+          <a:prstGeom prst="rect">
+            <a:avLst/>
+          </a:prstGeom>
+          <a:solidFill>
+            <a:schemeClr val="accent6">
+              <a:lumMod val="20000"/>
+              <a:lumOff val="80000"/>
+            </a:schemeClr>
+          </a:solidFill>
+          <a:ln>
+            <a:solidFill>
+              <a:schemeClr val="tx1"/>
+            </a:solidFill>
+          </a:ln>
+          <a:effectLst>
+            <a:glow rad="101600">
+              <a:schemeClr val="accent3">
+                <a:satMod val="175000"/>
+                <a:alpha val="40000"/>
+              </a:schemeClr>
+            </a:glow>
+          </a:effectLst>
+        </p:spPr>
+        <p:style>
+          <a:lnRef idx="2">
+            <a:schemeClr val="accent1">
+              <a:shade val="50000"/>
+            </a:schemeClr>
+          </a:lnRef>
+          <a:fillRef idx="1">
+            <a:schemeClr val="accent1"/>
+          </a:fillRef>
+          <a:effectRef idx="0">
+            <a:schemeClr val="accent1"/>
+          </a:effectRef>
+          <a:fontRef idx="minor">
+            <a:schemeClr val="lt1"/>
+          </a:fontRef>
+        </p:style>
+        <p:txBody>
+          <a:bodyPr rtlCol="0" anchor="b" anchorCtr="0"/>
+          <a:lstStyle/>
+          <a:p>
+            <a:pPr algn="ctr"/>
+            <a:r>
+              <a:rPr lang="en-US" sz="1600" b="1" dirty="0">
+                <a:solidFill>
+                  <a:schemeClr val="tx1"/>
+                </a:solidFill>
+                <a:latin typeface="LXGW WenKai" panose="02020500000000000000" pitchFamily="18" charset="-120"/>
+                <a:ea typeface="LXGW WenKai" panose="02020500000000000000" pitchFamily="18" charset="-120"/>
+              </a:rPr>
+              <a:t>GPT-Agents</a:t>
+            </a:r>
+          </a:p>
+        </p:txBody>
+      </p:sp>
+      <p:sp>
+        <p:nvSpPr>
+          <p:cNvPr id="18" name="Rectangle 17">
+            <a:extLst>
+              <a:ext uri="{FF2B5EF4-FFF2-40B4-BE49-F238E27FC236}">
+                <a16:creationId xmlns:a16="http://schemas.microsoft.com/office/drawing/2014/main" id="{F9A13DD8-1A1B-732F-88E4-101524D7E147}"/>
+              </a:ext>
+            </a:extLst>
+          </p:cNvPr>
+          <p:cNvSpPr/>
+          <p:nvPr/>
+        </p:nvSpPr>
+        <p:spPr>
+          <a:xfrm>
+            <a:off x="9312051" y="5767188"/>
+            <a:ext cx="848209" cy="308049"/>
+          </a:xfrm>
+          <a:prstGeom prst="rect">
+            <a:avLst/>
+          </a:prstGeom>
+          <a:solidFill>
+            <a:schemeClr val="accent2">
+              <a:lumMod val="20000"/>
+              <a:lumOff val="80000"/>
+            </a:schemeClr>
+          </a:solidFill>
+          <a:ln>
+            <a:solidFill>
+              <a:schemeClr val="tx1"/>
+            </a:solidFill>
+            <a:prstDash val="dash"/>
+          </a:ln>
+        </p:spPr>
+        <p:style>
+          <a:lnRef idx="2">
+            <a:schemeClr val="accent1">
+              <a:shade val="50000"/>
+            </a:schemeClr>
+          </a:lnRef>
+          <a:fillRef idx="1">
+            <a:schemeClr val="accent1"/>
+          </a:fillRef>
+          <a:effectRef idx="0">
+            <a:schemeClr val="accent1"/>
+          </a:effectRef>
+          <a:fontRef idx="minor">
+            <a:schemeClr val="lt1"/>
+          </a:fontRef>
+        </p:style>
+        <p:txBody>
+          <a:bodyPr rtlCol="0" anchor="ctr" anchorCtr="1"/>
+          <a:lstStyle/>
+          <a:p>
+            <a:pPr algn="ctr"/>
+            <a:r>
+              <a:rPr lang="en-US" sz="1100" dirty="0">
+                <a:solidFill>
+                  <a:schemeClr val="tx1"/>
+                </a:solidFill>
+                <a:latin typeface="LXGW WenKai" panose="02020500000000000000" pitchFamily="18" charset="-120"/>
+                <a:ea typeface="LXGW WenKai" panose="02020500000000000000" pitchFamily="18" charset="-120"/>
+              </a:rPr>
+              <a:t>Manager</a:t>
+            </a:r>
+          </a:p>
+        </p:txBody>
+      </p:sp>
+      <p:sp>
+        <p:nvSpPr>
+          <p:cNvPr id="50" name="Rectangle 49">
+            <a:extLst>
+              <a:ext uri="{FF2B5EF4-FFF2-40B4-BE49-F238E27FC236}">
+                <a16:creationId xmlns:a16="http://schemas.microsoft.com/office/drawing/2014/main" id="{8BBD062D-3932-D5F7-67F9-E142136EB013}"/>
+              </a:ext>
+            </a:extLst>
+          </p:cNvPr>
+          <p:cNvSpPr/>
+          <p:nvPr/>
+        </p:nvSpPr>
+        <p:spPr>
+          <a:xfrm>
+            <a:off x="1906621" y="807396"/>
+            <a:ext cx="6177064" cy="4189691"/>
+          </a:xfrm>
+          <a:prstGeom prst="rect">
+            <a:avLst/>
+          </a:prstGeom>
+          <a:solidFill>
+            <a:schemeClr val="accent2">
+              <a:lumMod val="20000"/>
+              <a:lumOff val="80000"/>
+            </a:schemeClr>
+          </a:solidFill>
+          <a:ln>
+            <a:solidFill>
+              <a:schemeClr val="tx1"/>
+            </a:solidFill>
+          </a:ln>
+        </p:spPr>
+        <p:style>
+          <a:lnRef idx="2">
+            <a:schemeClr val="accent1">
+              <a:shade val="50000"/>
+            </a:schemeClr>
+          </a:lnRef>
+          <a:fillRef idx="1">
+            <a:schemeClr val="accent1"/>
+          </a:fillRef>
+          <a:effectRef idx="0">
+            <a:schemeClr val="accent1"/>
+          </a:effectRef>
+          <a:fontRef idx="minor">
+            <a:schemeClr val="lt1"/>
+          </a:fontRef>
+        </p:style>
+        <p:txBody>
+          <a:bodyPr rtlCol="0" anchor="b" anchorCtr="0"/>
+          <a:lstStyle/>
+          <a:p>
+            <a:pPr algn="ctr"/>
+            <a:r>
+              <a:rPr lang="en-US" sz="1400" dirty="0">
+                <a:solidFill>
+                  <a:schemeClr val="tx1"/>
+                </a:solidFill>
+                <a:latin typeface="LXGW WenKai" panose="02020500000000000000" pitchFamily="18" charset="-120"/>
+                <a:ea typeface="LXGW WenKai" panose="02020500000000000000" pitchFamily="18" charset="-120"/>
+              </a:rPr>
+              <a:t>Manager</a:t>
+            </a:r>
+          </a:p>
+        </p:txBody>
+      </p:sp>
+      <p:sp>
+        <p:nvSpPr>
+          <p:cNvPr id="75" name="Rectangle 74">
+            <a:extLst>
+              <a:ext uri="{FF2B5EF4-FFF2-40B4-BE49-F238E27FC236}">
+                <a16:creationId xmlns:a16="http://schemas.microsoft.com/office/drawing/2014/main" id="{44C68876-D9A9-1F96-3F1C-C2BB988232F8}"/>
+              </a:ext>
+            </a:extLst>
+          </p:cNvPr>
+          <p:cNvSpPr/>
+          <p:nvPr/>
+        </p:nvSpPr>
+        <p:spPr>
+          <a:xfrm>
+            <a:off x="6534696" y="3885677"/>
+            <a:ext cx="1371600" cy="457200"/>
+          </a:xfrm>
+          <a:prstGeom prst="rect">
+            <a:avLst/>
+          </a:prstGeom>
+          <a:solidFill>
+            <a:schemeClr val="accent4">
+              <a:lumMod val="20000"/>
+              <a:lumOff val="80000"/>
+            </a:schemeClr>
+          </a:solidFill>
+          <a:ln>
+            <a:solidFill>
+              <a:schemeClr val="tx1"/>
+            </a:solidFill>
+          </a:ln>
+        </p:spPr>
+        <p:style>
+          <a:lnRef idx="2">
+            <a:schemeClr val="accent1">
+              <a:shade val="50000"/>
+            </a:schemeClr>
+          </a:lnRef>
+          <a:fillRef idx="1">
+            <a:schemeClr val="accent1"/>
+          </a:fillRef>
+          <a:effectRef idx="0">
+            <a:schemeClr val="accent1"/>
+          </a:effectRef>
+          <a:fontRef idx="minor">
+            <a:schemeClr val="lt1"/>
+          </a:fontRef>
+        </p:style>
+        <p:txBody>
+          <a:bodyPr rtlCol="0" anchor="ctr" anchorCtr="1"/>
+          <a:lstStyle/>
+          <a:p>
+            <a:pPr algn="ctr"/>
+            <a:r>
+              <a:rPr lang="en-US" sz="1400" dirty="0">
+                <a:solidFill>
+                  <a:schemeClr val="tx1"/>
+                </a:solidFill>
+                <a:latin typeface="LXGW WenKai" panose="02020500000000000000" pitchFamily="18" charset="-120"/>
+                <a:ea typeface="LXGW WenKai" panose="02020500000000000000" pitchFamily="18" charset="-120"/>
+              </a:rPr>
+              <a:t>Knowledge</a:t>
+            </a:r>
+            <a:endParaRPr lang="en-US" sz="1600" dirty="0">
+              <a:solidFill>
+                <a:schemeClr val="tx1"/>
+              </a:solidFill>
+              <a:latin typeface="LXGW WenKai" panose="02020500000000000000" pitchFamily="18" charset="-120"/>
+              <a:ea typeface="LXGW WenKai" panose="02020500000000000000" pitchFamily="18" charset="-120"/>
+            </a:endParaRPr>
+          </a:p>
+        </p:txBody>
+      </p:sp>
+      <p:sp>
+        <p:nvSpPr>
+          <p:cNvPr id="77" name="Rectangle 76">
+            <a:extLst>
+              <a:ext uri="{FF2B5EF4-FFF2-40B4-BE49-F238E27FC236}">
+                <a16:creationId xmlns:a16="http://schemas.microsoft.com/office/drawing/2014/main" id="{E8620ACD-B15B-EF14-FC31-87AEE3C1C82D}"/>
+              </a:ext>
+            </a:extLst>
+          </p:cNvPr>
+          <p:cNvSpPr/>
+          <p:nvPr/>
+        </p:nvSpPr>
+        <p:spPr>
+          <a:xfrm>
+            <a:off x="6534696" y="1888186"/>
+            <a:ext cx="1371600" cy="640693"/>
+          </a:xfrm>
+          <a:prstGeom prst="rect">
+            <a:avLst/>
+          </a:prstGeom>
+          <a:solidFill>
+            <a:schemeClr val="accent4">
+              <a:lumMod val="20000"/>
+              <a:lumOff val="80000"/>
+            </a:schemeClr>
+          </a:solidFill>
+          <a:ln>
+            <a:solidFill>
+              <a:schemeClr val="tx1"/>
+            </a:solidFill>
+          </a:ln>
+        </p:spPr>
+        <p:style>
+          <a:lnRef idx="2">
+            <a:schemeClr val="accent1">
+              <a:shade val="50000"/>
+            </a:schemeClr>
+          </a:lnRef>
+          <a:fillRef idx="1">
+            <a:schemeClr val="accent1"/>
+          </a:fillRef>
+          <a:effectRef idx="0">
+            <a:schemeClr val="accent1"/>
+          </a:effectRef>
+          <a:fontRef idx="minor">
+            <a:schemeClr val="lt1"/>
+          </a:fontRef>
+        </p:style>
+        <p:txBody>
+          <a:bodyPr rtlCol="0" anchor="ctr" anchorCtr="1"/>
+          <a:lstStyle/>
+          <a:p>
+            <a:pPr algn="ctr"/>
+            <a:r>
+              <a:rPr lang="en-US" sz="1400" dirty="0">
+                <a:solidFill>
+                  <a:schemeClr val="tx1"/>
+                </a:solidFill>
+                <a:latin typeface="LXGW WenKai" panose="02020500000000000000" pitchFamily="18" charset="-120"/>
+                <a:ea typeface="LXGW WenKai" panose="02020500000000000000" pitchFamily="18" charset="-120"/>
+              </a:rPr>
+              <a:t>Global Contexts</a:t>
+            </a:r>
+          </a:p>
+        </p:txBody>
+      </p:sp>
+      <p:sp>
+        <p:nvSpPr>
+          <p:cNvPr id="89" name="Rectangle 88">
+            <a:extLst>
+              <a:ext uri="{FF2B5EF4-FFF2-40B4-BE49-F238E27FC236}">
+                <a16:creationId xmlns:a16="http://schemas.microsoft.com/office/drawing/2014/main" id="{3DD37A8C-A716-0782-2384-2753C896E362}"/>
+              </a:ext>
+            </a:extLst>
+          </p:cNvPr>
+          <p:cNvSpPr/>
+          <p:nvPr/>
+        </p:nvSpPr>
+        <p:spPr>
+          <a:xfrm>
+            <a:off x="8978631" y="4716814"/>
+            <a:ext cx="1181630" cy="308049"/>
+          </a:xfrm>
+          <a:prstGeom prst="rect">
+            <a:avLst/>
+          </a:prstGeom>
+          <a:solidFill>
+            <a:schemeClr val="accent4">
+              <a:lumMod val="20000"/>
+              <a:lumOff val="80000"/>
+            </a:schemeClr>
+          </a:solidFill>
+          <a:ln>
+            <a:solidFill>
+              <a:schemeClr val="tx1"/>
+            </a:solidFill>
+            <a:prstDash val="dash"/>
+          </a:ln>
+        </p:spPr>
+        <p:style>
+          <a:lnRef idx="2">
+            <a:schemeClr val="accent1">
+              <a:shade val="50000"/>
+            </a:schemeClr>
+          </a:lnRef>
+          <a:fillRef idx="1">
+            <a:schemeClr val="accent1"/>
+          </a:fillRef>
+          <a:effectRef idx="0">
+            <a:schemeClr val="accent1"/>
+          </a:effectRef>
+          <a:fontRef idx="minor">
+            <a:schemeClr val="lt1"/>
+          </a:fontRef>
+        </p:style>
+        <p:txBody>
+          <a:bodyPr rtlCol="0" anchor="ctr" anchorCtr="1"/>
+          <a:lstStyle/>
+          <a:p>
+            <a:pPr algn="ctr"/>
+            <a:r>
+              <a:rPr lang="en-US" sz="1100" dirty="0">
+                <a:solidFill>
+                  <a:schemeClr val="tx1"/>
+                </a:solidFill>
+                <a:latin typeface="LXGW WenKai" panose="02020500000000000000" pitchFamily="18" charset="-120"/>
+                <a:ea typeface="LXGW WenKai" panose="02020500000000000000" pitchFamily="18" charset="-120"/>
+              </a:rPr>
+              <a:t>Manager Data</a:t>
+            </a:r>
+          </a:p>
+        </p:txBody>
+      </p:sp>
+      <p:sp>
+        <p:nvSpPr>
+          <p:cNvPr id="105" name="Rectangle 104">
+            <a:extLst>
+              <a:ext uri="{FF2B5EF4-FFF2-40B4-BE49-F238E27FC236}">
+                <a16:creationId xmlns:a16="http://schemas.microsoft.com/office/drawing/2014/main" id="{1214C11B-A256-7176-4EFC-64EB301BEFA9}"/>
+              </a:ext>
+            </a:extLst>
+          </p:cNvPr>
+          <p:cNvSpPr/>
+          <p:nvPr/>
+        </p:nvSpPr>
+        <p:spPr>
+          <a:xfrm>
+            <a:off x="2373479" y="1124349"/>
+            <a:ext cx="2033151" cy="914400"/>
+          </a:xfrm>
+          <a:prstGeom prst="rect">
+            <a:avLst/>
+          </a:prstGeom>
+          <a:solidFill>
+            <a:schemeClr val="accent2">
+              <a:lumMod val="40000"/>
+              <a:lumOff val="60000"/>
+            </a:schemeClr>
+          </a:solidFill>
+          <a:ln>
+            <a:solidFill>
+              <a:schemeClr val="tx1"/>
+            </a:solidFill>
+          </a:ln>
+        </p:spPr>
+        <p:style>
+          <a:lnRef idx="2">
+            <a:schemeClr val="accent1">
+              <a:shade val="50000"/>
+            </a:schemeClr>
+          </a:lnRef>
+          <a:fillRef idx="1">
+            <a:schemeClr val="accent1"/>
+          </a:fillRef>
+          <a:effectRef idx="0">
+            <a:schemeClr val="accent1"/>
+          </a:effectRef>
+          <a:fontRef idx="minor">
+            <a:schemeClr val="lt1"/>
+          </a:fontRef>
+        </p:style>
+        <p:txBody>
+          <a:bodyPr rtlCol="0" anchor="b" anchorCtr="0"/>
+          <a:lstStyle/>
+          <a:p>
+            <a:pPr algn="ctr"/>
+            <a:r>
+              <a:rPr lang="en-US" sz="1400" dirty="0">
+                <a:solidFill>
+                  <a:schemeClr val="tx1"/>
+                </a:solidFill>
+                <a:latin typeface="LXGW WenKai" panose="02020500000000000000" pitchFamily="18" charset="-120"/>
+                <a:ea typeface="LXGW WenKai" panose="02020500000000000000" pitchFamily="18" charset="-120"/>
+              </a:rPr>
+              <a:t>Agent</a:t>
+            </a:r>
+          </a:p>
+        </p:txBody>
+      </p:sp>
+      <p:sp>
+        <p:nvSpPr>
+          <p:cNvPr id="108" name="Rectangle 107">
+            <a:extLst>
+              <a:ext uri="{FF2B5EF4-FFF2-40B4-BE49-F238E27FC236}">
+                <a16:creationId xmlns:a16="http://schemas.microsoft.com/office/drawing/2014/main" id="{DF6F82E6-1B4D-6F20-5C4A-BAC5F1A60D25}"/>
+              </a:ext>
+            </a:extLst>
+          </p:cNvPr>
+          <p:cNvSpPr/>
+          <p:nvPr/>
+        </p:nvSpPr>
+        <p:spPr>
+          <a:xfrm>
+            <a:off x="8978631" y="4226185"/>
+            <a:ext cx="1181629" cy="308049"/>
+          </a:xfrm>
+          <a:prstGeom prst="rect">
+            <a:avLst/>
+          </a:prstGeom>
+          <a:solidFill>
+            <a:schemeClr val="bg1">
+              <a:lumMod val="95000"/>
+            </a:schemeClr>
+          </a:solidFill>
+          <a:ln>
+            <a:solidFill>
+              <a:schemeClr val="tx1"/>
+            </a:solidFill>
+            <a:prstDash val="dash"/>
+          </a:ln>
+        </p:spPr>
+        <p:style>
+          <a:lnRef idx="2">
+            <a:schemeClr val="accent1">
+              <a:shade val="50000"/>
+            </a:schemeClr>
+          </a:lnRef>
+          <a:fillRef idx="1">
+            <a:schemeClr val="accent1"/>
+          </a:fillRef>
+          <a:effectRef idx="0">
+            <a:schemeClr val="accent1"/>
+          </a:effectRef>
+          <a:fontRef idx="minor">
+            <a:schemeClr val="lt1"/>
+          </a:fontRef>
+        </p:style>
+        <p:txBody>
+          <a:bodyPr rtlCol="0" anchor="ctr" anchorCtr="1"/>
+          <a:lstStyle/>
+          <a:p>
+            <a:pPr algn="ctr"/>
+            <a:r>
+              <a:rPr lang="en-US" sz="1100" dirty="0">
+                <a:solidFill>
+                  <a:schemeClr val="tx1"/>
+                </a:solidFill>
+                <a:latin typeface="LXGW WenKai" panose="02020500000000000000" pitchFamily="18" charset="-120"/>
+                <a:ea typeface="LXGW WenKai" panose="02020500000000000000" pitchFamily="18" charset="-120"/>
+              </a:rPr>
+              <a:t>Agent Data</a:t>
+            </a:r>
+          </a:p>
+        </p:txBody>
+      </p:sp>
+      <p:sp>
+        <p:nvSpPr>
+          <p:cNvPr id="76" name="Rectangle 75">
+            <a:extLst>
+              <a:ext uri="{FF2B5EF4-FFF2-40B4-BE49-F238E27FC236}">
+                <a16:creationId xmlns:a16="http://schemas.microsoft.com/office/drawing/2014/main" id="{5DDE9D0C-B83B-B506-FF0C-EDC49D03A075}"/>
+              </a:ext>
+            </a:extLst>
+          </p:cNvPr>
+          <p:cNvSpPr/>
+          <p:nvPr/>
+        </p:nvSpPr>
+        <p:spPr>
+          <a:xfrm>
+            <a:off x="2534866" y="1277253"/>
+            <a:ext cx="770430" cy="359761"/>
+          </a:xfrm>
+          <a:prstGeom prst="rect">
+            <a:avLst/>
+          </a:prstGeom>
+          <a:solidFill>
+            <a:schemeClr val="bg1">
+              <a:lumMod val="95000"/>
+            </a:schemeClr>
+          </a:solidFill>
+          <a:ln>
+            <a:solidFill>
+              <a:schemeClr val="tx1"/>
+            </a:solidFill>
+          </a:ln>
+        </p:spPr>
+        <p:style>
+          <a:lnRef idx="2">
+            <a:schemeClr val="accent1">
+              <a:shade val="50000"/>
+            </a:schemeClr>
+          </a:lnRef>
+          <a:fillRef idx="1">
+            <a:schemeClr val="accent1"/>
+          </a:fillRef>
+          <a:effectRef idx="0">
+            <a:schemeClr val="accent1"/>
+          </a:effectRef>
+          <a:fontRef idx="minor">
+            <a:schemeClr val="lt1"/>
+          </a:fontRef>
+        </p:style>
+        <p:txBody>
+          <a:bodyPr rtlCol="0" anchor="ctr" anchorCtr="1"/>
+          <a:lstStyle/>
+          <a:p>
+            <a:pPr algn="ctr"/>
+            <a:r>
+              <a:rPr lang="en-US" sz="1000" dirty="0">
+                <a:solidFill>
+                  <a:schemeClr val="tx1"/>
+                </a:solidFill>
+                <a:latin typeface="LXGW WenKai" panose="02020500000000000000" pitchFamily="18" charset="-120"/>
+                <a:ea typeface="LXGW WenKai" panose="02020500000000000000" pitchFamily="18" charset="-120"/>
+              </a:rPr>
+              <a:t>System prompts</a:t>
+            </a:r>
+            <a:endParaRPr lang="en-US" sz="1050" dirty="0">
+              <a:solidFill>
+                <a:schemeClr val="tx1"/>
+              </a:solidFill>
+              <a:latin typeface="LXGW WenKai" panose="02020500000000000000" pitchFamily="18" charset="-120"/>
+              <a:ea typeface="LXGW WenKai" panose="02020500000000000000" pitchFamily="18" charset="-120"/>
+            </a:endParaRPr>
+          </a:p>
+        </p:txBody>
+      </p:sp>
+      <p:sp>
+        <p:nvSpPr>
+          <p:cNvPr id="139" name="Rectangle 138">
+            <a:extLst>
+              <a:ext uri="{FF2B5EF4-FFF2-40B4-BE49-F238E27FC236}">
+                <a16:creationId xmlns:a16="http://schemas.microsoft.com/office/drawing/2014/main" id="{2C915C8B-9693-8987-029F-199D7C0DCE4A}"/>
+              </a:ext>
+            </a:extLst>
+          </p:cNvPr>
+          <p:cNvSpPr/>
+          <p:nvPr/>
+        </p:nvSpPr>
+        <p:spPr>
+          <a:xfrm>
+            <a:off x="3517280" y="1277253"/>
+            <a:ext cx="770430" cy="359761"/>
+          </a:xfrm>
+          <a:prstGeom prst="rect">
+            <a:avLst/>
+          </a:prstGeom>
+          <a:solidFill>
+            <a:schemeClr val="bg1">
+              <a:lumMod val="95000"/>
+            </a:schemeClr>
+          </a:solidFill>
+          <a:ln>
+            <a:solidFill>
+              <a:schemeClr val="tx1"/>
+            </a:solidFill>
+          </a:ln>
+        </p:spPr>
+        <p:style>
+          <a:lnRef idx="2">
+            <a:schemeClr val="accent1">
+              <a:shade val="50000"/>
+            </a:schemeClr>
+          </a:lnRef>
+          <a:fillRef idx="1">
+            <a:schemeClr val="accent1"/>
+          </a:fillRef>
+          <a:effectRef idx="0">
+            <a:schemeClr val="accent1"/>
+          </a:effectRef>
+          <a:fontRef idx="minor">
+            <a:schemeClr val="lt1"/>
+          </a:fontRef>
+        </p:style>
+        <p:txBody>
+          <a:bodyPr rtlCol="0" anchor="ctr" anchorCtr="1"/>
+          <a:lstStyle/>
+          <a:p>
+            <a:pPr algn="ctr"/>
+            <a:r>
+              <a:rPr lang="en-US" sz="1000" dirty="0">
+                <a:solidFill>
+                  <a:schemeClr val="tx1"/>
+                </a:solidFill>
+                <a:latin typeface="LXGW WenKai" panose="02020500000000000000" pitchFamily="18" charset="-120"/>
+                <a:ea typeface="LXGW WenKai" panose="02020500000000000000" pitchFamily="18" charset="-120"/>
+              </a:rPr>
+              <a:t>Chat</a:t>
+            </a:r>
+          </a:p>
+          <a:p>
+            <a:pPr algn="ctr"/>
+            <a:r>
+              <a:rPr lang="en-US" sz="1000" dirty="0">
+                <a:solidFill>
+                  <a:schemeClr val="tx1"/>
+                </a:solidFill>
+                <a:latin typeface="LXGW WenKai" panose="02020500000000000000" pitchFamily="18" charset="-120"/>
+                <a:ea typeface="LXGW WenKai" panose="02020500000000000000" pitchFamily="18" charset="-120"/>
+              </a:rPr>
+              <a:t>history</a:t>
+            </a:r>
+            <a:endParaRPr lang="en-US" sz="1050" dirty="0">
+              <a:solidFill>
+                <a:schemeClr val="tx1"/>
+              </a:solidFill>
+              <a:latin typeface="LXGW WenKai" panose="02020500000000000000" pitchFamily="18" charset="-120"/>
+              <a:ea typeface="LXGW WenKai" panose="02020500000000000000" pitchFamily="18" charset="-120"/>
+            </a:endParaRPr>
+          </a:p>
+        </p:txBody>
+      </p:sp>
+      <p:sp>
+        <p:nvSpPr>
+          <p:cNvPr id="140" name="Rectangle 139">
+            <a:extLst>
+              <a:ext uri="{FF2B5EF4-FFF2-40B4-BE49-F238E27FC236}">
+                <a16:creationId xmlns:a16="http://schemas.microsoft.com/office/drawing/2014/main" id="{3F4E18B8-7282-664E-294A-1DC6271F5490}"/>
+              </a:ext>
+            </a:extLst>
+          </p:cNvPr>
+          <p:cNvSpPr/>
+          <p:nvPr/>
+        </p:nvSpPr>
+        <p:spPr>
+          <a:xfrm>
+            <a:off x="2394714" y="2368209"/>
+            <a:ext cx="2033151" cy="914400"/>
+          </a:xfrm>
+          <a:prstGeom prst="rect">
+            <a:avLst/>
+          </a:prstGeom>
+          <a:solidFill>
+            <a:schemeClr val="accent2">
+              <a:lumMod val="40000"/>
+              <a:lumOff val="60000"/>
+            </a:schemeClr>
+          </a:solidFill>
+          <a:ln>
+            <a:solidFill>
+              <a:schemeClr val="tx1"/>
+            </a:solidFill>
+          </a:ln>
+        </p:spPr>
+        <p:style>
+          <a:lnRef idx="2">
+            <a:schemeClr val="accent1">
+              <a:shade val="50000"/>
+            </a:schemeClr>
+          </a:lnRef>
+          <a:fillRef idx="1">
+            <a:schemeClr val="accent1"/>
+          </a:fillRef>
+          <a:effectRef idx="0">
+            <a:schemeClr val="accent1"/>
+          </a:effectRef>
+          <a:fontRef idx="minor">
+            <a:schemeClr val="lt1"/>
+          </a:fontRef>
+        </p:style>
+        <p:txBody>
+          <a:bodyPr rtlCol="0" anchor="b" anchorCtr="0"/>
+          <a:lstStyle/>
+          <a:p>
+            <a:pPr algn="ctr"/>
+            <a:r>
+              <a:rPr lang="en-US" sz="1400" dirty="0">
+                <a:solidFill>
+                  <a:schemeClr val="tx1"/>
+                </a:solidFill>
+                <a:latin typeface="LXGW WenKai" panose="02020500000000000000" pitchFamily="18" charset="-120"/>
+                <a:ea typeface="LXGW WenKai" panose="02020500000000000000" pitchFamily="18" charset="-120"/>
+              </a:rPr>
+              <a:t>Agent</a:t>
+            </a:r>
+          </a:p>
+        </p:txBody>
+      </p:sp>
+      <p:sp>
+        <p:nvSpPr>
+          <p:cNvPr id="141" name="Rectangle 140">
+            <a:extLst>
+              <a:ext uri="{FF2B5EF4-FFF2-40B4-BE49-F238E27FC236}">
+                <a16:creationId xmlns:a16="http://schemas.microsoft.com/office/drawing/2014/main" id="{B9470EF6-B2B8-17B5-60F2-39024B4B359F}"/>
+              </a:ext>
+            </a:extLst>
+          </p:cNvPr>
+          <p:cNvSpPr/>
+          <p:nvPr/>
+        </p:nvSpPr>
+        <p:spPr>
+          <a:xfrm>
+            <a:off x="2534866" y="2528878"/>
+            <a:ext cx="770430" cy="359761"/>
+          </a:xfrm>
+          <a:prstGeom prst="rect">
+            <a:avLst/>
+          </a:prstGeom>
+          <a:solidFill>
+            <a:schemeClr val="bg1">
+              <a:lumMod val="95000"/>
+            </a:schemeClr>
+          </a:solidFill>
+          <a:ln>
+            <a:solidFill>
+              <a:schemeClr val="tx1"/>
+            </a:solidFill>
+          </a:ln>
+        </p:spPr>
+        <p:style>
+          <a:lnRef idx="2">
+            <a:schemeClr val="accent1">
+              <a:shade val="50000"/>
+            </a:schemeClr>
+          </a:lnRef>
+          <a:fillRef idx="1">
+            <a:schemeClr val="accent1"/>
+          </a:fillRef>
+          <a:effectRef idx="0">
+            <a:schemeClr val="accent1"/>
+          </a:effectRef>
+          <a:fontRef idx="minor">
+            <a:schemeClr val="lt1"/>
+          </a:fontRef>
+        </p:style>
+        <p:txBody>
+          <a:bodyPr rtlCol="0" anchor="ctr" anchorCtr="1"/>
+          <a:lstStyle/>
+          <a:p>
+            <a:pPr algn="ctr"/>
+            <a:r>
+              <a:rPr lang="en-US" sz="1000" dirty="0">
+                <a:solidFill>
+                  <a:schemeClr val="tx1"/>
+                </a:solidFill>
+                <a:latin typeface="LXGW WenKai" panose="02020500000000000000" pitchFamily="18" charset="-120"/>
+                <a:ea typeface="LXGW WenKai" panose="02020500000000000000" pitchFamily="18" charset="-120"/>
+              </a:rPr>
+              <a:t>System prompts</a:t>
+            </a:r>
+            <a:endParaRPr lang="en-US" sz="1050" dirty="0">
+              <a:solidFill>
+                <a:schemeClr val="tx1"/>
+              </a:solidFill>
+              <a:latin typeface="LXGW WenKai" panose="02020500000000000000" pitchFamily="18" charset="-120"/>
+              <a:ea typeface="LXGW WenKai" panose="02020500000000000000" pitchFamily="18" charset="-120"/>
+            </a:endParaRPr>
+          </a:p>
+        </p:txBody>
+      </p:sp>
+      <p:sp>
+        <p:nvSpPr>
+          <p:cNvPr id="142" name="Rectangle 141">
+            <a:extLst>
+              <a:ext uri="{FF2B5EF4-FFF2-40B4-BE49-F238E27FC236}">
+                <a16:creationId xmlns:a16="http://schemas.microsoft.com/office/drawing/2014/main" id="{CBFEEC7A-4A15-DB6B-15C8-5F074E904B67}"/>
+              </a:ext>
+            </a:extLst>
+          </p:cNvPr>
+          <p:cNvSpPr/>
+          <p:nvPr/>
+        </p:nvSpPr>
+        <p:spPr>
+          <a:xfrm>
+            <a:off x="3517280" y="2528878"/>
+            <a:ext cx="770430" cy="359761"/>
+          </a:xfrm>
+          <a:prstGeom prst="rect">
+            <a:avLst/>
+          </a:prstGeom>
+          <a:solidFill>
+            <a:schemeClr val="bg1">
+              <a:lumMod val="95000"/>
+            </a:schemeClr>
+          </a:solidFill>
+          <a:ln>
+            <a:solidFill>
+              <a:schemeClr val="tx1"/>
+            </a:solidFill>
+          </a:ln>
+        </p:spPr>
+        <p:style>
+          <a:lnRef idx="2">
+            <a:schemeClr val="accent1">
+              <a:shade val="50000"/>
+            </a:schemeClr>
+          </a:lnRef>
+          <a:fillRef idx="1">
+            <a:schemeClr val="accent1"/>
+          </a:fillRef>
+          <a:effectRef idx="0">
+            <a:schemeClr val="accent1"/>
+          </a:effectRef>
+          <a:fontRef idx="minor">
+            <a:schemeClr val="lt1"/>
+          </a:fontRef>
+        </p:style>
+        <p:txBody>
+          <a:bodyPr rtlCol="0" anchor="ctr" anchorCtr="1"/>
+          <a:lstStyle/>
+          <a:p>
+            <a:pPr algn="ctr"/>
+            <a:r>
+              <a:rPr lang="en-US" sz="1000" dirty="0">
+                <a:solidFill>
+                  <a:schemeClr val="tx1"/>
+                </a:solidFill>
+                <a:latin typeface="LXGW WenKai" panose="02020500000000000000" pitchFamily="18" charset="-120"/>
+                <a:ea typeface="LXGW WenKai" panose="02020500000000000000" pitchFamily="18" charset="-120"/>
+              </a:rPr>
+              <a:t>Chat</a:t>
+            </a:r>
+          </a:p>
+          <a:p>
+            <a:pPr algn="ctr"/>
+            <a:r>
+              <a:rPr lang="en-US" sz="1000" dirty="0">
+                <a:solidFill>
+                  <a:schemeClr val="tx1"/>
+                </a:solidFill>
+                <a:latin typeface="LXGW WenKai" panose="02020500000000000000" pitchFamily="18" charset="-120"/>
+                <a:ea typeface="LXGW WenKai" panose="02020500000000000000" pitchFamily="18" charset="-120"/>
+              </a:rPr>
+              <a:t>History</a:t>
+            </a:r>
+            <a:endParaRPr lang="en-US" sz="1050" dirty="0">
+              <a:solidFill>
+                <a:schemeClr val="tx1"/>
+              </a:solidFill>
+              <a:latin typeface="LXGW WenKai" panose="02020500000000000000" pitchFamily="18" charset="-120"/>
+              <a:ea typeface="LXGW WenKai" panose="02020500000000000000" pitchFamily="18" charset="-120"/>
+            </a:endParaRPr>
+          </a:p>
+        </p:txBody>
+      </p:sp>
+      <p:sp>
+        <p:nvSpPr>
+          <p:cNvPr id="143" name="Rectangle 142">
+            <a:extLst>
+              <a:ext uri="{FF2B5EF4-FFF2-40B4-BE49-F238E27FC236}">
+                <a16:creationId xmlns:a16="http://schemas.microsoft.com/office/drawing/2014/main" id="{B5FD6F14-F11F-8D87-FEE2-5494426F1A72}"/>
+              </a:ext>
+            </a:extLst>
+          </p:cNvPr>
+          <p:cNvSpPr/>
+          <p:nvPr/>
+        </p:nvSpPr>
+        <p:spPr>
+          <a:xfrm>
+            <a:off x="2373479" y="3619834"/>
+            <a:ext cx="2033151" cy="914400"/>
+          </a:xfrm>
+          <a:prstGeom prst="rect">
+            <a:avLst/>
+          </a:prstGeom>
+          <a:solidFill>
+            <a:schemeClr val="accent2">
+              <a:lumMod val="40000"/>
+              <a:lumOff val="60000"/>
+            </a:schemeClr>
+          </a:solidFill>
+          <a:ln>
+            <a:solidFill>
+              <a:schemeClr val="tx1"/>
+            </a:solidFill>
+          </a:ln>
+        </p:spPr>
+        <p:style>
+          <a:lnRef idx="2">
+            <a:schemeClr val="accent1">
+              <a:shade val="50000"/>
+            </a:schemeClr>
+          </a:lnRef>
+          <a:fillRef idx="1">
+            <a:schemeClr val="accent1"/>
+          </a:fillRef>
+          <a:effectRef idx="0">
+            <a:schemeClr val="accent1"/>
+          </a:effectRef>
+          <a:fontRef idx="minor">
+            <a:schemeClr val="lt1"/>
+          </a:fontRef>
+        </p:style>
+        <p:txBody>
+          <a:bodyPr rtlCol="0" anchor="b" anchorCtr="0"/>
+          <a:lstStyle/>
+          <a:p>
+            <a:pPr algn="ctr"/>
+            <a:r>
+              <a:rPr lang="en-US" sz="1400" dirty="0">
+                <a:solidFill>
+                  <a:schemeClr val="tx1"/>
+                </a:solidFill>
+                <a:latin typeface="LXGW WenKai" panose="02020500000000000000" pitchFamily="18" charset="-120"/>
+                <a:ea typeface="LXGW WenKai" panose="02020500000000000000" pitchFamily="18" charset="-120"/>
+              </a:rPr>
+              <a:t>Agent</a:t>
+            </a:r>
+          </a:p>
+        </p:txBody>
+      </p:sp>
+      <p:sp>
+        <p:nvSpPr>
+          <p:cNvPr id="144" name="Rectangle 143">
+            <a:extLst>
+              <a:ext uri="{FF2B5EF4-FFF2-40B4-BE49-F238E27FC236}">
+                <a16:creationId xmlns:a16="http://schemas.microsoft.com/office/drawing/2014/main" id="{91FED968-9E3F-7EAE-6E2E-84A4B4A9BCD2}"/>
+              </a:ext>
+            </a:extLst>
+          </p:cNvPr>
+          <p:cNvSpPr/>
+          <p:nvPr/>
+        </p:nvSpPr>
+        <p:spPr>
+          <a:xfrm>
+            <a:off x="2534866" y="3797862"/>
+            <a:ext cx="770430" cy="359761"/>
+          </a:xfrm>
+          <a:prstGeom prst="rect">
+            <a:avLst/>
+          </a:prstGeom>
+          <a:solidFill>
+            <a:schemeClr val="bg1">
+              <a:lumMod val="95000"/>
+            </a:schemeClr>
+          </a:solidFill>
+          <a:ln>
+            <a:solidFill>
+              <a:schemeClr val="tx1"/>
+            </a:solidFill>
+          </a:ln>
+        </p:spPr>
+        <p:style>
+          <a:lnRef idx="2">
+            <a:schemeClr val="accent1">
+              <a:shade val="50000"/>
+            </a:schemeClr>
+          </a:lnRef>
+          <a:fillRef idx="1">
+            <a:schemeClr val="accent1"/>
+          </a:fillRef>
+          <a:effectRef idx="0">
+            <a:schemeClr val="accent1"/>
+          </a:effectRef>
+          <a:fontRef idx="minor">
+            <a:schemeClr val="lt1"/>
+          </a:fontRef>
+        </p:style>
+        <p:txBody>
+          <a:bodyPr rtlCol="0" anchor="ctr" anchorCtr="1"/>
+          <a:lstStyle/>
+          <a:p>
+            <a:pPr algn="ctr"/>
+            <a:r>
+              <a:rPr lang="en-US" sz="1000" dirty="0">
+                <a:solidFill>
+                  <a:schemeClr val="tx1"/>
+                </a:solidFill>
+                <a:latin typeface="LXGW WenKai" panose="02020500000000000000" pitchFamily="18" charset="-120"/>
+                <a:ea typeface="LXGW WenKai" panose="02020500000000000000" pitchFamily="18" charset="-120"/>
+              </a:rPr>
+              <a:t>System prompts</a:t>
+            </a:r>
+            <a:endParaRPr lang="en-US" sz="1050" dirty="0">
+              <a:solidFill>
+                <a:schemeClr val="tx1"/>
+              </a:solidFill>
+              <a:latin typeface="LXGW WenKai" panose="02020500000000000000" pitchFamily="18" charset="-120"/>
+              <a:ea typeface="LXGW WenKai" panose="02020500000000000000" pitchFamily="18" charset="-120"/>
+            </a:endParaRPr>
+          </a:p>
+        </p:txBody>
+      </p:sp>
+      <p:sp>
+        <p:nvSpPr>
+          <p:cNvPr id="145" name="Rectangle 144">
+            <a:extLst>
+              <a:ext uri="{FF2B5EF4-FFF2-40B4-BE49-F238E27FC236}">
+                <a16:creationId xmlns:a16="http://schemas.microsoft.com/office/drawing/2014/main" id="{BD16667A-49D0-712E-D96E-003D719DA2D4}"/>
+              </a:ext>
+            </a:extLst>
+          </p:cNvPr>
+          <p:cNvSpPr/>
+          <p:nvPr/>
+        </p:nvSpPr>
+        <p:spPr>
+          <a:xfrm>
+            <a:off x="3517280" y="3797862"/>
+            <a:ext cx="770430" cy="359761"/>
+          </a:xfrm>
+          <a:prstGeom prst="rect">
+            <a:avLst/>
+          </a:prstGeom>
+          <a:solidFill>
+            <a:schemeClr val="bg1">
+              <a:lumMod val="95000"/>
+            </a:schemeClr>
+          </a:solidFill>
+          <a:ln>
+            <a:solidFill>
+              <a:schemeClr val="tx1"/>
+            </a:solidFill>
+          </a:ln>
+        </p:spPr>
+        <p:style>
+          <a:lnRef idx="2">
+            <a:schemeClr val="accent1">
+              <a:shade val="50000"/>
+            </a:schemeClr>
+          </a:lnRef>
+          <a:fillRef idx="1">
+            <a:schemeClr val="accent1"/>
+          </a:fillRef>
+          <a:effectRef idx="0">
+            <a:schemeClr val="accent1"/>
+          </a:effectRef>
+          <a:fontRef idx="minor">
+            <a:schemeClr val="lt1"/>
+          </a:fontRef>
+        </p:style>
+        <p:txBody>
+          <a:bodyPr rtlCol="0" anchor="ctr" anchorCtr="1"/>
+          <a:lstStyle/>
+          <a:p>
+            <a:pPr algn="ctr"/>
+            <a:r>
+              <a:rPr lang="en-US" sz="1000" dirty="0">
+                <a:solidFill>
+                  <a:schemeClr val="tx1"/>
+                </a:solidFill>
+                <a:latin typeface="LXGW WenKai" panose="02020500000000000000" pitchFamily="18" charset="-120"/>
+                <a:ea typeface="LXGW WenKai" panose="02020500000000000000" pitchFamily="18" charset="-120"/>
+              </a:rPr>
+              <a:t>Chat</a:t>
+            </a:r>
+          </a:p>
+          <a:p>
+            <a:pPr algn="ctr"/>
+            <a:r>
+              <a:rPr lang="en-US" sz="1000" dirty="0">
+                <a:solidFill>
+                  <a:schemeClr val="tx1"/>
+                </a:solidFill>
+                <a:latin typeface="LXGW WenKai" panose="02020500000000000000" pitchFamily="18" charset="-120"/>
+                <a:ea typeface="LXGW WenKai" panose="02020500000000000000" pitchFamily="18" charset="-120"/>
+              </a:rPr>
+              <a:t>History</a:t>
+            </a:r>
+            <a:endParaRPr lang="en-US" sz="1050" dirty="0">
+              <a:solidFill>
+                <a:schemeClr val="tx1"/>
+              </a:solidFill>
+              <a:latin typeface="LXGW WenKai" panose="02020500000000000000" pitchFamily="18" charset="-120"/>
+              <a:ea typeface="LXGW WenKai" panose="02020500000000000000" pitchFamily="18" charset="-120"/>
+            </a:endParaRPr>
+          </a:p>
+        </p:txBody>
+      </p:sp>
+      <p:sp>
+        <p:nvSpPr>
+          <p:cNvPr id="146" name="Rectangle 145">
+            <a:extLst>
+              <a:ext uri="{FF2B5EF4-FFF2-40B4-BE49-F238E27FC236}">
+                <a16:creationId xmlns:a16="http://schemas.microsoft.com/office/drawing/2014/main" id="{2F241573-1DFB-B4E8-A247-315E4818D5AC}"/>
+              </a:ext>
+            </a:extLst>
+          </p:cNvPr>
+          <p:cNvSpPr/>
+          <p:nvPr/>
+        </p:nvSpPr>
+        <p:spPr>
+          <a:xfrm>
+            <a:off x="9312051" y="5276558"/>
+            <a:ext cx="848209" cy="308049"/>
+          </a:xfrm>
+          <a:prstGeom prst="rect">
+            <a:avLst/>
+          </a:prstGeom>
+          <a:solidFill>
+            <a:schemeClr val="accent2">
+              <a:lumMod val="40000"/>
+              <a:lumOff val="60000"/>
+            </a:schemeClr>
+          </a:solidFill>
+          <a:ln>
+            <a:solidFill>
+              <a:schemeClr val="tx1"/>
+            </a:solidFill>
+            <a:prstDash val="dash"/>
+          </a:ln>
+        </p:spPr>
+        <p:style>
+          <a:lnRef idx="2">
+            <a:schemeClr val="accent1">
+              <a:shade val="50000"/>
+            </a:schemeClr>
+          </a:lnRef>
+          <a:fillRef idx="1">
+            <a:schemeClr val="accent1"/>
+          </a:fillRef>
+          <a:effectRef idx="0">
+            <a:schemeClr val="accent1"/>
+          </a:effectRef>
+          <a:fontRef idx="minor">
+            <a:schemeClr val="lt1"/>
+          </a:fontRef>
+        </p:style>
+        <p:txBody>
+          <a:bodyPr rtlCol="0" anchor="ctr" anchorCtr="1"/>
+          <a:lstStyle/>
+          <a:p>
+            <a:pPr algn="ctr"/>
+            <a:r>
+              <a:rPr lang="en-US" sz="1100" dirty="0">
+                <a:solidFill>
+                  <a:schemeClr val="tx1"/>
+                </a:solidFill>
+                <a:latin typeface="LXGW WenKai" panose="02020500000000000000" pitchFamily="18" charset="-120"/>
+                <a:ea typeface="LXGW WenKai" panose="02020500000000000000" pitchFamily="18" charset="-120"/>
+              </a:rPr>
+              <a:t>Agent</a:t>
+            </a:r>
+          </a:p>
+        </p:txBody>
+      </p:sp>
+      <p:cxnSp>
+        <p:nvCxnSpPr>
+          <p:cNvPr id="147" name="Connector: Elbow 146">
+            <a:extLst>
+              <a:ext uri="{FF2B5EF4-FFF2-40B4-BE49-F238E27FC236}">
+                <a16:creationId xmlns:a16="http://schemas.microsoft.com/office/drawing/2014/main" id="{58ECAB7D-063C-3497-99B4-5752BD3EE406}"/>
+              </a:ext>
+            </a:extLst>
+          </p:cNvPr>
+          <p:cNvCxnSpPr>
+            <a:cxnSpLocks/>
+            <a:stCxn id="77" idx="0"/>
+            <a:endCxn id="76" idx="0"/>
+          </p:cNvCxnSpPr>
+          <p:nvPr/>
+        </p:nvCxnSpPr>
+        <p:spPr>
+          <a:xfrm rot="16200000" flipV="1">
+            <a:off x="4764823" y="-567488"/>
+            <a:ext cx="610933" cy="4300415"/>
+          </a:xfrm>
+          <a:prstGeom prst="bentConnector3">
+            <a:avLst>
+              <a:gd name="adj1" fmla="val 143787"/>
+            </a:avLst>
+          </a:prstGeom>
+          <a:ln w="9525">
+            <a:solidFill>
+              <a:schemeClr val="tx1"/>
+            </a:solidFill>
+            <a:prstDash val="dash"/>
+            <a:headEnd type="triangle"/>
+            <a:tailEnd type="triangle"/>
+          </a:ln>
+        </p:spPr>
+        <p:style>
+          <a:lnRef idx="1">
+            <a:schemeClr val="accent1"/>
+          </a:lnRef>
+          <a:fillRef idx="0">
+            <a:schemeClr val="accent1"/>
+          </a:fillRef>
+          <a:effectRef idx="0">
+            <a:schemeClr val="accent1"/>
+          </a:effectRef>
+          <a:fontRef idx="minor">
+            <a:schemeClr val="tx1"/>
+          </a:fontRef>
+        </p:style>
+      </p:cxnSp>
+      <p:cxnSp>
+        <p:nvCxnSpPr>
+          <p:cNvPr id="152" name="Connector: Elbow 151">
+            <a:extLst>
+              <a:ext uri="{FF2B5EF4-FFF2-40B4-BE49-F238E27FC236}">
+                <a16:creationId xmlns:a16="http://schemas.microsoft.com/office/drawing/2014/main" id="{E0F8D9DA-5181-2F80-AF0D-1A1C1C83DD97}"/>
+              </a:ext>
+            </a:extLst>
+          </p:cNvPr>
+          <p:cNvCxnSpPr>
+            <a:cxnSpLocks/>
+            <a:stCxn id="77" idx="1"/>
+            <a:endCxn id="141" idx="0"/>
+          </p:cNvCxnSpPr>
+          <p:nvPr/>
+        </p:nvCxnSpPr>
+        <p:spPr>
+          <a:xfrm rot="10800000" flipV="1">
+            <a:off x="2920082" y="2208532"/>
+            <a:ext cx="3614615" cy="320345"/>
+          </a:xfrm>
+          <a:prstGeom prst="bentConnector2">
+            <a:avLst/>
+          </a:prstGeom>
+          <a:ln w="9525">
+            <a:solidFill>
+              <a:schemeClr val="tx1"/>
+            </a:solidFill>
+            <a:prstDash val="dash"/>
+            <a:headEnd type="triangle"/>
+            <a:tailEnd type="triangle"/>
+          </a:ln>
+        </p:spPr>
+        <p:style>
+          <a:lnRef idx="1">
+            <a:schemeClr val="accent1"/>
+          </a:lnRef>
+          <a:fillRef idx="0">
+            <a:schemeClr val="accent1"/>
+          </a:fillRef>
+          <a:effectRef idx="0">
+            <a:schemeClr val="accent1"/>
+          </a:effectRef>
+          <a:fontRef idx="minor">
+            <a:schemeClr val="tx1"/>
+          </a:fontRef>
+        </p:style>
+      </p:cxnSp>
+      <p:cxnSp>
+        <p:nvCxnSpPr>
+          <p:cNvPr id="155" name="Connector: Elbow 154">
+            <a:extLst>
+              <a:ext uri="{FF2B5EF4-FFF2-40B4-BE49-F238E27FC236}">
+                <a16:creationId xmlns:a16="http://schemas.microsoft.com/office/drawing/2014/main" id="{B610ECF4-E72B-70CD-6D29-99F74420E889}"/>
+              </a:ext>
+            </a:extLst>
+          </p:cNvPr>
+          <p:cNvCxnSpPr>
+            <a:cxnSpLocks/>
+            <a:stCxn id="77" idx="2"/>
+            <a:endCxn id="144" idx="0"/>
+          </p:cNvCxnSpPr>
+          <p:nvPr/>
+        </p:nvCxnSpPr>
+        <p:spPr>
+          <a:xfrm rot="5400000">
+            <a:off x="4435798" y="1013163"/>
+            <a:ext cx="1268983" cy="4300415"/>
+          </a:xfrm>
+          <a:prstGeom prst="bentConnector3">
+            <a:avLst>
+              <a:gd name="adj1" fmla="val 74530"/>
+            </a:avLst>
+          </a:prstGeom>
+          <a:ln w="9525">
+            <a:solidFill>
+              <a:schemeClr val="tx1"/>
+            </a:solidFill>
+            <a:prstDash val="dash"/>
+            <a:headEnd type="triangle"/>
+            <a:tailEnd type="triangle"/>
+          </a:ln>
+        </p:spPr>
+        <p:style>
+          <a:lnRef idx="1">
+            <a:schemeClr val="accent1"/>
+          </a:lnRef>
+          <a:fillRef idx="0">
+            <a:schemeClr val="accent1"/>
+          </a:fillRef>
+          <a:effectRef idx="0">
+            <a:schemeClr val="accent1"/>
+          </a:effectRef>
+          <a:fontRef idx="minor">
+            <a:schemeClr val="tx1"/>
+          </a:fontRef>
+        </p:style>
+      </p:cxnSp>
+      <p:cxnSp>
+        <p:nvCxnSpPr>
+          <p:cNvPr id="163" name="Connector: Elbow 162">
+            <a:extLst>
+              <a:ext uri="{FF2B5EF4-FFF2-40B4-BE49-F238E27FC236}">
+                <a16:creationId xmlns:a16="http://schemas.microsoft.com/office/drawing/2014/main" id="{0FE27888-A62C-8AE2-B24B-F57490930192}"/>
+              </a:ext>
+            </a:extLst>
+          </p:cNvPr>
+          <p:cNvCxnSpPr>
+            <a:cxnSpLocks/>
+            <a:stCxn id="77" idx="1"/>
+            <a:endCxn id="142" idx="0"/>
+          </p:cNvCxnSpPr>
+          <p:nvPr/>
+        </p:nvCxnSpPr>
+        <p:spPr>
+          <a:xfrm rot="10800000" flipV="1">
+            <a:off x="3902496" y="2208532"/>
+            <a:ext cx="2632201" cy="320345"/>
+          </a:xfrm>
+          <a:prstGeom prst="bentConnector2">
+            <a:avLst/>
+          </a:prstGeom>
+          <a:ln w="9525">
+            <a:solidFill>
+              <a:schemeClr val="tx1"/>
+            </a:solidFill>
+            <a:prstDash val="dash"/>
+            <a:headEnd type="triangle"/>
+            <a:tailEnd type="triangle"/>
+          </a:ln>
+        </p:spPr>
+        <p:style>
+          <a:lnRef idx="1">
+            <a:schemeClr val="accent1"/>
+          </a:lnRef>
+          <a:fillRef idx="0">
+            <a:schemeClr val="accent1"/>
+          </a:fillRef>
+          <a:effectRef idx="0">
+            <a:schemeClr val="accent1"/>
+          </a:effectRef>
+          <a:fontRef idx="minor">
+            <a:schemeClr val="tx1"/>
+          </a:fontRef>
+        </p:style>
+      </p:cxnSp>
+      <p:cxnSp>
+        <p:nvCxnSpPr>
+          <p:cNvPr id="167" name="Connector: Elbow 166">
+            <a:extLst>
+              <a:ext uri="{FF2B5EF4-FFF2-40B4-BE49-F238E27FC236}">
+                <a16:creationId xmlns:a16="http://schemas.microsoft.com/office/drawing/2014/main" id="{D88E1486-A9EA-09B1-DB52-912EF09BB8E6}"/>
+              </a:ext>
+            </a:extLst>
+          </p:cNvPr>
+          <p:cNvCxnSpPr>
+            <a:cxnSpLocks/>
+            <a:stCxn id="77" idx="2"/>
+            <a:endCxn id="145" idx="0"/>
+          </p:cNvCxnSpPr>
+          <p:nvPr/>
+        </p:nvCxnSpPr>
+        <p:spPr>
+          <a:xfrm rot="5400000">
+            <a:off x="4927005" y="1504370"/>
+            <a:ext cx="1268983" cy="3318001"/>
+          </a:xfrm>
+          <a:prstGeom prst="bentConnector3">
+            <a:avLst>
+              <a:gd name="adj1" fmla="val 74530"/>
+            </a:avLst>
+          </a:prstGeom>
+          <a:ln w="9525">
+            <a:solidFill>
+              <a:schemeClr val="tx1"/>
+            </a:solidFill>
+            <a:prstDash val="dash"/>
+            <a:headEnd type="triangle"/>
+            <a:tailEnd type="triangle"/>
+          </a:ln>
+        </p:spPr>
+        <p:style>
+          <a:lnRef idx="1">
+            <a:schemeClr val="accent1"/>
+          </a:lnRef>
+          <a:fillRef idx="0">
+            <a:schemeClr val="accent1"/>
+          </a:fillRef>
+          <a:effectRef idx="0">
+            <a:schemeClr val="accent1"/>
+          </a:effectRef>
+          <a:fontRef idx="minor">
+            <a:schemeClr val="tx1"/>
+          </a:fontRef>
+        </p:style>
+      </p:cxnSp>
+      <p:cxnSp>
+        <p:nvCxnSpPr>
+          <p:cNvPr id="170" name="Connector: Elbow 169">
+            <a:extLst>
+              <a:ext uri="{FF2B5EF4-FFF2-40B4-BE49-F238E27FC236}">
+                <a16:creationId xmlns:a16="http://schemas.microsoft.com/office/drawing/2014/main" id="{EBF495D6-F8BE-408D-9041-EF68C7867D46}"/>
+              </a:ext>
+            </a:extLst>
+          </p:cNvPr>
+          <p:cNvCxnSpPr>
+            <a:cxnSpLocks/>
+            <a:stCxn id="77" idx="0"/>
+            <a:endCxn id="139" idx="0"/>
+          </p:cNvCxnSpPr>
+          <p:nvPr/>
+        </p:nvCxnSpPr>
+        <p:spPr>
+          <a:xfrm rot="16200000" flipV="1">
+            <a:off x="5256030" y="-76281"/>
+            <a:ext cx="610933" cy="3318001"/>
+          </a:xfrm>
+          <a:prstGeom prst="bentConnector3">
+            <a:avLst>
+              <a:gd name="adj1" fmla="val 143787"/>
+            </a:avLst>
+          </a:prstGeom>
+          <a:ln w="9525">
+            <a:solidFill>
+              <a:schemeClr val="tx1"/>
+            </a:solidFill>
+            <a:prstDash val="dash"/>
+            <a:headEnd type="triangle"/>
+            <a:tailEnd type="triangle"/>
+          </a:ln>
+        </p:spPr>
+        <p:style>
+          <a:lnRef idx="1">
+            <a:schemeClr val="accent1"/>
+          </a:lnRef>
+          <a:fillRef idx="0">
+            <a:schemeClr val="accent1"/>
+          </a:fillRef>
+          <a:effectRef idx="0">
+            <a:schemeClr val="accent1"/>
+          </a:effectRef>
+          <a:fontRef idx="minor">
+            <a:schemeClr val="tx1"/>
+          </a:fontRef>
+        </p:style>
+      </p:cxnSp>
+    </p:spTree>
+    <p:extLst>
+      <p:ext uri="{BB962C8B-B14F-4D97-AF65-F5344CB8AC3E}">
+        <p14:creationId xmlns:p14="http://schemas.microsoft.com/office/powerpoint/2010/main" val="2831052583"/>
+      </p:ext>
+    </p:extLst>
+  </p:cSld>
+  <p:clrMapOvr>
+    <a:masterClrMapping/>
+  </p:clrMapOvr>
+</p:sld>
+</file>
+
 <file path=ppt/theme/theme1.xml><?xml version="1.0" encoding="utf-8"?>
+<a:theme xmlns:a="http://schemas.openxmlformats.org/drawingml/2006/main" name="Office Theme">
+  <a:themeElements>
+    <a:clrScheme name="Office">
+      <a:dk1>
+        <a:sysClr val="windowText" lastClr="000000"/>
+      </a:dk1>
+      <a:lt1>
+        <a:sysClr val="window" lastClr="FFFFFF"/>
+      </a:lt1>
+      <a:dk2>
+        <a:srgbClr val="44546A"/>
+      </a:dk2>
+      <a:lt2>
+        <a:srgbClr val="E7E6E6"/>
+      </a:lt2>
+      <a:accent1>
+        <a:srgbClr val="4472C4"/>
+      </a:accent1>
+      <a:accent2>
+        <a:srgbClr val="ED7D31"/>
+      </a:accent2>
+      <a:accent3>
+        <a:srgbClr val="A5A5A5"/>
+      </a:accent3>
+      <a:accent4>
+        <a:srgbClr val="FFC000"/>
+      </a:accent4>
+      <a:accent5>
+        <a:srgbClr val="5B9BD5"/>
+      </a:accent5>
+      <a:accent6>
+        <a:srgbClr val="70AD47"/>
+      </a:accent6>
+      <a:hlink>
+        <a:srgbClr val="0563C1"/>
+      </a:hlink>
+      <a:folHlink>
+        <a:srgbClr val="954F72"/>
+      </a:folHlink>
+    </a:clrScheme>
+    <a:fontScheme name="Office">
+      <a:majorFont>
+        <a:latin typeface="Calibri Light" panose="020F0302020204030204"/>
+        <a:ea typeface=""/>
+        <a:cs typeface=""/>
+        <a:font script="Jpan" typeface="游ゴシック Light"/>
+        <a:font script="Hang" typeface="맑은 고딕"/>
+        <a:font script="Hans" typeface="等线 Light"/>
+        <a:font script="Hant" typeface="新細明體"/>
+        <a:font script="Arab" typeface="Times New Roman"/>
+        <a:font script="Hebr" typeface="Times New Roman"/>
+        <a:font script="Thai" typeface="Angsana New"/>
+        <a:font script="Ethi" typeface="Nyala"/>
+        <a:font script="Beng" typeface="Vrinda"/>
+        <a:font script="Gujr" typeface="Shruti"/>
+        <a:font script="Khmr" typeface="MoolBoran"/>
+        <a:font script="Knda" typeface="Tunga"/>
+        <a:font script="Guru" typeface="Raavi"/>
+        <a:font script="Cans" typeface="Euphemia"/>
+        <a:font script="Cher" typeface="Plantagenet Cherokee"/>
+        <a:font script="Yiii" typeface="Microsoft Yi Baiti"/>
+        <a:font script="Tibt" typeface="Microsoft Himalaya"/>
+        <a:font script="Thaa" typeface="MV Boli"/>
+        <a:font script="Deva" typeface="Mangal"/>
+        <a:font script="Telu" typeface="Gautami"/>
+        <a:font script="Taml" typeface="Latha"/>
+        <a:font script="Syrc" typeface="Estrangelo Edessa"/>
+        <a:font script="Orya" typeface="Kalinga"/>
+        <a:font script="Mlym" typeface="Kartika"/>
+        <a:font script="Laoo" typeface="DokChampa"/>
+        <a:font script="Sinh" typeface="Iskoola Pota"/>
+        <a:font script="Mong" typeface="Mongolian Baiti"/>
+        <a:font script="Viet" typeface="Times New Roman"/>
+        <a:font script="Uigh" typeface="Microsoft Uighur"/>
+        <a:font script="Geor" typeface="Sylfaen"/>
+        <a:font script="Armn" typeface="Arial"/>
+        <a:font script="Bugi" typeface="Leelawadee UI"/>
+        <a:font script="Bopo" typeface="Microsoft JhengHei"/>
+        <a:font script="Java" typeface="Javanese Text"/>
+        <a:font script="Lisu" typeface="Segoe UI"/>
+        <a:font script="Mymr" typeface="Myanmar Text"/>
+        <a:font script="Nkoo" typeface="Ebrima"/>
+        <a:font script="Olck" typeface="Nirmala UI"/>
+        <a:font script="Osma" typeface="Ebrima"/>
+        <a:font script="Phag" typeface="Phagspa"/>
+        <a:font script="Syrn" typeface="Estrangelo Edessa"/>
+        <a:font script="Syrj" typeface="Estrangelo Edessa"/>
+        <a:font script="Syre" typeface="Estrangelo Edessa"/>
+        <a:font script="Sora" typeface="Nirmala UI"/>
+        <a:font script="Tale" typeface="Microsoft Tai Le"/>
+        <a:font script="Talu" typeface="Microsoft New Tai Lue"/>
+        <a:font script="Tfng" typeface="Ebrima"/>
+      </a:majorFont>
+      <a:minorFont>
+        <a:latin typeface="Calibri" panose="020F0502020204030204"/>
+        <a:ea typeface=""/>
+        <a:cs typeface=""/>
+        <a:font script="Jpan" typeface="游ゴシック"/>
+        <a:font script="Hang" typeface="맑은 고딕"/>
+        <a:font script="Hans" typeface="等线"/>
+        <a:font script="Hant" typeface="新細明體"/>
+        <a:font script="Arab" typeface="Arial"/>
+        <a:font script="Hebr" typeface="Arial"/>
+        <a:font script="Thai" typeface="Cordia New"/>
+        <a:font script="Ethi" typeface="Nyala"/>
+        <a:font script="Beng" typeface="Vrinda"/>
+        <a:font script="Gujr" typeface="Shruti"/>
+        <a:font script="Khmr" typeface="DaunPenh"/>
+        <a:font script="Knda" typeface="Tunga"/>
+        <a:font script="Guru" typeface="Raavi"/>
+        <a:font script="Cans" typeface="Euphemia"/>
+        <a:font script="Cher" typeface="Plantagenet Cherokee"/>
+        <a:font script="Yiii" typeface="Microsoft Yi Baiti"/>
+        <a:font script="Tibt" typeface="Microsoft Himalaya"/>
+        <a:font script="Thaa" typeface="MV Boli"/>
+        <a:font script="Deva" typeface="Mangal"/>
+        <a:font script="Telu" typeface="Gautami"/>
+        <a:font script="Taml" typeface="Latha"/>
+        <a:font script="Syrc" typeface="Estrangelo Edessa"/>
+        <a:font script="Orya" typeface="Kalinga"/>
+        <a:font script="Mlym" typeface="Kartika"/>
+        <a:font script="Laoo" typeface="DokChampa"/>
+        <a:font script="Sinh" typeface="Iskoola Pota"/>
+        <a:font script="Mong" typeface="Mongolian Baiti"/>
+        <a:font script="Viet" typeface="Arial"/>
+        <a:font script="Uigh" typeface="Microsoft Uighur"/>
+        <a:font script="Geor" typeface="Sylfaen"/>
+        <a:font script="Armn" typeface="Arial"/>
+        <a:font script="Bugi" typeface="Leelawadee UI"/>
+        <a:font script="Bopo" typeface="Microsoft JhengHei"/>
+        <a:font script="Java" typeface="Javanese Text"/>
+        <a:font script="Lisu" typeface="Segoe UI"/>
+        <a:font script="Mymr" typeface="Myanmar Text"/>
+        <a:font script="Nkoo" typeface="Ebrima"/>
+        <a:font script="Olck" typeface="Nirmala UI"/>
+        <a:font script="Osma" typeface="Ebrima"/>
+        <a:font script="Phag" typeface="Phagspa"/>
+        <a:font script="Syrn" typeface="Estrangelo Edessa"/>
+        <a:font script="Syrj" typeface="Estrangelo Edessa"/>
+        <a:font script="Syre" typeface="Estrangelo Edessa"/>
+        <a:font script="Sora" typeface="Nirmala UI"/>
+        <a:font script="Tale" typeface="Microsoft Tai Le"/>
+        <a:font script="Talu" typeface="Microsoft New Tai Lue"/>
+        <a:font script="Tfng" typeface="Ebrima"/>
+      </a:minorFont>
+    </a:fontScheme>
+    <a:fmtScheme name="Office">
+      <a:fillStyleLst>
+        <a:solidFill>
+          <a:schemeClr val="phClr"/>
+        </a:solidFill>
+        <a:gradFill rotWithShape="1">
+          <a:gsLst>
+            <a:gs pos="0">
+              <a:schemeClr val="phClr">
+                <a:lumMod val="110000"/>
+                <a:satMod val="105000"/>
+                <a:tint val="67000"/>
+              </a:schemeClr>
+            </a:gs>
+            <a:gs pos="50000">
+              <a:schemeClr val="phClr">
+                <a:lumMod val="105000"/>
+                <a:satMod val="103000"/>
+                <a:tint val="73000"/>
+              </a:schemeClr>
+            </a:gs>
+            <a:gs pos="100000">
+              <a:schemeClr val="phClr">
+                <a:lumMod val="105000"/>
+                <a:satMod val="109000"/>
+                <a:tint val="81000"/>
+              </a:schemeClr>
+            </a:gs>
+          </a:gsLst>
+          <a:lin ang="5400000" scaled="0"/>
+        </a:gradFill>
+        <a:gradFill rotWithShape="1">
+          <a:gsLst>
+            <a:gs pos="0">
+              <a:schemeClr val="phClr">
+                <a:satMod val="103000"/>
+                <a:lumMod val="102000"/>
+                <a:tint val="94000"/>
+              </a:schemeClr>
+            </a:gs>
+            <a:gs pos="50000">
+              <a:schemeClr val="phClr">
+                <a:satMod val="110000"/>
+                <a:lumMod val="100000"/>
+                <a:shade val="100000"/>
+              </a:schemeClr>
+            </a:gs>
+            <a:gs pos="100000">
+              <a:schemeClr val="phClr">
+                <a:lumMod val="99000"/>
+                <a:satMod val="120000"/>
+                <a:shade val="78000"/>
+              </a:schemeClr>
+            </a:gs>
+          </a:gsLst>
+          <a:lin ang="5400000" scaled="0"/>
+        </a:gradFill>
+      </a:fillStyleLst>
+      <a:lnStyleLst>
+        <a:ln w="6350" cap="flat" cmpd="sng" algn="ctr">
+          <a:solidFill>
+            <a:schemeClr val="phClr"/>
+          </a:solidFill>
+          <a:prstDash val="solid"/>
+          <a:miter lim="800000"/>
+        </a:ln>
+        <a:ln w="12700" cap="flat" cmpd="sng" algn="ctr">
+          <a:solidFill>
+            <a:schemeClr val="phClr"/>
+          </a:solidFill>
+          <a:prstDash val="solid"/>
+          <a:miter lim="800000"/>
+        </a:ln>
+        <a:ln w="19050" cap="flat" cmpd="sng" algn="ctr">
+          <a:solidFill>
+            <a:schemeClr val="phClr"/>
+          </a:solidFill>
+          <a:prstDash val="solid"/>
+          <a:miter lim="800000"/>
+        </a:ln>
+      </a:lnStyleLst>
+      <a:effectStyleLst>
+        <a:effectStyle>
+          <a:effectLst/>
+        </a:effectStyle>
+        <a:effectStyle>
+          <a:effectLst/>
+        </a:effectStyle>
+        <a:effectStyle>
+          <a:effectLst>
+            <a:outerShdw blurRad="57150" dist="19050" dir="5400000" algn="ctr" rotWithShape="0">
+              <a:srgbClr val="000000">
+                <a:alpha val="63000"/>
+              </a:srgbClr>
+            </a:outerShdw>
+          </a:effectLst>
+        </a:effectStyle>
+      </a:effectStyleLst>
+      <a:bgFillStyleLst>
+        <a:solidFill>
+          <a:schemeClr val="phClr"/>
+        </a:solidFill>
+        <a:solidFill>
+          <a:schemeClr val="phClr">
+            <a:tint val="95000"/>
+            <a:satMod val="170000"/>
+          </a:schemeClr>
+        </a:solidFill>
+        <a:gradFill rotWithShape="1">
+          <a:gsLst>
+            <a:gs pos="0">
+              <a:schemeClr val="phClr">
+                <a:tint val="93000"/>
+                <a:satMod val="150000"/>
+                <a:shade val="98000"/>
+                <a:lumMod val="102000"/>
+              </a:schemeClr>
+            </a:gs>
+            <a:gs pos="50000">
+              <a:schemeClr val="phClr">
+                <a:tint val="98000"/>
+                <a:satMod val="130000"/>
+                <a:shade val="90000"/>
+                <a:lumMod val="103000"/>
+              </a:schemeClr>
+            </a:gs>
+            <a:gs pos="100000">
+              <a:schemeClr val="phClr">
+                <a:shade val="63000"/>
+                <a:satMod val="120000"/>
+              </a:schemeClr>
+            </a:gs>
+          </a:gsLst>
+          <a:lin ang="5400000" scaled="0"/>
+        </a:gradFill>
+      </a:bgFillStyleLst>
+    </a:fmtScheme>
+  </a:themeElements>
+  <a:objectDefaults>
+    <a:lnDef>
+      <a:spPr>
+        <a:ln w="9525">
+          <a:solidFill>
+            <a:schemeClr val="tx1"/>
+          </a:solidFill>
+          <a:headEnd type="triangle"/>
+          <a:tailEnd type="triangle"/>
+        </a:ln>
+      </a:spPr>
+      <a:bodyPr/>
+      <a:lstStyle/>
+      <a:style>
+        <a:lnRef idx="1">
+          <a:schemeClr val="accent1"/>
+        </a:lnRef>
+        <a:fillRef idx="0">
+          <a:schemeClr val="accent1"/>
+        </a:fillRef>
+        <a:effectRef idx="0">
+          <a:schemeClr val="accent1"/>
+        </a:effectRef>
+        <a:fontRef idx="minor">
+          <a:schemeClr val="tx1"/>
+        </a:fontRef>
+      </a:style>
+    </a:lnDef>
+  </a:objectDefaults>
+  <a:extraClrSchemeLst/>
+  <a:extLst>
+    <a:ext uri="{05A4C25C-085E-4340-85A3-A5531E510DB2}">
+      <thm15:themeFamily xmlns:thm15="http://schemas.microsoft.com/office/thememl/2012/main" name="Office Theme" id="{62F939B6-93AF-4DB8-9C6B-D6C7DFDC589F}" vid="{4A3C46E8-61CC-4603-A589-7422A47A8E4A}"/>
+    </a:ext>
+  </a:extLst>
+</a:theme>
+</file>
+
+<file path=ppt/theme/theme2.xml><?xml version="1.0" encoding="utf-8"?>
 <a:theme xmlns:a="http://schemas.openxmlformats.org/drawingml/2006/main" name="Office Theme">
   <a:themeElements>
     <a:clrScheme name="Office">
@@ -5485,20 +7884,20 @@
 </file>
 
 <file path=customXml/item2.xml><?xml version="1.0" encoding="utf-8"?>
-<p:properties xmlns:p="http://schemas.microsoft.com/office/2006/metadata/properties" xmlns:xsi="http://www.w3.org/2001/XMLSchema-instance" xmlns:pc="http://schemas.microsoft.com/office/infopath/2007/PartnerControls">
-  <documentManagement>
-    <_activity xmlns="b9c0df90-6177-490c-b060-567d6533c817" xsi:nil="true"/>
-  </documentManagement>
-</p:properties>
-</file>
-
-<file path=customXml/item3.xml><?xml version="1.0" encoding="utf-8"?>
 <?mso-contentType ?>
 <FormTemplates xmlns="http://schemas.microsoft.com/sharepoint/v3/contenttype/forms">
   <Display>DocumentLibraryForm</Display>
   <Edit>DocumentLibraryForm</Edit>
   <New>DocumentLibraryForm</New>
 </FormTemplates>
+</file>
+
+<file path=customXml/item3.xml><?xml version="1.0" encoding="utf-8"?>
+<p:properties xmlns:p="http://schemas.microsoft.com/office/2006/metadata/properties" xmlns:xsi="http://www.w3.org/2001/XMLSchema-instance" xmlns:pc="http://schemas.microsoft.com/office/infopath/2007/PartnerControls">
+  <documentManagement>
+    <_activity xmlns="b9c0df90-6177-490c-b060-567d6533c817" xsi:nil="true"/>
+  </documentManagement>
+</p:properties>
 </file>
 
 <file path=customXml/itemProps1.xml><?xml version="1.0" encoding="utf-8"?>
@@ -5521,6 +7920,14 @@
 </file>
 
 <file path=customXml/itemProps2.xml><?xml version="1.0" encoding="utf-8"?>
+<ds:datastoreItem xmlns:ds="http://schemas.openxmlformats.org/officeDocument/2006/customXml" ds:itemID="{86A9A6AE-A2D2-4466-B053-FEAA2AECCDAE}">
+  <ds:schemaRefs>
+    <ds:schemaRef ds:uri="http://schemas.microsoft.com/sharepoint/v3/contenttype/forms"/>
+  </ds:schemaRefs>
+</ds:datastoreItem>
+</file>
+
+<file path=customXml/itemProps3.xml><?xml version="1.0" encoding="utf-8"?>
 <ds:datastoreItem xmlns:ds="http://schemas.openxmlformats.org/officeDocument/2006/customXml" ds:itemID="{0988BE9C-0C90-420C-9DA9-636C0435E5D7}">
   <ds:schemaRefs>
     <ds:schemaRef ds:uri="http://schemas.microsoft.com/office/2006/documentManagement/types"/>
@@ -5537,14 +7944,6 @@
 </ds:datastoreItem>
 </file>
 
-<file path=customXml/itemProps3.xml><?xml version="1.0" encoding="utf-8"?>
-<ds:datastoreItem xmlns:ds="http://schemas.openxmlformats.org/officeDocument/2006/customXml" ds:itemID="{86A9A6AE-A2D2-4466-B053-FEAA2AECCDAE}">
-  <ds:schemaRefs>
-    <ds:schemaRef ds:uri="http://schemas.microsoft.com/sharepoint/v3/contenttype/forms"/>
-  </ds:schemaRefs>
-</ds:datastoreItem>
-</file>
-
 <file path=docMetadata/LabelInfo.xml><?xml version="1.0" encoding="utf-8"?>
 <clbl:labelList xmlns:clbl="http://schemas.microsoft.com/office/2020/mipLabelMetadata">
   <clbl:label id="{46c98d88-e344-4ed4-8496-4ed7712e255d}" enabled="0" method="" siteId="{46c98d88-e344-4ed4-8496-4ed7712e255d}" removed="1"/>

</xml_diff>

<commit_message>
[Doc] Enhance architecture diagram with commands and positions
</commit_message>
<xml_diff>
--- a/examples/architecture.pptx
+++ b/examples/architecture.pptx
@@ -206,7 +206,7 @@
           <a:p>
             <a:fld id="{4CD64836-4BF9-4E6C-A54C-E76D3002B5D8}" type="datetimeFigureOut">
               <a:rPr lang="en-US" smtClean="0"/>
-              <a:t>07/21/2023</a:t>
+              <a:t>7/22/2023</a:t>
             </a:fld>
             <a:endParaRPr lang="en-US"/>
           </a:p>
@@ -802,7 +802,7 @@
           <a:p>
             <a:fld id="{C6D5F118-0C7E-4BDD-BBA0-7F61C0FBD2C0}" type="datetimeFigureOut">
               <a:rPr lang="en-US" smtClean="0"/>
-              <a:t>07/21/2023</a:t>
+              <a:t>7/22/2023</a:t>
             </a:fld>
             <a:endParaRPr lang="en-US"/>
           </a:p>
@@ -1000,7 +1000,7 @@
           <a:p>
             <a:fld id="{C6D5F118-0C7E-4BDD-BBA0-7F61C0FBD2C0}" type="datetimeFigureOut">
               <a:rPr lang="en-US" smtClean="0"/>
-              <a:t>07/21/2023</a:t>
+              <a:t>7/22/2023</a:t>
             </a:fld>
             <a:endParaRPr lang="en-US"/>
           </a:p>
@@ -1208,7 +1208,7 @@
           <a:p>
             <a:fld id="{C6D5F118-0C7E-4BDD-BBA0-7F61C0FBD2C0}" type="datetimeFigureOut">
               <a:rPr lang="en-US" smtClean="0"/>
-              <a:t>07/21/2023</a:t>
+              <a:t>7/22/2023</a:t>
             </a:fld>
             <a:endParaRPr lang="en-US"/>
           </a:p>
@@ -1406,7 +1406,7 @@
           <a:p>
             <a:fld id="{C6D5F118-0C7E-4BDD-BBA0-7F61C0FBD2C0}" type="datetimeFigureOut">
               <a:rPr lang="en-US" smtClean="0"/>
-              <a:t>07/21/2023</a:t>
+              <a:t>7/22/2023</a:t>
             </a:fld>
             <a:endParaRPr lang="en-US"/>
           </a:p>
@@ -1681,7 +1681,7 @@
           <a:p>
             <a:fld id="{C6D5F118-0C7E-4BDD-BBA0-7F61C0FBD2C0}" type="datetimeFigureOut">
               <a:rPr lang="en-US" smtClean="0"/>
-              <a:t>07/21/2023</a:t>
+              <a:t>7/22/2023</a:t>
             </a:fld>
             <a:endParaRPr lang="en-US"/>
           </a:p>
@@ -1946,7 +1946,7 @@
           <a:p>
             <a:fld id="{C6D5F118-0C7E-4BDD-BBA0-7F61C0FBD2C0}" type="datetimeFigureOut">
               <a:rPr lang="en-US" smtClean="0"/>
-              <a:t>07/21/2023</a:t>
+              <a:t>7/22/2023</a:t>
             </a:fld>
             <a:endParaRPr lang="en-US"/>
           </a:p>
@@ -2358,7 +2358,7 @@
           <a:p>
             <a:fld id="{C6D5F118-0C7E-4BDD-BBA0-7F61C0FBD2C0}" type="datetimeFigureOut">
               <a:rPr lang="en-US" smtClean="0"/>
-              <a:t>07/21/2023</a:t>
+              <a:t>7/22/2023</a:t>
             </a:fld>
             <a:endParaRPr lang="en-US"/>
           </a:p>
@@ -2499,7 +2499,7 @@
           <a:p>
             <a:fld id="{C6D5F118-0C7E-4BDD-BBA0-7F61C0FBD2C0}" type="datetimeFigureOut">
               <a:rPr lang="en-US" smtClean="0"/>
-              <a:t>07/21/2023</a:t>
+              <a:t>7/22/2023</a:t>
             </a:fld>
             <a:endParaRPr lang="en-US"/>
           </a:p>
@@ -2612,7 +2612,7 @@
           <a:p>
             <a:fld id="{C6D5F118-0C7E-4BDD-BBA0-7F61C0FBD2C0}" type="datetimeFigureOut">
               <a:rPr lang="en-US" smtClean="0"/>
-              <a:t>07/21/2023</a:t>
+              <a:t>7/22/2023</a:t>
             </a:fld>
             <a:endParaRPr lang="en-US"/>
           </a:p>
@@ -2923,7 +2923,7 @@
           <a:p>
             <a:fld id="{C6D5F118-0C7E-4BDD-BBA0-7F61C0FBD2C0}" type="datetimeFigureOut">
               <a:rPr lang="en-US" smtClean="0"/>
-              <a:t>07/21/2023</a:t>
+              <a:t>7/22/2023</a:t>
             </a:fld>
             <a:endParaRPr lang="en-US"/>
           </a:p>
@@ -3211,7 +3211,7 @@
           <a:p>
             <a:fld id="{C6D5F118-0C7E-4BDD-BBA0-7F61C0FBD2C0}" type="datetimeFigureOut">
               <a:rPr lang="en-US" smtClean="0"/>
-              <a:t>07/21/2023</a:t>
+              <a:t>7/22/2023</a:t>
             </a:fld>
             <a:endParaRPr lang="en-US"/>
           </a:p>
@@ -3452,7 +3452,7 @@
           <a:p>
             <a:fld id="{C6D5F118-0C7E-4BDD-BBA0-7F61C0FBD2C0}" type="datetimeFigureOut">
               <a:rPr lang="en-US" smtClean="0"/>
-              <a:t>07/21/2023</a:t>
+              <a:t>7/22/2023</a:t>
             </a:fld>
             <a:endParaRPr lang="en-US"/>
           </a:p>
@@ -3883,8 +3883,8 @@
         </p:nvSpPr>
         <p:spPr>
           <a:xfrm>
-            <a:off x="5635723" y="984597"/>
-            <a:ext cx="2782575" cy="1886465"/>
+            <a:off x="5269487" y="983830"/>
+            <a:ext cx="3594997" cy="1404057"/>
           </a:xfrm>
           <a:prstGeom prst="rect">
             <a:avLst/>
@@ -3974,16 +3974,16 @@
         </p:nvSpPr>
         <p:spPr>
           <a:xfrm>
-            <a:off x="7165929" y="1695110"/>
-            <a:ext cx="1075038" cy="465437"/>
+            <a:off x="7518836" y="1401332"/>
+            <a:ext cx="1080000" cy="465437"/>
           </a:xfrm>
           <a:prstGeom prst="rect">
             <a:avLst/>
           </a:prstGeom>
           <a:solidFill>
-            <a:schemeClr val="accent2">
-              <a:lumMod val="20000"/>
-              <a:lumOff val="80000"/>
+            <a:schemeClr val="accent6">
+              <a:lumMod val="40000"/>
+              <a:lumOff val="60000"/>
             </a:schemeClr>
           </a:solidFill>
           <a:ln>
@@ -4040,16 +4040,16 @@
         </p:nvSpPr>
         <p:spPr>
           <a:xfrm>
-            <a:off x="5799951" y="1695108"/>
-            <a:ext cx="1075037" cy="465437"/>
+            <a:off x="5721551" y="1397608"/>
+            <a:ext cx="1080000" cy="465437"/>
           </a:xfrm>
           <a:prstGeom prst="rect">
             <a:avLst/>
           </a:prstGeom>
           <a:solidFill>
-            <a:schemeClr val="accent2">
-              <a:lumMod val="20000"/>
-              <a:lumOff val="80000"/>
+            <a:schemeClr val="accent6">
+              <a:lumMod val="40000"/>
+              <a:lumOff val="60000"/>
             </a:schemeClr>
           </a:solidFill>
           <a:ln>
@@ -4106,8 +4106,8 @@
         </p:nvSpPr>
         <p:spPr>
           <a:xfrm>
-            <a:off x="1116630" y="984597"/>
-            <a:ext cx="2886436" cy="2628900"/>
+            <a:off x="388615" y="797424"/>
+            <a:ext cx="3594996" cy="2704534"/>
           </a:xfrm>
           <a:prstGeom prst="rect">
             <a:avLst/>
@@ -4180,7 +4180,7 @@
         </p:nvSpPr>
         <p:spPr>
           <a:xfrm>
-            <a:off x="4348265" y="3557081"/>
+            <a:off x="4328809" y="3265252"/>
             <a:ext cx="4070034" cy="2576452"/>
           </a:xfrm>
           <a:prstGeom prst="rect">
@@ -4254,7 +4254,7 @@
         </p:nvSpPr>
         <p:spPr>
           <a:xfrm>
-            <a:off x="5100716" y="3870929"/>
+            <a:off x="5081260" y="3579100"/>
             <a:ext cx="1196369" cy="457200"/>
           </a:xfrm>
           <a:prstGeom prst="rect">
@@ -4320,7 +4320,7 @@
         </p:nvSpPr>
         <p:spPr>
           <a:xfrm>
-            <a:off x="6404353" y="3870929"/>
+            <a:off x="6384897" y="3579100"/>
             <a:ext cx="1197864" cy="457200"/>
           </a:xfrm>
           <a:prstGeom prst="rect">
@@ -4386,7 +4386,7 @@
         </p:nvSpPr>
         <p:spPr>
           <a:xfrm>
-            <a:off x="6407343" y="4560846"/>
+            <a:off x="6387887" y="4269017"/>
             <a:ext cx="1196369" cy="457200"/>
           </a:xfrm>
           <a:prstGeom prst="rect">
@@ -4459,16 +4459,16 @@
         </p:nvSpPr>
         <p:spPr>
           <a:xfrm>
-            <a:off x="2762533" y="1695107"/>
+            <a:off x="2670520" y="1395758"/>
             <a:ext cx="1075037" cy="465437"/>
           </a:xfrm>
           <a:prstGeom prst="rect">
             <a:avLst/>
           </a:prstGeom>
           <a:solidFill>
-            <a:schemeClr val="accent2">
-              <a:lumMod val="20000"/>
-              <a:lumOff val="80000"/>
+            <a:schemeClr val="accent6">
+              <a:lumMod val="40000"/>
+              <a:lumOff val="60000"/>
             </a:schemeClr>
           </a:solidFill>
           <a:ln>
@@ -4525,7 +4525,7 @@
         </p:nvSpPr>
         <p:spPr>
           <a:xfrm>
-            <a:off x="9207760" y="1616384"/>
+            <a:off x="9259320" y="1323045"/>
             <a:ext cx="1257285" cy="622889"/>
           </a:xfrm>
           <a:prstGeom prst="rect">
@@ -4602,9 +4602,9 @@
           <p:nvPr/>
         </p:nvCxnSpPr>
         <p:spPr>
-          <a:xfrm flipH="1">
-            <a:off x="8240967" y="1927829"/>
-            <a:ext cx="966793" cy="0"/>
+          <a:xfrm flipH="1" flipV="1">
+            <a:off x="8598836" y="1634051"/>
+            <a:ext cx="660484" cy="439"/>
           </a:xfrm>
           <a:prstGeom prst="straightConnector1">
             <a:avLst/>
@@ -4656,8 +4656,8 @@
         </p:nvCxnSpPr>
         <p:spPr>
           <a:xfrm flipH="1" flipV="1">
-            <a:off x="6874988" y="1927827"/>
-            <a:ext cx="290941" cy="2"/>
+            <a:off x="6801551" y="1630327"/>
+            <a:ext cx="717285" cy="3724"/>
           </a:xfrm>
           <a:prstGeom prst="straightConnector1">
             <a:avLst/>
@@ -4710,8 +4710,8 @@
         </p:nvCxnSpPr>
         <p:spPr>
           <a:xfrm rot="16200000" flipH="1">
-            <a:off x="5815185" y="2682829"/>
-            <a:ext cx="1710384" cy="665815"/>
+            <a:off x="5764663" y="2359933"/>
+            <a:ext cx="1716055" cy="722278"/>
           </a:xfrm>
           <a:prstGeom prst="bentConnector3">
             <a:avLst>
@@ -4759,8 +4759,8 @@
         </p:nvCxnSpPr>
         <p:spPr>
           <a:xfrm rot="5400000">
-            <a:off x="5162994" y="2696453"/>
-            <a:ext cx="1710384" cy="638569"/>
+            <a:off x="5112471" y="2430019"/>
+            <a:ext cx="1716055" cy="582106"/>
           </a:xfrm>
           <a:prstGeom prst="bentConnector3">
             <a:avLst>
@@ -4804,8 +4804,74 @@
         </p:nvSpPr>
         <p:spPr>
           <a:xfrm>
-            <a:off x="1311160" y="1275659"/>
-            <a:ext cx="1075037" cy="465437"/>
+            <a:off x="847126" y="1031065"/>
+            <a:ext cx="1013311" cy="1194823"/>
+          </a:xfrm>
+          <a:prstGeom prst="rect">
+            <a:avLst/>
+          </a:prstGeom>
+          <a:solidFill>
+            <a:schemeClr val="accent2">
+              <a:lumMod val="20000"/>
+              <a:lumOff val="80000"/>
+            </a:schemeClr>
+          </a:solidFill>
+          <a:ln>
+            <a:solidFill>
+              <a:schemeClr val="tx1"/>
+            </a:solidFill>
+          </a:ln>
+        </p:spPr>
+        <p:style>
+          <a:lnRef idx="2">
+            <a:schemeClr val="accent1">
+              <a:shade val="50000"/>
+            </a:schemeClr>
+          </a:lnRef>
+          <a:fillRef idx="1">
+            <a:schemeClr val="accent1"/>
+          </a:fillRef>
+          <a:effectRef idx="0">
+            <a:schemeClr val="accent1"/>
+          </a:effectRef>
+          <a:fontRef idx="minor">
+            <a:schemeClr val="lt1"/>
+          </a:fontRef>
+        </p:style>
+        <p:txBody>
+          <a:bodyPr rtlCol="0" anchor="b" anchorCtr="1"/>
+          <a:lstStyle/>
+          <a:p>
+            <a:pPr algn="ctr"/>
+            <a:r>
+              <a:rPr lang="en-US" sz="1400" dirty="0">
+                <a:solidFill>
+                  <a:schemeClr val="tx1"/>
+                </a:solidFill>
+                <a:latin typeface="LXGW WenKai" panose="02020500000000000000" pitchFamily="18" charset="-120"/>
+                <a:ea typeface="LXGW WenKai" panose="02020500000000000000" pitchFamily="18" charset="-120"/>
+              </a:rPr>
+              <a:t>Managers</a:t>
+            </a:r>
+          </a:p>
+        </p:txBody>
+      </p:sp>
+      <p:sp>
+        <p:nvSpPr>
+          <p:cNvPr id="53" name="Rectangle 52">
+            <a:extLst>
+              <a:ext uri="{FF2B5EF4-FFF2-40B4-BE49-F238E27FC236}">
+                <a16:creationId xmlns:a16="http://schemas.microsoft.com/office/drawing/2014/main" id="{F899B14D-B54D-BDCA-ACEE-CFF7225092D0}"/>
+              </a:ext>
+            </a:extLst>
+          </p:cNvPr>
+          <p:cNvSpPr/>
+          <p:nvPr/>
+        </p:nvSpPr>
+        <p:spPr>
+          <a:xfrm>
+            <a:off x="1015922" y="1136397"/>
+            <a:ext cx="685449" cy="186648"/>
           </a:xfrm>
           <a:prstGeom prst="rect">
             <a:avLst/>
@@ -4844,6 +4910,72 @@
           <a:p>
             <a:pPr algn="ctr"/>
             <a:r>
+              <a:rPr lang="en-US" sz="1200" dirty="0">
+                <a:solidFill>
+                  <a:schemeClr val="tx1"/>
+                </a:solidFill>
+                <a:latin typeface="LXGW WenKai" panose="02020500000000000000" pitchFamily="18" charset="-120"/>
+                <a:ea typeface="LXGW WenKai" panose="02020500000000000000" pitchFamily="18" charset="-120"/>
+              </a:rPr>
+              <a:t>Agent</a:t>
+            </a:r>
+          </a:p>
+        </p:txBody>
+      </p:sp>
+      <p:sp>
+        <p:nvSpPr>
+          <p:cNvPr id="80" name="Rectangle 79">
+            <a:extLst>
+              <a:ext uri="{FF2B5EF4-FFF2-40B4-BE49-F238E27FC236}">
+                <a16:creationId xmlns:a16="http://schemas.microsoft.com/office/drawing/2014/main" id="{55E3340C-8A4D-29A5-5A0C-170E40347EC9}"/>
+              </a:ext>
+            </a:extLst>
+          </p:cNvPr>
+          <p:cNvSpPr/>
+          <p:nvPr/>
+        </p:nvSpPr>
+        <p:spPr>
+          <a:xfrm>
+            <a:off x="5081260" y="4958934"/>
+            <a:ext cx="1371600" cy="457200"/>
+          </a:xfrm>
+          <a:prstGeom prst="rect">
+            <a:avLst/>
+          </a:prstGeom>
+          <a:solidFill>
+            <a:schemeClr val="accent4">
+              <a:lumMod val="20000"/>
+              <a:lumOff val="80000"/>
+            </a:schemeClr>
+          </a:solidFill>
+          <a:ln>
+            <a:solidFill>
+              <a:schemeClr val="tx1"/>
+            </a:solidFill>
+          </a:ln>
+        </p:spPr>
+        <p:style>
+          <a:lnRef idx="2">
+            <a:schemeClr val="accent1">
+              <a:shade val="50000"/>
+            </a:schemeClr>
+          </a:lnRef>
+          <a:fillRef idx="1">
+            <a:schemeClr val="accent1"/>
+          </a:fillRef>
+          <a:effectRef idx="0">
+            <a:schemeClr val="accent1"/>
+          </a:effectRef>
+          <a:fontRef idx="minor">
+            <a:schemeClr val="lt1"/>
+          </a:fontRef>
+        </p:style>
+        <p:txBody>
+          <a:bodyPr rtlCol="0" anchor="ctr" anchorCtr="1"/>
+          <a:lstStyle/>
+          <a:p>
+            <a:pPr algn="ctr"/>
+            <a:r>
               <a:rPr lang="en-US" sz="1400" dirty="0">
                 <a:solidFill>
                   <a:schemeClr val="tx1"/>
@@ -4851,17 +4983,71 @@
                 <a:latin typeface="LXGW WenKai" panose="02020500000000000000" pitchFamily="18" charset="-120"/>
                 <a:ea typeface="LXGW WenKai" panose="02020500000000000000" pitchFamily="18" charset="-120"/>
               </a:rPr>
-              <a:t>Managers</a:t>
-            </a:r>
-          </a:p>
-        </p:txBody>
-      </p:sp>
-      <p:sp>
-        <p:nvSpPr>
-          <p:cNvPr id="53" name="Rectangle 52">
-            <a:extLst>
-              <a:ext uri="{FF2B5EF4-FFF2-40B4-BE49-F238E27FC236}">
-                <a16:creationId xmlns:a16="http://schemas.microsoft.com/office/drawing/2014/main" id="{F899B14D-B54D-BDCA-ACEE-CFF7225092D0}"/>
+              <a:t>Agent Configs</a:t>
+            </a:r>
+            <a:endParaRPr lang="en-US" sz="1600" dirty="0">
+              <a:solidFill>
+                <a:schemeClr val="tx1"/>
+              </a:solidFill>
+              <a:latin typeface="LXGW WenKai" panose="02020500000000000000" pitchFamily="18" charset="-120"/>
+              <a:ea typeface="LXGW WenKai" panose="02020500000000000000" pitchFamily="18" charset="-120"/>
+            </a:endParaRPr>
+          </a:p>
+        </p:txBody>
+      </p:sp>
+      <p:cxnSp>
+        <p:nvCxnSpPr>
+          <p:cNvPr id="84" name="Connector: Elbow 83">
+            <a:extLst>
+              <a:ext uri="{FF2B5EF4-FFF2-40B4-BE49-F238E27FC236}">
+                <a16:creationId xmlns:a16="http://schemas.microsoft.com/office/drawing/2014/main" id="{0EA3BDB1-F2A4-5C02-333F-366299C1662B}"/>
+              </a:ext>
+            </a:extLst>
+          </p:cNvPr>
+          <p:cNvCxnSpPr>
+            <a:cxnSpLocks/>
+            <a:stCxn id="10" idx="2"/>
+            <a:endCxn id="96" idx="1"/>
+          </p:cNvCxnSpPr>
+          <p:nvPr/>
+        </p:nvCxnSpPr>
+        <p:spPr>
+          <a:xfrm rot="16200000" flipH="1">
+            <a:off x="2826438" y="2242795"/>
+            <a:ext cx="2636422" cy="1873221"/>
+          </a:xfrm>
+          <a:prstGeom prst="bentConnector2">
+            <a:avLst/>
+          </a:prstGeom>
+          <a:ln w="9525">
+            <a:solidFill>
+              <a:schemeClr val="tx1"/>
+            </a:solidFill>
+            <a:headEnd type="triangle"/>
+            <a:tailEnd type="triangle"/>
+          </a:ln>
+        </p:spPr>
+        <p:style>
+          <a:lnRef idx="1">
+            <a:schemeClr val="accent1"/>
+          </a:lnRef>
+          <a:fillRef idx="0">
+            <a:schemeClr val="accent1"/>
+          </a:fillRef>
+          <a:effectRef idx="0">
+            <a:schemeClr val="accent1"/>
+          </a:effectRef>
+          <a:fontRef idx="minor">
+            <a:schemeClr val="tx1"/>
+          </a:fontRef>
+        </p:style>
+      </p:cxnSp>
+      <p:sp>
+        <p:nvSpPr>
+          <p:cNvPr id="96" name="Rectangle 95">
+            <a:extLst>
+              <a:ext uri="{FF2B5EF4-FFF2-40B4-BE49-F238E27FC236}">
+                <a16:creationId xmlns:a16="http://schemas.microsoft.com/office/drawing/2014/main" id="{1A571AEA-B399-C4AC-3A18-2CA6BF7CEACD}"/>
               </a:ext>
             </a:extLst>
           </p:cNvPr>
@@ -4870,16 +5056,16 @@
         </p:nvSpPr>
         <p:spPr>
           <a:xfrm>
-            <a:off x="1311158" y="2005045"/>
-            <a:ext cx="1075037" cy="465437"/>
+            <a:off x="5081260" y="4269017"/>
+            <a:ext cx="1196369" cy="457200"/>
           </a:xfrm>
           <a:prstGeom prst="rect">
             <a:avLst/>
           </a:prstGeom>
           <a:solidFill>
-            <a:schemeClr val="accent2">
-              <a:lumMod val="40000"/>
-              <a:lumOff val="60000"/>
+            <a:schemeClr val="accent4">
+              <a:lumMod val="20000"/>
+              <a:lumOff val="80000"/>
             </a:schemeClr>
           </a:solidFill>
           <a:ln>
@@ -4917,31 +5103,377 @@
                 <a:latin typeface="LXGW WenKai" panose="02020500000000000000" pitchFamily="18" charset="-120"/>
                 <a:ea typeface="LXGW WenKai" panose="02020500000000000000" pitchFamily="18" charset="-120"/>
               </a:rPr>
-              <a:t>Agents</a:t>
+              <a:t>Contexts</a:t>
             </a:r>
           </a:p>
         </p:txBody>
       </p:sp>
       <p:cxnSp>
         <p:nvCxnSpPr>
-          <p:cNvPr id="58" name="Straight Arrow Connector 57">
-            <a:extLst>
-              <a:ext uri="{FF2B5EF4-FFF2-40B4-BE49-F238E27FC236}">
-                <a16:creationId xmlns:a16="http://schemas.microsoft.com/office/drawing/2014/main" id="{8292F6D1-99B9-261E-A427-933A611650C2}"/>
+          <p:cNvPr id="100" name="Connector: Elbow 99">
+            <a:extLst>
+              <a:ext uri="{FF2B5EF4-FFF2-40B4-BE49-F238E27FC236}">
+                <a16:creationId xmlns:a16="http://schemas.microsoft.com/office/drawing/2014/main" id="{3264145F-BEA8-B01C-6434-B36E905DE09F}"/>
               </a:ext>
             </a:extLst>
           </p:cNvPr>
           <p:cNvCxnSpPr>
             <a:cxnSpLocks/>
-            <a:stCxn id="53" idx="0"/>
-            <a:endCxn id="49" idx="2"/>
+            <a:stCxn id="10" idx="2"/>
+            <a:endCxn id="80" idx="2"/>
           </p:cNvCxnSpPr>
           <p:nvPr/>
         </p:nvCxnSpPr>
         <p:spPr>
-          <a:xfrm flipV="1">
-            <a:off x="1848677" y="1741096"/>
-            <a:ext cx="2" cy="263949"/>
+          <a:xfrm rot="16200000" flipH="1">
+            <a:off x="2710080" y="2359153"/>
+            <a:ext cx="3554939" cy="2559021"/>
+          </a:xfrm>
+          <a:prstGeom prst="bentConnector3">
+            <a:avLst>
+              <a:gd name="adj1" fmla="val 106430"/>
+            </a:avLst>
+          </a:prstGeom>
+          <a:ln w="9525">
+            <a:solidFill>
+              <a:schemeClr val="tx1"/>
+            </a:solidFill>
+            <a:headEnd type="triangle"/>
+            <a:tailEnd type="triangle"/>
+          </a:ln>
+        </p:spPr>
+        <p:style>
+          <a:lnRef idx="1">
+            <a:schemeClr val="accent1"/>
+          </a:lnRef>
+          <a:fillRef idx="0">
+            <a:schemeClr val="accent1"/>
+          </a:fillRef>
+          <a:effectRef idx="0">
+            <a:schemeClr val="accent1"/>
+          </a:effectRef>
+          <a:fontRef idx="minor">
+            <a:schemeClr val="tx1"/>
+          </a:fontRef>
+        </p:style>
+      </p:cxnSp>
+      <p:cxnSp>
+        <p:nvCxnSpPr>
+          <p:cNvPr id="33" name="Connector: Elbow 32">
+            <a:extLst>
+              <a:ext uri="{FF2B5EF4-FFF2-40B4-BE49-F238E27FC236}">
+                <a16:creationId xmlns:a16="http://schemas.microsoft.com/office/drawing/2014/main" id="{FECD5B19-9ABD-FBE1-1881-23E52064E9EF}"/>
+              </a:ext>
+            </a:extLst>
+          </p:cNvPr>
+          <p:cNvCxnSpPr>
+            <a:cxnSpLocks/>
+            <a:stCxn id="10" idx="2"/>
+            <a:endCxn id="9" idx="2"/>
+          </p:cNvCxnSpPr>
+          <p:nvPr/>
+        </p:nvCxnSpPr>
+        <p:spPr>
+          <a:xfrm rot="16200000" flipH="1">
+            <a:off x="3664544" y="1404689"/>
+            <a:ext cx="2865022" cy="3778033"/>
+          </a:xfrm>
+          <a:prstGeom prst="bentConnector3">
+            <a:avLst>
+              <a:gd name="adj1" fmla="val 105942"/>
+            </a:avLst>
+          </a:prstGeom>
+          <a:ln w="9525">
+            <a:solidFill>
+              <a:schemeClr val="tx1"/>
+            </a:solidFill>
+            <a:headEnd type="triangle"/>
+            <a:tailEnd type="triangle"/>
+          </a:ln>
+        </p:spPr>
+        <p:style>
+          <a:lnRef idx="1">
+            <a:schemeClr val="accent1"/>
+          </a:lnRef>
+          <a:fillRef idx="0">
+            <a:schemeClr val="accent1"/>
+          </a:fillRef>
+          <a:effectRef idx="0">
+            <a:schemeClr val="accent1"/>
+          </a:effectRef>
+          <a:fontRef idx="minor">
+            <a:schemeClr val="tx1"/>
+          </a:fontRef>
+        </p:style>
+      </p:cxnSp>
+      <p:sp>
+        <p:nvSpPr>
+          <p:cNvPr id="160" name="Rectangle 159">
+            <a:extLst>
+              <a:ext uri="{FF2B5EF4-FFF2-40B4-BE49-F238E27FC236}">
+                <a16:creationId xmlns:a16="http://schemas.microsoft.com/office/drawing/2014/main" id="{2D663D7A-E75A-A89B-C125-37C84B176016}"/>
+              </a:ext>
+            </a:extLst>
+          </p:cNvPr>
+          <p:cNvSpPr/>
+          <p:nvPr/>
+        </p:nvSpPr>
+        <p:spPr>
+          <a:xfrm>
+            <a:off x="847126" y="2479496"/>
+            <a:ext cx="881844" cy="415942"/>
+          </a:xfrm>
+          <a:prstGeom prst="rect">
+            <a:avLst/>
+          </a:prstGeom>
+          <a:solidFill>
+            <a:schemeClr val="accent2">
+              <a:lumMod val="60000"/>
+              <a:lumOff val="40000"/>
+            </a:schemeClr>
+          </a:solidFill>
+          <a:ln>
+            <a:solidFill>
+              <a:schemeClr val="tx1"/>
+            </a:solidFill>
+          </a:ln>
+        </p:spPr>
+        <p:style>
+          <a:lnRef idx="2">
+            <a:schemeClr val="accent1">
+              <a:shade val="50000"/>
+            </a:schemeClr>
+          </a:lnRef>
+          <a:fillRef idx="1">
+            <a:schemeClr val="accent1"/>
+          </a:fillRef>
+          <a:effectRef idx="0">
+            <a:schemeClr val="accent1"/>
+          </a:effectRef>
+          <a:fontRef idx="minor">
+            <a:schemeClr val="lt1"/>
+          </a:fontRef>
+        </p:style>
+        <p:txBody>
+          <a:bodyPr rtlCol="0" anchor="ctr" anchorCtr="1"/>
+          <a:lstStyle/>
+          <a:p>
+            <a:pPr algn="ctr"/>
+            <a:r>
+              <a:rPr lang="en-US" sz="1400" dirty="0">
+                <a:solidFill>
+                  <a:schemeClr val="tx1"/>
+                </a:solidFill>
+                <a:latin typeface="LXGW WenKai" panose="02020500000000000000" pitchFamily="18" charset="-120"/>
+                <a:ea typeface="LXGW WenKai" panose="02020500000000000000" pitchFamily="18" charset="-120"/>
+              </a:rPr>
+              <a:t>LLMs</a:t>
+            </a:r>
+          </a:p>
+        </p:txBody>
+      </p:sp>
+      <p:sp>
+        <p:nvSpPr>
+          <p:cNvPr id="18" name="文本框 17">
+            <a:extLst>
+              <a:ext uri="{FF2B5EF4-FFF2-40B4-BE49-F238E27FC236}">
+                <a16:creationId xmlns:a16="http://schemas.microsoft.com/office/drawing/2014/main" id="{0DDDA220-E70A-3BF9-3E9A-236405248724}"/>
+              </a:ext>
+            </a:extLst>
+          </p:cNvPr>
+          <p:cNvSpPr txBox="1"/>
+          <p:nvPr/>
+        </p:nvSpPr>
+        <p:spPr>
+          <a:xfrm>
+            <a:off x="5451466" y="323758"/>
+            <a:ext cx="1620169" cy="453183"/>
+          </a:xfrm>
+          <a:prstGeom prst="rect">
+            <a:avLst/>
+          </a:prstGeom>
+          <a:noFill/>
+          <a:ln>
+            <a:solidFill>
+              <a:schemeClr val="accent2">
+                <a:lumMod val="75000"/>
+              </a:schemeClr>
+            </a:solidFill>
+            <a:prstDash val="dash"/>
+          </a:ln>
+        </p:spPr>
+        <p:txBody>
+          <a:bodyPr wrap="none" lIns="72000" tIns="72000" rIns="72000" bIns="72000" rtlCol="0">
+            <a:spAutoFit/>
+          </a:bodyPr>
+          <a:lstStyle/>
+          <a:p>
+            <a:pPr algn="ctr"/>
+            <a:r>
+              <a:rPr lang="en-US" altLang="zh-CN" sz="1000" dirty="0">
+                <a:solidFill>
+                  <a:schemeClr val="accent2">
+                    <a:lumMod val="75000"/>
+                  </a:schemeClr>
+                </a:solidFill>
+                <a:latin typeface="LXGW WenKai Mono" panose="02020509000000000000" pitchFamily="49" charset="-122"/>
+                <a:ea typeface="LXGW WenKai Mono" panose="02020509000000000000" pitchFamily="49" charset="-122"/>
+              </a:rPr>
+              <a:t>python </a:t>
+            </a:r>
+            <a:r>
+              <a:rPr lang="en-US" altLang="zh-CN" sz="1000" dirty="0">
+                <a:solidFill>
+                  <a:schemeClr val="accent6">
+                    <a:lumMod val="75000"/>
+                  </a:schemeClr>
+                </a:solidFill>
+                <a:latin typeface="LXGW WenKai Mono" panose="02020509000000000000" pitchFamily="49" charset="-122"/>
+                <a:ea typeface="LXGW WenKai Mono" panose="02020509000000000000" pitchFamily="49" charset="-122"/>
+              </a:rPr>
+              <a:t>./backend/app.py</a:t>
+            </a:r>
+          </a:p>
+          <a:p>
+            <a:pPr algn="ctr"/>
+            <a:r>
+              <a:rPr lang="en-US" altLang="zh-CN" sz="1000" dirty="0">
+                <a:latin typeface="LXGW WenKai Mono" panose="02020509000000000000" pitchFamily="49" charset="-122"/>
+                <a:ea typeface="LXGW WenKai Mono" panose="02020509000000000000" pitchFamily="49" charset="-122"/>
+              </a:rPr>
+              <a:t>http://localhost:</a:t>
+            </a:r>
+            <a:r>
+              <a:rPr lang="en-US" altLang="zh-CN" sz="1000" dirty="0">
+                <a:solidFill>
+                  <a:srgbClr val="00B0F0"/>
+                </a:solidFill>
+                <a:latin typeface="LXGW WenKai Mono" panose="02020509000000000000" pitchFamily="49" charset="-122"/>
+                <a:ea typeface="LXGW WenKai Mono" panose="02020509000000000000" pitchFamily="49" charset="-122"/>
+              </a:rPr>
+              <a:t>5000</a:t>
+            </a:r>
+            <a:endParaRPr lang="zh-CN" altLang="en-US" sz="1000" dirty="0">
+              <a:solidFill>
+                <a:srgbClr val="00B0F0"/>
+              </a:solidFill>
+              <a:latin typeface="LXGW WenKai Mono" panose="02020509000000000000" pitchFamily="49" charset="-122"/>
+              <a:ea typeface="LXGW WenKai Mono" panose="02020509000000000000" pitchFamily="49" charset="-122"/>
+            </a:endParaRPr>
+          </a:p>
+        </p:txBody>
+      </p:sp>
+      <p:sp>
+        <p:nvSpPr>
+          <p:cNvPr id="36" name="文本框 35">
+            <a:extLst>
+              <a:ext uri="{FF2B5EF4-FFF2-40B4-BE49-F238E27FC236}">
+                <a16:creationId xmlns:a16="http://schemas.microsoft.com/office/drawing/2014/main" id="{D6BEB6F2-52D1-30C4-ADEC-0530FBECB57D}"/>
+              </a:ext>
+            </a:extLst>
+          </p:cNvPr>
+          <p:cNvSpPr txBox="1"/>
+          <p:nvPr/>
+        </p:nvSpPr>
+        <p:spPr>
+          <a:xfrm>
+            <a:off x="7244316" y="337259"/>
+            <a:ext cx="1620168" cy="453183"/>
+          </a:xfrm>
+          <a:prstGeom prst="rect">
+            <a:avLst/>
+          </a:prstGeom>
+          <a:noFill/>
+          <a:ln>
+            <a:solidFill>
+              <a:schemeClr val="accent2">
+                <a:lumMod val="75000"/>
+              </a:schemeClr>
+            </a:solidFill>
+            <a:prstDash val="dash"/>
+          </a:ln>
+        </p:spPr>
+        <p:txBody>
+          <a:bodyPr wrap="square" lIns="72000" tIns="72000" rIns="72000" bIns="72000" rtlCol="0">
+            <a:spAutoFit/>
+          </a:bodyPr>
+          <a:lstStyle/>
+          <a:p>
+            <a:pPr algn="ctr"/>
+            <a:r>
+              <a:rPr lang="en-US" altLang="zh-CN" sz="1000" dirty="0" err="1">
+                <a:solidFill>
+                  <a:schemeClr val="accent2">
+                    <a:lumMod val="75000"/>
+                  </a:schemeClr>
+                </a:solidFill>
+                <a:latin typeface="LXGW WenKai Mono" panose="02020509000000000000" pitchFamily="49" charset="-122"/>
+                <a:ea typeface="LXGW WenKai Mono" panose="02020509000000000000" pitchFamily="49" charset="-122"/>
+              </a:rPr>
+              <a:t>npm</a:t>
+            </a:r>
+            <a:r>
+              <a:rPr lang="en-US" altLang="zh-CN" sz="1000" dirty="0">
+                <a:solidFill>
+                  <a:schemeClr val="accent2">
+                    <a:lumMod val="75000"/>
+                  </a:schemeClr>
+                </a:solidFill>
+                <a:latin typeface="LXGW WenKai Mono" panose="02020509000000000000" pitchFamily="49" charset="-122"/>
+                <a:ea typeface="LXGW WenKai Mono" panose="02020509000000000000" pitchFamily="49" charset="-122"/>
+              </a:rPr>
+              <a:t> run dev</a:t>
+            </a:r>
+          </a:p>
+          <a:p>
+            <a:pPr algn="ctr"/>
+            <a:r>
+              <a:rPr lang="en-US" altLang="zh-CN" sz="1000" dirty="0">
+                <a:latin typeface="LXGW WenKai Mono" panose="02020509000000000000" pitchFamily="49" charset="-122"/>
+                <a:ea typeface="LXGW WenKai Mono" panose="02020509000000000000" pitchFamily="49" charset="-122"/>
+              </a:rPr>
+              <a:t>http://localhost:</a:t>
+            </a:r>
+            <a:r>
+              <a:rPr lang="en-US" altLang="zh-CN" sz="1000" dirty="0">
+                <a:solidFill>
+                  <a:srgbClr val="00B0F0"/>
+                </a:solidFill>
+                <a:latin typeface="LXGW WenKai Mono" panose="02020509000000000000" pitchFamily="49" charset="-122"/>
+                <a:ea typeface="LXGW WenKai Mono" panose="02020509000000000000" pitchFamily="49" charset="-122"/>
+              </a:rPr>
+              <a:t>5173</a:t>
+            </a:r>
+            <a:endParaRPr lang="zh-CN" altLang="en-US" sz="1000" dirty="0">
+              <a:solidFill>
+                <a:srgbClr val="00B0F0"/>
+              </a:solidFill>
+              <a:latin typeface="LXGW WenKai Mono" panose="02020509000000000000" pitchFamily="49" charset="-122"/>
+              <a:ea typeface="LXGW WenKai Mono" panose="02020509000000000000" pitchFamily="49" charset="-122"/>
+            </a:endParaRPr>
+          </a:p>
+        </p:txBody>
+      </p:sp>
+      <p:cxnSp>
+        <p:nvCxnSpPr>
+          <p:cNvPr id="41" name="Straight Arrow Connector 14">
+            <a:extLst>
+              <a:ext uri="{FF2B5EF4-FFF2-40B4-BE49-F238E27FC236}">
+                <a16:creationId xmlns:a16="http://schemas.microsoft.com/office/drawing/2014/main" id="{CDC62C56-1195-B957-D7C1-7968E649D360}"/>
+              </a:ext>
+            </a:extLst>
+          </p:cNvPr>
+          <p:cNvCxnSpPr>
+            <a:cxnSpLocks/>
+            <a:stCxn id="6" idx="1"/>
+            <a:endCxn id="10" idx="3"/>
+          </p:cNvCxnSpPr>
+          <p:nvPr/>
+        </p:nvCxnSpPr>
+        <p:spPr>
+          <a:xfrm flipH="1" flipV="1">
+            <a:off x="3745557" y="1628477"/>
+            <a:ext cx="1975994" cy="1850"/>
           </a:xfrm>
           <a:prstGeom prst="straightConnector1">
             <a:avLst/>
@@ -4976,272 +5508,196 @@
           </a:fontRef>
         </p:style>
       </p:cxnSp>
+      <p:sp>
+        <p:nvSpPr>
+          <p:cNvPr id="65" name="文本框 64">
+            <a:extLst>
+              <a:ext uri="{FF2B5EF4-FFF2-40B4-BE49-F238E27FC236}">
+                <a16:creationId xmlns:a16="http://schemas.microsoft.com/office/drawing/2014/main" id="{2D9CF517-37F3-3837-FCFB-570C72192FB2}"/>
+              </a:ext>
+            </a:extLst>
+          </p:cNvPr>
+          <p:cNvSpPr txBox="1"/>
+          <p:nvPr/>
+        </p:nvSpPr>
+        <p:spPr>
+          <a:xfrm>
+            <a:off x="4752240" y="6093642"/>
+            <a:ext cx="3223172" cy="453183"/>
+          </a:xfrm>
+          <a:prstGeom prst="rect">
+            <a:avLst/>
+          </a:prstGeom>
+          <a:noFill/>
+          <a:ln>
+            <a:solidFill>
+              <a:schemeClr val="accent2">
+                <a:lumMod val="75000"/>
+              </a:schemeClr>
+            </a:solidFill>
+            <a:prstDash val="dash"/>
+          </a:ln>
+        </p:spPr>
+        <p:txBody>
+          <a:bodyPr wrap="none" lIns="72000" tIns="72000" rIns="72000" bIns="72000" rtlCol="0">
+            <a:spAutoFit/>
+          </a:bodyPr>
+          <a:lstStyle/>
+          <a:p>
+            <a:pPr algn="ctr"/>
+            <a:r>
+              <a:rPr lang="en-US" altLang="zh-CN" sz="1000" dirty="0" err="1">
+                <a:solidFill>
+                  <a:schemeClr val="accent2">
+                    <a:lumMod val="75000"/>
+                  </a:schemeClr>
+                </a:solidFill>
+                <a:latin typeface="LXGW WenKai Mono" panose="02020509000000000000" pitchFamily="49" charset="-122"/>
+                <a:ea typeface="LXGW WenKai Mono" panose="02020509000000000000" pitchFamily="49" charset="-122"/>
+              </a:rPr>
+              <a:t>mongod</a:t>
+            </a:r>
+            <a:r>
+              <a:rPr lang="en-US" altLang="zh-CN" sz="1000" dirty="0">
+                <a:solidFill>
+                  <a:schemeClr val="accent2">
+                    <a:lumMod val="75000"/>
+                  </a:schemeClr>
+                </a:solidFill>
+                <a:latin typeface="LXGW WenKai Mono" panose="02020509000000000000" pitchFamily="49" charset="-122"/>
+                <a:ea typeface="LXGW WenKai Mono" panose="02020509000000000000" pitchFamily="49" charset="-122"/>
+              </a:rPr>
+              <a:t> –</a:t>
+            </a:r>
+            <a:r>
+              <a:rPr lang="en-US" altLang="zh-CN" sz="1000" dirty="0" err="1">
+                <a:solidFill>
+                  <a:schemeClr val="accent2">
+                    <a:lumMod val="75000"/>
+                  </a:schemeClr>
+                </a:solidFill>
+                <a:latin typeface="LXGW WenKai Mono" panose="02020509000000000000" pitchFamily="49" charset="-122"/>
+                <a:ea typeface="LXGW WenKai Mono" panose="02020509000000000000" pitchFamily="49" charset="-122"/>
+              </a:rPr>
+              <a:t>dbpath</a:t>
+            </a:r>
+            <a:r>
+              <a:rPr lang="en-US" altLang="zh-CN" sz="1000" dirty="0">
+                <a:solidFill>
+                  <a:schemeClr val="accent2">
+                    <a:lumMod val="75000"/>
+                  </a:schemeClr>
+                </a:solidFill>
+                <a:latin typeface="LXGW WenKai Mono" panose="02020509000000000000" pitchFamily="49" charset="-122"/>
+                <a:ea typeface="LXGW WenKai Mono" panose="02020509000000000000" pitchFamily="49" charset="-122"/>
+              </a:rPr>
+              <a:t> </a:t>
+            </a:r>
+            <a:r>
+              <a:rPr lang="en-US" altLang="zh-CN" sz="1000" dirty="0">
+                <a:solidFill>
+                  <a:schemeClr val="accent6">
+                    <a:lumMod val="75000"/>
+                  </a:schemeClr>
+                </a:solidFill>
+                <a:latin typeface="LXGW WenKai Mono" panose="02020509000000000000" pitchFamily="49" charset="-122"/>
+                <a:ea typeface="LXGW WenKai Mono" panose="02020509000000000000" pitchFamily="49" charset="-122"/>
+              </a:rPr>
+              <a:t>“./backend/database/” </a:t>
+            </a:r>
+            <a:r>
+              <a:rPr lang="en-US" altLang="zh-CN" sz="1000" dirty="0">
+                <a:solidFill>
+                  <a:schemeClr val="accent2">
+                    <a:lumMod val="75000"/>
+                  </a:schemeClr>
+                </a:solidFill>
+                <a:latin typeface="LXGW WenKai Mono" panose="02020509000000000000" pitchFamily="49" charset="-122"/>
+                <a:ea typeface="LXGW WenKai Mono" panose="02020509000000000000" pitchFamily="49" charset="-122"/>
+              </a:rPr>
+              <a:t>–port </a:t>
+            </a:r>
+            <a:r>
+              <a:rPr lang="en-US" altLang="zh-CN" sz="1000" dirty="0">
+                <a:solidFill>
+                  <a:srgbClr val="00B0F0"/>
+                </a:solidFill>
+                <a:latin typeface="LXGW WenKai Mono" panose="02020509000000000000" pitchFamily="49" charset="-122"/>
+                <a:ea typeface="LXGW WenKai Mono" panose="02020509000000000000" pitchFamily="49" charset="-122"/>
+              </a:rPr>
+              <a:t>27027</a:t>
+            </a:r>
+          </a:p>
+          <a:p>
+            <a:pPr algn="ctr"/>
+            <a:r>
+              <a:rPr lang="en-US" altLang="zh-CN" sz="1000" dirty="0">
+                <a:latin typeface="LXGW WenKai Mono" panose="02020509000000000000" pitchFamily="49" charset="-122"/>
+                <a:ea typeface="LXGW WenKai Mono" panose="02020509000000000000" pitchFamily="49" charset="-122"/>
+              </a:rPr>
+              <a:t>mongodb://localhost:</a:t>
+            </a:r>
+            <a:r>
+              <a:rPr lang="en-US" altLang="zh-CN" sz="1000" dirty="0">
+                <a:solidFill>
+                  <a:srgbClr val="00B0F0"/>
+                </a:solidFill>
+                <a:latin typeface="LXGW WenKai Mono" panose="02020509000000000000" pitchFamily="49" charset="-122"/>
+                <a:ea typeface="LXGW WenKai Mono" panose="02020509000000000000" pitchFamily="49" charset="-122"/>
+              </a:rPr>
+              <a:t>27027</a:t>
+            </a:r>
+            <a:endParaRPr lang="zh-CN" altLang="en-US" sz="1000" dirty="0">
+              <a:solidFill>
+                <a:srgbClr val="00B0F0"/>
+              </a:solidFill>
+              <a:latin typeface="LXGW WenKai Mono" panose="02020509000000000000" pitchFamily="49" charset="-122"/>
+              <a:ea typeface="LXGW WenKai Mono" panose="02020509000000000000" pitchFamily="49" charset="-122"/>
+            </a:endParaRPr>
+          </a:p>
+        </p:txBody>
+      </p:sp>
       <p:cxnSp>
         <p:nvCxnSpPr>
-          <p:cNvPr id="64" name="Connector: Elbow 63">
-            <a:extLst>
-              <a:ext uri="{FF2B5EF4-FFF2-40B4-BE49-F238E27FC236}">
-                <a16:creationId xmlns:a16="http://schemas.microsoft.com/office/drawing/2014/main" id="{772D2E1C-8856-B709-01CF-3A391A4451A3}"/>
+          <p:cNvPr id="66" name="Straight Arrow Connector 14">
+            <a:extLst>
+              <a:ext uri="{FF2B5EF4-FFF2-40B4-BE49-F238E27FC236}">
+                <a16:creationId xmlns:a16="http://schemas.microsoft.com/office/drawing/2014/main" id="{F4577113-332D-6B62-C6B6-B8C28E909FD2}"/>
               </a:ext>
             </a:extLst>
           </p:cNvPr>
           <p:cNvCxnSpPr>
             <a:cxnSpLocks/>
-            <a:stCxn id="10" idx="0"/>
-            <a:endCxn id="49" idx="3"/>
+            <a:stCxn id="6" idx="0"/>
+            <a:endCxn id="18" idx="2"/>
           </p:cNvCxnSpPr>
           <p:nvPr/>
         </p:nvCxnSpPr>
         <p:spPr>
-          <a:xfrm rot="16200000" flipV="1">
-            <a:off x="2749761" y="1144815"/>
-            <a:ext cx="186729" cy="913855"/>
-          </a:xfrm>
-          <a:prstGeom prst="bentConnector2">
+          <a:xfrm flipV="1">
+            <a:off x="6261551" y="776941"/>
+            <a:ext cx="0" cy="620667"/>
+          </a:xfrm>
+          <a:prstGeom prst="straightConnector1">
             <a:avLst/>
           </a:prstGeom>
           <a:ln w="9525">
             <a:solidFill>
-              <a:schemeClr val="tx1"/>
+              <a:schemeClr val="accent2">
+                <a:lumMod val="75000"/>
+              </a:schemeClr>
             </a:solidFill>
-            <a:headEnd type="triangle"/>
-            <a:tailEnd type="triangle"/>
+            <a:prstDash val="dash"/>
+            <a:headEnd type="none"/>
+            <a:tailEnd type="none"/>
           </a:ln>
-        </p:spPr>
-        <p:style>
-          <a:lnRef idx="1">
-            <a:schemeClr val="accent1"/>
-          </a:lnRef>
-          <a:fillRef idx="0">
-            <a:schemeClr val="accent1"/>
-          </a:fillRef>
-          <a:effectRef idx="0">
-            <a:schemeClr val="accent1"/>
-          </a:effectRef>
-          <a:fontRef idx="minor">
-            <a:schemeClr val="tx1"/>
-          </a:fontRef>
-        </p:style>
-      </p:cxnSp>
-      <p:sp>
-        <p:nvSpPr>
-          <p:cNvPr id="80" name="Rectangle 79">
-            <a:extLst>
-              <a:ext uri="{FF2B5EF4-FFF2-40B4-BE49-F238E27FC236}">
-                <a16:creationId xmlns:a16="http://schemas.microsoft.com/office/drawing/2014/main" id="{55E3340C-8A4D-29A5-5A0C-170E40347EC9}"/>
-              </a:ext>
-            </a:extLst>
-          </p:cNvPr>
-          <p:cNvSpPr/>
-          <p:nvPr/>
-        </p:nvSpPr>
-        <p:spPr>
-          <a:xfrm>
-            <a:off x="5100716" y="5250763"/>
-            <a:ext cx="1371600" cy="457200"/>
-          </a:xfrm>
-          <a:prstGeom prst="rect">
-            <a:avLst/>
-          </a:prstGeom>
-          <a:solidFill>
-            <a:schemeClr val="accent4">
-              <a:lumMod val="20000"/>
-              <a:lumOff val="80000"/>
-            </a:schemeClr>
-          </a:solidFill>
-          <a:ln>
-            <a:solidFill>
-              <a:schemeClr val="tx1"/>
-            </a:solidFill>
-          </a:ln>
-        </p:spPr>
-        <p:style>
-          <a:lnRef idx="2">
-            <a:schemeClr val="accent1">
-              <a:shade val="50000"/>
-            </a:schemeClr>
-          </a:lnRef>
-          <a:fillRef idx="1">
-            <a:schemeClr val="accent1"/>
-          </a:fillRef>
-          <a:effectRef idx="0">
-            <a:schemeClr val="accent1"/>
-          </a:effectRef>
-          <a:fontRef idx="minor">
-            <a:schemeClr val="lt1"/>
-          </a:fontRef>
-        </p:style>
-        <p:txBody>
-          <a:bodyPr rtlCol="0" anchor="ctr" anchorCtr="1"/>
-          <a:lstStyle/>
-          <a:p>
-            <a:pPr algn="ctr"/>
-            <a:r>
-              <a:rPr lang="en-US" sz="1400" dirty="0">
-                <a:solidFill>
-                  <a:schemeClr val="tx1"/>
-                </a:solidFill>
-                <a:latin typeface="LXGW WenKai" panose="02020500000000000000" pitchFamily="18" charset="-120"/>
-                <a:ea typeface="LXGW WenKai" panose="02020500000000000000" pitchFamily="18" charset="-120"/>
-              </a:rPr>
-              <a:t>Agent Configs</a:t>
-            </a:r>
-            <a:endParaRPr lang="en-US" sz="1600" dirty="0">
-              <a:solidFill>
-                <a:schemeClr val="tx1"/>
-              </a:solidFill>
-              <a:latin typeface="LXGW WenKai" panose="02020500000000000000" pitchFamily="18" charset="-120"/>
-              <a:ea typeface="LXGW WenKai" panose="02020500000000000000" pitchFamily="18" charset="-120"/>
-            </a:endParaRPr>
-          </a:p>
-        </p:txBody>
-      </p:sp>
-      <p:cxnSp>
-        <p:nvCxnSpPr>
-          <p:cNvPr id="84" name="Connector: Elbow 83">
-            <a:extLst>
-              <a:ext uri="{FF2B5EF4-FFF2-40B4-BE49-F238E27FC236}">
-                <a16:creationId xmlns:a16="http://schemas.microsoft.com/office/drawing/2014/main" id="{0EA3BDB1-F2A4-5C02-333F-366299C1662B}"/>
-              </a:ext>
-            </a:extLst>
-          </p:cNvPr>
-          <p:cNvCxnSpPr>
-            <a:cxnSpLocks/>
-            <a:stCxn id="10" idx="2"/>
-            <a:endCxn id="96" idx="1"/>
-          </p:cNvCxnSpPr>
-          <p:nvPr/>
-        </p:nvCxnSpPr>
-        <p:spPr>
-          <a:xfrm rot="16200000" flipH="1">
-            <a:off x="2885933" y="2574663"/>
-            <a:ext cx="2628902" cy="1800664"/>
-          </a:xfrm>
-          <a:prstGeom prst="bentConnector2">
-            <a:avLst/>
-          </a:prstGeom>
-          <a:ln w="9525">
-            <a:solidFill>
-              <a:schemeClr val="tx1"/>
-            </a:solidFill>
-            <a:headEnd type="triangle"/>
-            <a:tailEnd type="triangle"/>
-          </a:ln>
-        </p:spPr>
-        <p:style>
-          <a:lnRef idx="1">
-            <a:schemeClr val="accent1"/>
-          </a:lnRef>
-          <a:fillRef idx="0">
-            <a:schemeClr val="accent1"/>
-          </a:fillRef>
-          <a:effectRef idx="0">
-            <a:schemeClr val="accent1"/>
-          </a:effectRef>
-          <a:fontRef idx="minor">
-            <a:schemeClr val="tx1"/>
-          </a:fontRef>
-        </p:style>
-      </p:cxnSp>
-      <p:sp>
-        <p:nvSpPr>
-          <p:cNvPr id="96" name="Rectangle 95">
-            <a:extLst>
-              <a:ext uri="{FF2B5EF4-FFF2-40B4-BE49-F238E27FC236}">
-                <a16:creationId xmlns:a16="http://schemas.microsoft.com/office/drawing/2014/main" id="{1A571AEA-B399-C4AC-3A18-2CA6BF7CEACD}"/>
-              </a:ext>
-            </a:extLst>
-          </p:cNvPr>
-          <p:cNvSpPr/>
-          <p:nvPr/>
-        </p:nvSpPr>
-        <p:spPr>
-          <a:xfrm>
-            <a:off x="5100716" y="4560846"/>
-            <a:ext cx="1196369" cy="457200"/>
-          </a:xfrm>
-          <a:prstGeom prst="rect">
-            <a:avLst/>
-          </a:prstGeom>
-          <a:solidFill>
-            <a:schemeClr val="accent4">
-              <a:lumMod val="20000"/>
-              <a:lumOff val="80000"/>
-            </a:schemeClr>
-          </a:solidFill>
-          <a:ln>
-            <a:solidFill>
-              <a:schemeClr val="tx1"/>
-            </a:solidFill>
-          </a:ln>
-        </p:spPr>
-        <p:style>
-          <a:lnRef idx="2">
-            <a:schemeClr val="accent1">
-              <a:shade val="50000"/>
-            </a:schemeClr>
-          </a:lnRef>
-          <a:fillRef idx="1">
-            <a:schemeClr val="accent1"/>
-          </a:fillRef>
-          <a:effectRef idx="0">
-            <a:schemeClr val="accent1"/>
-          </a:effectRef>
-          <a:fontRef idx="minor">
-            <a:schemeClr val="lt1"/>
-          </a:fontRef>
-        </p:style>
-        <p:txBody>
-          <a:bodyPr rtlCol="0" anchor="ctr" anchorCtr="1"/>
-          <a:lstStyle/>
-          <a:p>
-            <a:pPr algn="ctr"/>
-            <a:r>
-              <a:rPr lang="en-US" sz="1400" dirty="0">
-                <a:solidFill>
-                  <a:schemeClr val="tx1"/>
-                </a:solidFill>
-                <a:latin typeface="LXGW WenKai" panose="02020500000000000000" pitchFamily="18" charset="-120"/>
-                <a:ea typeface="LXGW WenKai" panose="02020500000000000000" pitchFamily="18" charset="-120"/>
-              </a:rPr>
-              <a:t>Contexts</a:t>
-            </a:r>
-          </a:p>
-        </p:txBody>
-      </p:sp>
-      <p:cxnSp>
-        <p:nvCxnSpPr>
-          <p:cNvPr id="100" name="Connector: Elbow 99">
-            <a:extLst>
-              <a:ext uri="{FF2B5EF4-FFF2-40B4-BE49-F238E27FC236}">
-                <a16:creationId xmlns:a16="http://schemas.microsoft.com/office/drawing/2014/main" id="{3264145F-BEA8-B01C-6434-B36E905DE09F}"/>
-              </a:ext>
-            </a:extLst>
-          </p:cNvPr>
-          <p:cNvCxnSpPr>
-            <a:cxnSpLocks/>
-            <a:stCxn id="10" idx="2"/>
-            <a:endCxn id="80" idx="2"/>
-          </p:cNvCxnSpPr>
-          <p:nvPr/>
-        </p:nvCxnSpPr>
-        <p:spPr>
-          <a:xfrm rot="16200000" flipH="1">
-            <a:off x="2769575" y="2691021"/>
-            <a:ext cx="3547419" cy="2486464"/>
-          </a:xfrm>
-          <a:prstGeom prst="bentConnector3">
-            <a:avLst>
-              <a:gd name="adj1" fmla="val 106444"/>
-            </a:avLst>
-          </a:prstGeom>
-          <a:ln w="9525">
-            <a:solidFill>
-              <a:schemeClr val="tx1"/>
-            </a:solidFill>
-            <a:headEnd type="triangle"/>
-            <a:tailEnd type="triangle"/>
-          </a:ln>
+          <a:effectLst>
+            <a:outerShdw blurRad="63500" sx="102000" sy="102000" algn="ctr" rotWithShape="0">
+              <a:prstClr val="black">
+                <a:alpha val="40000"/>
+              </a:prstClr>
+            </a:outerShdw>
+          </a:effectLst>
         </p:spPr>
         <p:style>
           <a:lnRef idx="1">
@@ -5260,37 +5716,45 @@
       </p:cxnSp>
       <p:cxnSp>
         <p:nvCxnSpPr>
-          <p:cNvPr id="33" name="Connector: Elbow 32">
-            <a:extLst>
-              <a:ext uri="{FF2B5EF4-FFF2-40B4-BE49-F238E27FC236}">
-                <a16:creationId xmlns:a16="http://schemas.microsoft.com/office/drawing/2014/main" id="{FECD5B19-9ABD-FBE1-1881-23E52064E9EF}"/>
+          <p:cNvPr id="71" name="Straight Arrow Connector 14">
+            <a:extLst>
+              <a:ext uri="{FF2B5EF4-FFF2-40B4-BE49-F238E27FC236}">
+                <a16:creationId xmlns:a16="http://schemas.microsoft.com/office/drawing/2014/main" id="{C24416BE-D92F-C784-FD2E-3583A17E5742}"/>
               </a:ext>
             </a:extLst>
           </p:cNvPr>
           <p:cNvCxnSpPr>
             <a:cxnSpLocks/>
-            <a:stCxn id="10" idx="2"/>
-            <a:endCxn id="9" idx="2"/>
+            <a:stCxn id="5" idx="0"/>
+            <a:endCxn id="36" idx="2"/>
           </p:cNvCxnSpPr>
           <p:nvPr/>
         </p:nvCxnSpPr>
         <p:spPr>
-          <a:xfrm rot="16200000" flipH="1">
-            <a:off x="3724039" y="1736557"/>
-            <a:ext cx="2857502" cy="3705476"/>
-          </a:xfrm>
-          <a:prstGeom prst="bentConnector3">
-            <a:avLst>
-              <a:gd name="adj1" fmla="val 105617"/>
-            </a:avLst>
+          <a:xfrm flipH="1" flipV="1">
+            <a:off x="8054400" y="790442"/>
+            <a:ext cx="4436" cy="610890"/>
+          </a:xfrm>
+          <a:prstGeom prst="straightConnector1">
+            <a:avLst/>
           </a:prstGeom>
           <a:ln w="9525">
             <a:solidFill>
-              <a:schemeClr val="tx1"/>
+              <a:schemeClr val="accent2">
+                <a:lumMod val="75000"/>
+              </a:schemeClr>
             </a:solidFill>
-            <a:headEnd type="triangle"/>
-            <a:tailEnd type="triangle"/>
+            <a:prstDash val="dash"/>
+            <a:headEnd type="none"/>
+            <a:tailEnd type="none"/>
           </a:ln>
+          <a:effectLst>
+            <a:outerShdw blurRad="63500" sx="102000" sy="102000" algn="ctr" rotWithShape="0">
+              <a:prstClr val="black">
+                <a:alpha val="40000"/>
+              </a:prstClr>
+            </a:outerShdw>
+          </a:effectLst>
         </p:spPr>
         <p:style>
           <a:lnRef idx="1">
@@ -5307,12 +5771,69 @@
           </a:fontRef>
         </p:style>
       </p:cxnSp>
-      <p:sp>
-        <p:nvSpPr>
-          <p:cNvPr id="160" name="Rectangle 159">
-            <a:extLst>
-              <a:ext uri="{FF2B5EF4-FFF2-40B4-BE49-F238E27FC236}">
-                <a16:creationId xmlns:a16="http://schemas.microsoft.com/office/drawing/2014/main" id="{2D663D7A-E75A-A89B-C125-37C84B176016}"/>
+      <p:cxnSp>
+        <p:nvCxnSpPr>
+          <p:cNvPr id="75" name="Straight Arrow Connector 14">
+            <a:extLst>
+              <a:ext uri="{FF2B5EF4-FFF2-40B4-BE49-F238E27FC236}">
+                <a16:creationId xmlns:a16="http://schemas.microsoft.com/office/drawing/2014/main" id="{AF8DCE8D-B5E1-CE0B-8B13-9B515C402769}"/>
+              </a:ext>
+            </a:extLst>
+          </p:cNvPr>
+          <p:cNvCxnSpPr>
+            <a:cxnSpLocks/>
+            <a:stCxn id="65" idx="0"/>
+            <a:endCxn id="3" idx="2"/>
+          </p:cNvCxnSpPr>
+          <p:nvPr/>
+        </p:nvCxnSpPr>
+        <p:spPr>
+          <a:xfrm flipV="1">
+            <a:off x="6363826" y="5841704"/>
+            <a:ext cx="0" cy="251938"/>
+          </a:xfrm>
+          <a:prstGeom prst="straightConnector1">
+            <a:avLst/>
+          </a:prstGeom>
+          <a:ln w="9525">
+            <a:solidFill>
+              <a:schemeClr val="accent2">
+                <a:lumMod val="75000"/>
+              </a:schemeClr>
+            </a:solidFill>
+            <a:prstDash val="dash"/>
+            <a:headEnd type="none"/>
+            <a:tailEnd type="none"/>
+          </a:ln>
+          <a:effectLst>
+            <a:outerShdw blurRad="63500" sx="102000" sy="102000" algn="ctr" rotWithShape="0">
+              <a:prstClr val="black">
+                <a:alpha val="40000"/>
+              </a:prstClr>
+            </a:outerShdw>
+          </a:effectLst>
+        </p:spPr>
+        <p:style>
+          <a:lnRef idx="1">
+            <a:schemeClr val="accent1"/>
+          </a:lnRef>
+          <a:fillRef idx="0">
+            <a:schemeClr val="accent1"/>
+          </a:fillRef>
+          <a:effectRef idx="0">
+            <a:schemeClr val="accent1"/>
+          </a:effectRef>
+          <a:fontRef idx="minor">
+            <a:schemeClr val="tx1"/>
+          </a:fontRef>
+        </p:style>
+      </p:cxnSp>
+      <p:sp>
+        <p:nvSpPr>
+          <p:cNvPr id="83" name="Rectangle 52">
+            <a:extLst>
+              <a:ext uri="{FF2B5EF4-FFF2-40B4-BE49-F238E27FC236}">
+                <a16:creationId xmlns:a16="http://schemas.microsoft.com/office/drawing/2014/main" id="{0A85C779-3F24-EEEE-765C-0FC920B834AE}"/>
               </a:ext>
             </a:extLst>
           </p:cNvPr>
@@ -5321,8 +5842,8 @@
         </p:nvSpPr>
         <p:spPr>
           <a:xfrm>
-            <a:off x="1311159" y="2734432"/>
-            <a:ext cx="1075037" cy="465437"/>
+            <a:off x="1015923" y="1379436"/>
+            <a:ext cx="685449" cy="186648"/>
           </a:xfrm>
           <a:prstGeom prst="rect">
             <a:avLst/>
@@ -5361,6 +5882,138 @@
           <a:p>
             <a:pPr algn="ctr"/>
             <a:r>
+              <a:rPr lang="en-US" sz="1200" dirty="0">
+                <a:solidFill>
+                  <a:schemeClr val="tx1"/>
+                </a:solidFill>
+                <a:latin typeface="LXGW WenKai" panose="02020500000000000000" pitchFamily="18" charset="-120"/>
+                <a:ea typeface="LXGW WenKai" panose="02020500000000000000" pitchFamily="18" charset="-120"/>
+              </a:rPr>
+              <a:t>Agent</a:t>
+            </a:r>
+          </a:p>
+        </p:txBody>
+      </p:sp>
+      <p:sp>
+        <p:nvSpPr>
+          <p:cNvPr id="85" name="Rectangle 52">
+            <a:extLst>
+              <a:ext uri="{FF2B5EF4-FFF2-40B4-BE49-F238E27FC236}">
+                <a16:creationId xmlns:a16="http://schemas.microsoft.com/office/drawing/2014/main" id="{041CC23B-3285-B7A5-1101-13C81F98304D}"/>
+              </a:ext>
+            </a:extLst>
+          </p:cNvPr>
+          <p:cNvSpPr/>
+          <p:nvPr/>
+        </p:nvSpPr>
+        <p:spPr>
+          <a:xfrm>
+            <a:off x="1015922" y="1631048"/>
+            <a:ext cx="685449" cy="186648"/>
+          </a:xfrm>
+          <a:prstGeom prst="rect">
+            <a:avLst/>
+          </a:prstGeom>
+          <a:solidFill>
+            <a:schemeClr val="accent2">
+              <a:lumMod val="40000"/>
+              <a:lumOff val="60000"/>
+            </a:schemeClr>
+          </a:solidFill>
+          <a:ln>
+            <a:solidFill>
+              <a:schemeClr val="tx1"/>
+            </a:solidFill>
+          </a:ln>
+        </p:spPr>
+        <p:style>
+          <a:lnRef idx="2">
+            <a:schemeClr val="accent1">
+              <a:shade val="50000"/>
+            </a:schemeClr>
+          </a:lnRef>
+          <a:fillRef idx="1">
+            <a:schemeClr val="accent1"/>
+          </a:fillRef>
+          <a:effectRef idx="0">
+            <a:schemeClr val="accent1"/>
+          </a:effectRef>
+          <a:fontRef idx="minor">
+            <a:schemeClr val="lt1"/>
+          </a:fontRef>
+        </p:style>
+        <p:txBody>
+          <a:bodyPr rtlCol="0" anchor="ctr" anchorCtr="1"/>
+          <a:lstStyle/>
+          <a:p>
+            <a:pPr algn="ctr"/>
+            <a:r>
+              <a:rPr lang="en-US" sz="1200" dirty="0">
+                <a:solidFill>
+                  <a:schemeClr val="tx1"/>
+                </a:solidFill>
+                <a:latin typeface="LXGW WenKai" panose="02020500000000000000" pitchFamily="18" charset="-120"/>
+                <a:ea typeface="LXGW WenKai" panose="02020500000000000000" pitchFamily="18" charset="-120"/>
+              </a:rPr>
+              <a:t>Agent</a:t>
+            </a:r>
+          </a:p>
+        </p:txBody>
+      </p:sp>
+      <p:sp>
+        <p:nvSpPr>
+          <p:cNvPr id="86" name="Rectangle 159">
+            <a:extLst>
+              <a:ext uri="{FF2B5EF4-FFF2-40B4-BE49-F238E27FC236}">
+                <a16:creationId xmlns:a16="http://schemas.microsoft.com/office/drawing/2014/main" id="{EF6E2E0D-B1C0-4AFC-FB19-9C1377E5B734}"/>
+              </a:ext>
+            </a:extLst>
+          </p:cNvPr>
+          <p:cNvSpPr/>
+          <p:nvPr/>
+        </p:nvSpPr>
+        <p:spPr>
+          <a:xfrm>
+            <a:off x="1930986" y="2479496"/>
+            <a:ext cx="881844" cy="415942"/>
+          </a:xfrm>
+          <a:prstGeom prst="rect">
+            <a:avLst/>
+          </a:prstGeom>
+          <a:solidFill>
+            <a:schemeClr val="accent2">
+              <a:lumMod val="60000"/>
+              <a:lumOff val="40000"/>
+            </a:schemeClr>
+          </a:solidFill>
+          <a:ln>
+            <a:solidFill>
+              <a:schemeClr val="tx1"/>
+            </a:solidFill>
+          </a:ln>
+        </p:spPr>
+        <p:style>
+          <a:lnRef idx="2">
+            <a:schemeClr val="accent1">
+              <a:shade val="50000"/>
+            </a:schemeClr>
+          </a:lnRef>
+          <a:fillRef idx="1">
+            <a:schemeClr val="accent1"/>
+          </a:fillRef>
+          <a:effectRef idx="0">
+            <a:schemeClr val="accent1"/>
+          </a:effectRef>
+          <a:fontRef idx="minor">
+            <a:schemeClr val="lt1"/>
+          </a:fontRef>
+        </p:style>
+        <p:txBody>
+          <a:bodyPr rtlCol="0" anchor="ctr" anchorCtr="1"/>
+          <a:lstStyle/>
+          <a:p>
+            <a:pPr algn="ctr"/>
+            <a:r>
               <a:rPr lang="en-US" sz="1400" dirty="0">
                 <a:solidFill>
                   <a:schemeClr val="tx1"/>
@@ -5368,31 +6021,31 @@
                 <a:latin typeface="LXGW WenKai" panose="02020500000000000000" pitchFamily="18" charset="-120"/>
                 <a:ea typeface="LXGW WenKai" panose="02020500000000000000" pitchFamily="18" charset="-120"/>
               </a:rPr>
-              <a:t>LLMs</a:t>
+              <a:t>Tools</a:t>
             </a:r>
           </a:p>
         </p:txBody>
       </p:sp>
       <p:cxnSp>
         <p:nvCxnSpPr>
-          <p:cNvPr id="161" name="Straight Arrow Connector 160">
-            <a:extLst>
-              <a:ext uri="{FF2B5EF4-FFF2-40B4-BE49-F238E27FC236}">
-                <a16:creationId xmlns:a16="http://schemas.microsoft.com/office/drawing/2014/main" id="{59012971-918C-39E7-CE63-3FF569ECFDA2}"/>
+          <p:cNvPr id="87" name="Straight Arrow Connector 14">
+            <a:extLst>
+              <a:ext uri="{FF2B5EF4-FFF2-40B4-BE49-F238E27FC236}">
+                <a16:creationId xmlns:a16="http://schemas.microsoft.com/office/drawing/2014/main" id="{F401348B-1F01-8AD4-25B3-8EE19ADB2291}"/>
               </a:ext>
             </a:extLst>
           </p:cNvPr>
           <p:cNvCxnSpPr>
             <a:cxnSpLocks/>
-            <a:stCxn id="160" idx="0"/>
-            <a:endCxn id="53" idx="2"/>
+            <a:stCxn id="10" idx="1"/>
+            <a:endCxn id="49" idx="3"/>
           </p:cNvCxnSpPr>
           <p:nvPr/>
         </p:nvCxnSpPr>
         <p:spPr>
-          <a:xfrm flipH="1" flipV="1">
-            <a:off x="1848677" y="2470482"/>
-            <a:ext cx="1" cy="263950"/>
+          <a:xfrm flipH="1">
+            <a:off x="1860437" y="1628477"/>
+            <a:ext cx="810083" cy="0"/>
           </a:xfrm>
           <a:prstGeom prst="straightConnector1">
             <a:avLst/>
@@ -5429,28 +6082,78 @@
       </p:cxnSp>
       <p:cxnSp>
         <p:nvCxnSpPr>
-          <p:cNvPr id="178" name="Connector: Elbow 177">
-            <a:extLst>
-              <a:ext uri="{FF2B5EF4-FFF2-40B4-BE49-F238E27FC236}">
-                <a16:creationId xmlns:a16="http://schemas.microsoft.com/office/drawing/2014/main" id="{26376437-534A-A16E-6711-D27AC44A27CC}"/>
+          <p:cNvPr id="93" name="Connector: Elbow 29">
+            <a:extLst>
+              <a:ext uri="{FF2B5EF4-FFF2-40B4-BE49-F238E27FC236}">
+                <a16:creationId xmlns:a16="http://schemas.microsoft.com/office/drawing/2014/main" id="{F7C8DBB6-03E3-069B-1DE6-74F5F0C3924E}"/>
               </a:ext>
             </a:extLst>
           </p:cNvPr>
           <p:cNvCxnSpPr>
             <a:cxnSpLocks/>
-            <a:stCxn id="6" idx="1"/>
-            <a:endCxn id="10" idx="3"/>
+            <a:stCxn id="49" idx="1"/>
+            <a:endCxn id="160" idx="1"/>
           </p:cNvCxnSpPr>
           <p:nvPr/>
         </p:nvCxnSpPr>
         <p:spPr>
-          <a:xfrm rot="10800000">
-            <a:off x="3837571" y="1927827"/>
-            <a:ext cx="1962381" cy="1"/>
+          <a:xfrm rot="10800000" flipV="1">
+            <a:off x="847126" y="1628477"/>
+            <a:ext cx="12700" cy="1058990"/>
           </a:xfrm>
           <a:prstGeom prst="bentConnector3">
             <a:avLst>
-              <a:gd name="adj1" fmla="val 50000"/>
+              <a:gd name="adj1" fmla="val 1800000"/>
+            </a:avLst>
+          </a:prstGeom>
+          <a:ln w="9525">
+            <a:solidFill>
+              <a:schemeClr val="tx1"/>
+            </a:solidFill>
+            <a:headEnd type="triangle"/>
+            <a:tailEnd type="triangle"/>
+          </a:ln>
+        </p:spPr>
+        <p:style>
+          <a:lnRef idx="1">
+            <a:schemeClr val="accent1"/>
+          </a:lnRef>
+          <a:fillRef idx="0">
+            <a:schemeClr val="accent1"/>
+          </a:fillRef>
+          <a:effectRef idx="0">
+            <a:schemeClr val="accent1"/>
+          </a:effectRef>
+          <a:fontRef idx="minor">
+            <a:schemeClr val="tx1"/>
+          </a:fontRef>
+        </p:style>
+      </p:cxnSp>
+      <p:cxnSp>
+        <p:nvCxnSpPr>
+          <p:cNvPr id="97" name="Connector: Elbow 29">
+            <a:extLst>
+              <a:ext uri="{FF2B5EF4-FFF2-40B4-BE49-F238E27FC236}">
+                <a16:creationId xmlns:a16="http://schemas.microsoft.com/office/drawing/2014/main" id="{B6C4DF2E-12C3-FD0F-D912-B3BF412437F0}"/>
+              </a:ext>
+            </a:extLst>
+          </p:cNvPr>
+          <p:cNvCxnSpPr>
+            <a:cxnSpLocks/>
+            <a:stCxn id="49" idx="1"/>
+            <a:endCxn id="86" idx="2"/>
+          </p:cNvCxnSpPr>
+          <p:nvPr/>
+        </p:nvCxnSpPr>
+        <p:spPr>
+          <a:xfrm rot="10800000" flipH="1" flipV="1">
+            <a:off x="847126" y="1628476"/>
+            <a:ext cx="1524782" cy="1266961"/>
+          </a:xfrm>
+          <a:prstGeom prst="bentConnector4">
+            <a:avLst>
+              <a:gd name="adj1" fmla="val -13716"/>
+              <a:gd name="adj2" fmla="val 118043"/>
             </a:avLst>
           </a:prstGeom>
           <a:ln w="9525">
@@ -7884,20 +8587,20 @@
 </file>
 
 <file path=customXml/item2.xml><?xml version="1.0" encoding="utf-8"?>
+<p:properties xmlns:p="http://schemas.microsoft.com/office/2006/metadata/properties" xmlns:xsi="http://www.w3.org/2001/XMLSchema-instance" xmlns:pc="http://schemas.microsoft.com/office/infopath/2007/PartnerControls">
+  <documentManagement>
+    <_activity xmlns="b9c0df90-6177-490c-b060-567d6533c817" xsi:nil="true"/>
+  </documentManagement>
+</p:properties>
+</file>
+
+<file path=customXml/item3.xml><?xml version="1.0" encoding="utf-8"?>
 <?mso-contentType ?>
 <FormTemplates xmlns="http://schemas.microsoft.com/sharepoint/v3/contenttype/forms">
   <Display>DocumentLibraryForm</Display>
   <Edit>DocumentLibraryForm</Edit>
   <New>DocumentLibraryForm</New>
 </FormTemplates>
-</file>
-
-<file path=customXml/item3.xml><?xml version="1.0" encoding="utf-8"?>
-<p:properties xmlns:p="http://schemas.microsoft.com/office/2006/metadata/properties" xmlns:xsi="http://www.w3.org/2001/XMLSchema-instance" xmlns:pc="http://schemas.microsoft.com/office/infopath/2007/PartnerControls">
-  <documentManagement>
-    <_activity xmlns="b9c0df90-6177-490c-b060-567d6533c817" xsi:nil="true"/>
-  </documentManagement>
-</p:properties>
 </file>
 
 <file path=customXml/itemProps1.xml><?xml version="1.0" encoding="utf-8"?>
@@ -7920,14 +8623,6 @@
 </file>
 
 <file path=customXml/itemProps2.xml><?xml version="1.0" encoding="utf-8"?>
-<ds:datastoreItem xmlns:ds="http://schemas.openxmlformats.org/officeDocument/2006/customXml" ds:itemID="{86A9A6AE-A2D2-4466-B053-FEAA2AECCDAE}">
-  <ds:schemaRefs>
-    <ds:schemaRef ds:uri="http://schemas.microsoft.com/sharepoint/v3/contenttype/forms"/>
-  </ds:schemaRefs>
-</ds:datastoreItem>
-</file>
-
-<file path=customXml/itemProps3.xml><?xml version="1.0" encoding="utf-8"?>
 <ds:datastoreItem xmlns:ds="http://schemas.openxmlformats.org/officeDocument/2006/customXml" ds:itemID="{0988BE9C-0C90-420C-9DA9-636C0435E5D7}">
   <ds:schemaRefs>
     <ds:schemaRef ds:uri="http://schemas.microsoft.com/office/2006/documentManagement/types"/>
@@ -7944,6 +8639,14 @@
 </ds:datastoreItem>
 </file>
 
+<file path=customXml/itemProps3.xml><?xml version="1.0" encoding="utf-8"?>
+<ds:datastoreItem xmlns:ds="http://schemas.openxmlformats.org/officeDocument/2006/customXml" ds:itemID="{86A9A6AE-A2D2-4466-B053-FEAA2AECCDAE}">
+  <ds:schemaRefs>
+    <ds:schemaRef ds:uri="http://schemas.microsoft.com/sharepoint/v3/contenttype/forms"/>
+  </ds:schemaRefs>
+</ds:datastoreItem>
+</file>
+
 <file path=docMetadata/LabelInfo.xml><?xml version="1.0" encoding="utf-8"?>
 <clbl:labelList xmlns:clbl="http://schemas.microsoft.com/office/2020/mipLabelMetadata">
   <clbl:label id="{46c98d88-e344-4ed4-8496-4ed7712e255d}" enabled="0" method="" siteId="{46c98d88-e344-4ed4-8496-4ed7712e255d}" removed="1"/>

</xml_diff>

<commit_message>
[Doc] Reposition compoents in architecture diagram
</commit_message>
<xml_diff>
--- a/examples/architecture.pptx
+++ b/examples/architecture.pptx
@@ -3883,8 +3883,8 @@
         </p:nvSpPr>
         <p:spPr>
           <a:xfrm>
-            <a:off x="5269487" y="983830"/>
-            <a:ext cx="3594997" cy="1404057"/>
+            <a:off x="5391151" y="983830"/>
+            <a:ext cx="3519813" cy="1404057"/>
           </a:xfrm>
           <a:prstGeom prst="rect">
             <a:avLst/>
@@ -4106,8 +4106,8 @@
         </p:nvSpPr>
         <p:spPr>
           <a:xfrm>
-            <a:off x="388615" y="797424"/>
-            <a:ext cx="3594996" cy="2704534"/>
+            <a:off x="5391151" y="3229541"/>
+            <a:ext cx="3519813" cy="2704534"/>
           </a:xfrm>
           <a:prstGeom prst="rect">
             <a:avLst/>
@@ -4180,8 +4180,8 @@
         </p:nvSpPr>
         <p:spPr>
           <a:xfrm>
-            <a:off x="4328809" y="3265252"/>
-            <a:ext cx="4070034" cy="2576452"/>
+            <a:off x="1053867" y="1880252"/>
+            <a:ext cx="3445879" cy="2576452"/>
           </a:xfrm>
           <a:prstGeom prst="rect">
             <a:avLst/>
@@ -4242,10 +4242,10 @@
       </p:sp>
       <p:sp>
         <p:nvSpPr>
-          <p:cNvPr id="4" name="Rectangle 3">
-            <a:extLst>
-              <a:ext uri="{FF2B5EF4-FFF2-40B4-BE49-F238E27FC236}">
-                <a16:creationId xmlns:a16="http://schemas.microsoft.com/office/drawing/2014/main" id="{D9806EAC-7DC2-FFAD-F565-90F93EC55137}"/>
+          <p:cNvPr id="10" name="Rectangle 9">
+            <a:extLst>
+              <a:ext uri="{FF2B5EF4-FFF2-40B4-BE49-F238E27FC236}">
+                <a16:creationId xmlns:a16="http://schemas.microsoft.com/office/drawing/2014/main" id="{DCA583BF-5F72-DDD0-2FD2-90E209D4DDC4}"/>
               </a:ext>
             </a:extLst>
           </p:cNvPr>
@@ -4254,212 +4254,7 @@
         </p:nvSpPr>
         <p:spPr>
           <a:xfrm>
-            <a:off x="5081260" y="3579100"/>
-            <a:ext cx="1196369" cy="457200"/>
-          </a:xfrm>
-          <a:prstGeom prst="rect">
-            <a:avLst/>
-          </a:prstGeom>
-          <a:solidFill>
-            <a:schemeClr val="accent4">
-              <a:lumMod val="40000"/>
-              <a:lumOff val="60000"/>
-            </a:schemeClr>
-          </a:solidFill>
-          <a:ln>
-            <a:solidFill>
-              <a:schemeClr val="tx1"/>
-            </a:solidFill>
-          </a:ln>
-        </p:spPr>
-        <p:style>
-          <a:lnRef idx="2">
-            <a:schemeClr val="accent1">
-              <a:shade val="50000"/>
-            </a:schemeClr>
-          </a:lnRef>
-          <a:fillRef idx="1">
-            <a:schemeClr val="accent1"/>
-          </a:fillRef>
-          <a:effectRef idx="0">
-            <a:schemeClr val="accent1"/>
-          </a:effectRef>
-          <a:fontRef idx="minor">
-            <a:schemeClr val="lt1"/>
-          </a:fontRef>
-        </p:style>
-        <p:txBody>
-          <a:bodyPr rtlCol="0" anchor="ctr" anchorCtr="1"/>
-          <a:lstStyle/>
-          <a:p>
-            <a:pPr algn="ctr"/>
-            <a:r>
-              <a:rPr lang="en-US" sz="1400" dirty="0">
-                <a:solidFill>
-                  <a:schemeClr val="tx1"/>
-                </a:solidFill>
-                <a:latin typeface="LXGW WenKai" panose="02020500000000000000" pitchFamily="18" charset="-120"/>
-                <a:ea typeface="LXGW WenKai" panose="02020500000000000000" pitchFamily="18" charset="-120"/>
-              </a:rPr>
-              <a:t>UI Configs</a:t>
-            </a:r>
-          </a:p>
-        </p:txBody>
-      </p:sp>
-      <p:sp>
-        <p:nvSpPr>
-          <p:cNvPr id="8" name="Rectangle 7">
-            <a:extLst>
-              <a:ext uri="{FF2B5EF4-FFF2-40B4-BE49-F238E27FC236}">
-                <a16:creationId xmlns:a16="http://schemas.microsoft.com/office/drawing/2014/main" id="{4DC41078-AFAF-45AD-5CA5-28463EEE9024}"/>
-              </a:ext>
-            </a:extLst>
-          </p:cNvPr>
-          <p:cNvSpPr/>
-          <p:nvPr/>
-        </p:nvSpPr>
-        <p:spPr>
-          <a:xfrm>
-            <a:off x="6384897" y="3579100"/>
-            <a:ext cx="1197864" cy="457200"/>
-          </a:xfrm>
-          <a:prstGeom prst="rect">
-            <a:avLst/>
-          </a:prstGeom>
-          <a:solidFill>
-            <a:schemeClr val="accent4">
-              <a:lumMod val="40000"/>
-              <a:lumOff val="60000"/>
-            </a:schemeClr>
-          </a:solidFill>
-          <a:ln>
-            <a:solidFill>
-              <a:schemeClr val="tx1"/>
-            </a:solidFill>
-          </a:ln>
-        </p:spPr>
-        <p:style>
-          <a:lnRef idx="2">
-            <a:schemeClr val="accent1">
-              <a:shade val="50000"/>
-            </a:schemeClr>
-          </a:lnRef>
-          <a:fillRef idx="1">
-            <a:schemeClr val="accent1"/>
-          </a:fillRef>
-          <a:effectRef idx="0">
-            <a:schemeClr val="accent1"/>
-          </a:effectRef>
-          <a:fontRef idx="minor">
-            <a:schemeClr val="lt1"/>
-          </a:fontRef>
-        </p:style>
-        <p:txBody>
-          <a:bodyPr rtlCol="0" anchor="ctr" anchorCtr="1"/>
-          <a:lstStyle/>
-          <a:p>
-            <a:pPr algn="ctr"/>
-            <a:r>
-              <a:rPr lang="en-US" sz="1400" dirty="0">
-                <a:solidFill>
-                  <a:schemeClr val="tx1"/>
-                </a:solidFill>
-                <a:latin typeface="LXGW WenKai" panose="02020500000000000000" pitchFamily="18" charset="-120"/>
-                <a:ea typeface="LXGW WenKai" panose="02020500000000000000" pitchFamily="18" charset="-120"/>
-              </a:rPr>
-              <a:t>Messages</a:t>
-            </a:r>
-          </a:p>
-        </p:txBody>
-      </p:sp>
-      <p:sp>
-        <p:nvSpPr>
-          <p:cNvPr id="9" name="Rectangle 8">
-            <a:extLst>
-              <a:ext uri="{FF2B5EF4-FFF2-40B4-BE49-F238E27FC236}">
-                <a16:creationId xmlns:a16="http://schemas.microsoft.com/office/drawing/2014/main" id="{56F4A4FE-1E8D-F949-D9CD-B3B0E98A42D0}"/>
-              </a:ext>
-            </a:extLst>
-          </p:cNvPr>
-          <p:cNvSpPr/>
-          <p:nvPr/>
-        </p:nvSpPr>
-        <p:spPr>
-          <a:xfrm>
-            <a:off x="6387887" y="4269017"/>
-            <a:ext cx="1196369" cy="457200"/>
-          </a:xfrm>
-          <a:prstGeom prst="rect">
-            <a:avLst/>
-          </a:prstGeom>
-          <a:solidFill>
-            <a:schemeClr val="accent4">
-              <a:lumMod val="20000"/>
-              <a:lumOff val="80000"/>
-            </a:schemeClr>
-          </a:solidFill>
-          <a:ln>
-            <a:solidFill>
-              <a:schemeClr val="tx1"/>
-            </a:solidFill>
-          </a:ln>
-        </p:spPr>
-        <p:style>
-          <a:lnRef idx="2">
-            <a:schemeClr val="accent1">
-              <a:shade val="50000"/>
-            </a:schemeClr>
-          </a:lnRef>
-          <a:fillRef idx="1">
-            <a:schemeClr val="accent1"/>
-          </a:fillRef>
-          <a:effectRef idx="0">
-            <a:schemeClr val="accent1"/>
-          </a:effectRef>
-          <a:fontRef idx="minor">
-            <a:schemeClr val="lt1"/>
-          </a:fontRef>
-        </p:style>
-        <p:txBody>
-          <a:bodyPr rtlCol="0" anchor="ctr" anchorCtr="1"/>
-          <a:lstStyle/>
-          <a:p>
-            <a:pPr algn="ctr"/>
-            <a:r>
-              <a:rPr lang="en-US" sz="1400" dirty="0">
-                <a:solidFill>
-                  <a:schemeClr val="tx1"/>
-                </a:solidFill>
-                <a:latin typeface="LXGW WenKai" panose="02020500000000000000" pitchFamily="18" charset="-120"/>
-                <a:ea typeface="LXGW WenKai" panose="02020500000000000000" pitchFamily="18" charset="-120"/>
-              </a:rPr>
-              <a:t>Knowledge</a:t>
-            </a:r>
-            <a:endParaRPr lang="en-US" sz="1600" dirty="0">
-              <a:solidFill>
-                <a:schemeClr val="tx1"/>
-              </a:solidFill>
-              <a:latin typeface="LXGW WenKai" panose="02020500000000000000" pitchFamily="18" charset="-120"/>
-              <a:ea typeface="LXGW WenKai" panose="02020500000000000000" pitchFamily="18" charset="-120"/>
-            </a:endParaRPr>
-          </a:p>
-        </p:txBody>
-      </p:sp>
-      <p:sp>
-        <p:nvSpPr>
-          <p:cNvPr id="10" name="Rectangle 9">
-            <a:extLst>
-              <a:ext uri="{FF2B5EF4-FFF2-40B4-BE49-F238E27FC236}">
-                <a16:creationId xmlns:a16="http://schemas.microsoft.com/office/drawing/2014/main" id="{DCA583BF-5F72-DDD0-2FD2-90E209D4DDC4}"/>
-              </a:ext>
-            </a:extLst>
-          </p:cNvPr>
-          <p:cNvSpPr/>
-          <p:nvPr/>
-        </p:nvSpPr>
-        <p:spPr>
-          <a:xfrm>
-            <a:off x="2670520" y="1395758"/>
+            <a:off x="5726514" y="3796684"/>
             <a:ext cx="1075037" cy="465437"/>
           </a:xfrm>
           <a:prstGeom prst="rect">
@@ -4692,104 +4487,6 @@
           </a:fontRef>
         </p:style>
       </p:cxnSp>
-      <p:cxnSp>
-        <p:nvCxnSpPr>
-          <p:cNvPr id="26" name="Connector: Elbow 25">
-            <a:extLst>
-              <a:ext uri="{FF2B5EF4-FFF2-40B4-BE49-F238E27FC236}">
-                <a16:creationId xmlns:a16="http://schemas.microsoft.com/office/drawing/2014/main" id="{05698F9B-C43C-23EA-C5ED-DB4DFE760783}"/>
-              </a:ext>
-            </a:extLst>
-          </p:cNvPr>
-          <p:cNvCxnSpPr>
-            <a:cxnSpLocks/>
-            <a:stCxn id="6" idx="2"/>
-            <a:endCxn id="8" idx="0"/>
-          </p:cNvCxnSpPr>
-          <p:nvPr/>
-        </p:nvCxnSpPr>
-        <p:spPr>
-          <a:xfrm rot="16200000" flipH="1">
-            <a:off x="5764663" y="2359933"/>
-            <a:ext cx="1716055" cy="722278"/>
-          </a:xfrm>
-          <a:prstGeom prst="bentConnector3">
-            <a:avLst>
-              <a:gd name="adj1" fmla="val 50000"/>
-            </a:avLst>
-          </a:prstGeom>
-          <a:ln w="9525">
-            <a:solidFill>
-              <a:schemeClr val="tx1"/>
-            </a:solidFill>
-            <a:headEnd type="triangle"/>
-            <a:tailEnd type="triangle"/>
-          </a:ln>
-        </p:spPr>
-        <p:style>
-          <a:lnRef idx="1">
-            <a:schemeClr val="accent1"/>
-          </a:lnRef>
-          <a:fillRef idx="0">
-            <a:schemeClr val="accent1"/>
-          </a:fillRef>
-          <a:effectRef idx="0">
-            <a:schemeClr val="accent1"/>
-          </a:effectRef>
-          <a:fontRef idx="minor">
-            <a:schemeClr val="tx1"/>
-          </a:fontRef>
-        </p:style>
-      </p:cxnSp>
-      <p:cxnSp>
-        <p:nvCxnSpPr>
-          <p:cNvPr id="30" name="Connector: Elbow 29">
-            <a:extLst>
-              <a:ext uri="{FF2B5EF4-FFF2-40B4-BE49-F238E27FC236}">
-                <a16:creationId xmlns:a16="http://schemas.microsoft.com/office/drawing/2014/main" id="{7278F500-F0D3-1D1E-C466-570F500391A0}"/>
-              </a:ext>
-            </a:extLst>
-          </p:cNvPr>
-          <p:cNvCxnSpPr>
-            <a:cxnSpLocks/>
-            <a:stCxn id="6" idx="2"/>
-            <a:endCxn id="4" idx="0"/>
-          </p:cNvCxnSpPr>
-          <p:nvPr/>
-        </p:nvCxnSpPr>
-        <p:spPr>
-          <a:xfrm rot="5400000">
-            <a:off x="5112471" y="2430019"/>
-            <a:ext cx="1716055" cy="582106"/>
-          </a:xfrm>
-          <a:prstGeom prst="bentConnector3">
-            <a:avLst>
-              <a:gd name="adj1" fmla="val 50000"/>
-            </a:avLst>
-          </a:prstGeom>
-          <a:ln w="9525">
-            <a:solidFill>
-              <a:schemeClr val="tx1"/>
-            </a:solidFill>
-            <a:headEnd type="triangle"/>
-            <a:tailEnd type="triangle"/>
-          </a:ln>
-        </p:spPr>
-        <p:style>
-          <a:lnRef idx="1">
-            <a:schemeClr val="accent1"/>
-          </a:lnRef>
-          <a:fillRef idx="0">
-            <a:schemeClr val="accent1"/>
-          </a:fillRef>
-          <a:effectRef idx="0">
-            <a:schemeClr val="accent1"/>
-          </a:effectRef>
-          <a:fontRef idx="minor">
-            <a:schemeClr val="tx1"/>
-          </a:fontRef>
-        </p:style>
-      </p:cxnSp>
       <p:sp>
         <p:nvSpPr>
           <p:cNvPr id="49" name="Rectangle 48">
@@ -4804,7 +4501,7 @@
         </p:nvSpPr>
         <p:spPr>
           <a:xfrm>
-            <a:off x="847126" y="1031065"/>
+            <a:off x="7587470" y="3429000"/>
             <a:ext cx="1013311" cy="1194823"/>
           </a:xfrm>
           <a:prstGeom prst="rect">
@@ -4870,7 +4567,7 @@
         </p:nvSpPr>
         <p:spPr>
           <a:xfrm>
-            <a:off x="1015922" y="1136397"/>
+            <a:off x="7756266" y="3534332"/>
             <a:ext cx="685449" cy="186648"/>
           </a:xfrm>
           <a:prstGeom prst="rect">
@@ -4924,356 +4621,6 @@
       </p:sp>
       <p:sp>
         <p:nvSpPr>
-          <p:cNvPr id="80" name="Rectangle 79">
-            <a:extLst>
-              <a:ext uri="{FF2B5EF4-FFF2-40B4-BE49-F238E27FC236}">
-                <a16:creationId xmlns:a16="http://schemas.microsoft.com/office/drawing/2014/main" id="{55E3340C-8A4D-29A5-5A0C-170E40347EC9}"/>
-              </a:ext>
-            </a:extLst>
-          </p:cNvPr>
-          <p:cNvSpPr/>
-          <p:nvPr/>
-        </p:nvSpPr>
-        <p:spPr>
-          <a:xfrm>
-            <a:off x="5081260" y="4958934"/>
-            <a:ext cx="1371600" cy="457200"/>
-          </a:xfrm>
-          <a:prstGeom prst="rect">
-            <a:avLst/>
-          </a:prstGeom>
-          <a:solidFill>
-            <a:schemeClr val="accent4">
-              <a:lumMod val="20000"/>
-              <a:lumOff val="80000"/>
-            </a:schemeClr>
-          </a:solidFill>
-          <a:ln>
-            <a:solidFill>
-              <a:schemeClr val="tx1"/>
-            </a:solidFill>
-          </a:ln>
-        </p:spPr>
-        <p:style>
-          <a:lnRef idx="2">
-            <a:schemeClr val="accent1">
-              <a:shade val="50000"/>
-            </a:schemeClr>
-          </a:lnRef>
-          <a:fillRef idx="1">
-            <a:schemeClr val="accent1"/>
-          </a:fillRef>
-          <a:effectRef idx="0">
-            <a:schemeClr val="accent1"/>
-          </a:effectRef>
-          <a:fontRef idx="minor">
-            <a:schemeClr val="lt1"/>
-          </a:fontRef>
-        </p:style>
-        <p:txBody>
-          <a:bodyPr rtlCol="0" anchor="ctr" anchorCtr="1"/>
-          <a:lstStyle/>
-          <a:p>
-            <a:pPr algn="ctr"/>
-            <a:r>
-              <a:rPr lang="en-US" sz="1400" dirty="0">
-                <a:solidFill>
-                  <a:schemeClr val="tx1"/>
-                </a:solidFill>
-                <a:latin typeface="LXGW WenKai" panose="02020500000000000000" pitchFamily="18" charset="-120"/>
-                <a:ea typeface="LXGW WenKai" panose="02020500000000000000" pitchFamily="18" charset="-120"/>
-              </a:rPr>
-              <a:t>Agent Configs</a:t>
-            </a:r>
-            <a:endParaRPr lang="en-US" sz="1600" dirty="0">
-              <a:solidFill>
-                <a:schemeClr val="tx1"/>
-              </a:solidFill>
-              <a:latin typeface="LXGW WenKai" panose="02020500000000000000" pitchFamily="18" charset="-120"/>
-              <a:ea typeface="LXGW WenKai" panose="02020500000000000000" pitchFamily="18" charset="-120"/>
-            </a:endParaRPr>
-          </a:p>
-        </p:txBody>
-      </p:sp>
-      <p:cxnSp>
-        <p:nvCxnSpPr>
-          <p:cNvPr id="84" name="Connector: Elbow 83">
-            <a:extLst>
-              <a:ext uri="{FF2B5EF4-FFF2-40B4-BE49-F238E27FC236}">
-                <a16:creationId xmlns:a16="http://schemas.microsoft.com/office/drawing/2014/main" id="{0EA3BDB1-F2A4-5C02-333F-366299C1662B}"/>
-              </a:ext>
-            </a:extLst>
-          </p:cNvPr>
-          <p:cNvCxnSpPr>
-            <a:cxnSpLocks/>
-            <a:stCxn id="10" idx="2"/>
-            <a:endCxn id="96" idx="1"/>
-          </p:cNvCxnSpPr>
-          <p:nvPr/>
-        </p:nvCxnSpPr>
-        <p:spPr>
-          <a:xfrm rot="16200000" flipH="1">
-            <a:off x="2826438" y="2242795"/>
-            <a:ext cx="2636422" cy="1873221"/>
-          </a:xfrm>
-          <a:prstGeom prst="bentConnector2">
-            <a:avLst/>
-          </a:prstGeom>
-          <a:ln w="9525">
-            <a:solidFill>
-              <a:schemeClr val="tx1"/>
-            </a:solidFill>
-            <a:headEnd type="triangle"/>
-            <a:tailEnd type="triangle"/>
-          </a:ln>
-        </p:spPr>
-        <p:style>
-          <a:lnRef idx="1">
-            <a:schemeClr val="accent1"/>
-          </a:lnRef>
-          <a:fillRef idx="0">
-            <a:schemeClr val="accent1"/>
-          </a:fillRef>
-          <a:effectRef idx="0">
-            <a:schemeClr val="accent1"/>
-          </a:effectRef>
-          <a:fontRef idx="minor">
-            <a:schemeClr val="tx1"/>
-          </a:fontRef>
-        </p:style>
-      </p:cxnSp>
-      <p:sp>
-        <p:nvSpPr>
-          <p:cNvPr id="96" name="Rectangle 95">
-            <a:extLst>
-              <a:ext uri="{FF2B5EF4-FFF2-40B4-BE49-F238E27FC236}">
-                <a16:creationId xmlns:a16="http://schemas.microsoft.com/office/drawing/2014/main" id="{1A571AEA-B399-C4AC-3A18-2CA6BF7CEACD}"/>
-              </a:ext>
-            </a:extLst>
-          </p:cNvPr>
-          <p:cNvSpPr/>
-          <p:nvPr/>
-        </p:nvSpPr>
-        <p:spPr>
-          <a:xfrm>
-            <a:off x="5081260" y="4269017"/>
-            <a:ext cx="1196369" cy="457200"/>
-          </a:xfrm>
-          <a:prstGeom prst="rect">
-            <a:avLst/>
-          </a:prstGeom>
-          <a:solidFill>
-            <a:schemeClr val="accent4">
-              <a:lumMod val="20000"/>
-              <a:lumOff val="80000"/>
-            </a:schemeClr>
-          </a:solidFill>
-          <a:ln>
-            <a:solidFill>
-              <a:schemeClr val="tx1"/>
-            </a:solidFill>
-          </a:ln>
-        </p:spPr>
-        <p:style>
-          <a:lnRef idx="2">
-            <a:schemeClr val="accent1">
-              <a:shade val="50000"/>
-            </a:schemeClr>
-          </a:lnRef>
-          <a:fillRef idx="1">
-            <a:schemeClr val="accent1"/>
-          </a:fillRef>
-          <a:effectRef idx="0">
-            <a:schemeClr val="accent1"/>
-          </a:effectRef>
-          <a:fontRef idx="minor">
-            <a:schemeClr val="lt1"/>
-          </a:fontRef>
-        </p:style>
-        <p:txBody>
-          <a:bodyPr rtlCol="0" anchor="ctr" anchorCtr="1"/>
-          <a:lstStyle/>
-          <a:p>
-            <a:pPr algn="ctr"/>
-            <a:r>
-              <a:rPr lang="en-US" sz="1400" dirty="0">
-                <a:solidFill>
-                  <a:schemeClr val="tx1"/>
-                </a:solidFill>
-                <a:latin typeface="LXGW WenKai" panose="02020500000000000000" pitchFamily="18" charset="-120"/>
-                <a:ea typeface="LXGW WenKai" panose="02020500000000000000" pitchFamily="18" charset="-120"/>
-              </a:rPr>
-              <a:t>Contexts</a:t>
-            </a:r>
-          </a:p>
-        </p:txBody>
-      </p:sp>
-      <p:cxnSp>
-        <p:nvCxnSpPr>
-          <p:cNvPr id="100" name="Connector: Elbow 99">
-            <a:extLst>
-              <a:ext uri="{FF2B5EF4-FFF2-40B4-BE49-F238E27FC236}">
-                <a16:creationId xmlns:a16="http://schemas.microsoft.com/office/drawing/2014/main" id="{3264145F-BEA8-B01C-6434-B36E905DE09F}"/>
-              </a:ext>
-            </a:extLst>
-          </p:cNvPr>
-          <p:cNvCxnSpPr>
-            <a:cxnSpLocks/>
-            <a:stCxn id="10" idx="2"/>
-            <a:endCxn id="80" idx="2"/>
-          </p:cNvCxnSpPr>
-          <p:nvPr/>
-        </p:nvCxnSpPr>
-        <p:spPr>
-          <a:xfrm rot="16200000" flipH="1">
-            <a:off x="2710080" y="2359153"/>
-            <a:ext cx="3554939" cy="2559021"/>
-          </a:xfrm>
-          <a:prstGeom prst="bentConnector3">
-            <a:avLst>
-              <a:gd name="adj1" fmla="val 106430"/>
-            </a:avLst>
-          </a:prstGeom>
-          <a:ln w="9525">
-            <a:solidFill>
-              <a:schemeClr val="tx1"/>
-            </a:solidFill>
-            <a:headEnd type="triangle"/>
-            <a:tailEnd type="triangle"/>
-          </a:ln>
-        </p:spPr>
-        <p:style>
-          <a:lnRef idx="1">
-            <a:schemeClr val="accent1"/>
-          </a:lnRef>
-          <a:fillRef idx="0">
-            <a:schemeClr val="accent1"/>
-          </a:fillRef>
-          <a:effectRef idx="0">
-            <a:schemeClr val="accent1"/>
-          </a:effectRef>
-          <a:fontRef idx="minor">
-            <a:schemeClr val="tx1"/>
-          </a:fontRef>
-        </p:style>
-      </p:cxnSp>
-      <p:cxnSp>
-        <p:nvCxnSpPr>
-          <p:cNvPr id="33" name="Connector: Elbow 32">
-            <a:extLst>
-              <a:ext uri="{FF2B5EF4-FFF2-40B4-BE49-F238E27FC236}">
-                <a16:creationId xmlns:a16="http://schemas.microsoft.com/office/drawing/2014/main" id="{FECD5B19-9ABD-FBE1-1881-23E52064E9EF}"/>
-              </a:ext>
-            </a:extLst>
-          </p:cNvPr>
-          <p:cNvCxnSpPr>
-            <a:cxnSpLocks/>
-            <a:stCxn id="10" idx="2"/>
-            <a:endCxn id="9" idx="2"/>
-          </p:cNvCxnSpPr>
-          <p:nvPr/>
-        </p:nvCxnSpPr>
-        <p:spPr>
-          <a:xfrm rot="16200000" flipH="1">
-            <a:off x="3664544" y="1404689"/>
-            <a:ext cx="2865022" cy="3778033"/>
-          </a:xfrm>
-          <a:prstGeom prst="bentConnector3">
-            <a:avLst>
-              <a:gd name="adj1" fmla="val 105942"/>
-            </a:avLst>
-          </a:prstGeom>
-          <a:ln w="9525">
-            <a:solidFill>
-              <a:schemeClr val="tx1"/>
-            </a:solidFill>
-            <a:headEnd type="triangle"/>
-            <a:tailEnd type="triangle"/>
-          </a:ln>
-        </p:spPr>
-        <p:style>
-          <a:lnRef idx="1">
-            <a:schemeClr val="accent1"/>
-          </a:lnRef>
-          <a:fillRef idx="0">
-            <a:schemeClr val="accent1"/>
-          </a:fillRef>
-          <a:effectRef idx="0">
-            <a:schemeClr val="accent1"/>
-          </a:effectRef>
-          <a:fontRef idx="minor">
-            <a:schemeClr val="tx1"/>
-          </a:fontRef>
-        </p:style>
-      </p:cxnSp>
-      <p:sp>
-        <p:nvSpPr>
-          <p:cNvPr id="160" name="Rectangle 159">
-            <a:extLst>
-              <a:ext uri="{FF2B5EF4-FFF2-40B4-BE49-F238E27FC236}">
-                <a16:creationId xmlns:a16="http://schemas.microsoft.com/office/drawing/2014/main" id="{2D663D7A-E75A-A89B-C125-37C84B176016}"/>
-              </a:ext>
-            </a:extLst>
-          </p:cNvPr>
-          <p:cNvSpPr/>
-          <p:nvPr/>
-        </p:nvSpPr>
-        <p:spPr>
-          <a:xfrm>
-            <a:off x="847126" y="2479496"/>
-            <a:ext cx="881844" cy="415942"/>
-          </a:xfrm>
-          <a:prstGeom prst="rect">
-            <a:avLst/>
-          </a:prstGeom>
-          <a:solidFill>
-            <a:schemeClr val="accent2">
-              <a:lumMod val="60000"/>
-              <a:lumOff val="40000"/>
-            </a:schemeClr>
-          </a:solidFill>
-          <a:ln>
-            <a:solidFill>
-              <a:schemeClr val="tx1"/>
-            </a:solidFill>
-          </a:ln>
-        </p:spPr>
-        <p:style>
-          <a:lnRef idx="2">
-            <a:schemeClr val="accent1">
-              <a:shade val="50000"/>
-            </a:schemeClr>
-          </a:lnRef>
-          <a:fillRef idx="1">
-            <a:schemeClr val="accent1"/>
-          </a:fillRef>
-          <a:effectRef idx="0">
-            <a:schemeClr val="accent1"/>
-          </a:effectRef>
-          <a:fontRef idx="minor">
-            <a:schemeClr val="lt1"/>
-          </a:fontRef>
-        </p:style>
-        <p:txBody>
-          <a:bodyPr rtlCol="0" anchor="ctr" anchorCtr="1"/>
-          <a:lstStyle/>
-          <a:p>
-            <a:pPr algn="ctr"/>
-            <a:r>
-              <a:rPr lang="en-US" sz="1400" dirty="0">
-                <a:solidFill>
-                  <a:schemeClr val="tx1"/>
-                </a:solidFill>
-                <a:latin typeface="LXGW WenKai" panose="02020500000000000000" pitchFamily="18" charset="-120"/>
-                <a:ea typeface="LXGW WenKai" panose="02020500000000000000" pitchFamily="18" charset="-120"/>
-              </a:rPr>
-              <a:t>LLMs</a:t>
-            </a:r>
-          </a:p>
-        </p:txBody>
-      </p:sp>
-      <p:sp>
-        <p:nvSpPr>
           <p:cNvPr id="18" name="文本框 17">
             <a:extLst>
               <a:ext uri="{FF2B5EF4-FFF2-40B4-BE49-F238E27FC236}">
@@ -5454,60 +4801,6 @@
           </a:p>
         </p:txBody>
       </p:sp>
-      <p:cxnSp>
-        <p:nvCxnSpPr>
-          <p:cNvPr id="41" name="Straight Arrow Connector 14">
-            <a:extLst>
-              <a:ext uri="{FF2B5EF4-FFF2-40B4-BE49-F238E27FC236}">
-                <a16:creationId xmlns:a16="http://schemas.microsoft.com/office/drawing/2014/main" id="{CDC62C56-1195-B957-D7C1-7968E649D360}"/>
-              </a:ext>
-            </a:extLst>
-          </p:cNvPr>
-          <p:cNvCxnSpPr>
-            <a:cxnSpLocks/>
-            <a:stCxn id="6" idx="1"/>
-            <a:endCxn id="10" idx="3"/>
-          </p:cNvCxnSpPr>
-          <p:nvPr/>
-        </p:nvCxnSpPr>
-        <p:spPr>
-          <a:xfrm flipH="1" flipV="1">
-            <a:off x="3745557" y="1628477"/>
-            <a:ext cx="1975994" cy="1850"/>
-          </a:xfrm>
-          <a:prstGeom prst="straightConnector1">
-            <a:avLst/>
-          </a:prstGeom>
-          <a:ln w="9525">
-            <a:solidFill>
-              <a:schemeClr val="tx1"/>
-            </a:solidFill>
-            <a:headEnd type="triangle"/>
-            <a:tailEnd type="triangle"/>
-          </a:ln>
-          <a:effectLst>
-            <a:outerShdw blurRad="63500" sx="102000" sy="102000" algn="ctr" rotWithShape="0">
-              <a:prstClr val="black">
-                <a:alpha val="40000"/>
-              </a:prstClr>
-            </a:outerShdw>
-          </a:effectLst>
-        </p:spPr>
-        <p:style>
-          <a:lnRef idx="1">
-            <a:schemeClr val="accent1"/>
-          </a:lnRef>
-          <a:fillRef idx="0">
-            <a:schemeClr val="accent1"/>
-          </a:fillRef>
-          <a:effectRef idx="0">
-            <a:schemeClr val="accent1"/>
-          </a:effectRef>
-          <a:fontRef idx="minor">
-            <a:schemeClr val="tx1"/>
-          </a:fontRef>
-        </p:style>
-      </p:cxnSp>
       <p:sp>
         <p:nvSpPr>
           <p:cNvPr id="65" name="文本框 64">
@@ -5522,7 +4815,7 @@
         </p:nvSpPr>
         <p:spPr>
           <a:xfrm>
-            <a:off x="4752240" y="6093642"/>
+            <a:off x="1165220" y="4702434"/>
             <a:ext cx="3223172" cy="453183"/>
           </a:xfrm>
           <a:prstGeom prst="rect">
@@ -5789,8 +5082,8 @@
         </p:nvCxnSpPr>
         <p:spPr>
           <a:xfrm flipV="1">
-            <a:off x="6363826" y="5841704"/>
-            <a:ext cx="0" cy="251938"/>
+            <a:off x="2776806" y="4456704"/>
+            <a:ext cx="1" cy="245730"/>
           </a:xfrm>
           <a:prstGeom prst="straightConnector1">
             <a:avLst/>
@@ -5842,7 +5135,7 @@
         </p:nvSpPr>
         <p:spPr>
           <a:xfrm>
-            <a:off x="1015923" y="1379436"/>
+            <a:off x="7756267" y="3777371"/>
             <a:ext cx="685449" cy="186648"/>
           </a:xfrm>
           <a:prstGeom prst="rect">
@@ -5908,7 +5201,7 @@
         </p:nvSpPr>
         <p:spPr>
           <a:xfrm>
-            <a:off x="1015922" y="1631048"/>
+            <a:off x="7756266" y="4028983"/>
             <a:ext cx="685449" cy="186648"/>
           </a:xfrm>
           <a:prstGeom prst="rect">
@@ -5960,12 +5253,116 @@
           </a:p>
         </p:txBody>
       </p:sp>
-      <p:sp>
-        <p:nvSpPr>
-          <p:cNvPr id="86" name="Rectangle 159">
-            <a:extLst>
-              <a:ext uri="{FF2B5EF4-FFF2-40B4-BE49-F238E27FC236}">
-                <a16:creationId xmlns:a16="http://schemas.microsoft.com/office/drawing/2014/main" id="{EF6E2E0D-B1C0-4AFC-FB19-9C1377E5B734}"/>
+      <p:cxnSp>
+        <p:nvCxnSpPr>
+          <p:cNvPr id="17" name="Straight Arrow Connector 14">
+            <a:extLst>
+              <a:ext uri="{FF2B5EF4-FFF2-40B4-BE49-F238E27FC236}">
+                <a16:creationId xmlns:a16="http://schemas.microsoft.com/office/drawing/2014/main" id="{421EA74A-CD49-C8AF-075B-075208BE8FD8}"/>
+              </a:ext>
+            </a:extLst>
+          </p:cNvPr>
+          <p:cNvCxnSpPr>
+            <a:cxnSpLocks/>
+            <a:stCxn id="10" idx="0"/>
+            <a:endCxn id="6" idx="2"/>
+          </p:cNvCxnSpPr>
+          <p:nvPr/>
+        </p:nvCxnSpPr>
+        <p:spPr>
+          <a:xfrm flipH="1" flipV="1">
+            <a:off x="6261551" y="1863045"/>
+            <a:ext cx="2482" cy="1933639"/>
+          </a:xfrm>
+          <a:prstGeom prst="straightConnector1">
+            <a:avLst/>
+          </a:prstGeom>
+          <a:ln w="9525">
+            <a:solidFill>
+              <a:schemeClr val="tx1"/>
+            </a:solidFill>
+            <a:headEnd type="triangle"/>
+            <a:tailEnd type="triangle"/>
+          </a:ln>
+          <a:effectLst>
+            <a:outerShdw blurRad="63500" sx="102000" sy="102000" algn="ctr" rotWithShape="0">
+              <a:prstClr val="black">
+                <a:alpha val="40000"/>
+              </a:prstClr>
+            </a:outerShdw>
+          </a:effectLst>
+        </p:spPr>
+        <p:style>
+          <a:lnRef idx="1">
+            <a:schemeClr val="accent1"/>
+          </a:lnRef>
+          <a:fillRef idx="0">
+            <a:schemeClr val="accent1"/>
+          </a:fillRef>
+          <a:effectRef idx="0">
+            <a:schemeClr val="accent1"/>
+          </a:effectRef>
+          <a:fontRef idx="minor">
+            <a:schemeClr val="tx1"/>
+          </a:fontRef>
+        </p:style>
+      </p:cxnSp>
+      <p:cxnSp>
+        <p:nvCxnSpPr>
+          <p:cNvPr id="22" name="Connector: Elbow 162">
+            <a:extLst>
+              <a:ext uri="{FF2B5EF4-FFF2-40B4-BE49-F238E27FC236}">
+                <a16:creationId xmlns:a16="http://schemas.microsoft.com/office/drawing/2014/main" id="{979BC091-250B-EB57-4A75-0FAE04EE1742}"/>
+              </a:ext>
+            </a:extLst>
+          </p:cNvPr>
+          <p:cNvCxnSpPr>
+            <a:cxnSpLocks/>
+            <a:stCxn id="10" idx="1"/>
+            <a:endCxn id="31" idx="3"/>
+          </p:cNvCxnSpPr>
+          <p:nvPr/>
+        </p:nvCxnSpPr>
+        <p:spPr>
+          <a:xfrm rot="10800000">
+            <a:off x="4050868" y="3484259"/>
+            <a:ext cx="1675646" cy="545144"/>
+          </a:xfrm>
+          <a:prstGeom prst="bentConnector3">
+            <a:avLst>
+              <a:gd name="adj1" fmla="val 50000"/>
+            </a:avLst>
+          </a:prstGeom>
+          <a:ln w="9525">
+            <a:solidFill>
+              <a:schemeClr val="tx1"/>
+            </a:solidFill>
+            <a:prstDash val="solid"/>
+            <a:headEnd type="triangle"/>
+            <a:tailEnd type="triangle"/>
+          </a:ln>
+        </p:spPr>
+        <p:style>
+          <a:lnRef idx="1">
+            <a:schemeClr val="accent1"/>
+          </a:lnRef>
+          <a:fillRef idx="0">
+            <a:schemeClr val="accent1"/>
+          </a:fillRef>
+          <a:effectRef idx="0">
+            <a:schemeClr val="accent1"/>
+          </a:effectRef>
+          <a:fontRef idx="minor">
+            <a:schemeClr val="tx1"/>
+          </a:fontRef>
+        </p:style>
+      </p:cxnSp>
+      <p:sp>
+        <p:nvSpPr>
+          <p:cNvPr id="29" name="矩形: 圆角 28">
+            <a:extLst>
+              <a:ext uri="{FF2B5EF4-FFF2-40B4-BE49-F238E27FC236}">
+                <a16:creationId xmlns:a16="http://schemas.microsoft.com/office/drawing/2014/main" id="{EBD2BC47-DB9F-F3D2-D581-9FE3C57A24E4}"/>
               </a:ext>
             </a:extLst>
           </p:cNvPr>
@@ -5974,7 +5371,578 @@
         </p:nvSpPr>
         <p:spPr>
           <a:xfrm>
-            <a:off x="1930986" y="2479496"/>
+            <a:off x="1307203" y="2160476"/>
+            <a:ext cx="2684834" cy="526339"/>
+          </a:xfrm>
+          <a:prstGeom prst="roundRect">
+            <a:avLst>
+              <a:gd name="adj" fmla="val 7426"/>
+            </a:avLst>
+          </a:prstGeom>
+          <a:solidFill>
+            <a:schemeClr val="bg1">
+              <a:alpha val="20000"/>
+            </a:schemeClr>
+          </a:solidFill>
+          <a:ln>
+            <a:solidFill>
+              <a:schemeClr val="tx1"/>
+            </a:solidFill>
+            <a:prstDash val="dash"/>
+          </a:ln>
+        </p:spPr>
+        <p:style>
+          <a:lnRef idx="2">
+            <a:schemeClr val="accent1">
+              <a:shade val="15000"/>
+            </a:schemeClr>
+          </a:lnRef>
+          <a:fillRef idx="1">
+            <a:schemeClr val="accent1"/>
+          </a:fillRef>
+          <a:effectRef idx="0">
+            <a:schemeClr val="accent1"/>
+          </a:effectRef>
+          <a:fontRef idx="minor">
+            <a:schemeClr val="lt1"/>
+          </a:fontRef>
+        </p:style>
+        <p:txBody>
+          <a:bodyPr rtlCol="0" anchor="ctr"/>
+          <a:lstStyle/>
+          <a:p>
+            <a:pPr algn="ctr"/>
+            <a:endParaRPr lang="zh-CN" altLang="en-US"/>
+          </a:p>
+        </p:txBody>
+      </p:sp>
+      <p:sp>
+        <p:nvSpPr>
+          <p:cNvPr id="31" name="矩形: 圆角 30">
+            <a:extLst>
+              <a:ext uri="{FF2B5EF4-FFF2-40B4-BE49-F238E27FC236}">
+                <a16:creationId xmlns:a16="http://schemas.microsoft.com/office/drawing/2014/main" id="{35726808-4A53-097D-B5EB-644A32A8073B}"/>
+              </a:ext>
+            </a:extLst>
+          </p:cNvPr>
+          <p:cNvSpPr/>
+          <p:nvPr/>
+        </p:nvSpPr>
+        <p:spPr>
+          <a:xfrm>
+            <a:off x="1307203" y="2964997"/>
+            <a:ext cx="2743665" cy="1038524"/>
+          </a:xfrm>
+          <a:prstGeom prst="roundRect">
+            <a:avLst>
+              <a:gd name="adj" fmla="val 8237"/>
+            </a:avLst>
+          </a:prstGeom>
+          <a:solidFill>
+            <a:schemeClr val="bg1">
+              <a:alpha val="20000"/>
+            </a:schemeClr>
+          </a:solidFill>
+          <a:ln>
+            <a:solidFill>
+              <a:schemeClr val="tx1"/>
+            </a:solidFill>
+            <a:prstDash val="dash"/>
+          </a:ln>
+        </p:spPr>
+        <p:style>
+          <a:lnRef idx="2">
+            <a:schemeClr val="accent1">
+              <a:shade val="15000"/>
+            </a:schemeClr>
+          </a:lnRef>
+          <a:fillRef idx="1">
+            <a:schemeClr val="accent1"/>
+          </a:fillRef>
+          <a:effectRef idx="0">
+            <a:schemeClr val="accent1"/>
+          </a:effectRef>
+          <a:fontRef idx="minor">
+            <a:schemeClr val="lt1"/>
+          </a:fontRef>
+        </p:style>
+        <p:txBody>
+          <a:bodyPr rtlCol="0" anchor="ctr"/>
+          <a:lstStyle/>
+          <a:p>
+            <a:pPr algn="ctr"/>
+            <a:endParaRPr lang="zh-CN" altLang="en-US"/>
+          </a:p>
+        </p:txBody>
+      </p:sp>
+      <p:sp>
+        <p:nvSpPr>
+          <p:cNvPr id="9" name="Rectangle 8">
+            <a:extLst>
+              <a:ext uri="{FF2B5EF4-FFF2-40B4-BE49-F238E27FC236}">
+                <a16:creationId xmlns:a16="http://schemas.microsoft.com/office/drawing/2014/main" id="{56F4A4FE-1E8D-F949-D9CD-B3B0E98A42D0}"/>
+              </a:ext>
+            </a:extLst>
+          </p:cNvPr>
+          <p:cNvSpPr/>
+          <p:nvPr/>
+        </p:nvSpPr>
+        <p:spPr>
+          <a:xfrm>
+            <a:off x="2720580" y="3518399"/>
+            <a:ext cx="1196369" cy="357840"/>
+          </a:xfrm>
+          <a:prstGeom prst="rect">
+            <a:avLst/>
+          </a:prstGeom>
+          <a:solidFill>
+            <a:schemeClr val="accent4">
+              <a:lumMod val="20000"/>
+              <a:lumOff val="80000"/>
+            </a:schemeClr>
+          </a:solidFill>
+          <a:ln>
+            <a:solidFill>
+              <a:schemeClr val="tx1"/>
+            </a:solidFill>
+          </a:ln>
+        </p:spPr>
+        <p:style>
+          <a:lnRef idx="2">
+            <a:schemeClr val="accent1">
+              <a:shade val="50000"/>
+            </a:schemeClr>
+          </a:lnRef>
+          <a:fillRef idx="1">
+            <a:schemeClr val="accent1"/>
+          </a:fillRef>
+          <a:effectRef idx="0">
+            <a:schemeClr val="accent1"/>
+          </a:effectRef>
+          <a:fontRef idx="minor">
+            <a:schemeClr val="lt1"/>
+          </a:fontRef>
+        </p:style>
+        <p:txBody>
+          <a:bodyPr rtlCol="0" anchor="ctr" anchorCtr="1"/>
+          <a:lstStyle/>
+          <a:p>
+            <a:pPr algn="ctr"/>
+            <a:r>
+              <a:rPr lang="en-US" sz="1400" dirty="0">
+                <a:solidFill>
+                  <a:schemeClr val="tx1"/>
+                </a:solidFill>
+                <a:latin typeface="LXGW WenKai" panose="02020500000000000000" pitchFamily="18" charset="-120"/>
+                <a:ea typeface="LXGW WenKai" panose="02020500000000000000" pitchFamily="18" charset="-120"/>
+              </a:rPr>
+              <a:t>Knowledge</a:t>
+            </a:r>
+            <a:endParaRPr lang="en-US" sz="1600" dirty="0">
+              <a:solidFill>
+                <a:schemeClr val="tx1"/>
+              </a:solidFill>
+              <a:latin typeface="LXGW WenKai" panose="02020500000000000000" pitchFamily="18" charset="-120"/>
+              <a:ea typeface="LXGW WenKai" panose="02020500000000000000" pitchFamily="18" charset="-120"/>
+            </a:endParaRPr>
+          </a:p>
+        </p:txBody>
+      </p:sp>
+      <p:sp>
+        <p:nvSpPr>
+          <p:cNvPr id="80" name="Rectangle 79">
+            <a:extLst>
+              <a:ext uri="{FF2B5EF4-FFF2-40B4-BE49-F238E27FC236}">
+                <a16:creationId xmlns:a16="http://schemas.microsoft.com/office/drawing/2014/main" id="{55E3340C-8A4D-29A5-5A0C-170E40347EC9}"/>
+              </a:ext>
+            </a:extLst>
+          </p:cNvPr>
+          <p:cNvSpPr/>
+          <p:nvPr/>
+        </p:nvSpPr>
+        <p:spPr>
+          <a:xfrm>
+            <a:off x="1391468" y="3185917"/>
+            <a:ext cx="1196369" cy="526339"/>
+          </a:xfrm>
+          <a:prstGeom prst="rect">
+            <a:avLst/>
+          </a:prstGeom>
+          <a:solidFill>
+            <a:schemeClr val="accent4">
+              <a:lumMod val="20000"/>
+              <a:lumOff val="80000"/>
+            </a:schemeClr>
+          </a:solidFill>
+          <a:ln>
+            <a:solidFill>
+              <a:schemeClr val="tx1"/>
+            </a:solidFill>
+          </a:ln>
+        </p:spPr>
+        <p:style>
+          <a:lnRef idx="2">
+            <a:schemeClr val="accent1">
+              <a:shade val="50000"/>
+            </a:schemeClr>
+          </a:lnRef>
+          <a:fillRef idx="1">
+            <a:schemeClr val="accent1"/>
+          </a:fillRef>
+          <a:effectRef idx="0">
+            <a:schemeClr val="accent1"/>
+          </a:effectRef>
+          <a:fontRef idx="minor">
+            <a:schemeClr val="lt1"/>
+          </a:fontRef>
+        </p:style>
+        <p:txBody>
+          <a:bodyPr rtlCol="0" anchor="ctr" anchorCtr="1"/>
+          <a:lstStyle/>
+          <a:p>
+            <a:pPr algn="ctr"/>
+            <a:r>
+              <a:rPr lang="en-US" sz="1400" dirty="0">
+                <a:solidFill>
+                  <a:schemeClr val="tx1"/>
+                </a:solidFill>
+                <a:latin typeface="LXGW WenKai" panose="02020500000000000000" pitchFamily="18" charset="-120"/>
+                <a:ea typeface="LXGW WenKai" panose="02020500000000000000" pitchFamily="18" charset="-120"/>
+              </a:rPr>
+              <a:t>Agent Configs</a:t>
+            </a:r>
+            <a:endParaRPr lang="en-US" sz="1600" dirty="0">
+              <a:solidFill>
+                <a:schemeClr val="tx1"/>
+              </a:solidFill>
+              <a:latin typeface="LXGW WenKai" panose="02020500000000000000" pitchFamily="18" charset="-120"/>
+              <a:ea typeface="LXGW WenKai" panose="02020500000000000000" pitchFamily="18" charset="-120"/>
+            </a:endParaRPr>
+          </a:p>
+        </p:txBody>
+      </p:sp>
+      <p:sp>
+        <p:nvSpPr>
+          <p:cNvPr id="96" name="Rectangle 95">
+            <a:extLst>
+              <a:ext uri="{FF2B5EF4-FFF2-40B4-BE49-F238E27FC236}">
+                <a16:creationId xmlns:a16="http://schemas.microsoft.com/office/drawing/2014/main" id="{1A571AEA-B399-C4AC-3A18-2CA6BF7CEACD}"/>
+              </a:ext>
+            </a:extLst>
+          </p:cNvPr>
+          <p:cNvSpPr/>
+          <p:nvPr/>
+        </p:nvSpPr>
+        <p:spPr>
+          <a:xfrm>
+            <a:off x="2723505" y="3021842"/>
+            <a:ext cx="1196369" cy="357840"/>
+          </a:xfrm>
+          <a:prstGeom prst="rect">
+            <a:avLst/>
+          </a:prstGeom>
+          <a:solidFill>
+            <a:schemeClr val="accent4">
+              <a:lumMod val="20000"/>
+              <a:lumOff val="80000"/>
+            </a:schemeClr>
+          </a:solidFill>
+          <a:ln>
+            <a:solidFill>
+              <a:schemeClr val="tx1"/>
+            </a:solidFill>
+          </a:ln>
+        </p:spPr>
+        <p:style>
+          <a:lnRef idx="2">
+            <a:schemeClr val="accent1">
+              <a:shade val="50000"/>
+            </a:schemeClr>
+          </a:lnRef>
+          <a:fillRef idx="1">
+            <a:schemeClr val="accent1"/>
+          </a:fillRef>
+          <a:effectRef idx="0">
+            <a:schemeClr val="accent1"/>
+          </a:effectRef>
+          <a:fontRef idx="minor">
+            <a:schemeClr val="lt1"/>
+          </a:fontRef>
+        </p:style>
+        <p:txBody>
+          <a:bodyPr rtlCol="0" anchor="ctr" anchorCtr="1"/>
+          <a:lstStyle/>
+          <a:p>
+            <a:pPr algn="ctr"/>
+            <a:r>
+              <a:rPr lang="en-US" sz="1400" dirty="0">
+                <a:solidFill>
+                  <a:schemeClr val="tx1"/>
+                </a:solidFill>
+                <a:latin typeface="LXGW WenKai" panose="02020500000000000000" pitchFamily="18" charset="-120"/>
+                <a:ea typeface="LXGW WenKai" panose="02020500000000000000" pitchFamily="18" charset="-120"/>
+              </a:rPr>
+              <a:t>Contexts</a:t>
+            </a:r>
+          </a:p>
+        </p:txBody>
+      </p:sp>
+      <p:sp>
+        <p:nvSpPr>
+          <p:cNvPr id="4" name="Rectangle 3">
+            <a:extLst>
+              <a:ext uri="{FF2B5EF4-FFF2-40B4-BE49-F238E27FC236}">
+                <a16:creationId xmlns:a16="http://schemas.microsoft.com/office/drawing/2014/main" id="{D9806EAC-7DC2-FFAD-F565-90F93EC55137}"/>
+              </a:ext>
+            </a:extLst>
+          </p:cNvPr>
+          <p:cNvSpPr/>
+          <p:nvPr/>
+        </p:nvSpPr>
+        <p:spPr>
+          <a:xfrm>
+            <a:off x="1391468" y="2248108"/>
+            <a:ext cx="1196369" cy="360000"/>
+          </a:xfrm>
+          <a:prstGeom prst="rect">
+            <a:avLst/>
+          </a:prstGeom>
+          <a:solidFill>
+            <a:schemeClr val="accent4">
+              <a:lumMod val="40000"/>
+              <a:lumOff val="60000"/>
+            </a:schemeClr>
+          </a:solidFill>
+          <a:ln>
+            <a:solidFill>
+              <a:schemeClr val="tx1"/>
+            </a:solidFill>
+          </a:ln>
+        </p:spPr>
+        <p:style>
+          <a:lnRef idx="2">
+            <a:schemeClr val="accent1">
+              <a:shade val="50000"/>
+            </a:schemeClr>
+          </a:lnRef>
+          <a:fillRef idx="1">
+            <a:schemeClr val="accent1"/>
+          </a:fillRef>
+          <a:effectRef idx="0">
+            <a:schemeClr val="accent1"/>
+          </a:effectRef>
+          <a:fontRef idx="minor">
+            <a:schemeClr val="lt1"/>
+          </a:fontRef>
+        </p:style>
+        <p:txBody>
+          <a:bodyPr rtlCol="0" anchor="ctr" anchorCtr="1"/>
+          <a:lstStyle/>
+          <a:p>
+            <a:pPr algn="ctr"/>
+            <a:r>
+              <a:rPr lang="en-US" sz="1400" dirty="0">
+                <a:solidFill>
+                  <a:schemeClr val="tx1"/>
+                </a:solidFill>
+                <a:latin typeface="LXGW WenKai" panose="02020500000000000000" pitchFamily="18" charset="-120"/>
+                <a:ea typeface="LXGW WenKai" panose="02020500000000000000" pitchFamily="18" charset="-120"/>
+              </a:rPr>
+              <a:t>UI Configs</a:t>
+            </a:r>
+          </a:p>
+        </p:txBody>
+      </p:sp>
+      <p:sp>
+        <p:nvSpPr>
+          <p:cNvPr id="8" name="Rectangle 7">
+            <a:extLst>
+              <a:ext uri="{FF2B5EF4-FFF2-40B4-BE49-F238E27FC236}">
+                <a16:creationId xmlns:a16="http://schemas.microsoft.com/office/drawing/2014/main" id="{4DC41078-AFAF-45AD-5CA5-28463EEE9024}"/>
+              </a:ext>
+            </a:extLst>
+          </p:cNvPr>
+          <p:cNvSpPr/>
+          <p:nvPr/>
+        </p:nvSpPr>
+        <p:spPr>
+          <a:xfrm>
+            <a:off x="2719832" y="2248108"/>
+            <a:ext cx="1197864" cy="360000"/>
+          </a:xfrm>
+          <a:prstGeom prst="rect">
+            <a:avLst/>
+          </a:prstGeom>
+          <a:solidFill>
+            <a:schemeClr val="accent4">
+              <a:lumMod val="40000"/>
+              <a:lumOff val="60000"/>
+            </a:schemeClr>
+          </a:solidFill>
+          <a:ln>
+            <a:solidFill>
+              <a:schemeClr val="tx1"/>
+            </a:solidFill>
+          </a:ln>
+        </p:spPr>
+        <p:style>
+          <a:lnRef idx="2">
+            <a:schemeClr val="accent1">
+              <a:shade val="50000"/>
+            </a:schemeClr>
+          </a:lnRef>
+          <a:fillRef idx="1">
+            <a:schemeClr val="accent1"/>
+          </a:fillRef>
+          <a:effectRef idx="0">
+            <a:schemeClr val="accent1"/>
+          </a:effectRef>
+          <a:fontRef idx="minor">
+            <a:schemeClr val="lt1"/>
+          </a:fontRef>
+        </p:style>
+        <p:txBody>
+          <a:bodyPr rtlCol="0" anchor="ctr" anchorCtr="1"/>
+          <a:lstStyle/>
+          <a:p>
+            <a:pPr algn="ctr"/>
+            <a:r>
+              <a:rPr lang="en-US" sz="1400" dirty="0">
+                <a:solidFill>
+                  <a:schemeClr val="tx1"/>
+                </a:solidFill>
+                <a:latin typeface="LXGW WenKai" panose="02020500000000000000" pitchFamily="18" charset="-120"/>
+                <a:ea typeface="LXGW WenKai" panose="02020500000000000000" pitchFamily="18" charset="-120"/>
+              </a:rPr>
+              <a:t>Messages</a:t>
+            </a:r>
+          </a:p>
+        </p:txBody>
+      </p:sp>
+      <p:cxnSp>
+        <p:nvCxnSpPr>
+          <p:cNvPr id="34" name="Connector: Elbow 162">
+            <a:extLst>
+              <a:ext uri="{FF2B5EF4-FFF2-40B4-BE49-F238E27FC236}">
+                <a16:creationId xmlns:a16="http://schemas.microsoft.com/office/drawing/2014/main" id="{F1F077E2-953D-059B-1561-459E974F0C35}"/>
+              </a:ext>
+            </a:extLst>
+          </p:cNvPr>
+          <p:cNvCxnSpPr>
+            <a:cxnSpLocks/>
+            <a:stCxn id="6" idx="1"/>
+            <a:endCxn id="29" idx="3"/>
+          </p:cNvCxnSpPr>
+          <p:nvPr/>
+        </p:nvCxnSpPr>
+        <p:spPr>
+          <a:xfrm rot="10800000" flipV="1">
+            <a:off x="3992037" y="1630326"/>
+            <a:ext cx="1729514" cy="793319"/>
+          </a:xfrm>
+          <a:prstGeom prst="bentConnector3">
+            <a:avLst>
+              <a:gd name="adj1" fmla="val 50000"/>
+            </a:avLst>
+          </a:prstGeom>
+          <a:ln w="9525">
+            <a:solidFill>
+              <a:schemeClr val="tx1"/>
+            </a:solidFill>
+            <a:prstDash val="solid"/>
+            <a:headEnd type="triangle"/>
+            <a:tailEnd type="triangle"/>
+          </a:ln>
+        </p:spPr>
+        <p:style>
+          <a:lnRef idx="1">
+            <a:schemeClr val="accent1"/>
+          </a:lnRef>
+          <a:fillRef idx="0">
+            <a:schemeClr val="accent1"/>
+          </a:fillRef>
+          <a:effectRef idx="0">
+            <a:schemeClr val="accent1"/>
+          </a:effectRef>
+          <a:fontRef idx="minor">
+            <a:schemeClr val="tx1"/>
+          </a:fontRef>
+        </p:style>
+      </p:cxnSp>
+      <p:sp>
+        <p:nvSpPr>
+          <p:cNvPr id="43" name="矩形: 圆角 42">
+            <a:extLst>
+              <a:ext uri="{FF2B5EF4-FFF2-40B4-BE49-F238E27FC236}">
+                <a16:creationId xmlns:a16="http://schemas.microsoft.com/office/drawing/2014/main" id="{CD04CB64-B710-56CD-45A1-FF5976F60349}"/>
+              </a:ext>
+            </a:extLst>
+          </p:cNvPr>
+          <p:cNvSpPr/>
+          <p:nvPr/>
+        </p:nvSpPr>
+        <p:spPr>
+          <a:xfrm>
+            <a:off x="5986527" y="4805124"/>
+            <a:ext cx="2347331" cy="641816"/>
+          </a:xfrm>
+          <a:prstGeom prst="roundRect">
+            <a:avLst>
+              <a:gd name="adj" fmla="val 8237"/>
+            </a:avLst>
+          </a:prstGeom>
+          <a:solidFill>
+            <a:schemeClr val="bg1">
+              <a:alpha val="20000"/>
+            </a:schemeClr>
+          </a:solidFill>
+          <a:ln>
+            <a:solidFill>
+              <a:schemeClr val="tx1"/>
+            </a:solidFill>
+            <a:prstDash val="dash"/>
+          </a:ln>
+        </p:spPr>
+        <p:style>
+          <a:lnRef idx="2">
+            <a:schemeClr val="accent1">
+              <a:shade val="15000"/>
+            </a:schemeClr>
+          </a:lnRef>
+          <a:fillRef idx="1">
+            <a:schemeClr val="accent1"/>
+          </a:fillRef>
+          <a:effectRef idx="0">
+            <a:schemeClr val="accent1"/>
+          </a:effectRef>
+          <a:fontRef idx="minor">
+            <a:schemeClr val="lt1"/>
+          </a:fontRef>
+        </p:style>
+        <p:txBody>
+          <a:bodyPr rtlCol="0" anchor="ctr"/>
+          <a:lstStyle/>
+          <a:p>
+            <a:pPr algn="ctr"/>
+            <a:endParaRPr lang="zh-CN" altLang="en-US"/>
+          </a:p>
+        </p:txBody>
+      </p:sp>
+      <p:sp>
+        <p:nvSpPr>
+          <p:cNvPr id="160" name="Rectangle 159">
+            <a:extLst>
+              <a:ext uri="{FF2B5EF4-FFF2-40B4-BE49-F238E27FC236}">
+                <a16:creationId xmlns:a16="http://schemas.microsoft.com/office/drawing/2014/main" id="{2D663D7A-E75A-A89B-C125-37C84B176016}"/>
+              </a:ext>
+            </a:extLst>
+          </p:cNvPr>
+          <p:cNvSpPr/>
+          <p:nvPr/>
+        </p:nvSpPr>
+        <p:spPr>
+          <a:xfrm>
+            <a:off x="6061393" y="4915666"/>
             <a:ext cx="881844" cy="415942"/>
           </a:xfrm>
           <a:prstGeom prst="rect">
@@ -6021,6 +5989,72 @@
                 <a:latin typeface="LXGW WenKai" panose="02020500000000000000" pitchFamily="18" charset="-120"/>
                 <a:ea typeface="LXGW WenKai" panose="02020500000000000000" pitchFamily="18" charset="-120"/>
               </a:rPr>
+              <a:t>LLMs</a:t>
+            </a:r>
+          </a:p>
+        </p:txBody>
+      </p:sp>
+      <p:sp>
+        <p:nvSpPr>
+          <p:cNvPr id="86" name="Rectangle 159">
+            <a:extLst>
+              <a:ext uri="{FF2B5EF4-FFF2-40B4-BE49-F238E27FC236}">
+                <a16:creationId xmlns:a16="http://schemas.microsoft.com/office/drawing/2014/main" id="{EF6E2E0D-B1C0-4AFC-FB19-9C1377E5B734}"/>
+              </a:ext>
+            </a:extLst>
+          </p:cNvPr>
+          <p:cNvSpPr/>
+          <p:nvPr/>
+        </p:nvSpPr>
+        <p:spPr>
+          <a:xfrm>
+            <a:off x="7361106" y="4915666"/>
+            <a:ext cx="881844" cy="415942"/>
+          </a:xfrm>
+          <a:prstGeom prst="rect">
+            <a:avLst/>
+          </a:prstGeom>
+          <a:solidFill>
+            <a:schemeClr val="accent2">
+              <a:lumMod val="60000"/>
+              <a:lumOff val="40000"/>
+            </a:schemeClr>
+          </a:solidFill>
+          <a:ln>
+            <a:solidFill>
+              <a:schemeClr val="tx1"/>
+            </a:solidFill>
+          </a:ln>
+        </p:spPr>
+        <p:style>
+          <a:lnRef idx="2">
+            <a:schemeClr val="accent1">
+              <a:shade val="50000"/>
+            </a:schemeClr>
+          </a:lnRef>
+          <a:fillRef idx="1">
+            <a:schemeClr val="accent1"/>
+          </a:fillRef>
+          <a:effectRef idx="0">
+            <a:schemeClr val="accent1"/>
+          </a:effectRef>
+          <a:fontRef idx="minor">
+            <a:schemeClr val="lt1"/>
+          </a:fontRef>
+        </p:style>
+        <p:txBody>
+          <a:bodyPr rtlCol="0" anchor="ctr" anchorCtr="1"/>
+          <a:lstStyle/>
+          <a:p>
+            <a:pPr algn="ctr"/>
+            <a:r>
+              <a:rPr lang="en-US" sz="1400" dirty="0">
+                <a:solidFill>
+                  <a:schemeClr val="tx1"/>
+                </a:solidFill>
+                <a:latin typeface="LXGW WenKai" panose="02020500000000000000" pitchFamily="18" charset="-120"/>
+                <a:ea typeface="LXGW WenKai" panose="02020500000000000000" pitchFamily="18" charset="-120"/>
+              </a:rPr>
               <a:t>Tools</a:t>
             </a:r>
           </a:p>
@@ -6028,24 +6062,74 @@
       </p:sp>
       <p:cxnSp>
         <p:nvCxnSpPr>
-          <p:cNvPr id="87" name="Straight Arrow Connector 14">
-            <a:extLst>
-              <a:ext uri="{FF2B5EF4-FFF2-40B4-BE49-F238E27FC236}">
-                <a16:creationId xmlns:a16="http://schemas.microsoft.com/office/drawing/2014/main" id="{F401348B-1F01-8AD4-25B3-8EE19ADB2291}"/>
+          <p:cNvPr id="44" name="Connector: Elbow 162">
+            <a:extLst>
+              <a:ext uri="{FF2B5EF4-FFF2-40B4-BE49-F238E27FC236}">
+                <a16:creationId xmlns:a16="http://schemas.microsoft.com/office/drawing/2014/main" id="{0732B11F-8D01-47FB-9ECE-AEC5AD37DB9E}"/>
               </a:ext>
             </a:extLst>
           </p:cNvPr>
           <p:cNvCxnSpPr>
             <a:cxnSpLocks/>
-            <a:stCxn id="10" idx="1"/>
+            <a:stCxn id="43" idx="3"/>
             <a:endCxn id="49" idx="3"/>
           </p:cNvCxnSpPr>
           <p:nvPr/>
         </p:nvCxnSpPr>
         <p:spPr>
+          <a:xfrm flipV="1">
+            <a:off x="8333858" y="4026412"/>
+            <a:ext cx="266923" cy="1099620"/>
+          </a:xfrm>
+          <a:prstGeom prst="bentConnector3">
+            <a:avLst>
+              <a:gd name="adj1" fmla="val 185643"/>
+            </a:avLst>
+          </a:prstGeom>
+          <a:ln w="9525">
+            <a:solidFill>
+              <a:schemeClr val="tx1"/>
+            </a:solidFill>
+            <a:prstDash val="solid"/>
+            <a:headEnd type="triangle"/>
+            <a:tailEnd type="triangle"/>
+          </a:ln>
+        </p:spPr>
+        <p:style>
+          <a:lnRef idx="1">
+            <a:schemeClr val="accent1"/>
+          </a:lnRef>
+          <a:fillRef idx="0">
+            <a:schemeClr val="accent1"/>
+          </a:fillRef>
+          <a:effectRef idx="0">
+            <a:schemeClr val="accent1"/>
+          </a:effectRef>
+          <a:fontRef idx="minor">
+            <a:schemeClr val="tx1"/>
+          </a:fontRef>
+        </p:style>
+      </p:cxnSp>
+      <p:cxnSp>
+        <p:nvCxnSpPr>
+          <p:cNvPr id="52" name="Straight Arrow Connector 14">
+            <a:extLst>
+              <a:ext uri="{FF2B5EF4-FFF2-40B4-BE49-F238E27FC236}">
+                <a16:creationId xmlns:a16="http://schemas.microsoft.com/office/drawing/2014/main" id="{1396601A-25D6-F7D1-97EC-2BD53FE112D5}"/>
+              </a:ext>
+            </a:extLst>
+          </p:cNvPr>
+          <p:cNvCxnSpPr>
+            <a:cxnSpLocks/>
+            <a:stCxn id="49" idx="1"/>
+            <a:endCxn id="10" idx="3"/>
+          </p:cNvCxnSpPr>
+          <p:nvPr/>
+        </p:nvCxnSpPr>
+        <p:spPr>
           <a:xfrm flipH="1">
-            <a:off x="1860437" y="1628477"/>
-            <a:ext cx="810083" cy="0"/>
+            <a:off x="6801551" y="4026412"/>
+            <a:ext cx="785919" cy="2991"/>
           </a:xfrm>
           <a:prstGeom prst="straightConnector1">
             <a:avLst/>
@@ -6064,105 +6148,6 @@
               </a:prstClr>
             </a:outerShdw>
           </a:effectLst>
-        </p:spPr>
-        <p:style>
-          <a:lnRef idx="1">
-            <a:schemeClr val="accent1"/>
-          </a:lnRef>
-          <a:fillRef idx="0">
-            <a:schemeClr val="accent1"/>
-          </a:fillRef>
-          <a:effectRef idx="0">
-            <a:schemeClr val="accent1"/>
-          </a:effectRef>
-          <a:fontRef idx="minor">
-            <a:schemeClr val="tx1"/>
-          </a:fontRef>
-        </p:style>
-      </p:cxnSp>
-      <p:cxnSp>
-        <p:nvCxnSpPr>
-          <p:cNvPr id="93" name="Connector: Elbow 29">
-            <a:extLst>
-              <a:ext uri="{FF2B5EF4-FFF2-40B4-BE49-F238E27FC236}">
-                <a16:creationId xmlns:a16="http://schemas.microsoft.com/office/drawing/2014/main" id="{F7C8DBB6-03E3-069B-1DE6-74F5F0C3924E}"/>
-              </a:ext>
-            </a:extLst>
-          </p:cNvPr>
-          <p:cNvCxnSpPr>
-            <a:cxnSpLocks/>
-            <a:stCxn id="49" idx="1"/>
-            <a:endCxn id="160" idx="1"/>
-          </p:cNvCxnSpPr>
-          <p:nvPr/>
-        </p:nvCxnSpPr>
-        <p:spPr>
-          <a:xfrm rot="10800000" flipV="1">
-            <a:off x="847126" y="1628477"/>
-            <a:ext cx="12700" cy="1058990"/>
-          </a:xfrm>
-          <a:prstGeom prst="bentConnector3">
-            <a:avLst>
-              <a:gd name="adj1" fmla="val 1800000"/>
-            </a:avLst>
-          </a:prstGeom>
-          <a:ln w="9525">
-            <a:solidFill>
-              <a:schemeClr val="tx1"/>
-            </a:solidFill>
-            <a:headEnd type="triangle"/>
-            <a:tailEnd type="triangle"/>
-          </a:ln>
-        </p:spPr>
-        <p:style>
-          <a:lnRef idx="1">
-            <a:schemeClr val="accent1"/>
-          </a:lnRef>
-          <a:fillRef idx="0">
-            <a:schemeClr val="accent1"/>
-          </a:fillRef>
-          <a:effectRef idx="0">
-            <a:schemeClr val="accent1"/>
-          </a:effectRef>
-          <a:fontRef idx="minor">
-            <a:schemeClr val="tx1"/>
-          </a:fontRef>
-        </p:style>
-      </p:cxnSp>
-      <p:cxnSp>
-        <p:nvCxnSpPr>
-          <p:cNvPr id="97" name="Connector: Elbow 29">
-            <a:extLst>
-              <a:ext uri="{FF2B5EF4-FFF2-40B4-BE49-F238E27FC236}">
-                <a16:creationId xmlns:a16="http://schemas.microsoft.com/office/drawing/2014/main" id="{B6C4DF2E-12C3-FD0F-D912-B3BF412437F0}"/>
-              </a:ext>
-            </a:extLst>
-          </p:cNvPr>
-          <p:cNvCxnSpPr>
-            <a:cxnSpLocks/>
-            <a:stCxn id="49" idx="1"/>
-            <a:endCxn id="86" idx="2"/>
-          </p:cNvCxnSpPr>
-          <p:nvPr/>
-        </p:nvCxnSpPr>
-        <p:spPr>
-          <a:xfrm rot="10800000" flipH="1" flipV="1">
-            <a:off x="847126" y="1628476"/>
-            <a:ext cx="1524782" cy="1266961"/>
-          </a:xfrm>
-          <a:prstGeom prst="bentConnector4">
-            <a:avLst>
-              <a:gd name="adj1" fmla="val -13716"/>
-              <a:gd name="adj2" fmla="val 118043"/>
-            </a:avLst>
-          </a:prstGeom>
-          <a:ln w="9525">
-            <a:solidFill>
-              <a:schemeClr val="tx1"/>
-            </a:solidFill>
-            <a:headEnd type="triangle"/>
-            <a:tailEnd type="triangle"/>
-          </a:ln>
         </p:spPr>
         <p:style>
           <a:lnRef idx="1">
@@ -8587,20 +8572,20 @@
 </file>
 
 <file path=customXml/item2.xml><?xml version="1.0" encoding="utf-8"?>
-<p:properties xmlns:p="http://schemas.microsoft.com/office/2006/metadata/properties" xmlns:xsi="http://www.w3.org/2001/XMLSchema-instance" xmlns:pc="http://schemas.microsoft.com/office/infopath/2007/PartnerControls">
-  <documentManagement>
-    <_activity xmlns="b9c0df90-6177-490c-b060-567d6533c817" xsi:nil="true"/>
-  </documentManagement>
-</p:properties>
-</file>
-
-<file path=customXml/item3.xml><?xml version="1.0" encoding="utf-8"?>
 <?mso-contentType ?>
 <FormTemplates xmlns="http://schemas.microsoft.com/sharepoint/v3/contenttype/forms">
   <Display>DocumentLibraryForm</Display>
   <Edit>DocumentLibraryForm</Edit>
   <New>DocumentLibraryForm</New>
 </FormTemplates>
+</file>
+
+<file path=customXml/item3.xml><?xml version="1.0" encoding="utf-8"?>
+<p:properties xmlns:p="http://schemas.microsoft.com/office/2006/metadata/properties" xmlns:xsi="http://www.w3.org/2001/XMLSchema-instance" xmlns:pc="http://schemas.microsoft.com/office/infopath/2007/PartnerControls">
+  <documentManagement>
+    <_activity xmlns="b9c0df90-6177-490c-b060-567d6533c817" xsi:nil="true"/>
+  </documentManagement>
+</p:properties>
 </file>
 
 <file path=customXml/itemProps1.xml><?xml version="1.0" encoding="utf-8"?>
@@ -8623,6 +8608,14 @@
 </file>
 
 <file path=customXml/itemProps2.xml><?xml version="1.0" encoding="utf-8"?>
+<ds:datastoreItem xmlns:ds="http://schemas.openxmlformats.org/officeDocument/2006/customXml" ds:itemID="{86A9A6AE-A2D2-4466-B053-FEAA2AECCDAE}">
+  <ds:schemaRefs>
+    <ds:schemaRef ds:uri="http://schemas.microsoft.com/sharepoint/v3/contenttype/forms"/>
+  </ds:schemaRefs>
+</ds:datastoreItem>
+</file>
+
+<file path=customXml/itemProps3.xml><?xml version="1.0" encoding="utf-8"?>
 <ds:datastoreItem xmlns:ds="http://schemas.openxmlformats.org/officeDocument/2006/customXml" ds:itemID="{0988BE9C-0C90-420C-9DA9-636C0435E5D7}">
   <ds:schemaRefs>
     <ds:schemaRef ds:uri="http://schemas.microsoft.com/office/2006/documentManagement/types"/>
@@ -8639,14 +8632,6 @@
 </ds:datastoreItem>
 </file>
 
-<file path=customXml/itemProps3.xml><?xml version="1.0" encoding="utf-8"?>
-<ds:datastoreItem xmlns:ds="http://schemas.openxmlformats.org/officeDocument/2006/customXml" ds:itemID="{86A9A6AE-A2D2-4466-B053-FEAA2AECCDAE}">
-  <ds:schemaRefs>
-    <ds:schemaRef ds:uri="http://schemas.microsoft.com/sharepoint/v3/contenttype/forms"/>
-  </ds:schemaRefs>
-</ds:datastoreItem>
-</file>
-
 <file path=docMetadata/LabelInfo.xml><?xml version="1.0" encoding="utf-8"?>
 <clbl:labelList xmlns:clbl="http://schemas.microsoft.com/office/2020/mipLabelMetadata">
   <clbl:label id="{46c98d88-e344-4ed4-8496-4ed7712e255d}" enabled="0" method="" siteId="{46c98d88-e344-4ed4-8496-4ed7712e255d}" removed="1"/>

</xml_diff>

<commit_message>
[Doc] Enhance GPT-Agents arch
</commit_message>
<xml_diff>
--- a/examples/architecture.pptx
+++ b/examples/architecture.pptx
@@ -206,7 +206,7 @@
           <a:p>
             <a:fld id="{4CD64836-4BF9-4E6C-A54C-E76D3002B5D8}" type="datetimeFigureOut">
               <a:rPr lang="en-US" smtClean="0"/>
-              <a:t>7/22/2023</a:t>
+              <a:t>7/23/2023</a:t>
             </a:fld>
             <a:endParaRPr lang="en-US"/>
           </a:p>
@@ -802,7 +802,7 @@
           <a:p>
             <a:fld id="{C6D5F118-0C7E-4BDD-BBA0-7F61C0FBD2C0}" type="datetimeFigureOut">
               <a:rPr lang="en-US" smtClean="0"/>
-              <a:t>7/22/2023</a:t>
+              <a:t>7/23/2023</a:t>
             </a:fld>
             <a:endParaRPr lang="en-US"/>
           </a:p>
@@ -1000,7 +1000,7 @@
           <a:p>
             <a:fld id="{C6D5F118-0C7E-4BDD-BBA0-7F61C0FBD2C0}" type="datetimeFigureOut">
               <a:rPr lang="en-US" smtClean="0"/>
-              <a:t>7/22/2023</a:t>
+              <a:t>7/23/2023</a:t>
             </a:fld>
             <a:endParaRPr lang="en-US"/>
           </a:p>
@@ -1208,7 +1208,7 @@
           <a:p>
             <a:fld id="{C6D5F118-0C7E-4BDD-BBA0-7F61C0FBD2C0}" type="datetimeFigureOut">
               <a:rPr lang="en-US" smtClean="0"/>
-              <a:t>7/22/2023</a:t>
+              <a:t>7/23/2023</a:t>
             </a:fld>
             <a:endParaRPr lang="en-US"/>
           </a:p>
@@ -1406,7 +1406,7 @@
           <a:p>
             <a:fld id="{C6D5F118-0C7E-4BDD-BBA0-7F61C0FBD2C0}" type="datetimeFigureOut">
               <a:rPr lang="en-US" smtClean="0"/>
-              <a:t>7/22/2023</a:t>
+              <a:t>7/23/2023</a:t>
             </a:fld>
             <a:endParaRPr lang="en-US"/>
           </a:p>
@@ -1681,7 +1681,7 @@
           <a:p>
             <a:fld id="{C6D5F118-0C7E-4BDD-BBA0-7F61C0FBD2C0}" type="datetimeFigureOut">
               <a:rPr lang="en-US" smtClean="0"/>
-              <a:t>7/22/2023</a:t>
+              <a:t>7/23/2023</a:t>
             </a:fld>
             <a:endParaRPr lang="en-US"/>
           </a:p>
@@ -1946,7 +1946,7 @@
           <a:p>
             <a:fld id="{C6D5F118-0C7E-4BDD-BBA0-7F61C0FBD2C0}" type="datetimeFigureOut">
               <a:rPr lang="en-US" smtClean="0"/>
-              <a:t>7/22/2023</a:t>
+              <a:t>7/23/2023</a:t>
             </a:fld>
             <a:endParaRPr lang="en-US"/>
           </a:p>
@@ -2358,7 +2358,7 @@
           <a:p>
             <a:fld id="{C6D5F118-0C7E-4BDD-BBA0-7F61C0FBD2C0}" type="datetimeFigureOut">
               <a:rPr lang="en-US" smtClean="0"/>
-              <a:t>7/22/2023</a:t>
+              <a:t>7/23/2023</a:t>
             </a:fld>
             <a:endParaRPr lang="en-US"/>
           </a:p>
@@ -2499,7 +2499,7 @@
           <a:p>
             <a:fld id="{C6D5F118-0C7E-4BDD-BBA0-7F61C0FBD2C0}" type="datetimeFigureOut">
               <a:rPr lang="en-US" smtClean="0"/>
-              <a:t>7/22/2023</a:t>
+              <a:t>7/23/2023</a:t>
             </a:fld>
             <a:endParaRPr lang="en-US"/>
           </a:p>
@@ -2612,7 +2612,7 @@
           <a:p>
             <a:fld id="{C6D5F118-0C7E-4BDD-BBA0-7F61C0FBD2C0}" type="datetimeFigureOut">
               <a:rPr lang="en-US" smtClean="0"/>
-              <a:t>7/22/2023</a:t>
+              <a:t>7/23/2023</a:t>
             </a:fld>
             <a:endParaRPr lang="en-US"/>
           </a:p>
@@ -2923,7 +2923,7 @@
           <a:p>
             <a:fld id="{C6D5F118-0C7E-4BDD-BBA0-7F61C0FBD2C0}" type="datetimeFigureOut">
               <a:rPr lang="en-US" smtClean="0"/>
-              <a:t>7/22/2023</a:t>
+              <a:t>7/23/2023</a:t>
             </a:fld>
             <a:endParaRPr lang="en-US"/>
           </a:p>
@@ -3211,7 +3211,7 @@
           <a:p>
             <a:fld id="{C6D5F118-0C7E-4BDD-BBA0-7F61C0FBD2C0}" type="datetimeFigureOut">
               <a:rPr lang="en-US" smtClean="0"/>
-              <a:t>7/22/2023</a:t>
+              <a:t>7/23/2023</a:t>
             </a:fld>
             <a:endParaRPr lang="en-US"/>
           </a:p>
@@ -3452,7 +3452,7 @@
           <a:p>
             <a:fld id="{C6D5F118-0C7E-4BDD-BBA0-7F61C0FBD2C0}" type="datetimeFigureOut">
               <a:rPr lang="en-US" smtClean="0"/>
-              <a:t>7/22/2023</a:t>
+              <a:t>7/23/2023</a:t>
             </a:fld>
             <a:endParaRPr lang="en-US"/>
           </a:p>
@@ -6208,8 +6208,8 @@
         </p:nvSpPr>
         <p:spPr>
           <a:xfrm>
-            <a:off x="1324302" y="437981"/>
-            <a:ext cx="9006472" cy="5816904"/>
+            <a:off x="1560945" y="437981"/>
+            <a:ext cx="8096189" cy="5066892"/>
           </a:xfrm>
           <a:prstGeom prst="rect">
             <a:avLst/>
@@ -6270,10 +6270,10 @@
       </p:sp>
       <p:sp>
         <p:nvSpPr>
-          <p:cNvPr id="18" name="Rectangle 17">
-            <a:extLst>
-              <a:ext uri="{FF2B5EF4-FFF2-40B4-BE49-F238E27FC236}">
-                <a16:creationId xmlns:a16="http://schemas.microsoft.com/office/drawing/2014/main" id="{F9A13DD8-1A1B-732F-88E4-101524D7E147}"/>
+          <p:cNvPr id="50" name="Rectangle 49">
+            <a:extLst>
+              <a:ext uri="{FF2B5EF4-FFF2-40B4-BE49-F238E27FC236}">
+                <a16:creationId xmlns:a16="http://schemas.microsoft.com/office/drawing/2014/main" id="{8BBD062D-3932-D5F7-67F9-E142136EB013}"/>
               </a:ext>
             </a:extLst>
           </p:cNvPr>
@@ -6282,8 +6282,1787 @@
         </p:nvSpPr>
         <p:spPr>
           <a:xfrm>
-            <a:off x="9312051" y="5767188"/>
-            <a:ext cx="848209" cy="308049"/>
+            <a:off x="1906621" y="807396"/>
+            <a:ext cx="6064361" cy="4189691"/>
+          </a:xfrm>
+          <a:prstGeom prst="rect">
+            <a:avLst/>
+          </a:prstGeom>
+          <a:solidFill>
+            <a:schemeClr val="accent2">
+              <a:lumMod val="20000"/>
+              <a:lumOff val="80000"/>
+            </a:schemeClr>
+          </a:solidFill>
+          <a:ln>
+            <a:solidFill>
+              <a:schemeClr val="tx1"/>
+            </a:solidFill>
+          </a:ln>
+        </p:spPr>
+        <p:style>
+          <a:lnRef idx="2">
+            <a:schemeClr val="accent1">
+              <a:shade val="50000"/>
+            </a:schemeClr>
+          </a:lnRef>
+          <a:fillRef idx="1">
+            <a:schemeClr val="accent1"/>
+          </a:fillRef>
+          <a:effectRef idx="0">
+            <a:schemeClr val="accent1"/>
+          </a:effectRef>
+          <a:fontRef idx="minor">
+            <a:schemeClr val="lt1"/>
+          </a:fontRef>
+        </p:style>
+        <p:txBody>
+          <a:bodyPr rtlCol="0" anchor="b" anchorCtr="0"/>
+          <a:lstStyle/>
+          <a:p>
+            <a:pPr algn="ctr"/>
+            <a:r>
+              <a:rPr lang="en-US" sz="1400" dirty="0">
+                <a:solidFill>
+                  <a:schemeClr val="tx1"/>
+                </a:solidFill>
+                <a:latin typeface="LXGW WenKai" panose="02020500000000000000" pitchFamily="18" charset="-120"/>
+                <a:ea typeface="LXGW WenKai" panose="02020500000000000000" pitchFamily="18" charset="-120"/>
+              </a:rPr>
+              <a:t>Manager</a:t>
+            </a:r>
+          </a:p>
+        </p:txBody>
+      </p:sp>
+      <p:sp>
+        <p:nvSpPr>
+          <p:cNvPr id="77" name="Rectangle 76">
+            <a:extLst>
+              <a:ext uri="{FF2B5EF4-FFF2-40B4-BE49-F238E27FC236}">
+                <a16:creationId xmlns:a16="http://schemas.microsoft.com/office/drawing/2014/main" id="{E8620ACD-B15B-EF14-FC31-87AEE3C1C82D}"/>
+              </a:ext>
+            </a:extLst>
+          </p:cNvPr>
+          <p:cNvSpPr/>
+          <p:nvPr/>
+        </p:nvSpPr>
+        <p:spPr>
+          <a:xfrm>
+            <a:off x="6132277" y="1888186"/>
+            <a:ext cx="1371600" cy="640693"/>
+          </a:xfrm>
+          <a:prstGeom prst="rect">
+            <a:avLst/>
+          </a:prstGeom>
+          <a:solidFill>
+            <a:schemeClr val="accent4">
+              <a:lumMod val="20000"/>
+              <a:lumOff val="80000"/>
+            </a:schemeClr>
+          </a:solidFill>
+          <a:ln>
+            <a:solidFill>
+              <a:schemeClr val="tx1"/>
+            </a:solidFill>
+          </a:ln>
+        </p:spPr>
+        <p:style>
+          <a:lnRef idx="2">
+            <a:schemeClr val="accent1">
+              <a:shade val="50000"/>
+            </a:schemeClr>
+          </a:lnRef>
+          <a:fillRef idx="1">
+            <a:schemeClr val="accent1"/>
+          </a:fillRef>
+          <a:effectRef idx="0">
+            <a:schemeClr val="accent1"/>
+          </a:effectRef>
+          <a:fontRef idx="minor">
+            <a:schemeClr val="lt1"/>
+          </a:fontRef>
+        </p:style>
+        <p:txBody>
+          <a:bodyPr rtlCol="0" anchor="ctr" anchorCtr="1"/>
+          <a:lstStyle/>
+          <a:p>
+            <a:pPr algn="ctr"/>
+            <a:r>
+              <a:rPr lang="en-US" sz="1400" dirty="0">
+                <a:solidFill>
+                  <a:schemeClr val="tx1"/>
+                </a:solidFill>
+                <a:latin typeface="LXGW WenKai" panose="02020500000000000000" pitchFamily="18" charset="-120"/>
+                <a:ea typeface="LXGW WenKai" panose="02020500000000000000" pitchFamily="18" charset="-120"/>
+              </a:rPr>
+              <a:t>Global Contexts</a:t>
+            </a:r>
+          </a:p>
+        </p:txBody>
+      </p:sp>
+      <p:sp>
+        <p:nvSpPr>
+          <p:cNvPr id="105" name="Rectangle 104">
+            <a:extLst>
+              <a:ext uri="{FF2B5EF4-FFF2-40B4-BE49-F238E27FC236}">
+                <a16:creationId xmlns:a16="http://schemas.microsoft.com/office/drawing/2014/main" id="{1214C11B-A256-7176-4EFC-64EB301BEFA9}"/>
+              </a:ext>
+            </a:extLst>
+          </p:cNvPr>
+          <p:cNvSpPr/>
+          <p:nvPr/>
+        </p:nvSpPr>
+        <p:spPr>
+          <a:xfrm>
+            <a:off x="2373478" y="1124349"/>
+            <a:ext cx="3180033" cy="914400"/>
+          </a:xfrm>
+          <a:prstGeom prst="rect">
+            <a:avLst/>
+          </a:prstGeom>
+          <a:solidFill>
+            <a:schemeClr val="accent2">
+              <a:lumMod val="40000"/>
+              <a:lumOff val="60000"/>
+            </a:schemeClr>
+          </a:solidFill>
+          <a:ln>
+            <a:solidFill>
+              <a:schemeClr val="tx1"/>
+            </a:solidFill>
+          </a:ln>
+        </p:spPr>
+        <p:style>
+          <a:lnRef idx="2">
+            <a:schemeClr val="accent1">
+              <a:shade val="50000"/>
+            </a:schemeClr>
+          </a:lnRef>
+          <a:fillRef idx="1">
+            <a:schemeClr val="accent1"/>
+          </a:fillRef>
+          <a:effectRef idx="0">
+            <a:schemeClr val="accent1"/>
+          </a:effectRef>
+          <a:fontRef idx="minor">
+            <a:schemeClr val="lt1"/>
+          </a:fontRef>
+        </p:style>
+        <p:txBody>
+          <a:bodyPr rtlCol="0" anchor="b" anchorCtr="0"/>
+          <a:lstStyle/>
+          <a:p>
+            <a:pPr algn="ctr"/>
+            <a:r>
+              <a:rPr lang="en-US" sz="1400" dirty="0">
+                <a:solidFill>
+                  <a:schemeClr val="tx1"/>
+                </a:solidFill>
+                <a:latin typeface="LXGW WenKai" panose="02020500000000000000" pitchFamily="18" charset="-120"/>
+                <a:ea typeface="LXGW WenKai" panose="02020500000000000000" pitchFamily="18" charset="-120"/>
+              </a:rPr>
+              <a:t>Agent</a:t>
+            </a:r>
+          </a:p>
+        </p:txBody>
+      </p:sp>
+      <p:sp>
+        <p:nvSpPr>
+          <p:cNvPr id="76" name="Rectangle 75">
+            <a:extLst>
+              <a:ext uri="{FF2B5EF4-FFF2-40B4-BE49-F238E27FC236}">
+                <a16:creationId xmlns:a16="http://schemas.microsoft.com/office/drawing/2014/main" id="{5DDE9D0C-B83B-B506-FF0C-EDC49D03A075}"/>
+              </a:ext>
+            </a:extLst>
+          </p:cNvPr>
+          <p:cNvSpPr/>
+          <p:nvPr/>
+        </p:nvSpPr>
+        <p:spPr>
+          <a:xfrm>
+            <a:off x="2534866" y="1277253"/>
+            <a:ext cx="770430" cy="359761"/>
+          </a:xfrm>
+          <a:prstGeom prst="rect">
+            <a:avLst/>
+          </a:prstGeom>
+          <a:solidFill>
+            <a:schemeClr val="bg1">
+              <a:lumMod val="95000"/>
+            </a:schemeClr>
+          </a:solidFill>
+          <a:ln>
+            <a:solidFill>
+              <a:schemeClr val="tx1"/>
+            </a:solidFill>
+          </a:ln>
+        </p:spPr>
+        <p:style>
+          <a:lnRef idx="2">
+            <a:schemeClr val="accent1">
+              <a:shade val="50000"/>
+            </a:schemeClr>
+          </a:lnRef>
+          <a:fillRef idx="1">
+            <a:schemeClr val="accent1"/>
+          </a:fillRef>
+          <a:effectRef idx="0">
+            <a:schemeClr val="accent1"/>
+          </a:effectRef>
+          <a:fontRef idx="minor">
+            <a:schemeClr val="lt1"/>
+          </a:fontRef>
+        </p:style>
+        <p:txBody>
+          <a:bodyPr rtlCol="0" anchor="ctr" anchorCtr="1"/>
+          <a:lstStyle/>
+          <a:p>
+            <a:pPr algn="ctr"/>
+            <a:r>
+              <a:rPr lang="en-US" sz="1000" dirty="0">
+                <a:solidFill>
+                  <a:schemeClr val="tx1"/>
+                </a:solidFill>
+                <a:latin typeface="LXGW WenKai" panose="02020500000000000000" pitchFamily="18" charset="-120"/>
+                <a:ea typeface="LXGW WenKai" panose="02020500000000000000" pitchFamily="18" charset="-120"/>
+              </a:rPr>
+              <a:t>System prompts</a:t>
+            </a:r>
+            <a:endParaRPr lang="en-US" sz="1050" dirty="0">
+              <a:solidFill>
+                <a:schemeClr val="tx1"/>
+              </a:solidFill>
+              <a:latin typeface="LXGW WenKai" panose="02020500000000000000" pitchFamily="18" charset="-120"/>
+              <a:ea typeface="LXGW WenKai" panose="02020500000000000000" pitchFamily="18" charset="-120"/>
+            </a:endParaRPr>
+          </a:p>
+        </p:txBody>
+      </p:sp>
+      <p:sp>
+        <p:nvSpPr>
+          <p:cNvPr id="139" name="Rectangle 138">
+            <a:extLst>
+              <a:ext uri="{FF2B5EF4-FFF2-40B4-BE49-F238E27FC236}">
+                <a16:creationId xmlns:a16="http://schemas.microsoft.com/office/drawing/2014/main" id="{2C915C8B-9693-8987-029F-199D7C0DCE4A}"/>
+              </a:ext>
+            </a:extLst>
+          </p:cNvPr>
+          <p:cNvSpPr/>
+          <p:nvPr/>
+        </p:nvSpPr>
+        <p:spPr>
+          <a:xfrm>
+            <a:off x="3517280" y="1277253"/>
+            <a:ext cx="770430" cy="359761"/>
+          </a:xfrm>
+          <a:prstGeom prst="rect">
+            <a:avLst/>
+          </a:prstGeom>
+          <a:solidFill>
+            <a:schemeClr val="bg1">
+              <a:lumMod val="95000"/>
+            </a:schemeClr>
+          </a:solidFill>
+          <a:ln>
+            <a:solidFill>
+              <a:schemeClr val="tx1"/>
+            </a:solidFill>
+          </a:ln>
+        </p:spPr>
+        <p:style>
+          <a:lnRef idx="2">
+            <a:schemeClr val="accent1">
+              <a:shade val="50000"/>
+            </a:schemeClr>
+          </a:lnRef>
+          <a:fillRef idx="1">
+            <a:schemeClr val="accent1"/>
+          </a:fillRef>
+          <a:effectRef idx="0">
+            <a:schemeClr val="accent1"/>
+          </a:effectRef>
+          <a:fontRef idx="minor">
+            <a:schemeClr val="lt1"/>
+          </a:fontRef>
+        </p:style>
+        <p:txBody>
+          <a:bodyPr rtlCol="0" anchor="ctr" anchorCtr="1"/>
+          <a:lstStyle/>
+          <a:p>
+            <a:pPr algn="ctr"/>
+            <a:r>
+              <a:rPr lang="en-US" sz="1000" dirty="0">
+                <a:solidFill>
+                  <a:schemeClr val="tx1"/>
+                </a:solidFill>
+                <a:latin typeface="LXGW WenKai" panose="02020500000000000000" pitchFamily="18" charset="-120"/>
+                <a:ea typeface="LXGW WenKai" panose="02020500000000000000" pitchFamily="18" charset="-120"/>
+              </a:rPr>
+              <a:t>Chat</a:t>
+            </a:r>
+          </a:p>
+          <a:p>
+            <a:pPr algn="ctr"/>
+            <a:r>
+              <a:rPr lang="en-US" sz="1000" dirty="0">
+                <a:solidFill>
+                  <a:schemeClr val="tx1"/>
+                </a:solidFill>
+                <a:latin typeface="LXGW WenKai" panose="02020500000000000000" pitchFamily="18" charset="-120"/>
+                <a:ea typeface="LXGW WenKai" panose="02020500000000000000" pitchFamily="18" charset="-120"/>
+              </a:rPr>
+              <a:t>history</a:t>
+            </a:r>
+            <a:endParaRPr lang="en-US" sz="1050" dirty="0">
+              <a:solidFill>
+                <a:schemeClr val="tx1"/>
+              </a:solidFill>
+              <a:latin typeface="LXGW WenKai" panose="02020500000000000000" pitchFamily="18" charset="-120"/>
+              <a:ea typeface="LXGW WenKai" panose="02020500000000000000" pitchFamily="18" charset="-120"/>
+            </a:endParaRPr>
+          </a:p>
+        </p:txBody>
+      </p:sp>
+      <p:sp>
+        <p:nvSpPr>
+          <p:cNvPr id="140" name="Rectangle 139">
+            <a:extLst>
+              <a:ext uri="{FF2B5EF4-FFF2-40B4-BE49-F238E27FC236}">
+                <a16:creationId xmlns:a16="http://schemas.microsoft.com/office/drawing/2014/main" id="{3F4E18B8-7282-664E-294A-1DC6271F5490}"/>
+              </a:ext>
+            </a:extLst>
+          </p:cNvPr>
+          <p:cNvSpPr/>
+          <p:nvPr/>
+        </p:nvSpPr>
+        <p:spPr>
+          <a:xfrm>
+            <a:off x="2381464" y="2345673"/>
+            <a:ext cx="3172048" cy="914400"/>
+          </a:xfrm>
+          <a:prstGeom prst="rect">
+            <a:avLst/>
+          </a:prstGeom>
+          <a:solidFill>
+            <a:schemeClr val="accent2">
+              <a:lumMod val="40000"/>
+              <a:lumOff val="60000"/>
+            </a:schemeClr>
+          </a:solidFill>
+          <a:ln>
+            <a:solidFill>
+              <a:schemeClr val="tx1"/>
+            </a:solidFill>
+          </a:ln>
+        </p:spPr>
+        <p:style>
+          <a:lnRef idx="2">
+            <a:schemeClr val="accent1">
+              <a:shade val="50000"/>
+            </a:schemeClr>
+          </a:lnRef>
+          <a:fillRef idx="1">
+            <a:schemeClr val="accent1"/>
+          </a:fillRef>
+          <a:effectRef idx="0">
+            <a:schemeClr val="accent1"/>
+          </a:effectRef>
+          <a:fontRef idx="minor">
+            <a:schemeClr val="lt1"/>
+          </a:fontRef>
+        </p:style>
+        <p:txBody>
+          <a:bodyPr rtlCol="0" anchor="b" anchorCtr="0"/>
+          <a:lstStyle/>
+          <a:p>
+            <a:pPr algn="ctr"/>
+            <a:r>
+              <a:rPr lang="en-US" sz="1400" dirty="0">
+                <a:solidFill>
+                  <a:schemeClr val="tx1"/>
+                </a:solidFill>
+                <a:latin typeface="LXGW WenKai" panose="02020500000000000000" pitchFamily="18" charset="-120"/>
+                <a:ea typeface="LXGW WenKai" panose="02020500000000000000" pitchFamily="18" charset="-120"/>
+              </a:rPr>
+              <a:t>Agent</a:t>
+            </a:r>
+          </a:p>
+        </p:txBody>
+      </p:sp>
+      <p:sp>
+        <p:nvSpPr>
+          <p:cNvPr id="141" name="Rectangle 140">
+            <a:extLst>
+              <a:ext uri="{FF2B5EF4-FFF2-40B4-BE49-F238E27FC236}">
+                <a16:creationId xmlns:a16="http://schemas.microsoft.com/office/drawing/2014/main" id="{B9470EF6-B2B8-17B5-60F2-39024B4B359F}"/>
+              </a:ext>
+            </a:extLst>
+          </p:cNvPr>
+          <p:cNvSpPr/>
+          <p:nvPr/>
+        </p:nvSpPr>
+        <p:spPr>
+          <a:xfrm>
+            <a:off x="2534866" y="2528878"/>
+            <a:ext cx="770430" cy="359761"/>
+          </a:xfrm>
+          <a:prstGeom prst="rect">
+            <a:avLst/>
+          </a:prstGeom>
+          <a:solidFill>
+            <a:schemeClr val="bg1">
+              <a:lumMod val="95000"/>
+            </a:schemeClr>
+          </a:solidFill>
+          <a:ln>
+            <a:solidFill>
+              <a:schemeClr val="tx1"/>
+            </a:solidFill>
+          </a:ln>
+        </p:spPr>
+        <p:style>
+          <a:lnRef idx="2">
+            <a:schemeClr val="accent1">
+              <a:shade val="50000"/>
+            </a:schemeClr>
+          </a:lnRef>
+          <a:fillRef idx="1">
+            <a:schemeClr val="accent1"/>
+          </a:fillRef>
+          <a:effectRef idx="0">
+            <a:schemeClr val="accent1"/>
+          </a:effectRef>
+          <a:fontRef idx="minor">
+            <a:schemeClr val="lt1"/>
+          </a:fontRef>
+        </p:style>
+        <p:txBody>
+          <a:bodyPr rtlCol="0" anchor="ctr" anchorCtr="1"/>
+          <a:lstStyle/>
+          <a:p>
+            <a:pPr algn="ctr"/>
+            <a:r>
+              <a:rPr lang="en-US" sz="1000" dirty="0">
+                <a:solidFill>
+                  <a:schemeClr val="tx1"/>
+                </a:solidFill>
+                <a:latin typeface="LXGW WenKai" panose="02020500000000000000" pitchFamily="18" charset="-120"/>
+                <a:ea typeface="LXGW WenKai" panose="02020500000000000000" pitchFamily="18" charset="-120"/>
+              </a:rPr>
+              <a:t>System prompts</a:t>
+            </a:r>
+            <a:endParaRPr lang="en-US" sz="1050" dirty="0">
+              <a:solidFill>
+                <a:schemeClr val="tx1"/>
+              </a:solidFill>
+              <a:latin typeface="LXGW WenKai" panose="02020500000000000000" pitchFamily="18" charset="-120"/>
+              <a:ea typeface="LXGW WenKai" panose="02020500000000000000" pitchFamily="18" charset="-120"/>
+            </a:endParaRPr>
+          </a:p>
+        </p:txBody>
+      </p:sp>
+      <p:sp>
+        <p:nvSpPr>
+          <p:cNvPr id="142" name="Rectangle 141">
+            <a:extLst>
+              <a:ext uri="{FF2B5EF4-FFF2-40B4-BE49-F238E27FC236}">
+                <a16:creationId xmlns:a16="http://schemas.microsoft.com/office/drawing/2014/main" id="{CBFEEC7A-4A15-DB6B-15C8-5F074E904B67}"/>
+              </a:ext>
+            </a:extLst>
+          </p:cNvPr>
+          <p:cNvSpPr/>
+          <p:nvPr/>
+        </p:nvSpPr>
+        <p:spPr>
+          <a:xfrm>
+            <a:off x="3517280" y="2528878"/>
+            <a:ext cx="770430" cy="359761"/>
+          </a:xfrm>
+          <a:prstGeom prst="rect">
+            <a:avLst/>
+          </a:prstGeom>
+          <a:solidFill>
+            <a:schemeClr val="bg1">
+              <a:lumMod val="95000"/>
+            </a:schemeClr>
+          </a:solidFill>
+          <a:ln>
+            <a:solidFill>
+              <a:schemeClr val="tx1"/>
+            </a:solidFill>
+          </a:ln>
+        </p:spPr>
+        <p:style>
+          <a:lnRef idx="2">
+            <a:schemeClr val="accent1">
+              <a:shade val="50000"/>
+            </a:schemeClr>
+          </a:lnRef>
+          <a:fillRef idx="1">
+            <a:schemeClr val="accent1"/>
+          </a:fillRef>
+          <a:effectRef idx="0">
+            <a:schemeClr val="accent1"/>
+          </a:effectRef>
+          <a:fontRef idx="minor">
+            <a:schemeClr val="lt1"/>
+          </a:fontRef>
+        </p:style>
+        <p:txBody>
+          <a:bodyPr rtlCol="0" anchor="ctr" anchorCtr="1"/>
+          <a:lstStyle/>
+          <a:p>
+            <a:pPr algn="ctr"/>
+            <a:r>
+              <a:rPr lang="en-US" sz="1000" dirty="0">
+                <a:solidFill>
+                  <a:schemeClr val="tx1"/>
+                </a:solidFill>
+                <a:latin typeface="LXGW WenKai" panose="02020500000000000000" pitchFamily="18" charset="-120"/>
+                <a:ea typeface="LXGW WenKai" panose="02020500000000000000" pitchFamily="18" charset="-120"/>
+              </a:rPr>
+              <a:t>Chat</a:t>
+            </a:r>
+          </a:p>
+          <a:p>
+            <a:pPr algn="ctr"/>
+            <a:r>
+              <a:rPr lang="en-US" sz="1000" dirty="0">
+                <a:solidFill>
+                  <a:schemeClr val="tx1"/>
+                </a:solidFill>
+                <a:latin typeface="LXGW WenKai" panose="02020500000000000000" pitchFamily="18" charset="-120"/>
+                <a:ea typeface="LXGW WenKai" panose="02020500000000000000" pitchFamily="18" charset="-120"/>
+              </a:rPr>
+              <a:t>History</a:t>
+            </a:r>
+            <a:endParaRPr lang="en-US" sz="1050" dirty="0">
+              <a:solidFill>
+                <a:schemeClr val="tx1"/>
+              </a:solidFill>
+              <a:latin typeface="LXGW WenKai" panose="02020500000000000000" pitchFamily="18" charset="-120"/>
+              <a:ea typeface="LXGW WenKai" panose="02020500000000000000" pitchFamily="18" charset="-120"/>
+            </a:endParaRPr>
+          </a:p>
+        </p:txBody>
+      </p:sp>
+      <p:sp>
+        <p:nvSpPr>
+          <p:cNvPr id="143" name="Rectangle 142">
+            <a:extLst>
+              <a:ext uri="{FF2B5EF4-FFF2-40B4-BE49-F238E27FC236}">
+                <a16:creationId xmlns:a16="http://schemas.microsoft.com/office/drawing/2014/main" id="{B5FD6F14-F11F-8D87-FEE2-5494426F1A72}"/>
+              </a:ext>
+            </a:extLst>
+          </p:cNvPr>
+          <p:cNvSpPr/>
+          <p:nvPr/>
+        </p:nvSpPr>
+        <p:spPr>
+          <a:xfrm>
+            <a:off x="2373479" y="3629488"/>
+            <a:ext cx="3180032" cy="904746"/>
+          </a:xfrm>
+          <a:prstGeom prst="rect">
+            <a:avLst/>
+          </a:prstGeom>
+          <a:solidFill>
+            <a:schemeClr val="accent2">
+              <a:lumMod val="40000"/>
+              <a:lumOff val="60000"/>
+            </a:schemeClr>
+          </a:solidFill>
+          <a:ln>
+            <a:solidFill>
+              <a:schemeClr val="tx1"/>
+            </a:solidFill>
+          </a:ln>
+        </p:spPr>
+        <p:style>
+          <a:lnRef idx="2">
+            <a:schemeClr val="accent1">
+              <a:shade val="50000"/>
+            </a:schemeClr>
+          </a:lnRef>
+          <a:fillRef idx="1">
+            <a:schemeClr val="accent1"/>
+          </a:fillRef>
+          <a:effectRef idx="0">
+            <a:schemeClr val="accent1"/>
+          </a:effectRef>
+          <a:fontRef idx="minor">
+            <a:schemeClr val="lt1"/>
+          </a:fontRef>
+        </p:style>
+        <p:txBody>
+          <a:bodyPr rtlCol="0" anchor="b" anchorCtr="0"/>
+          <a:lstStyle/>
+          <a:p>
+            <a:pPr algn="ctr"/>
+            <a:r>
+              <a:rPr lang="en-US" sz="1400" dirty="0">
+                <a:solidFill>
+                  <a:schemeClr val="tx1"/>
+                </a:solidFill>
+                <a:latin typeface="LXGW WenKai" panose="02020500000000000000" pitchFamily="18" charset="-120"/>
+                <a:ea typeface="LXGW WenKai" panose="02020500000000000000" pitchFamily="18" charset="-120"/>
+              </a:rPr>
+              <a:t>Agent</a:t>
+            </a:r>
+          </a:p>
+        </p:txBody>
+      </p:sp>
+      <p:sp>
+        <p:nvSpPr>
+          <p:cNvPr id="144" name="Rectangle 143">
+            <a:extLst>
+              <a:ext uri="{FF2B5EF4-FFF2-40B4-BE49-F238E27FC236}">
+                <a16:creationId xmlns:a16="http://schemas.microsoft.com/office/drawing/2014/main" id="{91FED968-9E3F-7EAE-6E2E-84A4B4A9BCD2}"/>
+              </a:ext>
+            </a:extLst>
+          </p:cNvPr>
+          <p:cNvSpPr/>
+          <p:nvPr/>
+        </p:nvSpPr>
+        <p:spPr>
+          <a:xfrm>
+            <a:off x="2534866" y="3797862"/>
+            <a:ext cx="770430" cy="359761"/>
+          </a:xfrm>
+          <a:prstGeom prst="rect">
+            <a:avLst/>
+          </a:prstGeom>
+          <a:solidFill>
+            <a:schemeClr val="bg1">
+              <a:lumMod val="95000"/>
+            </a:schemeClr>
+          </a:solidFill>
+          <a:ln>
+            <a:solidFill>
+              <a:schemeClr val="tx1"/>
+            </a:solidFill>
+          </a:ln>
+        </p:spPr>
+        <p:style>
+          <a:lnRef idx="2">
+            <a:schemeClr val="accent1">
+              <a:shade val="50000"/>
+            </a:schemeClr>
+          </a:lnRef>
+          <a:fillRef idx="1">
+            <a:schemeClr val="accent1"/>
+          </a:fillRef>
+          <a:effectRef idx="0">
+            <a:schemeClr val="accent1"/>
+          </a:effectRef>
+          <a:fontRef idx="minor">
+            <a:schemeClr val="lt1"/>
+          </a:fontRef>
+        </p:style>
+        <p:txBody>
+          <a:bodyPr rtlCol="0" anchor="ctr" anchorCtr="1"/>
+          <a:lstStyle/>
+          <a:p>
+            <a:pPr algn="ctr"/>
+            <a:r>
+              <a:rPr lang="en-US" sz="1000" dirty="0">
+                <a:solidFill>
+                  <a:schemeClr val="tx1"/>
+                </a:solidFill>
+                <a:latin typeface="LXGW WenKai" panose="02020500000000000000" pitchFamily="18" charset="-120"/>
+                <a:ea typeface="LXGW WenKai" panose="02020500000000000000" pitchFamily="18" charset="-120"/>
+              </a:rPr>
+              <a:t>System prompts</a:t>
+            </a:r>
+            <a:endParaRPr lang="en-US" sz="1050" dirty="0">
+              <a:solidFill>
+                <a:schemeClr val="tx1"/>
+              </a:solidFill>
+              <a:latin typeface="LXGW WenKai" panose="02020500000000000000" pitchFamily="18" charset="-120"/>
+              <a:ea typeface="LXGW WenKai" panose="02020500000000000000" pitchFamily="18" charset="-120"/>
+            </a:endParaRPr>
+          </a:p>
+        </p:txBody>
+      </p:sp>
+      <p:sp>
+        <p:nvSpPr>
+          <p:cNvPr id="145" name="Rectangle 144">
+            <a:extLst>
+              <a:ext uri="{FF2B5EF4-FFF2-40B4-BE49-F238E27FC236}">
+                <a16:creationId xmlns:a16="http://schemas.microsoft.com/office/drawing/2014/main" id="{BD16667A-49D0-712E-D96E-003D719DA2D4}"/>
+              </a:ext>
+            </a:extLst>
+          </p:cNvPr>
+          <p:cNvSpPr/>
+          <p:nvPr/>
+        </p:nvSpPr>
+        <p:spPr>
+          <a:xfrm>
+            <a:off x="3517280" y="3797862"/>
+            <a:ext cx="770430" cy="359761"/>
+          </a:xfrm>
+          <a:prstGeom prst="rect">
+            <a:avLst/>
+          </a:prstGeom>
+          <a:solidFill>
+            <a:schemeClr val="bg1">
+              <a:lumMod val="95000"/>
+            </a:schemeClr>
+          </a:solidFill>
+          <a:ln>
+            <a:solidFill>
+              <a:schemeClr val="tx1"/>
+            </a:solidFill>
+          </a:ln>
+        </p:spPr>
+        <p:style>
+          <a:lnRef idx="2">
+            <a:schemeClr val="accent1">
+              <a:shade val="50000"/>
+            </a:schemeClr>
+          </a:lnRef>
+          <a:fillRef idx="1">
+            <a:schemeClr val="accent1"/>
+          </a:fillRef>
+          <a:effectRef idx="0">
+            <a:schemeClr val="accent1"/>
+          </a:effectRef>
+          <a:fontRef idx="minor">
+            <a:schemeClr val="lt1"/>
+          </a:fontRef>
+        </p:style>
+        <p:txBody>
+          <a:bodyPr rtlCol="0" anchor="ctr" anchorCtr="1"/>
+          <a:lstStyle/>
+          <a:p>
+            <a:pPr algn="ctr"/>
+            <a:r>
+              <a:rPr lang="en-US" sz="1000" dirty="0">
+                <a:solidFill>
+                  <a:schemeClr val="tx1"/>
+                </a:solidFill>
+                <a:latin typeface="LXGW WenKai" panose="02020500000000000000" pitchFamily="18" charset="-120"/>
+                <a:ea typeface="LXGW WenKai" panose="02020500000000000000" pitchFamily="18" charset="-120"/>
+              </a:rPr>
+              <a:t>Chat</a:t>
+            </a:r>
+          </a:p>
+          <a:p>
+            <a:pPr algn="ctr"/>
+            <a:r>
+              <a:rPr lang="en-US" sz="1000" dirty="0">
+                <a:solidFill>
+                  <a:schemeClr val="tx1"/>
+                </a:solidFill>
+                <a:latin typeface="LXGW WenKai" panose="02020500000000000000" pitchFamily="18" charset="-120"/>
+                <a:ea typeface="LXGW WenKai" panose="02020500000000000000" pitchFamily="18" charset="-120"/>
+              </a:rPr>
+              <a:t>History</a:t>
+            </a:r>
+            <a:endParaRPr lang="en-US" sz="1050" dirty="0">
+              <a:solidFill>
+                <a:schemeClr val="tx1"/>
+              </a:solidFill>
+              <a:latin typeface="LXGW WenKai" panose="02020500000000000000" pitchFamily="18" charset="-120"/>
+              <a:ea typeface="LXGW WenKai" panose="02020500000000000000" pitchFamily="18" charset="-120"/>
+            </a:endParaRPr>
+          </a:p>
+        </p:txBody>
+      </p:sp>
+      <p:cxnSp>
+        <p:nvCxnSpPr>
+          <p:cNvPr id="147" name="Connector: Elbow 146">
+            <a:extLst>
+              <a:ext uri="{FF2B5EF4-FFF2-40B4-BE49-F238E27FC236}">
+                <a16:creationId xmlns:a16="http://schemas.microsoft.com/office/drawing/2014/main" id="{58ECAB7D-063C-3497-99B4-5752BD3EE406}"/>
+              </a:ext>
+            </a:extLst>
+          </p:cNvPr>
+          <p:cNvCxnSpPr>
+            <a:cxnSpLocks/>
+            <a:stCxn id="77" idx="0"/>
+            <a:endCxn id="76" idx="0"/>
+          </p:cNvCxnSpPr>
+          <p:nvPr/>
+        </p:nvCxnSpPr>
+        <p:spPr>
+          <a:xfrm rot="16200000" flipV="1">
+            <a:off x="4563613" y="-366278"/>
+            <a:ext cx="610933" cy="3897996"/>
+          </a:xfrm>
+          <a:prstGeom prst="bentConnector3">
+            <a:avLst>
+              <a:gd name="adj1" fmla="val 143465"/>
+            </a:avLst>
+          </a:prstGeom>
+          <a:ln w="9525">
+            <a:solidFill>
+              <a:schemeClr val="tx1"/>
+            </a:solidFill>
+            <a:prstDash val="dash"/>
+            <a:headEnd type="triangle"/>
+            <a:tailEnd type="triangle"/>
+          </a:ln>
+        </p:spPr>
+        <p:style>
+          <a:lnRef idx="1">
+            <a:schemeClr val="accent1"/>
+          </a:lnRef>
+          <a:fillRef idx="0">
+            <a:schemeClr val="accent1"/>
+          </a:fillRef>
+          <a:effectRef idx="0">
+            <a:schemeClr val="accent1"/>
+          </a:effectRef>
+          <a:fontRef idx="minor">
+            <a:schemeClr val="tx1"/>
+          </a:fontRef>
+        </p:style>
+      </p:cxnSp>
+      <p:cxnSp>
+        <p:nvCxnSpPr>
+          <p:cNvPr id="152" name="Connector: Elbow 151">
+            <a:extLst>
+              <a:ext uri="{FF2B5EF4-FFF2-40B4-BE49-F238E27FC236}">
+                <a16:creationId xmlns:a16="http://schemas.microsoft.com/office/drawing/2014/main" id="{E0F8D9DA-5181-2F80-AF0D-1A1C1C83DD97}"/>
+              </a:ext>
+            </a:extLst>
+          </p:cNvPr>
+          <p:cNvCxnSpPr>
+            <a:cxnSpLocks/>
+            <a:stCxn id="77" idx="1"/>
+            <a:endCxn id="141" idx="0"/>
+          </p:cNvCxnSpPr>
+          <p:nvPr/>
+        </p:nvCxnSpPr>
+        <p:spPr>
+          <a:xfrm rot="10800000" flipV="1">
+            <a:off x="2920081" y="2208532"/>
+            <a:ext cx="3212196" cy="320345"/>
+          </a:xfrm>
+          <a:prstGeom prst="bentConnector2">
+            <a:avLst/>
+          </a:prstGeom>
+          <a:ln w="9525">
+            <a:solidFill>
+              <a:schemeClr val="tx1"/>
+            </a:solidFill>
+            <a:prstDash val="dash"/>
+            <a:headEnd type="triangle"/>
+            <a:tailEnd type="triangle"/>
+          </a:ln>
+        </p:spPr>
+        <p:style>
+          <a:lnRef idx="1">
+            <a:schemeClr val="accent1"/>
+          </a:lnRef>
+          <a:fillRef idx="0">
+            <a:schemeClr val="accent1"/>
+          </a:fillRef>
+          <a:effectRef idx="0">
+            <a:schemeClr val="accent1"/>
+          </a:effectRef>
+          <a:fontRef idx="minor">
+            <a:schemeClr val="tx1"/>
+          </a:fontRef>
+        </p:style>
+      </p:cxnSp>
+      <p:cxnSp>
+        <p:nvCxnSpPr>
+          <p:cNvPr id="155" name="Connector: Elbow 154">
+            <a:extLst>
+              <a:ext uri="{FF2B5EF4-FFF2-40B4-BE49-F238E27FC236}">
+                <a16:creationId xmlns:a16="http://schemas.microsoft.com/office/drawing/2014/main" id="{B610ECF4-E72B-70CD-6D29-99F74420E889}"/>
+              </a:ext>
+            </a:extLst>
+          </p:cNvPr>
+          <p:cNvCxnSpPr>
+            <a:cxnSpLocks/>
+            <a:stCxn id="77" idx="2"/>
+            <a:endCxn id="144" idx="0"/>
+          </p:cNvCxnSpPr>
+          <p:nvPr/>
+        </p:nvCxnSpPr>
+        <p:spPr>
+          <a:xfrm rot="5400000">
+            <a:off x="4234588" y="1214372"/>
+            <a:ext cx="1268983" cy="3897996"/>
+          </a:xfrm>
+          <a:prstGeom prst="bentConnector3">
+            <a:avLst>
+              <a:gd name="adj1" fmla="val 73291"/>
+            </a:avLst>
+          </a:prstGeom>
+          <a:ln w="9525">
+            <a:solidFill>
+              <a:schemeClr val="tx1"/>
+            </a:solidFill>
+            <a:prstDash val="dash"/>
+            <a:headEnd type="triangle"/>
+            <a:tailEnd type="triangle"/>
+          </a:ln>
+        </p:spPr>
+        <p:style>
+          <a:lnRef idx="1">
+            <a:schemeClr val="accent1"/>
+          </a:lnRef>
+          <a:fillRef idx="0">
+            <a:schemeClr val="accent1"/>
+          </a:fillRef>
+          <a:effectRef idx="0">
+            <a:schemeClr val="accent1"/>
+          </a:effectRef>
+          <a:fontRef idx="minor">
+            <a:schemeClr val="tx1"/>
+          </a:fontRef>
+        </p:style>
+      </p:cxnSp>
+      <p:cxnSp>
+        <p:nvCxnSpPr>
+          <p:cNvPr id="163" name="Connector: Elbow 162">
+            <a:extLst>
+              <a:ext uri="{FF2B5EF4-FFF2-40B4-BE49-F238E27FC236}">
+                <a16:creationId xmlns:a16="http://schemas.microsoft.com/office/drawing/2014/main" id="{0FE27888-A62C-8AE2-B24B-F57490930192}"/>
+              </a:ext>
+            </a:extLst>
+          </p:cNvPr>
+          <p:cNvCxnSpPr>
+            <a:cxnSpLocks/>
+            <a:stCxn id="77" idx="1"/>
+            <a:endCxn id="142" idx="0"/>
+          </p:cNvCxnSpPr>
+          <p:nvPr/>
+        </p:nvCxnSpPr>
+        <p:spPr>
+          <a:xfrm rot="10800000" flipV="1">
+            <a:off x="3902495" y="2208532"/>
+            <a:ext cx="2229782" cy="320345"/>
+          </a:xfrm>
+          <a:prstGeom prst="bentConnector2">
+            <a:avLst/>
+          </a:prstGeom>
+          <a:ln w="9525">
+            <a:solidFill>
+              <a:schemeClr val="tx1"/>
+            </a:solidFill>
+            <a:prstDash val="dash"/>
+            <a:headEnd type="triangle"/>
+            <a:tailEnd type="triangle"/>
+          </a:ln>
+        </p:spPr>
+        <p:style>
+          <a:lnRef idx="1">
+            <a:schemeClr val="accent1"/>
+          </a:lnRef>
+          <a:fillRef idx="0">
+            <a:schemeClr val="accent1"/>
+          </a:fillRef>
+          <a:effectRef idx="0">
+            <a:schemeClr val="accent1"/>
+          </a:effectRef>
+          <a:fontRef idx="minor">
+            <a:schemeClr val="tx1"/>
+          </a:fontRef>
+        </p:style>
+      </p:cxnSp>
+      <p:cxnSp>
+        <p:nvCxnSpPr>
+          <p:cNvPr id="167" name="Connector: Elbow 166">
+            <a:extLst>
+              <a:ext uri="{FF2B5EF4-FFF2-40B4-BE49-F238E27FC236}">
+                <a16:creationId xmlns:a16="http://schemas.microsoft.com/office/drawing/2014/main" id="{D88E1486-A9EA-09B1-DB52-912EF09BB8E6}"/>
+              </a:ext>
+            </a:extLst>
+          </p:cNvPr>
+          <p:cNvCxnSpPr>
+            <a:cxnSpLocks/>
+            <a:stCxn id="77" idx="2"/>
+            <a:endCxn id="145" idx="0"/>
+          </p:cNvCxnSpPr>
+          <p:nvPr/>
+        </p:nvCxnSpPr>
+        <p:spPr>
+          <a:xfrm rot="5400000">
+            <a:off x="4725795" y="1705579"/>
+            <a:ext cx="1268983" cy="2915582"/>
+          </a:xfrm>
+          <a:prstGeom prst="bentConnector3">
+            <a:avLst>
+              <a:gd name="adj1" fmla="val 73428"/>
+            </a:avLst>
+          </a:prstGeom>
+          <a:ln w="9525">
+            <a:solidFill>
+              <a:schemeClr val="tx1"/>
+            </a:solidFill>
+            <a:prstDash val="dash"/>
+            <a:headEnd type="triangle"/>
+            <a:tailEnd type="triangle"/>
+          </a:ln>
+        </p:spPr>
+        <p:style>
+          <a:lnRef idx="1">
+            <a:schemeClr val="accent1"/>
+          </a:lnRef>
+          <a:fillRef idx="0">
+            <a:schemeClr val="accent1"/>
+          </a:fillRef>
+          <a:effectRef idx="0">
+            <a:schemeClr val="accent1"/>
+          </a:effectRef>
+          <a:fontRef idx="minor">
+            <a:schemeClr val="tx1"/>
+          </a:fontRef>
+        </p:style>
+      </p:cxnSp>
+      <p:cxnSp>
+        <p:nvCxnSpPr>
+          <p:cNvPr id="170" name="Connector: Elbow 169">
+            <a:extLst>
+              <a:ext uri="{FF2B5EF4-FFF2-40B4-BE49-F238E27FC236}">
+                <a16:creationId xmlns:a16="http://schemas.microsoft.com/office/drawing/2014/main" id="{EBF495D6-F8BE-408D-9041-EF68C7867D46}"/>
+              </a:ext>
+            </a:extLst>
+          </p:cNvPr>
+          <p:cNvCxnSpPr>
+            <a:cxnSpLocks/>
+            <a:stCxn id="77" idx="0"/>
+            <a:endCxn id="139" idx="0"/>
+          </p:cNvCxnSpPr>
+          <p:nvPr/>
+        </p:nvCxnSpPr>
+        <p:spPr>
+          <a:xfrm rot="16200000" flipV="1">
+            <a:off x="5054820" y="124929"/>
+            <a:ext cx="610933" cy="2915582"/>
+          </a:xfrm>
+          <a:prstGeom prst="bentConnector3">
+            <a:avLst>
+              <a:gd name="adj1" fmla="val 143466"/>
+            </a:avLst>
+          </a:prstGeom>
+          <a:ln w="9525">
+            <a:solidFill>
+              <a:schemeClr val="tx1"/>
+            </a:solidFill>
+            <a:prstDash val="dash"/>
+            <a:headEnd type="triangle"/>
+            <a:tailEnd type="triangle"/>
+          </a:ln>
+        </p:spPr>
+        <p:style>
+          <a:lnRef idx="1">
+            <a:schemeClr val="accent1"/>
+          </a:lnRef>
+          <a:fillRef idx="0">
+            <a:schemeClr val="accent1"/>
+          </a:fillRef>
+          <a:effectRef idx="0">
+            <a:schemeClr val="accent1"/>
+          </a:effectRef>
+          <a:fontRef idx="minor">
+            <a:schemeClr val="tx1"/>
+          </a:fontRef>
+        </p:style>
+      </p:cxnSp>
+      <p:sp>
+        <p:nvSpPr>
+          <p:cNvPr id="2" name="Rectangle 138">
+            <a:extLst>
+              <a:ext uri="{FF2B5EF4-FFF2-40B4-BE49-F238E27FC236}">
+                <a16:creationId xmlns:a16="http://schemas.microsoft.com/office/drawing/2014/main" id="{82CC1FC8-E197-9C92-FFD6-369260E8C740}"/>
+              </a:ext>
+            </a:extLst>
+          </p:cNvPr>
+          <p:cNvSpPr/>
+          <p:nvPr/>
+        </p:nvSpPr>
+        <p:spPr>
+          <a:xfrm>
+            <a:off x="4499694" y="1258823"/>
+            <a:ext cx="906747" cy="359761"/>
+          </a:xfrm>
+          <a:prstGeom prst="rect">
+            <a:avLst/>
+          </a:prstGeom>
+          <a:solidFill>
+            <a:schemeClr val="bg1">
+              <a:lumMod val="95000"/>
+            </a:schemeClr>
+          </a:solidFill>
+          <a:ln>
+            <a:solidFill>
+              <a:schemeClr val="tx1"/>
+            </a:solidFill>
+          </a:ln>
+        </p:spPr>
+        <p:style>
+          <a:lnRef idx="2">
+            <a:schemeClr val="accent1">
+              <a:shade val="50000"/>
+            </a:schemeClr>
+          </a:lnRef>
+          <a:fillRef idx="1">
+            <a:schemeClr val="accent1"/>
+          </a:fillRef>
+          <a:effectRef idx="0">
+            <a:schemeClr val="accent1"/>
+          </a:effectRef>
+          <a:fontRef idx="minor">
+            <a:schemeClr val="lt1"/>
+          </a:fontRef>
+        </p:style>
+        <p:txBody>
+          <a:bodyPr rtlCol="0" anchor="ctr" anchorCtr="1"/>
+          <a:lstStyle/>
+          <a:p>
+            <a:pPr algn="ctr"/>
+            <a:r>
+              <a:rPr lang="en-US" altLang="zh-CN" sz="1000" dirty="0">
+                <a:solidFill>
+                  <a:schemeClr val="tx1"/>
+                </a:solidFill>
+                <a:latin typeface="LXGW WenKai" panose="02020500000000000000" pitchFamily="18" charset="-120"/>
+                <a:ea typeface="LXGW WenKai" panose="02020500000000000000" pitchFamily="18" charset="-120"/>
+              </a:rPr>
+              <a:t>Experience</a:t>
+            </a:r>
+            <a:br>
+              <a:rPr lang="en-US" altLang="zh-CN" sz="1000" dirty="0">
+                <a:solidFill>
+                  <a:schemeClr val="tx1"/>
+                </a:solidFill>
+                <a:latin typeface="LXGW WenKai" panose="02020500000000000000" pitchFamily="18" charset="-120"/>
+                <a:ea typeface="LXGW WenKai" panose="02020500000000000000" pitchFamily="18" charset="-120"/>
+              </a:rPr>
+            </a:br>
+            <a:r>
+              <a:rPr lang="en-US" altLang="zh-CN" sz="1050" dirty="0">
+                <a:solidFill>
+                  <a:schemeClr val="tx1"/>
+                </a:solidFill>
+                <a:latin typeface="LXGW WenKai" panose="02020500000000000000" pitchFamily="18" charset="-120"/>
+                <a:ea typeface="LXGW WenKai" panose="02020500000000000000" pitchFamily="18" charset="-120"/>
+              </a:rPr>
+              <a:t>Pre/Post</a:t>
+            </a:r>
+            <a:endParaRPr lang="en-US" altLang="zh-CN" sz="1100" dirty="0">
+              <a:solidFill>
+                <a:schemeClr val="tx1"/>
+              </a:solidFill>
+              <a:latin typeface="LXGW WenKai" panose="02020500000000000000" pitchFamily="18" charset="-120"/>
+              <a:ea typeface="LXGW WenKai" panose="02020500000000000000" pitchFamily="18" charset="-120"/>
+            </a:endParaRPr>
+          </a:p>
+        </p:txBody>
+      </p:sp>
+      <p:sp>
+        <p:nvSpPr>
+          <p:cNvPr id="3" name="Rectangle 138">
+            <a:extLst>
+              <a:ext uri="{FF2B5EF4-FFF2-40B4-BE49-F238E27FC236}">
+                <a16:creationId xmlns:a16="http://schemas.microsoft.com/office/drawing/2014/main" id="{CB0DC554-918C-44FA-DDFD-AA5496319B81}"/>
+              </a:ext>
+            </a:extLst>
+          </p:cNvPr>
+          <p:cNvSpPr/>
+          <p:nvPr/>
+        </p:nvSpPr>
+        <p:spPr>
+          <a:xfrm>
+            <a:off x="4501401" y="2538532"/>
+            <a:ext cx="906747" cy="359761"/>
+          </a:xfrm>
+          <a:prstGeom prst="rect">
+            <a:avLst/>
+          </a:prstGeom>
+          <a:solidFill>
+            <a:schemeClr val="bg1">
+              <a:lumMod val="95000"/>
+            </a:schemeClr>
+          </a:solidFill>
+          <a:ln>
+            <a:solidFill>
+              <a:schemeClr val="tx1"/>
+            </a:solidFill>
+          </a:ln>
+        </p:spPr>
+        <p:style>
+          <a:lnRef idx="2">
+            <a:schemeClr val="accent1">
+              <a:shade val="50000"/>
+            </a:schemeClr>
+          </a:lnRef>
+          <a:fillRef idx="1">
+            <a:schemeClr val="accent1"/>
+          </a:fillRef>
+          <a:effectRef idx="0">
+            <a:schemeClr val="accent1"/>
+          </a:effectRef>
+          <a:fontRef idx="minor">
+            <a:schemeClr val="lt1"/>
+          </a:fontRef>
+        </p:style>
+        <p:txBody>
+          <a:bodyPr rtlCol="0" anchor="ctr" anchorCtr="1"/>
+          <a:lstStyle/>
+          <a:p>
+            <a:pPr algn="ctr"/>
+            <a:r>
+              <a:rPr lang="en-US" altLang="zh-CN" sz="1000" dirty="0">
+                <a:solidFill>
+                  <a:schemeClr val="tx1"/>
+                </a:solidFill>
+                <a:latin typeface="LXGW WenKai" panose="02020500000000000000" pitchFamily="18" charset="-120"/>
+                <a:ea typeface="LXGW WenKai" panose="02020500000000000000" pitchFamily="18" charset="-120"/>
+              </a:rPr>
+              <a:t>Experience</a:t>
+            </a:r>
+          </a:p>
+          <a:p>
+            <a:pPr algn="ctr"/>
+            <a:r>
+              <a:rPr lang="en-US" sz="1000" dirty="0">
+                <a:solidFill>
+                  <a:schemeClr val="tx1"/>
+                </a:solidFill>
+                <a:latin typeface="LXGW WenKai" panose="02020500000000000000" pitchFamily="18" charset="-120"/>
+                <a:ea typeface="LXGW WenKai" panose="02020500000000000000" pitchFamily="18" charset="-120"/>
+              </a:rPr>
+              <a:t>Pre/Post</a:t>
+            </a:r>
+            <a:endParaRPr lang="en-US" sz="1050" dirty="0">
+              <a:solidFill>
+                <a:schemeClr val="tx1"/>
+              </a:solidFill>
+              <a:latin typeface="LXGW WenKai" panose="02020500000000000000" pitchFamily="18" charset="-120"/>
+              <a:ea typeface="LXGW WenKai" panose="02020500000000000000" pitchFamily="18" charset="-120"/>
+            </a:endParaRPr>
+          </a:p>
+        </p:txBody>
+      </p:sp>
+      <p:sp>
+        <p:nvSpPr>
+          <p:cNvPr id="5" name="Rectangle 138">
+            <a:extLst>
+              <a:ext uri="{FF2B5EF4-FFF2-40B4-BE49-F238E27FC236}">
+                <a16:creationId xmlns:a16="http://schemas.microsoft.com/office/drawing/2014/main" id="{C3B8A1E1-E06C-D45C-99A5-DE58E427384C}"/>
+              </a:ext>
+            </a:extLst>
+          </p:cNvPr>
+          <p:cNvSpPr/>
+          <p:nvPr/>
+        </p:nvSpPr>
+        <p:spPr>
+          <a:xfrm>
+            <a:off x="4499694" y="3807516"/>
+            <a:ext cx="906747" cy="359761"/>
+          </a:xfrm>
+          <a:prstGeom prst="rect">
+            <a:avLst/>
+          </a:prstGeom>
+          <a:solidFill>
+            <a:schemeClr val="bg1">
+              <a:lumMod val="95000"/>
+            </a:schemeClr>
+          </a:solidFill>
+          <a:ln>
+            <a:solidFill>
+              <a:schemeClr val="tx1"/>
+            </a:solidFill>
+          </a:ln>
+        </p:spPr>
+        <p:style>
+          <a:lnRef idx="2">
+            <a:schemeClr val="accent1">
+              <a:shade val="50000"/>
+            </a:schemeClr>
+          </a:lnRef>
+          <a:fillRef idx="1">
+            <a:schemeClr val="accent1"/>
+          </a:fillRef>
+          <a:effectRef idx="0">
+            <a:schemeClr val="accent1"/>
+          </a:effectRef>
+          <a:fontRef idx="minor">
+            <a:schemeClr val="lt1"/>
+          </a:fontRef>
+        </p:style>
+        <p:txBody>
+          <a:bodyPr rtlCol="0" anchor="ctr" anchorCtr="1"/>
+          <a:lstStyle/>
+          <a:p>
+            <a:pPr algn="ctr"/>
+            <a:r>
+              <a:rPr lang="en-US" altLang="zh-CN" sz="1000" dirty="0">
+                <a:solidFill>
+                  <a:schemeClr val="tx1"/>
+                </a:solidFill>
+                <a:latin typeface="LXGW WenKai" panose="02020500000000000000" pitchFamily="18" charset="-120"/>
+                <a:ea typeface="LXGW WenKai" panose="02020500000000000000" pitchFamily="18" charset="-120"/>
+              </a:rPr>
+              <a:t>Experience</a:t>
+            </a:r>
+          </a:p>
+          <a:p>
+            <a:pPr algn="ctr"/>
+            <a:r>
+              <a:rPr lang="en-US" sz="1000" dirty="0">
+                <a:solidFill>
+                  <a:schemeClr val="tx1"/>
+                </a:solidFill>
+                <a:latin typeface="LXGW WenKai" panose="02020500000000000000" pitchFamily="18" charset="-120"/>
+                <a:ea typeface="LXGW WenKai" panose="02020500000000000000" pitchFamily="18" charset="-120"/>
+              </a:rPr>
+              <a:t>Pre/Post</a:t>
+            </a:r>
+            <a:endParaRPr lang="en-US" sz="1050" dirty="0">
+              <a:solidFill>
+                <a:schemeClr val="tx1"/>
+              </a:solidFill>
+              <a:latin typeface="LXGW WenKai" panose="02020500000000000000" pitchFamily="18" charset="-120"/>
+              <a:ea typeface="LXGW WenKai" panose="02020500000000000000" pitchFamily="18" charset="-120"/>
+            </a:endParaRPr>
+          </a:p>
+        </p:txBody>
+      </p:sp>
+      <p:sp>
+        <p:nvSpPr>
+          <p:cNvPr id="6" name="Rectangle 74">
+            <a:extLst>
+              <a:ext uri="{FF2B5EF4-FFF2-40B4-BE49-F238E27FC236}">
+                <a16:creationId xmlns:a16="http://schemas.microsoft.com/office/drawing/2014/main" id="{23FA5171-0CC2-8DC8-242E-6812E56712FA}"/>
+              </a:ext>
+            </a:extLst>
+          </p:cNvPr>
+          <p:cNvSpPr/>
+          <p:nvPr/>
+        </p:nvSpPr>
+        <p:spPr>
+          <a:xfrm>
+            <a:off x="10252200" y="1700377"/>
+            <a:ext cx="1167764" cy="1018035"/>
+          </a:xfrm>
+          <a:prstGeom prst="rect">
+            <a:avLst/>
+          </a:prstGeom>
+          <a:solidFill>
+            <a:schemeClr val="accent6">
+              <a:lumMod val="20000"/>
+              <a:lumOff val="80000"/>
+            </a:schemeClr>
+          </a:solidFill>
+          <a:ln>
+            <a:solidFill>
+              <a:schemeClr val="tx1"/>
+            </a:solidFill>
+          </a:ln>
+        </p:spPr>
+        <p:style>
+          <a:lnRef idx="2">
+            <a:schemeClr val="accent1">
+              <a:shade val="50000"/>
+            </a:schemeClr>
+          </a:lnRef>
+          <a:fillRef idx="1">
+            <a:schemeClr val="accent1"/>
+          </a:fillRef>
+          <a:effectRef idx="0">
+            <a:schemeClr val="accent1"/>
+          </a:effectRef>
+          <a:fontRef idx="minor">
+            <a:schemeClr val="lt1"/>
+          </a:fontRef>
+        </p:style>
+        <p:txBody>
+          <a:bodyPr rtlCol="0" anchor="ctr" anchorCtr="1"/>
+          <a:lstStyle/>
+          <a:p>
+            <a:pPr algn="ctr"/>
+            <a:r>
+              <a:rPr lang="en-US" altLang="zh-CN" sz="1400" dirty="0">
+                <a:solidFill>
+                  <a:schemeClr val="tx1"/>
+                </a:solidFill>
+                <a:latin typeface="LXGW WenKai" panose="02020500000000000000" pitchFamily="18" charset="-120"/>
+                <a:ea typeface="LXGW WenKai" panose="02020500000000000000" pitchFamily="18" charset="-120"/>
+              </a:rPr>
+              <a:t>Database</a:t>
+            </a:r>
+            <a:endParaRPr lang="en-US" sz="1600" dirty="0">
+              <a:solidFill>
+                <a:schemeClr val="tx1"/>
+              </a:solidFill>
+              <a:latin typeface="LXGW WenKai" panose="02020500000000000000" pitchFamily="18" charset="-120"/>
+              <a:ea typeface="LXGW WenKai" panose="02020500000000000000" pitchFamily="18" charset="-120"/>
+            </a:endParaRPr>
+          </a:p>
+        </p:txBody>
+      </p:sp>
+      <p:cxnSp>
+        <p:nvCxnSpPr>
+          <p:cNvPr id="7" name="Connector: Elbow 166">
+            <a:extLst>
+              <a:ext uri="{FF2B5EF4-FFF2-40B4-BE49-F238E27FC236}">
+                <a16:creationId xmlns:a16="http://schemas.microsoft.com/office/drawing/2014/main" id="{C585E097-C6A4-1E4B-F859-B33CB52C72B1}"/>
+              </a:ext>
+            </a:extLst>
+          </p:cNvPr>
+          <p:cNvCxnSpPr>
+            <a:cxnSpLocks/>
+            <a:stCxn id="77" idx="2"/>
+            <a:endCxn id="5" idx="0"/>
+          </p:cNvCxnSpPr>
+          <p:nvPr/>
+        </p:nvCxnSpPr>
+        <p:spPr>
+          <a:xfrm rot="5400000">
+            <a:off x="5246255" y="2235693"/>
+            <a:ext cx="1278637" cy="1865009"/>
+          </a:xfrm>
+          <a:prstGeom prst="bentConnector3">
+            <a:avLst>
+              <a:gd name="adj1" fmla="val 72517"/>
+            </a:avLst>
+          </a:prstGeom>
+          <a:ln w="9525">
+            <a:solidFill>
+              <a:schemeClr val="tx1"/>
+            </a:solidFill>
+            <a:prstDash val="dash"/>
+            <a:headEnd type="triangle"/>
+            <a:tailEnd type="triangle"/>
+          </a:ln>
+        </p:spPr>
+        <p:style>
+          <a:lnRef idx="1">
+            <a:schemeClr val="accent1"/>
+          </a:lnRef>
+          <a:fillRef idx="0">
+            <a:schemeClr val="accent1"/>
+          </a:fillRef>
+          <a:effectRef idx="0">
+            <a:schemeClr val="accent1"/>
+          </a:effectRef>
+          <a:fontRef idx="minor">
+            <a:schemeClr val="tx1"/>
+          </a:fontRef>
+        </p:style>
+      </p:cxnSp>
+      <p:cxnSp>
+        <p:nvCxnSpPr>
+          <p:cNvPr id="10" name="Connector: Elbow 166">
+            <a:extLst>
+              <a:ext uri="{FF2B5EF4-FFF2-40B4-BE49-F238E27FC236}">
+                <a16:creationId xmlns:a16="http://schemas.microsoft.com/office/drawing/2014/main" id="{48E64060-BAF0-146A-B1D2-A56DF776CA0E}"/>
+              </a:ext>
+            </a:extLst>
+          </p:cNvPr>
+          <p:cNvCxnSpPr>
+            <a:cxnSpLocks/>
+            <a:stCxn id="77" idx="1"/>
+            <a:endCxn id="3" idx="0"/>
+          </p:cNvCxnSpPr>
+          <p:nvPr/>
+        </p:nvCxnSpPr>
+        <p:spPr>
+          <a:xfrm rot="10800000" flipV="1">
+            <a:off x="4954775" y="2208532"/>
+            <a:ext cx="1177502" cy="329999"/>
+          </a:xfrm>
+          <a:prstGeom prst="bentConnector2">
+            <a:avLst/>
+          </a:prstGeom>
+          <a:ln w="9525">
+            <a:solidFill>
+              <a:schemeClr val="tx1"/>
+            </a:solidFill>
+            <a:prstDash val="dash"/>
+            <a:headEnd type="triangle"/>
+            <a:tailEnd type="triangle"/>
+          </a:ln>
+        </p:spPr>
+        <p:style>
+          <a:lnRef idx="1">
+            <a:schemeClr val="accent1"/>
+          </a:lnRef>
+          <a:fillRef idx="0">
+            <a:schemeClr val="accent1"/>
+          </a:fillRef>
+          <a:effectRef idx="0">
+            <a:schemeClr val="accent1"/>
+          </a:effectRef>
+          <a:fontRef idx="minor">
+            <a:schemeClr val="tx1"/>
+          </a:fontRef>
+        </p:style>
+      </p:cxnSp>
+      <p:cxnSp>
+        <p:nvCxnSpPr>
+          <p:cNvPr id="13" name="Connector: Elbow 169">
+            <a:extLst>
+              <a:ext uri="{FF2B5EF4-FFF2-40B4-BE49-F238E27FC236}">
+                <a16:creationId xmlns:a16="http://schemas.microsoft.com/office/drawing/2014/main" id="{B9988024-2174-BB80-33D6-6780C0CB3F00}"/>
+              </a:ext>
+            </a:extLst>
+          </p:cNvPr>
+          <p:cNvCxnSpPr>
+            <a:cxnSpLocks/>
+            <a:stCxn id="77" idx="0"/>
+            <a:endCxn id="2" idx="0"/>
+          </p:cNvCxnSpPr>
+          <p:nvPr/>
+        </p:nvCxnSpPr>
+        <p:spPr>
+          <a:xfrm rot="16200000" flipV="1">
+            <a:off x="5570892" y="641000"/>
+            <a:ext cx="629363" cy="1865009"/>
+          </a:xfrm>
+          <a:prstGeom prst="bentConnector3">
+            <a:avLst>
+              <a:gd name="adj1" fmla="val 139257"/>
+            </a:avLst>
+          </a:prstGeom>
+          <a:ln w="9525">
+            <a:solidFill>
+              <a:schemeClr val="tx1"/>
+            </a:solidFill>
+            <a:prstDash val="dash"/>
+            <a:headEnd type="triangle"/>
+            <a:tailEnd type="triangle"/>
+          </a:ln>
+        </p:spPr>
+        <p:style>
+          <a:lnRef idx="1">
+            <a:schemeClr val="accent1"/>
+          </a:lnRef>
+          <a:fillRef idx="0">
+            <a:schemeClr val="accent1"/>
+          </a:fillRef>
+          <a:effectRef idx="0">
+            <a:schemeClr val="accent1"/>
+          </a:effectRef>
+          <a:fontRef idx="minor">
+            <a:schemeClr val="tx1"/>
+          </a:fontRef>
+        </p:style>
+      </p:cxnSp>
+      <p:cxnSp>
+        <p:nvCxnSpPr>
+          <p:cNvPr id="19" name="Connector: Elbow 169">
+            <a:extLst>
+              <a:ext uri="{FF2B5EF4-FFF2-40B4-BE49-F238E27FC236}">
+                <a16:creationId xmlns:a16="http://schemas.microsoft.com/office/drawing/2014/main" id="{09C567B4-51D1-C8F9-B8D3-FCE778CBE9E8}"/>
+              </a:ext>
+            </a:extLst>
+          </p:cNvPr>
+          <p:cNvCxnSpPr>
+            <a:cxnSpLocks/>
+            <a:stCxn id="6" idx="1"/>
+            <a:endCxn id="77" idx="3"/>
+          </p:cNvCxnSpPr>
+          <p:nvPr/>
+        </p:nvCxnSpPr>
+        <p:spPr>
+          <a:xfrm rot="10800000">
+            <a:off x="7503878" y="2208533"/>
+            <a:ext cx="2748323" cy="862"/>
+          </a:xfrm>
+          <a:prstGeom prst="bentConnector3">
+            <a:avLst>
+              <a:gd name="adj1" fmla="val 50000"/>
+            </a:avLst>
+          </a:prstGeom>
+          <a:ln w="9525" cmpd="sng">
+            <a:solidFill>
+              <a:schemeClr val="tx1"/>
+            </a:solidFill>
+            <a:prstDash val="solid"/>
+            <a:headEnd type="triangle"/>
+            <a:tailEnd type="triangle"/>
+          </a:ln>
+        </p:spPr>
+        <p:style>
+          <a:lnRef idx="1">
+            <a:schemeClr val="accent1"/>
+          </a:lnRef>
+          <a:fillRef idx="0">
+            <a:schemeClr val="accent1"/>
+          </a:fillRef>
+          <a:effectRef idx="0">
+            <a:schemeClr val="accent1"/>
+          </a:effectRef>
+          <a:fontRef idx="minor">
+            <a:schemeClr val="tx1"/>
+          </a:fontRef>
+        </p:style>
+      </p:cxnSp>
+      <p:sp>
+        <p:nvSpPr>
+          <p:cNvPr id="22" name="Rectangle 76">
+            <a:extLst>
+              <a:ext uri="{FF2B5EF4-FFF2-40B4-BE49-F238E27FC236}">
+                <a16:creationId xmlns:a16="http://schemas.microsoft.com/office/drawing/2014/main" id="{E1ECA520-2118-C952-7E96-676DF37BB92A}"/>
+              </a:ext>
+            </a:extLst>
+          </p:cNvPr>
+          <p:cNvSpPr/>
+          <p:nvPr/>
+        </p:nvSpPr>
+        <p:spPr>
+          <a:xfrm>
+            <a:off x="6418475" y="3923825"/>
+            <a:ext cx="1371600" cy="640693"/>
+          </a:xfrm>
+          <a:prstGeom prst="rect">
+            <a:avLst/>
+          </a:prstGeom>
+          <a:solidFill>
+            <a:schemeClr val="accent4">
+              <a:lumMod val="20000"/>
+              <a:lumOff val="80000"/>
+            </a:schemeClr>
+          </a:solidFill>
+          <a:ln>
+            <a:solidFill>
+              <a:schemeClr val="tx1"/>
+            </a:solidFill>
+          </a:ln>
+        </p:spPr>
+        <p:style>
+          <a:lnRef idx="2">
+            <a:schemeClr val="accent1">
+              <a:shade val="50000"/>
+            </a:schemeClr>
+          </a:lnRef>
+          <a:fillRef idx="1">
+            <a:schemeClr val="accent1"/>
+          </a:fillRef>
+          <a:effectRef idx="0">
+            <a:schemeClr val="accent1"/>
+          </a:effectRef>
+          <a:fontRef idx="minor">
+            <a:schemeClr val="lt1"/>
+          </a:fontRef>
+        </p:style>
+        <p:txBody>
+          <a:bodyPr rtlCol="0" anchor="ctr" anchorCtr="1"/>
+          <a:lstStyle/>
+          <a:p>
+            <a:pPr algn="ctr"/>
+            <a:r>
+              <a:rPr lang="en-US" sz="1400" dirty="0">
+                <a:solidFill>
+                  <a:schemeClr val="tx1"/>
+                </a:solidFill>
+                <a:latin typeface="LXGW WenKai" panose="02020500000000000000" pitchFamily="18" charset="-120"/>
+                <a:ea typeface="LXGW WenKai" panose="02020500000000000000" pitchFamily="18" charset="-120"/>
+              </a:rPr>
+              <a:t>Intera</a:t>
+            </a:r>
+            <a:r>
+              <a:rPr lang="en-US" altLang="zh-CN" sz="1400" dirty="0">
+                <a:solidFill>
+                  <a:schemeClr val="tx1"/>
+                </a:solidFill>
+                <a:latin typeface="LXGW WenKai" panose="02020500000000000000" pitchFamily="18" charset="-120"/>
+                <a:ea typeface="LXGW WenKai" panose="02020500000000000000" pitchFamily="18" charset="-120"/>
+              </a:rPr>
+              <a:t>c</a:t>
+            </a:r>
+            <a:r>
+              <a:rPr lang="en-US" sz="1400" dirty="0">
+                <a:solidFill>
+                  <a:schemeClr val="tx1"/>
+                </a:solidFill>
+                <a:latin typeface="LXGW WenKai" panose="02020500000000000000" pitchFamily="18" charset="-120"/>
+                <a:ea typeface="LXGW WenKai" panose="02020500000000000000" pitchFamily="18" charset="-120"/>
+              </a:rPr>
+              <a:t>tive</a:t>
+            </a:r>
+          </a:p>
+          <a:p>
+            <a:pPr algn="ctr"/>
+            <a:r>
+              <a:rPr lang="en-US" sz="1400" dirty="0">
+                <a:solidFill>
+                  <a:schemeClr val="tx1"/>
+                </a:solidFill>
+                <a:latin typeface="LXGW WenKai" panose="02020500000000000000" pitchFamily="18" charset="-120"/>
+                <a:ea typeface="LXGW WenKai" panose="02020500000000000000" pitchFamily="18" charset="-120"/>
+              </a:rPr>
+              <a:t>Environment</a:t>
+            </a:r>
+          </a:p>
+        </p:txBody>
+      </p:sp>
+      <p:cxnSp>
+        <p:nvCxnSpPr>
+          <p:cNvPr id="23" name="Connector: Elbow 169">
+            <a:extLst>
+              <a:ext uri="{FF2B5EF4-FFF2-40B4-BE49-F238E27FC236}">
+                <a16:creationId xmlns:a16="http://schemas.microsoft.com/office/drawing/2014/main" id="{4DF70A14-F868-8D74-87E3-74CB68D5FDE0}"/>
+              </a:ext>
+            </a:extLst>
+          </p:cNvPr>
+          <p:cNvCxnSpPr>
+            <a:cxnSpLocks/>
+            <a:stCxn id="77" idx="3"/>
+            <a:endCxn id="22" idx="0"/>
+          </p:cNvCxnSpPr>
+          <p:nvPr/>
+        </p:nvCxnSpPr>
+        <p:spPr>
+          <a:xfrm flipH="1">
+            <a:off x="7104275" y="2208533"/>
+            <a:ext cx="399602" cy="1715292"/>
+          </a:xfrm>
+          <a:prstGeom prst="bentConnector4">
+            <a:avLst>
+              <a:gd name="adj1" fmla="val -57207"/>
+              <a:gd name="adj2" fmla="val 59338"/>
+            </a:avLst>
+          </a:prstGeom>
+          <a:ln w="9525">
+            <a:solidFill>
+              <a:schemeClr val="tx1"/>
+            </a:solidFill>
+            <a:prstDash val="dash"/>
+            <a:headEnd type="triangle"/>
+            <a:tailEnd type="triangle"/>
+          </a:ln>
+        </p:spPr>
+        <p:style>
+          <a:lnRef idx="1">
+            <a:schemeClr val="accent1"/>
+          </a:lnRef>
+          <a:fillRef idx="0">
+            <a:schemeClr val="accent1"/>
+          </a:fillRef>
+          <a:effectRef idx="0">
+            <a:schemeClr val="accent1"/>
+          </a:effectRef>
+          <a:fontRef idx="minor">
+            <a:schemeClr val="tx1"/>
+          </a:fontRef>
+        </p:style>
+      </p:cxnSp>
+      <p:sp>
+        <p:nvSpPr>
+          <p:cNvPr id="18" name="Rectangle 17">
+            <a:extLst>
+              <a:ext uri="{FF2B5EF4-FFF2-40B4-BE49-F238E27FC236}">
+                <a16:creationId xmlns:a16="http://schemas.microsoft.com/office/drawing/2014/main" id="{F9A13DD8-1A1B-732F-88E4-101524D7E147}"/>
+              </a:ext>
+            </a:extLst>
+          </p:cNvPr>
+          <p:cNvSpPr/>
+          <p:nvPr/>
+        </p:nvSpPr>
+        <p:spPr>
+          <a:xfrm>
+            <a:off x="8660843" y="4695185"/>
+            <a:ext cx="774000" cy="223200"/>
           </a:xfrm>
           <a:prstGeom prst="rect">
             <a:avLst/>
@@ -6323,7 +8102,7 @@
           <a:p>
             <a:pPr algn="ctr"/>
             <a:r>
-              <a:rPr lang="en-US" sz="1100" dirty="0">
+              <a:rPr lang="en-US" sz="1000" dirty="0">
                 <a:solidFill>
                   <a:schemeClr val="tx1"/>
                 </a:solidFill>
@@ -6337,10 +8116,10 @@
       </p:sp>
       <p:sp>
         <p:nvSpPr>
-          <p:cNvPr id="50" name="Rectangle 49">
-            <a:extLst>
-              <a:ext uri="{FF2B5EF4-FFF2-40B4-BE49-F238E27FC236}">
-                <a16:creationId xmlns:a16="http://schemas.microsoft.com/office/drawing/2014/main" id="{8BBD062D-3932-D5F7-67F9-E142136EB013}"/>
+          <p:cNvPr id="89" name="Rectangle 88">
+            <a:extLst>
+              <a:ext uri="{FF2B5EF4-FFF2-40B4-BE49-F238E27FC236}">
+                <a16:creationId xmlns:a16="http://schemas.microsoft.com/office/drawing/2014/main" id="{3DD37A8C-A716-0782-2384-2753C896E362}"/>
               </a:ext>
             </a:extLst>
           </p:cNvPr>
@@ -6349,213 +8128,8 @@
         </p:nvSpPr>
         <p:spPr>
           <a:xfrm>
-            <a:off x="1906621" y="807396"/>
-            <a:ext cx="6177064" cy="4189691"/>
-          </a:xfrm>
-          <a:prstGeom prst="rect">
-            <a:avLst/>
-          </a:prstGeom>
-          <a:solidFill>
-            <a:schemeClr val="accent2">
-              <a:lumMod val="20000"/>
-              <a:lumOff val="80000"/>
-            </a:schemeClr>
-          </a:solidFill>
-          <a:ln>
-            <a:solidFill>
-              <a:schemeClr val="tx1"/>
-            </a:solidFill>
-          </a:ln>
-        </p:spPr>
-        <p:style>
-          <a:lnRef idx="2">
-            <a:schemeClr val="accent1">
-              <a:shade val="50000"/>
-            </a:schemeClr>
-          </a:lnRef>
-          <a:fillRef idx="1">
-            <a:schemeClr val="accent1"/>
-          </a:fillRef>
-          <a:effectRef idx="0">
-            <a:schemeClr val="accent1"/>
-          </a:effectRef>
-          <a:fontRef idx="minor">
-            <a:schemeClr val="lt1"/>
-          </a:fontRef>
-        </p:style>
-        <p:txBody>
-          <a:bodyPr rtlCol="0" anchor="b" anchorCtr="0"/>
-          <a:lstStyle/>
-          <a:p>
-            <a:pPr algn="ctr"/>
-            <a:r>
-              <a:rPr lang="en-US" sz="1400" dirty="0">
-                <a:solidFill>
-                  <a:schemeClr val="tx1"/>
-                </a:solidFill>
-                <a:latin typeface="LXGW WenKai" panose="02020500000000000000" pitchFamily="18" charset="-120"/>
-                <a:ea typeface="LXGW WenKai" panose="02020500000000000000" pitchFamily="18" charset="-120"/>
-              </a:rPr>
-              <a:t>Manager</a:t>
-            </a:r>
-          </a:p>
-        </p:txBody>
-      </p:sp>
-      <p:sp>
-        <p:nvSpPr>
-          <p:cNvPr id="75" name="Rectangle 74">
-            <a:extLst>
-              <a:ext uri="{FF2B5EF4-FFF2-40B4-BE49-F238E27FC236}">
-                <a16:creationId xmlns:a16="http://schemas.microsoft.com/office/drawing/2014/main" id="{44C68876-D9A9-1F96-3F1C-C2BB988232F8}"/>
-              </a:ext>
-            </a:extLst>
-          </p:cNvPr>
-          <p:cNvSpPr/>
-          <p:nvPr/>
-        </p:nvSpPr>
-        <p:spPr>
-          <a:xfrm>
-            <a:off x="6534696" y="3885677"/>
-            <a:ext cx="1371600" cy="457200"/>
-          </a:xfrm>
-          <a:prstGeom prst="rect">
-            <a:avLst/>
-          </a:prstGeom>
-          <a:solidFill>
-            <a:schemeClr val="accent4">
-              <a:lumMod val="20000"/>
-              <a:lumOff val="80000"/>
-            </a:schemeClr>
-          </a:solidFill>
-          <a:ln>
-            <a:solidFill>
-              <a:schemeClr val="tx1"/>
-            </a:solidFill>
-          </a:ln>
-        </p:spPr>
-        <p:style>
-          <a:lnRef idx="2">
-            <a:schemeClr val="accent1">
-              <a:shade val="50000"/>
-            </a:schemeClr>
-          </a:lnRef>
-          <a:fillRef idx="1">
-            <a:schemeClr val="accent1"/>
-          </a:fillRef>
-          <a:effectRef idx="0">
-            <a:schemeClr val="accent1"/>
-          </a:effectRef>
-          <a:fontRef idx="minor">
-            <a:schemeClr val="lt1"/>
-          </a:fontRef>
-        </p:style>
-        <p:txBody>
-          <a:bodyPr rtlCol="0" anchor="ctr" anchorCtr="1"/>
-          <a:lstStyle/>
-          <a:p>
-            <a:pPr algn="ctr"/>
-            <a:r>
-              <a:rPr lang="en-US" sz="1400" dirty="0">
-                <a:solidFill>
-                  <a:schemeClr val="tx1"/>
-                </a:solidFill>
-                <a:latin typeface="LXGW WenKai" panose="02020500000000000000" pitchFamily="18" charset="-120"/>
-                <a:ea typeface="LXGW WenKai" panose="02020500000000000000" pitchFamily="18" charset="-120"/>
-              </a:rPr>
-              <a:t>Knowledge</a:t>
-            </a:r>
-            <a:endParaRPr lang="en-US" sz="1600" dirty="0">
-              <a:solidFill>
-                <a:schemeClr val="tx1"/>
-              </a:solidFill>
-              <a:latin typeface="LXGW WenKai" panose="02020500000000000000" pitchFamily="18" charset="-120"/>
-              <a:ea typeface="LXGW WenKai" panose="02020500000000000000" pitchFamily="18" charset="-120"/>
-            </a:endParaRPr>
-          </a:p>
-        </p:txBody>
-      </p:sp>
-      <p:sp>
-        <p:nvSpPr>
-          <p:cNvPr id="77" name="Rectangle 76">
-            <a:extLst>
-              <a:ext uri="{FF2B5EF4-FFF2-40B4-BE49-F238E27FC236}">
-                <a16:creationId xmlns:a16="http://schemas.microsoft.com/office/drawing/2014/main" id="{E8620ACD-B15B-EF14-FC31-87AEE3C1C82D}"/>
-              </a:ext>
-            </a:extLst>
-          </p:cNvPr>
-          <p:cNvSpPr/>
-          <p:nvPr/>
-        </p:nvSpPr>
-        <p:spPr>
-          <a:xfrm>
-            <a:off x="6534696" y="1888186"/>
-            <a:ext cx="1371600" cy="640693"/>
-          </a:xfrm>
-          <a:prstGeom prst="rect">
-            <a:avLst/>
-          </a:prstGeom>
-          <a:solidFill>
-            <a:schemeClr val="accent4">
-              <a:lumMod val="20000"/>
-              <a:lumOff val="80000"/>
-            </a:schemeClr>
-          </a:solidFill>
-          <a:ln>
-            <a:solidFill>
-              <a:schemeClr val="tx1"/>
-            </a:solidFill>
-          </a:ln>
-        </p:spPr>
-        <p:style>
-          <a:lnRef idx="2">
-            <a:schemeClr val="accent1">
-              <a:shade val="50000"/>
-            </a:schemeClr>
-          </a:lnRef>
-          <a:fillRef idx="1">
-            <a:schemeClr val="accent1"/>
-          </a:fillRef>
-          <a:effectRef idx="0">
-            <a:schemeClr val="accent1"/>
-          </a:effectRef>
-          <a:fontRef idx="minor">
-            <a:schemeClr val="lt1"/>
-          </a:fontRef>
-        </p:style>
-        <p:txBody>
-          <a:bodyPr rtlCol="0" anchor="ctr" anchorCtr="1"/>
-          <a:lstStyle/>
-          <a:p>
-            <a:pPr algn="ctr"/>
-            <a:r>
-              <a:rPr lang="en-US" sz="1400" dirty="0">
-                <a:solidFill>
-                  <a:schemeClr val="tx1"/>
-                </a:solidFill>
-                <a:latin typeface="LXGW WenKai" panose="02020500000000000000" pitchFamily="18" charset="-120"/>
-                <a:ea typeface="LXGW WenKai" panose="02020500000000000000" pitchFamily="18" charset="-120"/>
-              </a:rPr>
-              <a:t>Global Contexts</a:t>
-            </a:r>
-          </a:p>
-        </p:txBody>
-      </p:sp>
-      <p:sp>
-        <p:nvSpPr>
-          <p:cNvPr id="89" name="Rectangle 88">
-            <a:extLst>
-              <a:ext uri="{FF2B5EF4-FFF2-40B4-BE49-F238E27FC236}">
-                <a16:creationId xmlns:a16="http://schemas.microsoft.com/office/drawing/2014/main" id="{3DD37A8C-A716-0782-2384-2753C896E362}"/>
-              </a:ext>
-            </a:extLst>
-          </p:cNvPr>
-          <p:cNvSpPr/>
-          <p:nvPr/>
-        </p:nvSpPr>
-        <p:spPr>
-          <a:xfrm>
-            <a:off x="8978631" y="4716814"/>
-            <a:ext cx="1181630" cy="308049"/>
+            <a:off x="8344144" y="3896664"/>
+            <a:ext cx="1090700" cy="221755"/>
           </a:xfrm>
           <a:prstGeom prst="rect">
             <a:avLst/>
@@ -6595,7 +8169,7 @@
           <a:p>
             <a:pPr algn="ctr"/>
             <a:r>
-              <a:rPr lang="en-US" sz="1100" dirty="0">
+              <a:rPr lang="en-US" sz="1000" dirty="0">
                 <a:solidFill>
                   <a:schemeClr val="tx1"/>
                 </a:solidFill>
@@ -6609,10 +8183,10 @@
       </p:sp>
       <p:sp>
         <p:nvSpPr>
-          <p:cNvPr id="105" name="Rectangle 104">
-            <a:extLst>
-              <a:ext uri="{FF2B5EF4-FFF2-40B4-BE49-F238E27FC236}">
-                <a16:creationId xmlns:a16="http://schemas.microsoft.com/office/drawing/2014/main" id="{1214C11B-A256-7176-4EFC-64EB301BEFA9}"/>
+          <p:cNvPr id="108" name="Rectangle 107">
+            <a:extLst>
+              <a:ext uri="{FF2B5EF4-FFF2-40B4-BE49-F238E27FC236}">
+                <a16:creationId xmlns:a16="http://schemas.microsoft.com/office/drawing/2014/main" id="{DF6F82E6-1B4D-6F20-5C4A-BAC5F1A60D25}"/>
               </a:ext>
             </a:extLst>
           </p:cNvPr>
@@ -6621,74 +8195,8 @@
         </p:nvSpPr>
         <p:spPr>
           <a:xfrm>
-            <a:off x="2373479" y="1124349"/>
-            <a:ext cx="2033151" cy="914400"/>
-          </a:xfrm>
-          <a:prstGeom prst="rect">
-            <a:avLst/>
-          </a:prstGeom>
-          <a:solidFill>
-            <a:schemeClr val="accent2">
-              <a:lumMod val="40000"/>
-              <a:lumOff val="60000"/>
-            </a:schemeClr>
-          </a:solidFill>
-          <a:ln>
-            <a:solidFill>
-              <a:schemeClr val="tx1"/>
-            </a:solidFill>
-          </a:ln>
-        </p:spPr>
-        <p:style>
-          <a:lnRef idx="2">
-            <a:schemeClr val="accent1">
-              <a:shade val="50000"/>
-            </a:schemeClr>
-          </a:lnRef>
-          <a:fillRef idx="1">
-            <a:schemeClr val="accent1"/>
-          </a:fillRef>
-          <a:effectRef idx="0">
-            <a:schemeClr val="accent1"/>
-          </a:effectRef>
-          <a:fontRef idx="minor">
-            <a:schemeClr val="lt1"/>
-          </a:fontRef>
-        </p:style>
-        <p:txBody>
-          <a:bodyPr rtlCol="0" anchor="b" anchorCtr="0"/>
-          <a:lstStyle/>
-          <a:p>
-            <a:pPr algn="ctr"/>
-            <a:r>
-              <a:rPr lang="en-US" sz="1400" dirty="0">
-                <a:solidFill>
-                  <a:schemeClr val="tx1"/>
-                </a:solidFill>
-                <a:latin typeface="LXGW WenKai" panose="02020500000000000000" pitchFamily="18" charset="-120"/>
-                <a:ea typeface="LXGW WenKai" panose="02020500000000000000" pitchFamily="18" charset="-120"/>
-              </a:rPr>
-              <a:t>Agent</a:t>
-            </a:r>
-          </a:p>
-        </p:txBody>
-      </p:sp>
-      <p:sp>
-        <p:nvSpPr>
-          <p:cNvPr id="108" name="Rectangle 107">
-            <a:extLst>
-              <a:ext uri="{FF2B5EF4-FFF2-40B4-BE49-F238E27FC236}">
-                <a16:creationId xmlns:a16="http://schemas.microsoft.com/office/drawing/2014/main" id="{DF6F82E6-1B4D-6F20-5C4A-BAC5F1A60D25}"/>
-              </a:ext>
-            </a:extLst>
-          </p:cNvPr>
-          <p:cNvSpPr/>
-          <p:nvPr/>
-        </p:nvSpPr>
-        <p:spPr>
-          <a:xfrm>
-            <a:off x="8978631" y="4226185"/>
-            <a:ext cx="1181629" cy="308049"/>
+            <a:off x="8344144" y="3492330"/>
+            <a:ext cx="1090699" cy="221754"/>
           </a:xfrm>
           <a:prstGeom prst="rect">
             <a:avLst/>
@@ -6727,7 +8235,7 @@
           <a:p>
             <a:pPr algn="ctr"/>
             <a:r>
-              <a:rPr lang="en-US" sz="1100" dirty="0">
+              <a:rPr lang="en-US" sz="1000" dirty="0">
                 <a:solidFill>
                   <a:schemeClr val="tx1"/>
                 </a:solidFill>
@@ -6741,10 +8249,10 @@
       </p:sp>
       <p:sp>
         <p:nvSpPr>
-          <p:cNvPr id="76" name="Rectangle 75">
-            <a:extLst>
-              <a:ext uri="{FF2B5EF4-FFF2-40B4-BE49-F238E27FC236}">
-                <a16:creationId xmlns:a16="http://schemas.microsoft.com/office/drawing/2014/main" id="{5DDE9D0C-B83B-B506-FF0C-EDC49D03A075}"/>
+          <p:cNvPr id="146" name="Rectangle 145">
+            <a:extLst>
+              <a:ext uri="{FF2B5EF4-FFF2-40B4-BE49-F238E27FC236}">
+                <a16:creationId xmlns:a16="http://schemas.microsoft.com/office/drawing/2014/main" id="{2F241573-1DFB-B4E8-A247-315E4818D5AC}"/>
               </a:ext>
             </a:extLst>
           </p:cNvPr>
@@ -6753,611 +8261,8 @@
         </p:nvSpPr>
         <p:spPr>
           <a:xfrm>
-            <a:off x="2534866" y="1277253"/>
-            <a:ext cx="770430" cy="359761"/>
-          </a:xfrm>
-          <a:prstGeom prst="rect">
-            <a:avLst/>
-          </a:prstGeom>
-          <a:solidFill>
-            <a:schemeClr val="bg1">
-              <a:lumMod val="95000"/>
-            </a:schemeClr>
-          </a:solidFill>
-          <a:ln>
-            <a:solidFill>
-              <a:schemeClr val="tx1"/>
-            </a:solidFill>
-          </a:ln>
-        </p:spPr>
-        <p:style>
-          <a:lnRef idx="2">
-            <a:schemeClr val="accent1">
-              <a:shade val="50000"/>
-            </a:schemeClr>
-          </a:lnRef>
-          <a:fillRef idx="1">
-            <a:schemeClr val="accent1"/>
-          </a:fillRef>
-          <a:effectRef idx="0">
-            <a:schemeClr val="accent1"/>
-          </a:effectRef>
-          <a:fontRef idx="minor">
-            <a:schemeClr val="lt1"/>
-          </a:fontRef>
-        </p:style>
-        <p:txBody>
-          <a:bodyPr rtlCol="0" anchor="ctr" anchorCtr="1"/>
-          <a:lstStyle/>
-          <a:p>
-            <a:pPr algn="ctr"/>
-            <a:r>
-              <a:rPr lang="en-US" sz="1000" dirty="0">
-                <a:solidFill>
-                  <a:schemeClr val="tx1"/>
-                </a:solidFill>
-                <a:latin typeface="LXGW WenKai" panose="02020500000000000000" pitchFamily="18" charset="-120"/>
-                <a:ea typeface="LXGW WenKai" panose="02020500000000000000" pitchFamily="18" charset="-120"/>
-              </a:rPr>
-              <a:t>System prompts</a:t>
-            </a:r>
-            <a:endParaRPr lang="en-US" sz="1050" dirty="0">
-              <a:solidFill>
-                <a:schemeClr val="tx1"/>
-              </a:solidFill>
-              <a:latin typeface="LXGW WenKai" panose="02020500000000000000" pitchFamily="18" charset="-120"/>
-              <a:ea typeface="LXGW WenKai" panose="02020500000000000000" pitchFamily="18" charset="-120"/>
-            </a:endParaRPr>
-          </a:p>
-        </p:txBody>
-      </p:sp>
-      <p:sp>
-        <p:nvSpPr>
-          <p:cNvPr id="139" name="Rectangle 138">
-            <a:extLst>
-              <a:ext uri="{FF2B5EF4-FFF2-40B4-BE49-F238E27FC236}">
-                <a16:creationId xmlns:a16="http://schemas.microsoft.com/office/drawing/2014/main" id="{2C915C8B-9693-8987-029F-199D7C0DCE4A}"/>
-              </a:ext>
-            </a:extLst>
-          </p:cNvPr>
-          <p:cNvSpPr/>
-          <p:nvPr/>
-        </p:nvSpPr>
-        <p:spPr>
-          <a:xfrm>
-            <a:off x="3517280" y="1277253"/>
-            <a:ext cx="770430" cy="359761"/>
-          </a:xfrm>
-          <a:prstGeom prst="rect">
-            <a:avLst/>
-          </a:prstGeom>
-          <a:solidFill>
-            <a:schemeClr val="bg1">
-              <a:lumMod val="95000"/>
-            </a:schemeClr>
-          </a:solidFill>
-          <a:ln>
-            <a:solidFill>
-              <a:schemeClr val="tx1"/>
-            </a:solidFill>
-          </a:ln>
-        </p:spPr>
-        <p:style>
-          <a:lnRef idx="2">
-            <a:schemeClr val="accent1">
-              <a:shade val="50000"/>
-            </a:schemeClr>
-          </a:lnRef>
-          <a:fillRef idx="1">
-            <a:schemeClr val="accent1"/>
-          </a:fillRef>
-          <a:effectRef idx="0">
-            <a:schemeClr val="accent1"/>
-          </a:effectRef>
-          <a:fontRef idx="minor">
-            <a:schemeClr val="lt1"/>
-          </a:fontRef>
-        </p:style>
-        <p:txBody>
-          <a:bodyPr rtlCol="0" anchor="ctr" anchorCtr="1"/>
-          <a:lstStyle/>
-          <a:p>
-            <a:pPr algn="ctr"/>
-            <a:r>
-              <a:rPr lang="en-US" sz="1000" dirty="0">
-                <a:solidFill>
-                  <a:schemeClr val="tx1"/>
-                </a:solidFill>
-                <a:latin typeface="LXGW WenKai" panose="02020500000000000000" pitchFamily="18" charset="-120"/>
-                <a:ea typeface="LXGW WenKai" panose="02020500000000000000" pitchFamily="18" charset="-120"/>
-              </a:rPr>
-              <a:t>Chat</a:t>
-            </a:r>
-          </a:p>
-          <a:p>
-            <a:pPr algn="ctr"/>
-            <a:r>
-              <a:rPr lang="en-US" sz="1000" dirty="0">
-                <a:solidFill>
-                  <a:schemeClr val="tx1"/>
-                </a:solidFill>
-                <a:latin typeface="LXGW WenKai" panose="02020500000000000000" pitchFamily="18" charset="-120"/>
-                <a:ea typeface="LXGW WenKai" panose="02020500000000000000" pitchFamily="18" charset="-120"/>
-              </a:rPr>
-              <a:t>history</a:t>
-            </a:r>
-            <a:endParaRPr lang="en-US" sz="1050" dirty="0">
-              <a:solidFill>
-                <a:schemeClr val="tx1"/>
-              </a:solidFill>
-              <a:latin typeface="LXGW WenKai" panose="02020500000000000000" pitchFamily="18" charset="-120"/>
-              <a:ea typeface="LXGW WenKai" panose="02020500000000000000" pitchFamily="18" charset="-120"/>
-            </a:endParaRPr>
-          </a:p>
-        </p:txBody>
-      </p:sp>
-      <p:sp>
-        <p:nvSpPr>
-          <p:cNvPr id="140" name="Rectangle 139">
-            <a:extLst>
-              <a:ext uri="{FF2B5EF4-FFF2-40B4-BE49-F238E27FC236}">
-                <a16:creationId xmlns:a16="http://schemas.microsoft.com/office/drawing/2014/main" id="{3F4E18B8-7282-664E-294A-1DC6271F5490}"/>
-              </a:ext>
-            </a:extLst>
-          </p:cNvPr>
-          <p:cNvSpPr/>
-          <p:nvPr/>
-        </p:nvSpPr>
-        <p:spPr>
-          <a:xfrm>
-            <a:off x="2394714" y="2368209"/>
-            <a:ext cx="2033151" cy="914400"/>
-          </a:xfrm>
-          <a:prstGeom prst="rect">
-            <a:avLst/>
-          </a:prstGeom>
-          <a:solidFill>
-            <a:schemeClr val="accent2">
-              <a:lumMod val="40000"/>
-              <a:lumOff val="60000"/>
-            </a:schemeClr>
-          </a:solidFill>
-          <a:ln>
-            <a:solidFill>
-              <a:schemeClr val="tx1"/>
-            </a:solidFill>
-          </a:ln>
-        </p:spPr>
-        <p:style>
-          <a:lnRef idx="2">
-            <a:schemeClr val="accent1">
-              <a:shade val="50000"/>
-            </a:schemeClr>
-          </a:lnRef>
-          <a:fillRef idx="1">
-            <a:schemeClr val="accent1"/>
-          </a:fillRef>
-          <a:effectRef idx="0">
-            <a:schemeClr val="accent1"/>
-          </a:effectRef>
-          <a:fontRef idx="minor">
-            <a:schemeClr val="lt1"/>
-          </a:fontRef>
-        </p:style>
-        <p:txBody>
-          <a:bodyPr rtlCol="0" anchor="b" anchorCtr="0"/>
-          <a:lstStyle/>
-          <a:p>
-            <a:pPr algn="ctr"/>
-            <a:r>
-              <a:rPr lang="en-US" sz="1400" dirty="0">
-                <a:solidFill>
-                  <a:schemeClr val="tx1"/>
-                </a:solidFill>
-                <a:latin typeface="LXGW WenKai" panose="02020500000000000000" pitchFamily="18" charset="-120"/>
-                <a:ea typeface="LXGW WenKai" panose="02020500000000000000" pitchFamily="18" charset="-120"/>
-              </a:rPr>
-              <a:t>Agent</a:t>
-            </a:r>
-          </a:p>
-        </p:txBody>
-      </p:sp>
-      <p:sp>
-        <p:nvSpPr>
-          <p:cNvPr id="141" name="Rectangle 140">
-            <a:extLst>
-              <a:ext uri="{FF2B5EF4-FFF2-40B4-BE49-F238E27FC236}">
-                <a16:creationId xmlns:a16="http://schemas.microsoft.com/office/drawing/2014/main" id="{B9470EF6-B2B8-17B5-60F2-39024B4B359F}"/>
-              </a:ext>
-            </a:extLst>
-          </p:cNvPr>
-          <p:cNvSpPr/>
-          <p:nvPr/>
-        </p:nvSpPr>
-        <p:spPr>
-          <a:xfrm>
-            <a:off x="2534866" y="2528878"/>
-            <a:ext cx="770430" cy="359761"/>
-          </a:xfrm>
-          <a:prstGeom prst="rect">
-            <a:avLst/>
-          </a:prstGeom>
-          <a:solidFill>
-            <a:schemeClr val="bg1">
-              <a:lumMod val="95000"/>
-            </a:schemeClr>
-          </a:solidFill>
-          <a:ln>
-            <a:solidFill>
-              <a:schemeClr val="tx1"/>
-            </a:solidFill>
-          </a:ln>
-        </p:spPr>
-        <p:style>
-          <a:lnRef idx="2">
-            <a:schemeClr val="accent1">
-              <a:shade val="50000"/>
-            </a:schemeClr>
-          </a:lnRef>
-          <a:fillRef idx="1">
-            <a:schemeClr val="accent1"/>
-          </a:fillRef>
-          <a:effectRef idx="0">
-            <a:schemeClr val="accent1"/>
-          </a:effectRef>
-          <a:fontRef idx="minor">
-            <a:schemeClr val="lt1"/>
-          </a:fontRef>
-        </p:style>
-        <p:txBody>
-          <a:bodyPr rtlCol="0" anchor="ctr" anchorCtr="1"/>
-          <a:lstStyle/>
-          <a:p>
-            <a:pPr algn="ctr"/>
-            <a:r>
-              <a:rPr lang="en-US" sz="1000" dirty="0">
-                <a:solidFill>
-                  <a:schemeClr val="tx1"/>
-                </a:solidFill>
-                <a:latin typeface="LXGW WenKai" panose="02020500000000000000" pitchFamily="18" charset="-120"/>
-                <a:ea typeface="LXGW WenKai" panose="02020500000000000000" pitchFamily="18" charset="-120"/>
-              </a:rPr>
-              <a:t>System prompts</a:t>
-            </a:r>
-            <a:endParaRPr lang="en-US" sz="1050" dirty="0">
-              <a:solidFill>
-                <a:schemeClr val="tx1"/>
-              </a:solidFill>
-              <a:latin typeface="LXGW WenKai" panose="02020500000000000000" pitchFamily="18" charset="-120"/>
-              <a:ea typeface="LXGW WenKai" panose="02020500000000000000" pitchFamily="18" charset="-120"/>
-            </a:endParaRPr>
-          </a:p>
-        </p:txBody>
-      </p:sp>
-      <p:sp>
-        <p:nvSpPr>
-          <p:cNvPr id="142" name="Rectangle 141">
-            <a:extLst>
-              <a:ext uri="{FF2B5EF4-FFF2-40B4-BE49-F238E27FC236}">
-                <a16:creationId xmlns:a16="http://schemas.microsoft.com/office/drawing/2014/main" id="{CBFEEC7A-4A15-DB6B-15C8-5F074E904B67}"/>
-              </a:ext>
-            </a:extLst>
-          </p:cNvPr>
-          <p:cNvSpPr/>
-          <p:nvPr/>
-        </p:nvSpPr>
-        <p:spPr>
-          <a:xfrm>
-            <a:off x="3517280" y="2528878"/>
-            <a:ext cx="770430" cy="359761"/>
-          </a:xfrm>
-          <a:prstGeom prst="rect">
-            <a:avLst/>
-          </a:prstGeom>
-          <a:solidFill>
-            <a:schemeClr val="bg1">
-              <a:lumMod val="95000"/>
-            </a:schemeClr>
-          </a:solidFill>
-          <a:ln>
-            <a:solidFill>
-              <a:schemeClr val="tx1"/>
-            </a:solidFill>
-          </a:ln>
-        </p:spPr>
-        <p:style>
-          <a:lnRef idx="2">
-            <a:schemeClr val="accent1">
-              <a:shade val="50000"/>
-            </a:schemeClr>
-          </a:lnRef>
-          <a:fillRef idx="1">
-            <a:schemeClr val="accent1"/>
-          </a:fillRef>
-          <a:effectRef idx="0">
-            <a:schemeClr val="accent1"/>
-          </a:effectRef>
-          <a:fontRef idx="minor">
-            <a:schemeClr val="lt1"/>
-          </a:fontRef>
-        </p:style>
-        <p:txBody>
-          <a:bodyPr rtlCol="0" anchor="ctr" anchorCtr="1"/>
-          <a:lstStyle/>
-          <a:p>
-            <a:pPr algn="ctr"/>
-            <a:r>
-              <a:rPr lang="en-US" sz="1000" dirty="0">
-                <a:solidFill>
-                  <a:schemeClr val="tx1"/>
-                </a:solidFill>
-                <a:latin typeface="LXGW WenKai" panose="02020500000000000000" pitchFamily="18" charset="-120"/>
-                <a:ea typeface="LXGW WenKai" panose="02020500000000000000" pitchFamily="18" charset="-120"/>
-              </a:rPr>
-              <a:t>Chat</a:t>
-            </a:r>
-          </a:p>
-          <a:p>
-            <a:pPr algn="ctr"/>
-            <a:r>
-              <a:rPr lang="en-US" sz="1000" dirty="0">
-                <a:solidFill>
-                  <a:schemeClr val="tx1"/>
-                </a:solidFill>
-                <a:latin typeface="LXGW WenKai" panose="02020500000000000000" pitchFamily="18" charset="-120"/>
-                <a:ea typeface="LXGW WenKai" panose="02020500000000000000" pitchFamily="18" charset="-120"/>
-              </a:rPr>
-              <a:t>History</a:t>
-            </a:r>
-            <a:endParaRPr lang="en-US" sz="1050" dirty="0">
-              <a:solidFill>
-                <a:schemeClr val="tx1"/>
-              </a:solidFill>
-              <a:latin typeface="LXGW WenKai" panose="02020500000000000000" pitchFamily="18" charset="-120"/>
-              <a:ea typeface="LXGW WenKai" panose="02020500000000000000" pitchFamily="18" charset="-120"/>
-            </a:endParaRPr>
-          </a:p>
-        </p:txBody>
-      </p:sp>
-      <p:sp>
-        <p:nvSpPr>
-          <p:cNvPr id="143" name="Rectangle 142">
-            <a:extLst>
-              <a:ext uri="{FF2B5EF4-FFF2-40B4-BE49-F238E27FC236}">
-                <a16:creationId xmlns:a16="http://schemas.microsoft.com/office/drawing/2014/main" id="{B5FD6F14-F11F-8D87-FEE2-5494426F1A72}"/>
-              </a:ext>
-            </a:extLst>
-          </p:cNvPr>
-          <p:cNvSpPr/>
-          <p:nvPr/>
-        </p:nvSpPr>
-        <p:spPr>
-          <a:xfrm>
-            <a:off x="2373479" y="3619834"/>
-            <a:ext cx="2033151" cy="914400"/>
-          </a:xfrm>
-          <a:prstGeom prst="rect">
-            <a:avLst/>
-          </a:prstGeom>
-          <a:solidFill>
-            <a:schemeClr val="accent2">
-              <a:lumMod val="40000"/>
-              <a:lumOff val="60000"/>
-            </a:schemeClr>
-          </a:solidFill>
-          <a:ln>
-            <a:solidFill>
-              <a:schemeClr val="tx1"/>
-            </a:solidFill>
-          </a:ln>
-        </p:spPr>
-        <p:style>
-          <a:lnRef idx="2">
-            <a:schemeClr val="accent1">
-              <a:shade val="50000"/>
-            </a:schemeClr>
-          </a:lnRef>
-          <a:fillRef idx="1">
-            <a:schemeClr val="accent1"/>
-          </a:fillRef>
-          <a:effectRef idx="0">
-            <a:schemeClr val="accent1"/>
-          </a:effectRef>
-          <a:fontRef idx="minor">
-            <a:schemeClr val="lt1"/>
-          </a:fontRef>
-        </p:style>
-        <p:txBody>
-          <a:bodyPr rtlCol="0" anchor="b" anchorCtr="0"/>
-          <a:lstStyle/>
-          <a:p>
-            <a:pPr algn="ctr"/>
-            <a:r>
-              <a:rPr lang="en-US" sz="1400" dirty="0">
-                <a:solidFill>
-                  <a:schemeClr val="tx1"/>
-                </a:solidFill>
-                <a:latin typeface="LXGW WenKai" panose="02020500000000000000" pitchFamily="18" charset="-120"/>
-                <a:ea typeface="LXGW WenKai" panose="02020500000000000000" pitchFamily="18" charset="-120"/>
-              </a:rPr>
-              <a:t>Agent</a:t>
-            </a:r>
-          </a:p>
-        </p:txBody>
-      </p:sp>
-      <p:sp>
-        <p:nvSpPr>
-          <p:cNvPr id="144" name="Rectangle 143">
-            <a:extLst>
-              <a:ext uri="{FF2B5EF4-FFF2-40B4-BE49-F238E27FC236}">
-                <a16:creationId xmlns:a16="http://schemas.microsoft.com/office/drawing/2014/main" id="{91FED968-9E3F-7EAE-6E2E-84A4B4A9BCD2}"/>
-              </a:ext>
-            </a:extLst>
-          </p:cNvPr>
-          <p:cNvSpPr/>
-          <p:nvPr/>
-        </p:nvSpPr>
-        <p:spPr>
-          <a:xfrm>
-            <a:off x="2534866" y="3797862"/>
-            <a:ext cx="770430" cy="359761"/>
-          </a:xfrm>
-          <a:prstGeom prst="rect">
-            <a:avLst/>
-          </a:prstGeom>
-          <a:solidFill>
-            <a:schemeClr val="bg1">
-              <a:lumMod val="95000"/>
-            </a:schemeClr>
-          </a:solidFill>
-          <a:ln>
-            <a:solidFill>
-              <a:schemeClr val="tx1"/>
-            </a:solidFill>
-          </a:ln>
-        </p:spPr>
-        <p:style>
-          <a:lnRef idx="2">
-            <a:schemeClr val="accent1">
-              <a:shade val="50000"/>
-            </a:schemeClr>
-          </a:lnRef>
-          <a:fillRef idx="1">
-            <a:schemeClr val="accent1"/>
-          </a:fillRef>
-          <a:effectRef idx="0">
-            <a:schemeClr val="accent1"/>
-          </a:effectRef>
-          <a:fontRef idx="minor">
-            <a:schemeClr val="lt1"/>
-          </a:fontRef>
-        </p:style>
-        <p:txBody>
-          <a:bodyPr rtlCol="0" anchor="ctr" anchorCtr="1"/>
-          <a:lstStyle/>
-          <a:p>
-            <a:pPr algn="ctr"/>
-            <a:r>
-              <a:rPr lang="en-US" sz="1000" dirty="0">
-                <a:solidFill>
-                  <a:schemeClr val="tx1"/>
-                </a:solidFill>
-                <a:latin typeface="LXGW WenKai" panose="02020500000000000000" pitchFamily="18" charset="-120"/>
-                <a:ea typeface="LXGW WenKai" panose="02020500000000000000" pitchFamily="18" charset="-120"/>
-              </a:rPr>
-              <a:t>System prompts</a:t>
-            </a:r>
-            <a:endParaRPr lang="en-US" sz="1050" dirty="0">
-              <a:solidFill>
-                <a:schemeClr val="tx1"/>
-              </a:solidFill>
-              <a:latin typeface="LXGW WenKai" panose="02020500000000000000" pitchFamily="18" charset="-120"/>
-              <a:ea typeface="LXGW WenKai" panose="02020500000000000000" pitchFamily="18" charset="-120"/>
-            </a:endParaRPr>
-          </a:p>
-        </p:txBody>
-      </p:sp>
-      <p:sp>
-        <p:nvSpPr>
-          <p:cNvPr id="145" name="Rectangle 144">
-            <a:extLst>
-              <a:ext uri="{FF2B5EF4-FFF2-40B4-BE49-F238E27FC236}">
-                <a16:creationId xmlns:a16="http://schemas.microsoft.com/office/drawing/2014/main" id="{BD16667A-49D0-712E-D96E-003D719DA2D4}"/>
-              </a:ext>
-            </a:extLst>
-          </p:cNvPr>
-          <p:cNvSpPr/>
-          <p:nvPr/>
-        </p:nvSpPr>
-        <p:spPr>
-          <a:xfrm>
-            <a:off x="3517280" y="3797862"/>
-            <a:ext cx="770430" cy="359761"/>
-          </a:xfrm>
-          <a:prstGeom prst="rect">
-            <a:avLst/>
-          </a:prstGeom>
-          <a:solidFill>
-            <a:schemeClr val="bg1">
-              <a:lumMod val="95000"/>
-            </a:schemeClr>
-          </a:solidFill>
-          <a:ln>
-            <a:solidFill>
-              <a:schemeClr val="tx1"/>
-            </a:solidFill>
-          </a:ln>
-        </p:spPr>
-        <p:style>
-          <a:lnRef idx="2">
-            <a:schemeClr val="accent1">
-              <a:shade val="50000"/>
-            </a:schemeClr>
-          </a:lnRef>
-          <a:fillRef idx="1">
-            <a:schemeClr val="accent1"/>
-          </a:fillRef>
-          <a:effectRef idx="0">
-            <a:schemeClr val="accent1"/>
-          </a:effectRef>
-          <a:fontRef idx="minor">
-            <a:schemeClr val="lt1"/>
-          </a:fontRef>
-        </p:style>
-        <p:txBody>
-          <a:bodyPr rtlCol="0" anchor="ctr" anchorCtr="1"/>
-          <a:lstStyle/>
-          <a:p>
-            <a:pPr algn="ctr"/>
-            <a:r>
-              <a:rPr lang="en-US" sz="1000" dirty="0">
-                <a:solidFill>
-                  <a:schemeClr val="tx1"/>
-                </a:solidFill>
-                <a:latin typeface="LXGW WenKai" panose="02020500000000000000" pitchFamily="18" charset="-120"/>
-                <a:ea typeface="LXGW WenKai" panose="02020500000000000000" pitchFamily="18" charset="-120"/>
-              </a:rPr>
-              <a:t>Chat</a:t>
-            </a:r>
-          </a:p>
-          <a:p>
-            <a:pPr algn="ctr"/>
-            <a:r>
-              <a:rPr lang="en-US" sz="1000" dirty="0">
-                <a:solidFill>
-                  <a:schemeClr val="tx1"/>
-                </a:solidFill>
-                <a:latin typeface="LXGW WenKai" panose="02020500000000000000" pitchFamily="18" charset="-120"/>
-                <a:ea typeface="LXGW WenKai" panose="02020500000000000000" pitchFamily="18" charset="-120"/>
-              </a:rPr>
-              <a:t>History</a:t>
-            </a:r>
-            <a:endParaRPr lang="en-US" sz="1050" dirty="0">
-              <a:solidFill>
-                <a:schemeClr val="tx1"/>
-              </a:solidFill>
-              <a:latin typeface="LXGW WenKai" panose="02020500000000000000" pitchFamily="18" charset="-120"/>
-              <a:ea typeface="LXGW WenKai" panose="02020500000000000000" pitchFamily="18" charset="-120"/>
-            </a:endParaRPr>
-          </a:p>
-        </p:txBody>
-      </p:sp>
-      <p:sp>
-        <p:nvSpPr>
-          <p:cNvPr id="146" name="Rectangle 145">
-            <a:extLst>
-              <a:ext uri="{FF2B5EF4-FFF2-40B4-BE49-F238E27FC236}">
-                <a16:creationId xmlns:a16="http://schemas.microsoft.com/office/drawing/2014/main" id="{2F241573-1DFB-B4E8-A247-315E4818D5AC}"/>
-              </a:ext>
-            </a:extLst>
-          </p:cNvPr>
-          <p:cNvSpPr/>
-          <p:nvPr/>
-        </p:nvSpPr>
-        <p:spPr>
-          <a:xfrm>
-            <a:off x="9312051" y="5276558"/>
-            <a:ext cx="848209" cy="308049"/>
+            <a:off x="8660843" y="4300999"/>
+            <a:ext cx="774000" cy="223200"/>
           </a:xfrm>
           <a:prstGeom prst="rect">
             <a:avLst/>
@@ -7397,7 +8302,7 @@
           <a:p>
             <a:pPr algn="ctr"/>
             <a:r>
-              <a:rPr lang="en-US" sz="1100" dirty="0">
+              <a:rPr lang="en-US" sz="1000" dirty="0">
                 <a:solidFill>
                   <a:schemeClr val="tx1"/>
                 </a:solidFill>
@@ -7409,302 +8314,6 @@
           </a:p>
         </p:txBody>
       </p:sp>
-      <p:cxnSp>
-        <p:nvCxnSpPr>
-          <p:cNvPr id="147" name="Connector: Elbow 146">
-            <a:extLst>
-              <a:ext uri="{FF2B5EF4-FFF2-40B4-BE49-F238E27FC236}">
-                <a16:creationId xmlns:a16="http://schemas.microsoft.com/office/drawing/2014/main" id="{58ECAB7D-063C-3497-99B4-5752BD3EE406}"/>
-              </a:ext>
-            </a:extLst>
-          </p:cNvPr>
-          <p:cNvCxnSpPr>
-            <a:cxnSpLocks/>
-            <a:stCxn id="77" idx="0"/>
-            <a:endCxn id="76" idx="0"/>
-          </p:cNvCxnSpPr>
-          <p:nvPr/>
-        </p:nvCxnSpPr>
-        <p:spPr>
-          <a:xfrm rot="16200000" flipV="1">
-            <a:off x="4764823" y="-567488"/>
-            <a:ext cx="610933" cy="4300415"/>
-          </a:xfrm>
-          <a:prstGeom prst="bentConnector3">
-            <a:avLst>
-              <a:gd name="adj1" fmla="val 143787"/>
-            </a:avLst>
-          </a:prstGeom>
-          <a:ln w="9525">
-            <a:solidFill>
-              <a:schemeClr val="tx1"/>
-            </a:solidFill>
-            <a:prstDash val="dash"/>
-            <a:headEnd type="triangle"/>
-            <a:tailEnd type="triangle"/>
-          </a:ln>
-        </p:spPr>
-        <p:style>
-          <a:lnRef idx="1">
-            <a:schemeClr val="accent1"/>
-          </a:lnRef>
-          <a:fillRef idx="0">
-            <a:schemeClr val="accent1"/>
-          </a:fillRef>
-          <a:effectRef idx="0">
-            <a:schemeClr val="accent1"/>
-          </a:effectRef>
-          <a:fontRef idx="minor">
-            <a:schemeClr val="tx1"/>
-          </a:fontRef>
-        </p:style>
-      </p:cxnSp>
-      <p:cxnSp>
-        <p:nvCxnSpPr>
-          <p:cNvPr id="152" name="Connector: Elbow 151">
-            <a:extLst>
-              <a:ext uri="{FF2B5EF4-FFF2-40B4-BE49-F238E27FC236}">
-                <a16:creationId xmlns:a16="http://schemas.microsoft.com/office/drawing/2014/main" id="{E0F8D9DA-5181-2F80-AF0D-1A1C1C83DD97}"/>
-              </a:ext>
-            </a:extLst>
-          </p:cNvPr>
-          <p:cNvCxnSpPr>
-            <a:cxnSpLocks/>
-            <a:stCxn id="77" idx="1"/>
-            <a:endCxn id="141" idx="0"/>
-          </p:cNvCxnSpPr>
-          <p:nvPr/>
-        </p:nvCxnSpPr>
-        <p:spPr>
-          <a:xfrm rot="10800000" flipV="1">
-            <a:off x="2920082" y="2208532"/>
-            <a:ext cx="3614615" cy="320345"/>
-          </a:xfrm>
-          <a:prstGeom prst="bentConnector2">
-            <a:avLst/>
-          </a:prstGeom>
-          <a:ln w="9525">
-            <a:solidFill>
-              <a:schemeClr val="tx1"/>
-            </a:solidFill>
-            <a:prstDash val="dash"/>
-            <a:headEnd type="triangle"/>
-            <a:tailEnd type="triangle"/>
-          </a:ln>
-        </p:spPr>
-        <p:style>
-          <a:lnRef idx="1">
-            <a:schemeClr val="accent1"/>
-          </a:lnRef>
-          <a:fillRef idx="0">
-            <a:schemeClr val="accent1"/>
-          </a:fillRef>
-          <a:effectRef idx="0">
-            <a:schemeClr val="accent1"/>
-          </a:effectRef>
-          <a:fontRef idx="minor">
-            <a:schemeClr val="tx1"/>
-          </a:fontRef>
-        </p:style>
-      </p:cxnSp>
-      <p:cxnSp>
-        <p:nvCxnSpPr>
-          <p:cNvPr id="155" name="Connector: Elbow 154">
-            <a:extLst>
-              <a:ext uri="{FF2B5EF4-FFF2-40B4-BE49-F238E27FC236}">
-                <a16:creationId xmlns:a16="http://schemas.microsoft.com/office/drawing/2014/main" id="{B610ECF4-E72B-70CD-6D29-99F74420E889}"/>
-              </a:ext>
-            </a:extLst>
-          </p:cNvPr>
-          <p:cNvCxnSpPr>
-            <a:cxnSpLocks/>
-            <a:stCxn id="77" idx="2"/>
-            <a:endCxn id="144" idx="0"/>
-          </p:cNvCxnSpPr>
-          <p:nvPr/>
-        </p:nvCxnSpPr>
-        <p:spPr>
-          <a:xfrm rot="5400000">
-            <a:off x="4435798" y="1013163"/>
-            <a:ext cx="1268983" cy="4300415"/>
-          </a:xfrm>
-          <a:prstGeom prst="bentConnector3">
-            <a:avLst>
-              <a:gd name="adj1" fmla="val 74530"/>
-            </a:avLst>
-          </a:prstGeom>
-          <a:ln w="9525">
-            <a:solidFill>
-              <a:schemeClr val="tx1"/>
-            </a:solidFill>
-            <a:prstDash val="dash"/>
-            <a:headEnd type="triangle"/>
-            <a:tailEnd type="triangle"/>
-          </a:ln>
-        </p:spPr>
-        <p:style>
-          <a:lnRef idx="1">
-            <a:schemeClr val="accent1"/>
-          </a:lnRef>
-          <a:fillRef idx="0">
-            <a:schemeClr val="accent1"/>
-          </a:fillRef>
-          <a:effectRef idx="0">
-            <a:schemeClr val="accent1"/>
-          </a:effectRef>
-          <a:fontRef idx="minor">
-            <a:schemeClr val="tx1"/>
-          </a:fontRef>
-        </p:style>
-      </p:cxnSp>
-      <p:cxnSp>
-        <p:nvCxnSpPr>
-          <p:cNvPr id="163" name="Connector: Elbow 162">
-            <a:extLst>
-              <a:ext uri="{FF2B5EF4-FFF2-40B4-BE49-F238E27FC236}">
-                <a16:creationId xmlns:a16="http://schemas.microsoft.com/office/drawing/2014/main" id="{0FE27888-A62C-8AE2-B24B-F57490930192}"/>
-              </a:ext>
-            </a:extLst>
-          </p:cNvPr>
-          <p:cNvCxnSpPr>
-            <a:cxnSpLocks/>
-            <a:stCxn id="77" idx="1"/>
-            <a:endCxn id="142" idx="0"/>
-          </p:cNvCxnSpPr>
-          <p:nvPr/>
-        </p:nvCxnSpPr>
-        <p:spPr>
-          <a:xfrm rot="10800000" flipV="1">
-            <a:off x="3902496" y="2208532"/>
-            <a:ext cx="2632201" cy="320345"/>
-          </a:xfrm>
-          <a:prstGeom prst="bentConnector2">
-            <a:avLst/>
-          </a:prstGeom>
-          <a:ln w="9525">
-            <a:solidFill>
-              <a:schemeClr val="tx1"/>
-            </a:solidFill>
-            <a:prstDash val="dash"/>
-            <a:headEnd type="triangle"/>
-            <a:tailEnd type="triangle"/>
-          </a:ln>
-        </p:spPr>
-        <p:style>
-          <a:lnRef idx="1">
-            <a:schemeClr val="accent1"/>
-          </a:lnRef>
-          <a:fillRef idx="0">
-            <a:schemeClr val="accent1"/>
-          </a:fillRef>
-          <a:effectRef idx="0">
-            <a:schemeClr val="accent1"/>
-          </a:effectRef>
-          <a:fontRef idx="minor">
-            <a:schemeClr val="tx1"/>
-          </a:fontRef>
-        </p:style>
-      </p:cxnSp>
-      <p:cxnSp>
-        <p:nvCxnSpPr>
-          <p:cNvPr id="167" name="Connector: Elbow 166">
-            <a:extLst>
-              <a:ext uri="{FF2B5EF4-FFF2-40B4-BE49-F238E27FC236}">
-                <a16:creationId xmlns:a16="http://schemas.microsoft.com/office/drawing/2014/main" id="{D88E1486-A9EA-09B1-DB52-912EF09BB8E6}"/>
-              </a:ext>
-            </a:extLst>
-          </p:cNvPr>
-          <p:cNvCxnSpPr>
-            <a:cxnSpLocks/>
-            <a:stCxn id="77" idx="2"/>
-            <a:endCxn id="145" idx="0"/>
-          </p:cNvCxnSpPr>
-          <p:nvPr/>
-        </p:nvCxnSpPr>
-        <p:spPr>
-          <a:xfrm rot="5400000">
-            <a:off x="4927005" y="1504370"/>
-            <a:ext cx="1268983" cy="3318001"/>
-          </a:xfrm>
-          <a:prstGeom prst="bentConnector3">
-            <a:avLst>
-              <a:gd name="adj1" fmla="val 74530"/>
-            </a:avLst>
-          </a:prstGeom>
-          <a:ln w="9525">
-            <a:solidFill>
-              <a:schemeClr val="tx1"/>
-            </a:solidFill>
-            <a:prstDash val="dash"/>
-            <a:headEnd type="triangle"/>
-            <a:tailEnd type="triangle"/>
-          </a:ln>
-        </p:spPr>
-        <p:style>
-          <a:lnRef idx="1">
-            <a:schemeClr val="accent1"/>
-          </a:lnRef>
-          <a:fillRef idx="0">
-            <a:schemeClr val="accent1"/>
-          </a:fillRef>
-          <a:effectRef idx="0">
-            <a:schemeClr val="accent1"/>
-          </a:effectRef>
-          <a:fontRef idx="minor">
-            <a:schemeClr val="tx1"/>
-          </a:fontRef>
-        </p:style>
-      </p:cxnSp>
-      <p:cxnSp>
-        <p:nvCxnSpPr>
-          <p:cNvPr id="170" name="Connector: Elbow 169">
-            <a:extLst>
-              <a:ext uri="{FF2B5EF4-FFF2-40B4-BE49-F238E27FC236}">
-                <a16:creationId xmlns:a16="http://schemas.microsoft.com/office/drawing/2014/main" id="{EBF495D6-F8BE-408D-9041-EF68C7867D46}"/>
-              </a:ext>
-            </a:extLst>
-          </p:cNvPr>
-          <p:cNvCxnSpPr>
-            <a:cxnSpLocks/>
-            <a:stCxn id="77" idx="0"/>
-            <a:endCxn id="139" idx="0"/>
-          </p:cNvCxnSpPr>
-          <p:nvPr/>
-        </p:nvCxnSpPr>
-        <p:spPr>
-          <a:xfrm rot="16200000" flipV="1">
-            <a:off x="5256030" y="-76281"/>
-            <a:ext cx="610933" cy="3318001"/>
-          </a:xfrm>
-          <a:prstGeom prst="bentConnector3">
-            <a:avLst>
-              <a:gd name="adj1" fmla="val 143787"/>
-            </a:avLst>
-          </a:prstGeom>
-          <a:ln w="9525">
-            <a:solidFill>
-              <a:schemeClr val="tx1"/>
-            </a:solidFill>
-            <a:prstDash val="dash"/>
-            <a:headEnd type="triangle"/>
-            <a:tailEnd type="triangle"/>
-          </a:ln>
-        </p:spPr>
-        <p:style>
-          <a:lnRef idx="1">
-            <a:schemeClr val="accent1"/>
-          </a:lnRef>
-          <a:fillRef idx="0">
-            <a:schemeClr val="accent1"/>
-          </a:fillRef>
-          <a:effectRef idx="0">
-            <a:schemeClr val="accent1"/>
-          </a:effectRef>
-          <a:fontRef idx="minor">
-            <a:schemeClr val="tx1"/>
-          </a:fontRef>
-        </p:style>
-      </p:cxnSp>
     </p:spTree>
     <p:extLst>
       <p:ext uri="{BB962C8B-B14F-4D97-AF65-F5344CB8AC3E}">
@@ -8572,20 +9181,20 @@
 </file>
 
 <file path=customXml/item2.xml><?xml version="1.0" encoding="utf-8"?>
+<p:properties xmlns:p="http://schemas.microsoft.com/office/2006/metadata/properties" xmlns:xsi="http://www.w3.org/2001/XMLSchema-instance" xmlns:pc="http://schemas.microsoft.com/office/infopath/2007/PartnerControls">
+  <documentManagement>
+    <_activity xmlns="b9c0df90-6177-490c-b060-567d6533c817" xsi:nil="true"/>
+  </documentManagement>
+</p:properties>
+</file>
+
+<file path=customXml/item3.xml><?xml version="1.0" encoding="utf-8"?>
 <?mso-contentType ?>
 <FormTemplates xmlns="http://schemas.microsoft.com/sharepoint/v3/contenttype/forms">
   <Display>DocumentLibraryForm</Display>
   <Edit>DocumentLibraryForm</Edit>
   <New>DocumentLibraryForm</New>
 </FormTemplates>
-</file>
-
-<file path=customXml/item3.xml><?xml version="1.0" encoding="utf-8"?>
-<p:properties xmlns:p="http://schemas.microsoft.com/office/2006/metadata/properties" xmlns:xsi="http://www.w3.org/2001/XMLSchema-instance" xmlns:pc="http://schemas.microsoft.com/office/infopath/2007/PartnerControls">
-  <documentManagement>
-    <_activity xmlns="b9c0df90-6177-490c-b060-567d6533c817" xsi:nil="true"/>
-  </documentManagement>
-</p:properties>
 </file>
 
 <file path=customXml/itemProps1.xml><?xml version="1.0" encoding="utf-8"?>
@@ -8608,14 +9217,6 @@
 </file>
 
 <file path=customXml/itemProps2.xml><?xml version="1.0" encoding="utf-8"?>
-<ds:datastoreItem xmlns:ds="http://schemas.openxmlformats.org/officeDocument/2006/customXml" ds:itemID="{86A9A6AE-A2D2-4466-B053-FEAA2AECCDAE}">
-  <ds:schemaRefs>
-    <ds:schemaRef ds:uri="http://schemas.microsoft.com/sharepoint/v3/contenttype/forms"/>
-  </ds:schemaRefs>
-</ds:datastoreItem>
-</file>
-
-<file path=customXml/itemProps3.xml><?xml version="1.0" encoding="utf-8"?>
 <ds:datastoreItem xmlns:ds="http://schemas.openxmlformats.org/officeDocument/2006/customXml" ds:itemID="{0988BE9C-0C90-420C-9DA9-636C0435E5D7}">
   <ds:schemaRefs>
     <ds:schemaRef ds:uri="http://schemas.microsoft.com/office/2006/documentManagement/types"/>
@@ -8632,6 +9233,14 @@
 </ds:datastoreItem>
 </file>
 
+<file path=customXml/itemProps3.xml><?xml version="1.0" encoding="utf-8"?>
+<ds:datastoreItem xmlns:ds="http://schemas.openxmlformats.org/officeDocument/2006/customXml" ds:itemID="{86A9A6AE-A2D2-4466-B053-FEAA2AECCDAE}">
+  <ds:schemaRefs>
+    <ds:schemaRef ds:uri="http://schemas.microsoft.com/sharepoint/v3/contenttype/forms"/>
+  </ds:schemaRefs>
+</ds:datastoreItem>
+</file>
+
 <file path=docMetadata/LabelInfo.xml><?xml version="1.0" encoding="utf-8"?>
 <clbl:labelList xmlns:clbl="http://schemas.microsoft.com/office/2020/mipLabelMetadata">
   <clbl:label id="{46c98d88-e344-4ed4-8496-4ed7712e255d}" enabled="0" method="" siteId="{46c98d88-e344-4ed4-8496-4ed7712e255d}" removed="1"/>

</xml_diff>

<commit_message>
[Doc] Update architecture to make it more general, and move GPT-Agents part
</commit_message>
<xml_diff>
--- a/examples/architecture.pptx
+++ b/examples/architecture.pptx
@@ -5,11 +5,10 @@
     <p:sldMasterId id="2147483648" r:id="rId4"/>
   </p:sldMasterIdLst>
   <p:notesMasterIdLst>
-    <p:notesMasterId r:id="rId7"/>
+    <p:notesMasterId r:id="rId6"/>
   </p:notesMasterIdLst>
   <p:sldIdLst>
     <p:sldId id="256" r:id="rId5"/>
-    <p:sldId id="257" r:id="rId6"/>
   </p:sldIdLst>
   <p:sldSz cx="12192000" cy="6858000"/>
   <p:notesSz cx="6858000" cy="9144000"/>
@@ -559,93 +558,6 @@
     <p:extLst>
       <p:ext uri="{BB962C8B-B14F-4D97-AF65-F5344CB8AC3E}">
         <p14:creationId xmlns:p14="http://schemas.microsoft.com/office/powerpoint/2010/main" val="2085464243"/>
-      </p:ext>
-    </p:extLst>
-  </p:cSld>
-  <p:clrMapOvr>
-    <a:masterClrMapping/>
-  </p:clrMapOvr>
-</p:notes>
-</file>
-
-<file path=ppt/notesSlides/notesSlide2.xml><?xml version="1.0" encoding="utf-8"?>
-<p:notes xmlns:a="http://schemas.openxmlformats.org/drawingml/2006/main" xmlns:r="http://schemas.openxmlformats.org/officeDocument/2006/relationships" xmlns:p="http://schemas.openxmlformats.org/presentationml/2006/main">
-  <p:cSld>
-    <p:spTree>
-      <p:nvGrpSpPr>
-        <p:cNvPr id="1" name=""/>
-        <p:cNvGrpSpPr/>
-        <p:nvPr/>
-      </p:nvGrpSpPr>
-      <p:grpSpPr>
-        <a:xfrm>
-          <a:off x="0" y="0"/>
-          <a:ext cx="0" cy="0"/>
-          <a:chOff x="0" y="0"/>
-          <a:chExt cx="0" cy="0"/>
-        </a:xfrm>
-      </p:grpSpPr>
-      <p:sp>
-        <p:nvSpPr>
-          <p:cNvPr id="2" name="Slide Image Placeholder 1"/>
-          <p:cNvSpPr>
-            <a:spLocks noGrp="1" noRot="1" noChangeAspect="1"/>
-          </p:cNvSpPr>
-          <p:nvPr>
-            <p:ph type="sldImg"/>
-          </p:nvPr>
-        </p:nvSpPr>
-        <p:spPr/>
-      </p:sp>
-      <p:sp>
-        <p:nvSpPr>
-          <p:cNvPr id="3" name="Notes Placeholder 2"/>
-          <p:cNvSpPr>
-            <a:spLocks noGrp="1"/>
-          </p:cNvSpPr>
-          <p:nvPr>
-            <p:ph type="body" idx="1"/>
-          </p:nvPr>
-        </p:nvSpPr>
-        <p:spPr/>
-        <p:txBody>
-          <a:bodyPr/>
-          <a:lstStyle/>
-          <a:p>
-            <a:r>
-              <a:rPr lang="en-US" dirty="0"/>
-              <a:t>GPT-Agents</a:t>
-            </a:r>
-          </a:p>
-        </p:txBody>
-      </p:sp>
-      <p:sp>
-        <p:nvSpPr>
-          <p:cNvPr id="4" name="Slide Number Placeholder 3"/>
-          <p:cNvSpPr>
-            <a:spLocks noGrp="1"/>
-          </p:cNvSpPr>
-          <p:nvPr>
-            <p:ph type="sldNum" sz="quarter" idx="5"/>
-          </p:nvPr>
-        </p:nvSpPr>
-        <p:spPr/>
-        <p:txBody>
-          <a:bodyPr/>
-          <a:lstStyle/>
-          <a:p>
-            <a:fld id="{D537CB0D-FD8F-437B-8EA1-4310BDC2B6BC}" type="slidenum">
-              <a:rPr lang="en-US" smtClean="0"/>
-              <a:t>2</a:t>
-            </a:fld>
-            <a:endParaRPr lang="en-US"/>
-          </a:p>
-        </p:txBody>
-      </p:sp>
-    </p:spTree>
-    <p:extLst>
-      <p:ext uri="{BB962C8B-B14F-4D97-AF65-F5344CB8AC3E}">
-        <p14:creationId xmlns:p14="http://schemas.microsoft.com/office/powerpoint/2010/main" val="3235507340"/>
       </p:ext>
     </p:extLst>
   </p:cSld>
@@ -4106,8 +4018,8 @@
         </p:nvSpPr>
         <p:spPr>
           <a:xfrm>
-            <a:off x="5391151" y="3229541"/>
-            <a:ext cx="3519813" cy="2704534"/>
+            <a:off x="5391150" y="2907149"/>
+            <a:ext cx="3519801" cy="1352046"/>
           </a:xfrm>
           <a:prstGeom prst="rect">
             <a:avLst/>
@@ -4161,7 +4073,7 @@
                 <a:latin typeface="LXGW WenKai" panose="02020500000000000000" pitchFamily="18" charset="-120"/>
                 <a:ea typeface="LXGW WenKai" panose="02020500000000000000" pitchFamily="18" charset="-120"/>
               </a:rPr>
-              <a:t>GPT-Agents</a:t>
+              <a:t>Reactors</a:t>
             </a:r>
           </a:p>
         </p:txBody>
@@ -4180,7 +4092,7 @@
         </p:nvSpPr>
         <p:spPr>
           <a:xfrm>
-            <a:off x="1053867" y="1880252"/>
+            <a:off x="1048847" y="983830"/>
             <a:ext cx="3445879" cy="2576452"/>
           </a:xfrm>
           <a:prstGeom prst="rect">
@@ -4236,72 +4148,6 @@
                 <a:ea typeface="LXGW WenKai" panose="02020500000000000000" pitchFamily="18" charset="-120"/>
               </a:rPr>
               <a:t>MongoDB</a:t>
-            </a:r>
-          </a:p>
-        </p:txBody>
-      </p:sp>
-      <p:sp>
-        <p:nvSpPr>
-          <p:cNvPr id="10" name="Rectangle 9">
-            <a:extLst>
-              <a:ext uri="{FF2B5EF4-FFF2-40B4-BE49-F238E27FC236}">
-                <a16:creationId xmlns:a16="http://schemas.microsoft.com/office/drawing/2014/main" id="{DCA583BF-5F72-DDD0-2FD2-90E209D4DDC4}"/>
-              </a:ext>
-            </a:extLst>
-          </p:cNvPr>
-          <p:cNvSpPr/>
-          <p:nvPr/>
-        </p:nvSpPr>
-        <p:spPr>
-          <a:xfrm>
-            <a:off x="5726514" y="3796684"/>
-            <a:ext cx="1075037" cy="465437"/>
-          </a:xfrm>
-          <a:prstGeom prst="rect">
-            <a:avLst/>
-          </a:prstGeom>
-          <a:solidFill>
-            <a:schemeClr val="accent6">
-              <a:lumMod val="40000"/>
-              <a:lumOff val="60000"/>
-            </a:schemeClr>
-          </a:solidFill>
-          <a:ln>
-            <a:solidFill>
-              <a:schemeClr val="tx1"/>
-            </a:solidFill>
-          </a:ln>
-        </p:spPr>
-        <p:style>
-          <a:lnRef idx="2">
-            <a:schemeClr val="accent1">
-              <a:shade val="50000"/>
-            </a:schemeClr>
-          </a:lnRef>
-          <a:fillRef idx="1">
-            <a:schemeClr val="accent1"/>
-          </a:fillRef>
-          <a:effectRef idx="0">
-            <a:schemeClr val="accent1"/>
-          </a:effectRef>
-          <a:fontRef idx="minor">
-            <a:schemeClr val="lt1"/>
-          </a:fontRef>
-        </p:style>
-        <p:txBody>
-          <a:bodyPr rtlCol="0" anchor="ctr" anchorCtr="1"/>
-          <a:lstStyle/>
-          <a:p>
-            <a:pPr algn="ctr"/>
-            <a:r>
-              <a:rPr lang="en-US" sz="1400" dirty="0">
-                <a:solidFill>
-                  <a:schemeClr val="tx1"/>
-                </a:solidFill>
-                <a:latin typeface="LXGW WenKai" panose="02020500000000000000" pitchFamily="18" charset="-120"/>
-                <a:ea typeface="LXGW WenKai" panose="02020500000000000000" pitchFamily="18" charset="-120"/>
-              </a:rPr>
-              <a:t>Flask</a:t>
             </a:r>
           </a:p>
         </p:txBody>
@@ -4489,138 +4335,6 @@
       </p:cxnSp>
       <p:sp>
         <p:nvSpPr>
-          <p:cNvPr id="49" name="Rectangle 48">
-            <a:extLst>
-              <a:ext uri="{FF2B5EF4-FFF2-40B4-BE49-F238E27FC236}">
-                <a16:creationId xmlns:a16="http://schemas.microsoft.com/office/drawing/2014/main" id="{0900D2F3-9AD4-665C-2FF9-7C36D51D3EF0}"/>
-              </a:ext>
-            </a:extLst>
-          </p:cNvPr>
-          <p:cNvSpPr/>
-          <p:nvPr/>
-        </p:nvSpPr>
-        <p:spPr>
-          <a:xfrm>
-            <a:off x="7587470" y="3429000"/>
-            <a:ext cx="1013311" cy="1194823"/>
-          </a:xfrm>
-          <a:prstGeom prst="rect">
-            <a:avLst/>
-          </a:prstGeom>
-          <a:solidFill>
-            <a:schemeClr val="accent2">
-              <a:lumMod val="20000"/>
-              <a:lumOff val="80000"/>
-            </a:schemeClr>
-          </a:solidFill>
-          <a:ln>
-            <a:solidFill>
-              <a:schemeClr val="tx1"/>
-            </a:solidFill>
-          </a:ln>
-        </p:spPr>
-        <p:style>
-          <a:lnRef idx="2">
-            <a:schemeClr val="accent1">
-              <a:shade val="50000"/>
-            </a:schemeClr>
-          </a:lnRef>
-          <a:fillRef idx="1">
-            <a:schemeClr val="accent1"/>
-          </a:fillRef>
-          <a:effectRef idx="0">
-            <a:schemeClr val="accent1"/>
-          </a:effectRef>
-          <a:fontRef idx="minor">
-            <a:schemeClr val="lt1"/>
-          </a:fontRef>
-        </p:style>
-        <p:txBody>
-          <a:bodyPr rtlCol="0" anchor="b" anchorCtr="1"/>
-          <a:lstStyle/>
-          <a:p>
-            <a:pPr algn="ctr"/>
-            <a:r>
-              <a:rPr lang="en-US" sz="1400" dirty="0">
-                <a:solidFill>
-                  <a:schemeClr val="tx1"/>
-                </a:solidFill>
-                <a:latin typeface="LXGW WenKai" panose="02020500000000000000" pitchFamily="18" charset="-120"/>
-                <a:ea typeface="LXGW WenKai" panose="02020500000000000000" pitchFamily="18" charset="-120"/>
-              </a:rPr>
-              <a:t>Managers</a:t>
-            </a:r>
-          </a:p>
-        </p:txBody>
-      </p:sp>
-      <p:sp>
-        <p:nvSpPr>
-          <p:cNvPr id="53" name="Rectangle 52">
-            <a:extLst>
-              <a:ext uri="{FF2B5EF4-FFF2-40B4-BE49-F238E27FC236}">
-                <a16:creationId xmlns:a16="http://schemas.microsoft.com/office/drawing/2014/main" id="{F899B14D-B54D-BDCA-ACEE-CFF7225092D0}"/>
-              </a:ext>
-            </a:extLst>
-          </p:cNvPr>
-          <p:cNvSpPr/>
-          <p:nvPr/>
-        </p:nvSpPr>
-        <p:spPr>
-          <a:xfrm>
-            <a:off x="7756266" y="3534332"/>
-            <a:ext cx="685449" cy="186648"/>
-          </a:xfrm>
-          <a:prstGeom prst="rect">
-            <a:avLst/>
-          </a:prstGeom>
-          <a:solidFill>
-            <a:schemeClr val="accent2">
-              <a:lumMod val="40000"/>
-              <a:lumOff val="60000"/>
-            </a:schemeClr>
-          </a:solidFill>
-          <a:ln>
-            <a:solidFill>
-              <a:schemeClr val="tx1"/>
-            </a:solidFill>
-          </a:ln>
-        </p:spPr>
-        <p:style>
-          <a:lnRef idx="2">
-            <a:schemeClr val="accent1">
-              <a:shade val="50000"/>
-            </a:schemeClr>
-          </a:lnRef>
-          <a:fillRef idx="1">
-            <a:schemeClr val="accent1"/>
-          </a:fillRef>
-          <a:effectRef idx="0">
-            <a:schemeClr val="accent1"/>
-          </a:effectRef>
-          <a:fontRef idx="minor">
-            <a:schemeClr val="lt1"/>
-          </a:fontRef>
-        </p:style>
-        <p:txBody>
-          <a:bodyPr rtlCol="0" anchor="ctr" anchorCtr="1"/>
-          <a:lstStyle/>
-          <a:p>
-            <a:pPr algn="ctr"/>
-            <a:r>
-              <a:rPr lang="en-US" sz="1200" dirty="0">
-                <a:solidFill>
-                  <a:schemeClr val="tx1"/>
-                </a:solidFill>
-                <a:latin typeface="LXGW WenKai" panose="02020500000000000000" pitchFamily="18" charset="-120"/>
-                <a:ea typeface="LXGW WenKai" panose="02020500000000000000" pitchFamily="18" charset="-120"/>
-              </a:rPr>
-              <a:t>Agent</a:t>
-            </a:r>
-          </a:p>
-        </p:txBody>
-      </p:sp>
-      <p:sp>
-        <p:nvSpPr>
           <p:cNvPr id="18" name="文本框 17">
             <a:extLst>
               <a:ext uri="{FF2B5EF4-FFF2-40B4-BE49-F238E27FC236}">
@@ -4815,7 +4529,7 @@
         </p:nvSpPr>
         <p:spPr>
           <a:xfrm>
-            <a:off x="1165220" y="4702434"/>
+            <a:off x="1160200" y="3806012"/>
             <a:ext cx="3223172" cy="453183"/>
           </a:xfrm>
           <a:prstGeom prst="rect">
@@ -5082,7 +4796,7 @@
         </p:nvCxnSpPr>
         <p:spPr>
           <a:xfrm flipV="1">
-            <a:off x="2776806" y="4456704"/>
+            <a:off x="2771786" y="3560282"/>
             <a:ext cx="1" cy="245730"/>
           </a:xfrm>
           <a:prstGeom prst="straightConnector1">
@@ -5121,138 +4835,6 @@
           </a:fontRef>
         </p:style>
       </p:cxnSp>
-      <p:sp>
-        <p:nvSpPr>
-          <p:cNvPr id="83" name="Rectangle 52">
-            <a:extLst>
-              <a:ext uri="{FF2B5EF4-FFF2-40B4-BE49-F238E27FC236}">
-                <a16:creationId xmlns:a16="http://schemas.microsoft.com/office/drawing/2014/main" id="{0A85C779-3F24-EEEE-765C-0FC920B834AE}"/>
-              </a:ext>
-            </a:extLst>
-          </p:cNvPr>
-          <p:cNvSpPr/>
-          <p:nvPr/>
-        </p:nvSpPr>
-        <p:spPr>
-          <a:xfrm>
-            <a:off x="7756267" y="3777371"/>
-            <a:ext cx="685449" cy="186648"/>
-          </a:xfrm>
-          <a:prstGeom prst="rect">
-            <a:avLst/>
-          </a:prstGeom>
-          <a:solidFill>
-            <a:schemeClr val="accent2">
-              <a:lumMod val="40000"/>
-              <a:lumOff val="60000"/>
-            </a:schemeClr>
-          </a:solidFill>
-          <a:ln>
-            <a:solidFill>
-              <a:schemeClr val="tx1"/>
-            </a:solidFill>
-          </a:ln>
-        </p:spPr>
-        <p:style>
-          <a:lnRef idx="2">
-            <a:schemeClr val="accent1">
-              <a:shade val="50000"/>
-            </a:schemeClr>
-          </a:lnRef>
-          <a:fillRef idx="1">
-            <a:schemeClr val="accent1"/>
-          </a:fillRef>
-          <a:effectRef idx="0">
-            <a:schemeClr val="accent1"/>
-          </a:effectRef>
-          <a:fontRef idx="minor">
-            <a:schemeClr val="lt1"/>
-          </a:fontRef>
-        </p:style>
-        <p:txBody>
-          <a:bodyPr rtlCol="0" anchor="ctr" anchorCtr="1"/>
-          <a:lstStyle/>
-          <a:p>
-            <a:pPr algn="ctr"/>
-            <a:r>
-              <a:rPr lang="en-US" sz="1200" dirty="0">
-                <a:solidFill>
-                  <a:schemeClr val="tx1"/>
-                </a:solidFill>
-                <a:latin typeface="LXGW WenKai" panose="02020500000000000000" pitchFamily="18" charset="-120"/>
-                <a:ea typeface="LXGW WenKai" panose="02020500000000000000" pitchFamily="18" charset="-120"/>
-              </a:rPr>
-              <a:t>Agent</a:t>
-            </a:r>
-          </a:p>
-        </p:txBody>
-      </p:sp>
-      <p:sp>
-        <p:nvSpPr>
-          <p:cNvPr id="85" name="Rectangle 52">
-            <a:extLst>
-              <a:ext uri="{FF2B5EF4-FFF2-40B4-BE49-F238E27FC236}">
-                <a16:creationId xmlns:a16="http://schemas.microsoft.com/office/drawing/2014/main" id="{041CC23B-3285-B7A5-1101-13C81F98304D}"/>
-              </a:ext>
-            </a:extLst>
-          </p:cNvPr>
-          <p:cNvSpPr/>
-          <p:nvPr/>
-        </p:nvSpPr>
-        <p:spPr>
-          <a:xfrm>
-            <a:off x="7756266" y="4028983"/>
-            <a:ext cx="685449" cy="186648"/>
-          </a:xfrm>
-          <a:prstGeom prst="rect">
-            <a:avLst/>
-          </a:prstGeom>
-          <a:solidFill>
-            <a:schemeClr val="accent2">
-              <a:lumMod val="40000"/>
-              <a:lumOff val="60000"/>
-            </a:schemeClr>
-          </a:solidFill>
-          <a:ln>
-            <a:solidFill>
-              <a:schemeClr val="tx1"/>
-            </a:solidFill>
-          </a:ln>
-        </p:spPr>
-        <p:style>
-          <a:lnRef idx="2">
-            <a:schemeClr val="accent1">
-              <a:shade val="50000"/>
-            </a:schemeClr>
-          </a:lnRef>
-          <a:fillRef idx="1">
-            <a:schemeClr val="accent1"/>
-          </a:fillRef>
-          <a:effectRef idx="0">
-            <a:schemeClr val="accent1"/>
-          </a:effectRef>
-          <a:fontRef idx="minor">
-            <a:schemeClr val="lt1"/>
-          </a:fontRef>
-        </p:style>
-        <p:txBody>
-          <a:bodyPr rtlCol="0" anchor="ctr" anchorCtr="1"/>
-          <a:lstStyle/>
-          <a:p>
-            <a:pPr algn="ctr"/>
-            <a:r>
-              <a:rPr lang="en-US" sz="1200" dirty="0">
-                <a:solidFill>
-                  <a:schemeClr val="tx1"/>
-                </a:solidFill>
-                <a:latin typeface="LXGW WenKai" panose="02020500000000000000" pitchFamily="18" charset="-120"/>
-                <a:ea typeface="LXGW WenKai" panose="02020500000000000000" pitchFamily="18" charset="-120"/>
-              </a:rPr>
-              <a:t>Agent</a:t>
-            </a:r>
-          </a:p>
-        </p:txBody>
-      </p:sp>
       <p:cxnSp>
         <p:nvCxnSpPr>
           <p:cNvPr id="17" name="Straight Arrow Connector 14">
@@ -5264,7 +4846,7 @@
           </p:cNvPr>
           <p:cNvCxnSpPr>
             <a:cxnSpLocks/>
-            <a:stCxn id="10" idx="0"/>
+            <a:stCxn id="16" idx="0"/>
             <a:endCxn id="6" idx="2"/>
           </p:cNvCxnSpPr>
           <p:nvPr/>
@@ -5272,7 +4854,7 @@
         <p:spPr>
           <a:xfrm flipH="1" flipV="1">
             <a:off x="6261551" y="1863045"/>
-            <a:ext cx="2482" cy="1933639"/>
+            <a:ext cx="1" cy="1411790"/>
           </a:xfrm>
           <a:prstGeom prst="straightConnector1">
             <a:avLst/>
@@ -5318,15 +4900,15 @@
           </p:cNvPr>
           <p:cNvCxnSpPr>
             <a:cxnSpLocks/>
-            <a:stCxn id="10" idx="1"/>
+            <a:stCxn id="16" idx="1"/>
             <a:endCxn id="31" idx="3"/>
           </p:cNvCxnSpPr>
           <p:nvPr/>
         </p:nvCxnSpPr>
         <p:spPr>
           <a:xfrm rot="10800000">
-            <a:off x="4050868" y="3484259"/>
-            <a:ext cx="1675646" cy="545144"/>
+            <a:off x="4045848" y="2587838"/>
+            <a:ext cx="1675704" cy="919717"/>
           </a:xfrm>
           <a:prstGeom prst="bentConnector3">
             <a:avLst>
@@ -5371,7 +4953,7 @@
         </p:nvSpPr>
         <p:spPr>
           <a:xfrm>
-            <a:off x="1307203" y="2160476"/>
+            <a:off x="1302183" y="1264054"/>
             <a:ext cx="2684834" cy="526339"/>
           </a:xfrm>
           <a:prstGeom prst="roundRect">
@@ -5430,7 +5012,7 @@
         </p:nvSpPr>
         <p:spPr>
           <a:xfrm>
-            <a:off x="1307203" y="2964997"/>
+            <a:off x="1302183" y="2068575"/>
             <a:ext cx="2743665" cy="1038524"/>
           </a:xfrm>
           <a:prstGeom prst="roundRect">
@@ -5489,7 +5071,7 @@
         </p:nvSpPr>
         <p:spPr>
           <a:xfrm>
-            <a:off x="2720580" y="3518399"/>
+            <a:off x="2715560" y="2638755"/>
             <a:ext cx="1196369" cy="357840"/>
           </a:xfrm>
           <a:prstGeom prst="rect">
@@ -5562,7 +5144,7 @@
         </p:nvSpPr>
         <p:spPr>
           <a:xfrm>
-            <a:off x="1391468" y="3185917"/>
+            <a:off x="1386448" y="2306273"/>
             <a:ext cx="1196369" cy="526339"/>
           </a:xfrm>
           <a:prstGeom prst="rect">
@@ -5635,7 +5217,7 @@
         </p:nvSpPr>
         <p:spPr>
           <a:xfrm>
-            <a:off x="2723505" y="3021842"/>
+            <a:off x="2714812" y="2183998"/>
             <a:ext cx="1196369" cy="357840"/>
           </a:xfrm>
           <a:prstGeom prst="rect">
@@ -5701,7 +5283,7 @@
         </p:nvSpPr>
         <p:spPr>
           <a:xfrm>
-            <a:off x="1391468" y="2248108"/>
+            <a:off x="1386448" y="1351686"/>
             <a:ext cx="1196369" cy="360000"/>
           </a:xfrm>
           <a:prstGeom prst="rect">
@@ -5767,7 +5349,7 @@
         </p:nvSpPr>
         <p:spPr>
           <a:xfrm>
-            <a:off x="2719832" y="2248108"/>
+            <a:off x="2714812" y="1351686"/>
             <a:ext cx="1197864" cy="360000"/>
           </a:xfrm>
           <a:prstGeom prst="rect">
@@ -5836,9 +5418,9 @@
           <p:nvPr/>
         </p:nvCxnSpPr>
         <p:spPr>
-          <a:xfrm rot="10800000" flipV="1">
-            <a:off x="3992037" y="1630326"/>
-            <a:ext cx="1729514" cy="793319"/>
+          <a:xfrm rot="10800000">
+            <a:off x="3987017" y="1527225"/>
+            <a:ext cx="1734534" cy="103103"/>
           </a:xfrm>
           <a:prstGeom prst="bentConnector3">
             <a:avLst>
@@ -5871,10 +5453,10 @@
       </p:cxnSp>
       <p:sp>
         <p:nvSpPr>
-          <p:cNvPr id="43" name="矩形: 圆角 42">
-            <a:extLst>
-              <a:ext uri="{FF2B5EF4-FFF2-40B4-BE49-F238E27FC236}">
-                <a16:creationId xmlns:a16="http://schemas.microsoft.com/office/drawing/2014/main" id="{CD04CB64-B710-56CD-45A1-FF5976F60349}"/>
+          <p:cNvPr id="16" name="Rectangle 5">
+            <a:extLst>
+              <a:ext uri="{FF2B5EF4-FFF2-40B4-BE49-F238E27FC236}">
+                <a16:creationId xmlns:a16="http://schemas.microsoft.com/office/drawing/2014/main" id="{8802EFC9-F714-C822-EAE5-DBECC6774615}"/>
               </a:ext>
             </a:extLst>
           </p:cNvPr>
@@ -5883,75 +5465,16 @@
         </p:nvSpPr>
         <p:spPr>
           <a:xfrm>
-            <a:off x="5986527" y="4805124"/>
-            <a:ext cx="2347331" cy="641816"/>
-          </a:xfrm>
-          <a:prstGeom prst="roundRect">
-            <a:avLst>
-              <a:gd name="adj" fmla="val 8237"/>
-            </a:avLst>
-          </a:prstGeom>
-          <a:solidFill>
-            <a:schemeClr val="bg1">
-              <a:alpha val="20000"/>
-            </a:schemeClr>
-          </a:solidFill>
-          <a:ln>
-            <a:solidFill>
-              <a:schemeClr val="tx1"/>
-            </a:solidFill>
-            <a:prstDash val="dash"/>
-          </a:ln>
-        </p:spPr>
-        <p:style>
-          <a:lnRef idx="2">
-            <a:schemeClr val="accent1">
-              <a:shade val="15000"/>
-            </a:schemeClr>
-          </a:lnRef>
-          <a:fillRef idx="1">
-            <a:schemeClr val="accent1"/>
-          </a:fillRef>
-          <a:effectRef idx="0">
-            <a:schemeClr val="accent1"/>
-          </a:effectRef>
-          <a:fontRef idx="minor">
-            <a:schemeClr val="lt1"/>
-          </a:fontRef>
-        </p:style>
-        <p:txBody>
-          <a:bodyPr rtlCol="0" anchor="ctr"/>
-          <a:lstStyle/>
-          <a:p>
-            <a:pPr algn="ctr"/>
-            <a:endParaRPr lang="zh-CN" altLang="en-US"/>
-          </a:p>
-        </p:txBody>
-      </p:sp>
-      <p:sp>
-        <p:nvSpPr>
-          <p:cNvPr id="160" name="Rectangle 159">
-            <a:extLst>
-              <a:ext uri="{FF2B5EF4-FFF2-40B4-BE49-F238E27FC236}">
-                <a16:creationId xmlns:a16="http://schemas.microsoft.com/office/drawing/2014/main" id="{2D663D7A-E75A-A89B-C125-37C84B176016}"/>
-              </a:ext>
-            </a:extLst>
-          </p:cNvPr>
-          <p:cNvSpPr/>
-          <p:nvPr/>
-        </p:nvSpPr>
-        <p:spPr>
-          <a:xfrm>
-            <a:off x="6061393" y="4915666"/>
-            <a:ext cx="881844" cy="415942"/>
+            <a:off x="5721552" y="3274835"/>
+            <a:ext cx="1080000" cy="465437"/>
           </a:xfrm>
           <a:prstGeom prst="rect">
             <a:avLst/>
           </a:prstGeom>
           <a:solidFill>
-            <a:schemeClr val="accent2">
-              <a:lumMod val="60000"/>
-              <a:lumOff val="40000"/>
+            <a:schemeClr val="accent6">
+              <a:lumMod val="40000"/>
+              <a:lumOff val="60000"/>
             </a:schemeClr>
           </a:solidFill>
           <a:ln>
@@ -5989,17 +5512,17 @@
                 <a:latin typeface="LXGW WenKai" panose="02020500000000000000" pitchFamily="18" charset="-120"/>
                 <a:ea typeface="LXGW WenKai" panose="02020500000000000000" pitchFamily="18" charset="-120"/>
               </a:rPr>
-              <a:t>LLMs</a:t>
-            </a:r>
-          </a:p>
-        </p:txBody>
-      </p:sp>
-      <p:sp>
-        <p:nvSpPr>
-          <p:cNvPr id="86" name="Rectangle 159">
-            <a:extLst>
-              <a:ext uri="{FF2B5EF4-FFF2-40B4-BE49-F238E27FC236}">
-                <a16:creationId xmlns:a16="http://schemas.microsoft.com/office/drawing/2014/main" id="{EF6E2E0D-B1C0-4AFC-FB19-9C1377E5B734}"/>
+              <a:t>Flask</a:t>
+            </a:r>
+          </a:p>
+        </p:txBody>
+      </p:sp>
+      <p:sp>
+        <p:nvSpPr>
+          <p:cNvPr id="26" name="Rectangle 7">
+            <a:extLst>
+              <a:ext uri="{FF2B5EF4-FFF2-40B4-BE49-F238E27FC236}">
+                <a16:creationId xmlns:a16="http://schemas.microsoft.com/office/drawing/2014/main" id="{82F1360A-182D-A555-1FF2-284CBF3EACCE}"/>
               </a:ext>
             </a:extLst>
           </p:cNvPr>
@@ -6008,16 +5531,16 @@
         </p:nvSpPr>
         <p:spPr>
           <a:xfrm>
-            <a:off x="7361106" y="4915666"/>
-            <a:ext cx="881844" cy="415942"/>
+            <a:off x="7576314" y="3039908"/>
+            <a:ext cx="897196" cy="364001"/>
           </a:xfrm>
           <a:prstGeom prst="rect">
             <a:avLst/>
           </a:prstGeom>
           <a:solidFill>
-            <a:schemeClr val="accent2">
-              <a:lumMod val="60000"/>
-              <a:lumOff val="40000"/>
+            <a:schemeClr val="accent4">
+              <a:lumMod val="40000"/>
+              <a:lumOff val="60000"/>
             </a:schemeClr>
           </a:solidFill>
           <a:ln>
@@ -6055,35 +5578,35 @@
                 <a:latin typeface="LXGW WenKai" panose="02020500000000000000" pitchFamily="18" charset="-120"/>
                 <a:ea typeface="LXGW WenKai" panose="02020500000000000000" pitchFamily="18" charset="-120"/>
               </a:rPr>
-              <a:t>Tools</a:t>
+              <a:t>LLMs</a:t>
             </a:r>
           </a:p>
         </p:txBody>
       </p:sp>
       <p:cxnSp>
         <p:nvCxnSpPr>
-          <p:cNvPr id="44" name="Connector: Elbow 162">
-            <a:extLst>
-              <a:ext uri="{FF2B5EF4-FFF2-40B4-BE49-F238E27FC236}">
-                <a16:creationId xmlns:a16="http://schemas.microsoft.com/office/drawing/2014/main" id="{0732B11F-8D01-47FB-9ECE-AEC5AD37DB9E}"/>
+          <p:cNvPr id="28" name="Connector: Elbow 162">
+            <a:extLst>
+              <a:ext uri="{FF2B5EF4-FFF2-40B4-BE49-F238E27FC236}">
+                <a16:creationId xmlns:a16="http://schemas.microsoft.com/office/drawing/2014/main" id="{1C2AA5DB-93CF-CFBA-5387-FEAE7B238D15}"/>
               </a:ext>
             </a:extLst>
           </p:cNvPr>
           <p:cNvCxnSpPr>
             <a:cxnSpLocks/>
-            <a:stCxn id="43" idx="3"/>
-            <a:endCxn id="49" idx="3"/>
+            <a:stCxn id="26" idx="1"/>
+            <a:endCxn id="16" idx="3"/>
           </p:cNvCxnSpPr>
           <p:nvPr/>
         </p:nvCxnSpPr>
         <p:spPr>
-          <a:xfrm flipV="1">
-            <a:off x="8333858" y="4026412"/>
-            <a:ext cx="266923" cy="1099620"/>
+          <a:xfrm rot="10800000" flipV="1">
+            <a:off x="6801552" y="3221908"/>
+            <a:ext cx="774762" cy="285645"/>
           </a:xfrm>
           <a:prstGeom prst="bentConnector3">
             <a:avLst>
-              <a:gd name="adj1" fmla="val 185643"/>
+              <a:gd name="adj1" fmla="val 50000"/>
             </a:avLst>
           </a:prstGeom>
           <a:ln w="9525">
@@ -6110,96 +5633,12 @@
           </a:fontRef>
         </p:style>
       </p:cxnSp>
-      <p:cxnSp>
-        <p:nvCxnSpPr>
-          <p:cNvPr id="52" name="Straight Arrow Connector 14">
-            <a:extLst>
-              <a:ext uri="{FF2B5EF4-FFF2-40B4-BE49-F238E27FC236}">
-                <a16:creationId xmlns:a16="http://schemas.microsoft.com/office/drawing/2014/main" id="{1396601A-25D6-F7D1-97EC-2BD53FE112D5}"/>
-              </a:ext>
-            </a:extLst>
-          </p:cNvPr>
-          <p:cNvCxnSpPr>
-            <a:cxnSpLocks/>
-            <a:stCxn id="49" idx="1"/>
-            <a:endCxn id="10" idx="3"/>
-          </p:cNvCxnSpPr>
-          <p:nvPr/>
-        </p:nvCxnSpPr>
-        <p:spPr>
-          <a:xfrm flipH="1">
-            <a:off x="6801551" y="4026412"/>
-            <a:ext cx="785919" cy="2991"/>
-          </a:xfrm>
-          <a:prstGeom prst="straightConnector1">
-            <a:avLst/>
-          </a:prstGeom>
-          <a:ln w="9525">
-            <a:solidFill>
-              <a:schemeClr val="tx1"/>
-            </a:solidFill>
-            <a:headEnd type="triangle"/>
-            <a:tailEnd type="triangle"/>
-          </a:ln>
-          <a:effectLst>
-            <a:outerShdw blurRad="63500" sx="102000" sy="102000" algn="ctr" rotWithShape="0">
-              <a:prstClr val="black">
-                <a:alpha val="40000"/>
-              </a:prstClr>
-            </a:outerShdw>
-          </a:effectLst>
-        </p:spPr>
-        <p:style>
-          <a:lnRef idx="1">
-            <a:schemeClr val="accent1"/>
-          </a:lnRef>
-          <a:fillRef idx="0">
-            <a:schemeClr val="accent1"/>
-          </a:fillRef>
-          <a:effectRef idx="0">
-            <a:schemeClr val="accent1"/>
-          </a:effectRef>
-          <a:fontRef idx="minor">
-            <a:schemeClr val="tx1"/>
-          </a:fontRef>
-        </p:style>
-      </p:cxnSp>
-    </p:spTree>
-    <p:extLst>
-      <p:ext uri="{BB962C8B-B14F-4D97-AF65-F5344CB8AC3E}">
-        <p14:creationId xmlns:p14="http://schemas.microsoft.com/office/powerpoint/2010/main" val="2097340981"/>
-      </p:ext>
-    </p:extLst>
-  </p:cSld>
-  <p:clrMapOvr>
-    <a:masterClrMapping/>
-  </p:clrMapOvr>
-</p:sld>
-</file>
-
-<file path=ppt/slides/slide2.xml><?xml version="1.0" encoding="utf-8"?>
-<p:sld xmlns:a="http://schemas.openxmlformats.org/drawingml/2006/main" xmlns:r="http://schemas.openxmlformats.org/officeDocument/2006/relationships" xmlns:p="http://schemas.openxmlformats.org/presentationml/2006/main">
-  <p:cSld>
-    <p:spTree>
-      <p:nvGrpSpPr>
-        <p:cNvPr id="1" name=""/>
-        <p:cNvGrpSpPr/>
-        <p:nvPr/>
-      </p:nvGrpSpPr>
-      <p:grpSpPr>
-        <a:xfrm>
-          <a:off x="0" y="0"/>
-          <a:ext cx="0" cy="0"/>
-          <a:chOff x="0" y="0"/>
-          <a:chExt cx="0" cy="0"/>
-        </a:xfrm>
-      </p:grpSpPr>
-      <p:sp>
-        <p:nvSpPr>
-          <p:cNvPr id="4" name="Rectangle 3">
-            <a:extLst>
-              <a:ext uri="{FF2B5EF4-FFF2-40B4-BE49-F238E27FC236}">
-                <a16:creationId xmlns:a16="http://schemas.microsoft.com/office/drawing/2014/main" id="{44402ADA-9BD3-F8A5-3A13-F439AF70C28F}"/>
+      <p:sp>
+        <p:nvSpPr>
+          <p:cNvPr id="38" name="Rectangle 7">
+            <a:extLst>
+              <a:ext uri="{FF2B5EF4-FFF2-40B4-BE49-F238E27FC236}">
+                <a16:creationId xmlns:a16="http://schemas.microsoft.com/office/drawing/2014/main" id="{E3013295-9E6D-2D57-A962-EC15F65154E9}"/>
               </a:ext>
             </a:extLst>
           </p:cNvPr>
@@ -6208,220 +5647,14 @@
         </p:nvSpPr>
         <p:spPr>
           <a:xfrm>
-            <a:off x="1560945" y="437981"/>
-            <a:ext cx="8096189" cy="5066892"/>
-          </a:xfrm>
-          <a:prstGeom prst="rect">
-            <a:avLst/>
-          </a:prstGeom>
-          <a:solidFill>
-            <a:schemeClr val="accent6">
-              <a:lumMod val="20000"/>
-              <a:lumOff val="80000"/>
-            </a:schemeClr>
-          </a:solidFill>
-          <a:ln>
-            <a:solidFill>
-              <a:schemeClr val="tx1"/>
-            </a:solidFill>
-          </a:ln>
-          <a:effectLst>
-            <a:glow rad="101600">
-              <a:schemeClr val="accent3">
-                <a:satMod val="175000"/>
-                <a:alpha val="40000"/>
-              </a:schemeClr>
-            </a:glow>
-          </a:effectLst>
-        </p:spPr>
-        <p:style>
-          <a:lnRef idx="2">
-            <a:schemeClr val="accent1">
-              <a:shade val="50000"/>
-            </a:schemeClr>
-          </a:lnRef>
-          <a:fillRef idx="1">
-            <a:schemeClr val="accent1"/>
-          </a:fillRef>
-          <a:effectRef idx="0">
-            <a:schemeClr val="accent1"/>
-          </a:effectRef>
-          <a:fontRef idx="minor">
-            <a:schemeClr val="lt1"/>
-          </a:fontRef>
-        </p:style>
-        <p:txBody>
-          <a:bodyPr rtlCol="0" anchor="b" anchorCtr="0"/>
-          <a:lstStyle/>
-          <a:p>
-            <a:pPr algn="ctr"/>
-            <a:r>
-              <a:rPr lang="en-US" sz="1600" b="1" dirty="0">
-                <a:solidFill>
-                  <a:schemeClr val="tx1"/>
-                </a:solidFill>
-                <a:latin typeface="LXGW WenKai" panose="02020500000000000000" pitchFamily="18" charset="-120"/>
-                <a:ea typeface="LXGW WenKai" panose="02020500000000000000" pitchFamily="18" charset="-120"/>
-              </a:rPr>
-              <a:t>GPT-Agents</a:t>
-            </a:r>
-          </a:p>
-        </p:txBody>
-      </p:sp>
-      <p:sp>
-        <p:nvSpPr>
-          <p:cNvPr id="50" name="Rectangle 49">
-            <a:extLst>
-              <a:ext uri="{FF2B5EF4-FFF2-40B4-BE49-F238E27FC236}">
-                <a16:creationId xmlns:a16="http://schemas.microsoft.com/office/drawing/2014/main" id="{8BBD062D-3932-D5F7-67F9-E142136EB013}"/>
-              </a:ext>
-            </a:extLst>
-          </p:cNvPr>
-          <p:cNvSpPr/>
-          <p:nvPr/>
-        </p:nvSpPr>
-        <p:spPr>
-          <a:xfrm>
-            <a:off x="1906621" y="807396"/>
-            <a:ext cx="6064361" cy="4189691"/>
-          </a:xfrm>
-          <a:prstGeom prst="rect">
-            <a:avLst/>
-          </a:prstGeom>
-          <a:solidFill>
-            <a:schemeClr val="accent2">
-              <a:lumMod val="20000"/>
-              <a:lumOff val="80000"/>
-            </a:schemeClr>
-          </a:solidFill>
-          <a:ln>
-            <a:solidFill>
-              <a:schemeClr val="tx1"/>
-            </a:solidFill>
-          </a:ln>
-        </p:spPr>
-        <p:style>
-          <a:lnRef idx="2">
-            <a:schemeClr val="accent1">
-              <a:shade val="50000"/>
-            </a:schemeClr>
-          </a:lnRef>
-          <a:fillRef idx="1">
-            <a:schemeClr val="accent1"/>
-          </a:fillRef>
-          <a:effectRef idx="0">
-            <a:schemeClr val="accent1"/>
-          </a:effectRef>
-          <a:fontRef idx="minor">
-            <a:schemeClr val="lt1"/>
-          </a:fontRef>
-        </p:style>
-        <p:txBody>
-          <a:bodyPr rtlCol="0" anchor="b" anchorCtr="0"/>
-          <a:lstStyle/>
-          <a:p>
-            <a:pPr algn="ctr"/>
-            <a:r>
-              <a:rPr lang="en-US" sz="1400" dirty="0">
-                <a:solidFill>
-                  <a:schemeClr val="tx1"/>
-                </a:solidFill>
-                <a:latin typeface="LXGW WenKai" panose="02020500000000000000" pitchFamily="18" charset="-120"/>
-                <a:ea typeface="LXGW WenKai" panose="02020500000000000000" pitchFamily="18" charset="-120"/>
-              </a:rPr>
-              <a:t>Manager</a:t>
-            </a:r>
-          </a:p>
-        </p:txBody>
-      </p:sp>
-      <p:sp>
-        <p:nvSpPr>
-          <p:cNvPr id="77" name="Rectangle 76">
-            <a:extLst>
-              <a:ext uri="{FF2B5EF4-FFF2-40B4-BE49-F238E27FC236}">
-                <a16:creationId xmlns:a16="http://schemas.microsoft.com/office/drawing/2014/main" id="{E8620ACD-B15B-EF14-FC31-87AEE3C1C82D}"/>
-              </a:ext>
-            </a:extLst>
-          </p:cNvPr>
-          <p:cNvSpPr/>
-          <p:nvPr/>
-        </p:nvSpPr>
-        <p:spPr>
-          <a:xfrm>
-            <a:off x="6132277" y="1888186"/>
-            <a:ext cx="1371600" cy="640693"/>
+            <a:off x="7576314" y="3577916"/>
+            <a:ext cx="897196" cy="364001"/>
           </a:xfrm>
           <a:prstGeom prst="rect">
             <a:avLst/>
           </a:prstGeom>
           <a:solidFill>
             <a:schemeClr val="accent4">
-              <a:lumMod val="20000"/>
-              <a:lumOff val="80000"/>
-            </a:schemeClr>
-          </a:solidFill>
-          <a:ln>
-            <a:solidFill>
-              <a:schemeClr val="tx1"/>
-            </a:solidFill>
-          </a:ln>
-        </p:spPr>
-        <p:style>
-          <a:lnRef idx="2">
-            <a:schemeClr val="accent1">
-              <a:shade val="50000"/>
-            </a:schemeClr>
-          </a:lnRef>
-          <a:fillRef idx="1">
-            <a:schemeClr val="accent1"/>
-          </a:fillRef>
-          <a:effectRef idx="0">
-            <a:schemeClr val="accent1"/>
-          </a:effectRef>
-          <a:fontRef idx="minor">
-            <a:schemeClr val="lt1"/>
-          </a:fontRef>
-        </p:style>
-        <p:txBody>
-          <a:bodyPr rtlCol="0" anchor="ctr" anchorCtr="1"/>
-          <a:lstStyle/>
-          <a:p>
-            <a:pPr algn="ctr"/>
-            <a:r>
-              <a:rPr lang="en-US" sz="1400" dirty="0">
-                <a:solidFill>
-                  <a:schemeClr val="tx1"/>
-                </a:solidFill>
-                <a:latin typeface="LXGW WenKai" panose="02020500000000000000" pitchFamily="18" charset="-120"/>
-                <a:ea typeface="LXGW WenKai" panose="02020500000000000000" pitchFamily="18" charset="-120"/>
-              </a:rPr>
-              <a:t>Global Contexts</a:t>
-            </a:r>
-          </a:p>
-        </p:txBody>
-      </p:sp>
-      <p:sp>
-        <p:nvSpPr>
-          <p:cNvPr id="105" name="Rectangle 104">
-            <a:extLst>
-              <a:ext uri="{FF2B5EF4-FFF2-40B4-BE49-F238E27FC236}">
-                <a16:creationId xmlns:a16="http://schemas.microsoft.com/office/drawing/2014/main" id="{1214C11B-A256-7176-4EFC-64EB301BEFA9}"/>
-              </a:ext>
-            </a:extLst>
-          </p:cNvPr>
-          <p:cNvSpPr/>
-          <p:nvPr/>
-        </p:nvSpPr>
-        <p:spPr>
-          <a:xfrm>
-            <a:off x="2373478" y="1124349"/>
-            <a:ext cx="3180033" cy="914400"/>
-          </a:xfrm>
-          <a:prstGeom prst="rect">
-            <a:avLst/>
-          </a:prstGeom>
-          <a:solidFill>
-            <a:schemeClr val="accent2">
               <a:lumMod val="40000"/>
               <a:lumOff val="60000"/>
             </a:schemeClr>
@@ -6449,7 +5682,7 @@
           </a:fontRef>
         </p:style>
         <p:txBody>
-          <a:bodyPr rtlCol="0" anchor="b" anchorCtr="0"/>
+          <a:bodyPr rtlCol="0" anchor="ctr" anchorCtr="1"/>
           <a:lstStyle/>
           <a:p>
             <a:pPr algn="ctr"/>
@@ -6461,1419 +5694,38 @@
                 <a:latin typeface="LXGW WenKai" panose="02020500000000000000" pitchFamily="18" charset="-120"/>
                 <a:ea typeface="LXGW WenKai" panose="02020500000000000000" pitchFamily="18" charset="-120"/>
               </a:rPr>
-              <a:t>Agent</a:t>
-            </a:r>
-          </a:p>
-        </p:txBody>
-      </p:sp>
-      <p:sp>
-        <p:nvSpPr>
-          <p:cNvPr id="76" name="Rectangle 75">
-            <a:extLst>
-              <a:ext uri="{FF2B5EF4-FFF2-40B4-BE49-F238E27FC236}">
-                <a16:creationId xmlns:a16="http://schemas.microsoft.com/office/drawing/2014/main" id="{5DDE9D0C-B83B-B506-FF0C-EDC49D03A075}"/>
-              </a:ext>
-            </a:extLst>
-          </p:cNvPr>
-          <p:cNvSpPr/>
-          <p:nvPr/>
-        </p:nvSpPr>
-        <p:spPr>
-          <a:xfrm>
-            <a:off x="2534866" y="1277253"/>
-            <a:ext cx="770430" cy="359761"/>
-          </a:xfrm>
-          <a:prstGeom prst="rect">
-            <a:avLst/>
-          </a:prstGeom>
-          <a:solidFill>
-            <a:schemeClr val="bg1">
-              <a:lumMod val="95000"/>
-            </a:schemeClr>
-          </a:solidFill>
-          <a:ln>
-            <a:solidFill>
-              <a:schemeClr val="tx1"/>
-            </a:solidFill>
-          </a:ln>
-        </p:spPr>
-        <p:style>
-          <a:lnRef idx="2">
-            <a:schemeClr val="accent1">
-              <a:shade val="50000"/>
-            </a:schemeClr>
-          </a:lnRef>
-          <a:fillRef idx="1">
-            <a:schemeClr val="accent1"/>
-          </a:fillRef>
-          <a:effectRef idx="0">
-            <a:schemeClr val="accent1"/>
-          </a:effectRef>
-          <a:fontRef idx="minor">
-            <a:schemeClr val="lt1"/>
-          </a:fontRef>
-        </p:style>
-        <p:txBody>
-          <a:bodyPr rtlCol="0" anchor="ctr" anchorCtr="1"/>
-          <a:lstStyle/>
-          <a:p>
-            <a:pPr algn="ctr"/>
-            <a:r>
-              <a:rPr lang="en-US" sz="1000" dirty="0">
-                <a:solidFill>
-                  <a:schemeClr val="tx1"/>
-                </a:solidFill>
-                <a:latin typeface="LXGW WenKai" panose="02020500000000000000" pitchFamily="18" charset="-120"/>
-                <a:ea typeface="LXGW WenKai" panose="02020500000000000000" pitchFamily="18" charset="-120"/>
-              </a:rPr>
-              <a:t>System prompts</a:t>
-            </a:r>
-            <a:endParaRPr lang="en-US" sz="1050" dirty="0">
-              <a:solidFill>
-                <a:schemeClr val="tx1"/>
-              </a:solidFill>
-              <a:latin typeface="LXGW WenKai" panose="02020500000000000000" pitchFamily="18" charset="-120"/>
-              <a:ea typeface="LXGW WenKai" panose="02020500000000000000" pitchFamily="18" charset="-120"/>
-            </a:endParaRPr>
-          </a:p>
-        </p:txBody>
-      </p:sp>
-      <p:sp>
-        <p:nvSpPr>
-          <p:cNvPr id="139" name="Rectangle 138">
-            <a:extLst>
-              <a:ext uri="{FF2B5EF4-FFF2-40B4-BE49-F238E27FC236}">
-                <a16:creationId xmlns:a16="http://schemas.microsoft.com/office/drawing/2014/main" id="{2C915C8B-9693-8987-029F-199D7C0DCE4A}"/>
-              </a:ext>
-            </a:extLst>
-          </p:cNvPr>
-          <p:cNvSpPr/>
-          <p:nvPr/>
-        </p:nvSpPr>
-        <p:spPr>
-          <a:xfrm>
-            <a:off x="3517280" y="1277253"/>
-            <a:ext cx="770430" cy="359761"/>
-          </a:xfrm>
-          <a:prstGeom prst="rect">
-            <a:avLst/>
-          </a:prstGeom>
-          <a:solidFill>
-            <a:schemeClr val="bg1">
-              <a:lumMod val="95000"/>
-            </a:schemeClr>
-          </a:solidFill>
-          <a:ln>
-            <a:solidFill>
-              <a:schemeClr val="tx1"/>
-            </a:solidFill>
-          </a:ln>
-        </p:spPr>
-        <p:style>
-          <a:lnRef idx="2">
-            <a:schemeClr val="accent1">
-              <a:shade val="50000"/>
-            </a:schemeClr>
-          </a:lnRef>
-          <a:fillRef idx="1">
-            <a:schemeClr val="accent1"/>
-          </a:fillRef>
-          <a:effectRef idx="0">
-            <a:schemeClr val="accent1"/>
-          </a:effectRef>
-          <a:fontRef idx="minor">
-            <a:schemeClr val="lt1"/>
-          </a:fontRef>
-        </p:style>
-        <p:txBody>
-          <a:bodyPr rtlCol="0" anchor="ctr" anchorCtr="1"/>
-          <a:lstStyle/>
-          <a:p>
-            <a:pPr algn="ctr"/>
-            <a:r>
-              <a:rPr lang="en-US" sz="1000" dirty="0">
-                <a:solidFill>
-                  <a:schemeClr val="tx1"/>
-                </a:solidFill>
-                <a:latin typeface="LXGW WenKai" panose="02020500000000000000" pitchFamily="18" charset="-120"/>
-                <a:ea typeface="LXGW WenKai" panose="02020500000000000000" pitchFamily="18" charset="-120"/>
-              </a:rPr>
-              <a:t>Chat</a:t>
-            </a:r>
-          </a:p>
-          <a:p>
-            <a:pPr algn="ctr"/>
-            <a:r>
-              <a:rPr lang="en-US" sz="1000" dirty="0">
-                <a:solidFill>
-                  <a:schemeClr val="tx1"/>
-                </a:solidFill>
-                <a:latin typeface="LXGW WenKai" panose="02020500000000000000" pitchFamily="18" charset="-120"/>
-                <a:ea typeface="LXGW WenKai" panose="02020500000000000000" pitchFamily="18" charset="-120"/>
-              </a:rPr>
-              <a:t>history</a:t>
-            </a:r>
-            <a:endParaRPr lang="en-US" sz="1050" dirty="0">
-              <a:solidFill>
-                <a:schemeClr val="tx1"/>
-              </a:solidFill>
-              <a:latin typeface="LXGW WenKai" panose="02020500000000000000" pitchFamily="18" charset="-120"/>
-              <a:ea typeface="LXGW WenKai" panose="02020500000000000000" pitchFamily="18" charset="-120"/>
-            </a:endParaRPr>
-          </a:p>
-        </p:txBody>
-      </p:sp>
-      <p:sp>
-        <p:nvSpPr>
-          <p:cNvPr id="140" name="Rectangle 139">
-            <a:extLst>
-              <a:ext uri="{FF2B5EF4-FFF2-40B4-BE49-F238E27FC236}">
-                <a16:creationId xmlns:a16="http://schemas.microsoft.com/office/drawing/2014/main" id="{3F4E18B8-7282-664E-294A-1DC6271F5490}"/>
-              </a:ext>
-            </a:extLst>
-          </p:cNvPr>
-          <p:cNvSpPr/>
-          <p:nvPr/>
-        </p:nvSpPr>
-        <p:spPr>
-          <a:xfrm>
-            <a:off x="2381464" y="2345673"/>
-            <a:ext cx="3172048" cy="914400"/>
-          </a:xfrm>
-          <a:prstGeom prst="rect">
-            <a:avLst/>
-          </a:prstGeom>
-          <a:solidFill>
-            <a:schemeClr val="accent2">
-              <a:lumMod val="40000"/>
-              <a:lumOff val="60000"/>
-            </a:schemeClr>
-          </a:solidFill>
-          <a:ln>
-            <a:solidFill>
-              <a:schemeClr val="tx1"/>
-            </a:solidFill>
-          </a:ln>
-        </p:spPr>
-        <p:style>
-          <a:lnRef idx="2">
-            <a:schemeClr val="accent1">
-              <a:shade val="50000"/>
-            </a:schemeClr>
-          </a:lnRef>
-          <a:fillRef idx="1">
-            <a:schemeClr val="accent1"/>
-          </a:fillRef>
-          <a:effectRef idx="0">
-            <a:schemeClr val="accent1"/>
-          </a:effectRef>
-          <a:fontRef idx="minor">
-            <a:schemeClr val="lt1"/>
-          </a:fontRef>
-        </p:style>
-        <p:txBody>
-          <a:bodyPr rtlCol="0" anchor="b" anchorCtr="0"/>
-          <a:lstStyle/>
-          <a:p>
-            <a:pPr algn="ctr"/>
-            <a:r>
-              <a:rPr lang="en-US" sz="1400" dirty="0">
-                <a:solidFill>
-                  <a:schemeClr val="tx1"/>
-                </a:solidFill>
-                <a:latin typeface="LXGW WenKai" panose="02020500000000000000" pitchFamily="18" charset="-120"/>
-                <a:ea typeface="LXGW WenKai" panose="02020500000000000000" pitchFamily="18" charset="-120"/>
-              </a:rPr>
-              <a:t>Agent</a:t>
-            </a:r>
-          </a:p>
-        </p:txBody>
-      </p:sp>
-      <p:sp>
-        <p:nvSpPr>
-          <p:cNvPr id="141" name="Rectangle 140">
-            <a:extLst>
-              <a:ext uri="{FF2B5EF4-FFF2-40B4-BE49-F238E27FC236}">
-                <a16:creationId xmlns:a16="http://schemas.microsoft.com/office/drawing/2014/main" id="{B9470EF6-B2B8-17B5-60F2-39024B4B359F}"/>
-              </a:ext>
-            </a:extLst>
-          </p:cNvPr>
-          <p:cNvSpPr/>
-          <p:nvPr/>
-        </p:nvSpPr>
-        <p:spPr>
-          <a:xfrm>
-            <a:off x="2534866" y="2528878"/>
-            <a:ext cx="770430" cy="359761"/>
-          </a:xfrm>
-          <a:prstGeom prst="rect">
-            <a:avLst/>
-          </a:prstGeom>
-          <a:solidFill>
-            <a:schemeClr val="bg1">
-              <a:lumMod val="95000"/>
-            </a:schemeClr>
-          </a:solidFill>
-          <a:ln>
-            <a:solidFill>
-              <a:schemeClr val="tx1"/>
-            </a:solidFill>
-          </a:ln>
-        </p:spPr>
-        <p:style>
-          <a:lnRef idx="2">
-            <a:schemeClr val="accent1">
-              <a:shade val="50000"/>
-            </a:schemeClr>
-          </a:lnRef>
-          <a:fillRef idx="1">
-            <a:schemeClr val="accent1"/>
-          </a:fillRef>
-          <a:effectRef idx="0">
-            <a:schemeClr val="accent1"/>
-          </a:effectRef>
-          <a:fontRef idx="minor">
-            <a:schemeClr val="lt1"/>
-          </a:fontRef>
-        </p:style>
-        <p:txBody>
-          <a:bodyPr rtlCol="0" anchor="ctr" anchorCtr="1"/>
-          <a:lstStyle/>
-          <a:p>
-            <a:pPr algn="ctr"/>
-            <a:r>
-              <a:rPr lang="en-US" sz="1000" dirty="0">
-                <a:solidFill>
-                  <a:schemeClr val="tx1"/>
-                </a:solidFill>
-                <a:latin typeface="LXGW WenKai" panose="02020500000000000000" pitchFamily="18" charset="-120"/>
-                <a:ea typeface="LXGW WenKai" panose="02020500000000000000" pitchFamily="18" charset="-120"/>
-              </a:rPr>
-              <a:t>System prompts</a:t>
-            </a:r>
-            <a:endParaRPr lang="en-US" sz="1050" dirty="0">
-              <a:solidFill>
-                <a:schemeClr val="tx1"/>
-              </a:solidFill>
-              <a:latin typeface="LXGW WenKai" panose="02020500000000000000" pitchFamily="18" charset="-120"/>
-              <a:ea typeface="LXGW WenKai" panose="02020500000000000000" pitchFamily="18" charset="-120"/>
-            </a:endParaRPr>
-          </a:p>
-        </p:txBody>
-      </p:sp>
-      <p:sp>
-        <p:nvSpPr>
-          <p:cNvPr id="142" name="Rectangle 141">
-            <a:extLst>
-              <a:ext uri="{FF2B5EF4-FFF2-40B4-BE49-F238E27FC236}">
-                <a16:creationId xmlns:a16="http://schemas.microsoft.com/office/drawing/2014/main" id="{CBFEEC7A-4A15-DB6B-15C8-5F074E904B67}"/>
-              </a:ext>
-            </a:extLst>
-          </p:cNvPr>
-          <p:cNvSpPr/>
-          <p:nvPr/>
-        </p:nvSpPr>
-        <p:spPr>
-          <a:xfrm>
-            <a:off x="3517280" y="2528878"/>
-            <a:ext cx="770430" cy="359761"/>
-          </a:xfrm>
-          <a:prstGeom prst="rect">
-            <a:avLst/>
-          </a:prstGeom>
-          <a:solidFill>
-            <a:schemeClr val="bg1">
-              <a:lumMod val="95000"/>
-            </a:schemeClr>
-          </a:solidFill>
-          <a:ln>
-            <a:solidFill>
-              <a:schemeClr val="tx1"/>
-            </a:solidFill>
-          </a:ln>
-        </p:spPr>
-        <p:style>
-          <a:lnRef idx="2">
-            <a:schemeClr val="accent1">
-              <a:shade val="50000"/>
-            </a:schemeClr>
-          </a:lnRef>
-          <a:fillRef idx="1">
-            <a:schemeClr val="accent1"/>
-          </a:fillRef>
-          <a:effectRef idx="0">
-            <a:schemeClr val="accent1"/>
-          </a:effectRef>
-          <a:fontRef idx="minor">
-            <a:schemeClr val="lt1"/>
-          </a:fontRef>
-        </p:style>
-        <p:txBody>
-          <a:bodyPr rtlCol="0" anchor="ctr" anchorCtr="1"/>
-          <a:lstStyle/>
-          <a:p>
-            <a:pPr algn="ctr"/>
-            <a:r>
-              <a:rPr lang="en-US" sz="1000" dirty="0">
-                <a:solidFill>
-                  <a:schemeClr val="tx1"/>
-                </a:solidFill>
-                <a:latin typeface="LXGW WenKai" panose="02020500000000000000" pitchFamily="18" charset="-120"/>
-                <a:ea typeface="LXGW WenKai" panose="02020500000000000000" pitchFamily="18" charset="-120"/>
-              </a:rPr>
-              <a:t>Chat</a:t>
-            </a:r>
-          </a:p>
-          <a:p>
-            <a:pPr algn="ctr"/>
-            <a:r>
-              <a:rPr lang="en-US" sz="1000" dirty="0">
-                <a:solidFill>
-                  <a:schemeClr val="tx1"/>
-                </a:solidFill>
-                <a:latin typeface="LXGW WenKai" panose="02020500000000000000" pitchFamily="18" charset="-120"/>
-                <a:ea typeface="LXGW WenKai" panose="02020500000000000000" pitchFamily="18" charset="-120"/>
-              </a:rPr>
-              <a:t>History</a:t>
-            </a:r>
-            <a:endParaRPr lang="en-US" sz="1050" dirty="0">
-              <a:solidFill>
-                <a:schemeClr val="tx1"/>
-              </a:solidFill>
-              <a:latin typeface="LXGW WenKai" panose="02020500000000000000" pitchFamily="18" charset="-120"/>
-              <a:ea typeface="LXGW WenKai" panose="02020500000000000000" pitchFamily="18" charset="-120"/>
-            </a:endParaRPr>
-          </a:p>
-        </p:txBody>
-      </p:sp>
-      <p:sp>
-        <p:nvSpPr>
-          <p:cNvPr id="143" name="Rectangle 142">
-            <a:extLst>
-              <a:ext uri="{FF2B5EF4-FFF2-40B4-BE49-F238E27FC236}">
-                <a16:creationId xmlns:a16="http://schemas.microsoft.com/office/drawing/2014/main" id="{B5FD6F14-F11F-8D87-FEE2-5494426F1A72}"/>
-              </a:ext>
-            </a:extLst>
-          </p:cNvPr>
-          <p:cNvSpPr/>
-          <p:nvPr/>
-        </p:nvSpPr>
-        <p:spPr>
-          <a:xfrm>
-            <a:off x="2373479" y="3629488"/>
-            <a:ext cx="3180032" cy="904746"/>
-          </a:xfrm>
-          <a:prstGeom prst="rect">
-            <a:avLst/>
-          </a:prstGeom>
-          <a:solidFill>
-            <a:schemeClr val="accent2">
-              <a:lumMod val="40000"/>
-              <a:lumOff val="60000"/>
-            </a:schemeClr>
-          </a:solidFill>
-          <a:ln>
-            <a:solidFill>
-              <a:schemeClr val="tx1"/>
-            </a:solidFill>
-          </a:ln>
-        </p:spPr>
-        <p:style>
-          <a:lnRef idx="2">
-            <a:schemeClr val="accent1">
-              <a:shade val="50000"/>
-            </a:schemeClr>
-          </a:lnRef>
-          <a:fillRef idx="1">
-            <a:schemeClr val="accent1"/>
-          </a:fillRef>
-          <a:effectRef idx="0">
-            <a:schemeClr val="accent1"/>
-          </a:effectRef>
-          <a:fontRef idx="minor">
-            <a:schemeClr val="lt1"/>
-          </a:fontRef>
-        </p:style>
-        <p:txBody>
-          <a:bodyPr rtlCol="0" anchor="b" anchorCtr="0"/>
-          <a:lstStyle/>
-          <a:p>
-            <a:pPr algn="ctr"/>
-            <a:r>
-              <a:rPr lang="en-US" sz="1400" dirty="0">
-                <a:solidFill>
-                  <a:schemeClr val="tx1"/>
-                </a:solidFill>
-                <a:latin typeface="LXGW WenKai" panose="02020500000000000000" pitchFamily="18" charset="-120"/>
-                <a:ea typeface="LXGW WenKai" panose="02020500000000000000" pitchFamily="18" charset="-120"/>
-              </a:rPr>
-              <a:t>Agent</a:t>
-            </a:r>
-          </a:p>
-        </p:txBody>
-      </p:sp>
-      <p:sp>
-        <p:nvSpPr>
-          <p:cNvPr id="144" name="Rectangle 143">
-            <a:extLst>
-              <a:ext uri="{FF2B5EF4-FFF2-40B4-BE49-F238E27FC236}">
-                <a16:creationId xmlns:a16="http://schemas.microsoft.com/office/drawing/2014/main" id="{91FED968-9E3F-7EAE-6E2E-84A4B4A9BCD2}"/>
-              </a:ext>
-            </a:extLst>
-          </p:cNvPr>
-          <p:cNvSpPr/>
-          <p:nvPr/>
-        </p:nvSpPr>
-        <p:spPr>
-          <a:xfrm>
-            <a:off x="2534866" y="3797862"/>
-            <a:ext cx="770430" cy="359761"/>
-          </a:xfrm>
-          <a:prstGeom prst="rect">
-            <a:avLst/>
-          </a:prstGeom>
-          <a:solidFill>
-            <a:schemeClr val="bg1">
-              <a:lumMod val="95000"/>
-            </a:schemeClr>
-          </a:solidFill>
-          <a:ln>
-            <a:solidFill>
-              <a:schemeClr val="tx1"/>
-            </a:solidFill>
-          </a:ln>
-        </p:spPr>
-        <p:style>
-          <a:lnRef idx="2">
-            <a:schemeClr val="accent1">
-              <a:shade val="50000"/>
-            </a:schemeClr>
-          </a:lnRef>
-          <a:fillRef idx="1">
-            <a:schemeClr val="accent1"/>
-          </a:fillRef>
-          <a:effectRef idx="0">
-            <a:schemeClr val="accent1"/>
-          </a:effectRef>
-          <a:fontRef idx="minor">
-            <a:schemeClr val="lt1"/>
-          </a:fontRef>
-        </p:style>
-        <p:txBody>
-          <a:bodyPr rtlCol="0" anchor="ctr" anchorCtr="1"/>
-          <a:lstStyle/>
-          <a:p>
-            <a:pPr algn="ctr"/>
-            <a:r>
-              <a:rPr lang="en-US" sz="1000" dirty="0">
-                <a:solidFill>
-                  <a:schemeClr val="tx1"/>
-                </a:solidFill>
-                <a:latin typeface="LXGW WenKai" panose="02020500000000000000" pitchFamily="18" charset="-120"/>
-                <a:ea typeface="LXGW WenKai" panose="02020500000000000000" pitchFamily="18" charset="-120"/>
-              </a:rPr>
-              <a:t>System prompts</a:t>
-            </a:r>
-            <a:endParaRPr lang="en-US" sz="1050" dirty="0">
-              <a:solidFill>
-                <a:schemeClr val="tx1"/>
-              </a:solidFill>
-              <a:latin typeface="LXGW WenKai" panose="02020500000000000000" pitchFamily="18" charset="-120"/>
-              <a:ea typeface="LXGW WenKai" panose="02020500000000000000" pitchFamily="18" charset="-120"/>
-            </a:endParaRPr>
-          </a:p>
-        </p:txBody>
-      </p:sp>
-      <p:sp>
-        <p:nvSpPr>
-          <p:cNvPr id="145" name="Rectangle 144">
-            <a:extLst>
-              <a:ext uri="{FF2B5EF4-FFF2-40B4-BE49-F238E27FC236}">
-                <a16:creationId xmlns:a16="http://schemas.microsoft.com/office/drawing/2014/main" id="{BD16667A-49D0-712E-D96E-003D719DA2D4}"/>
-              </a:ext>
-            </a:extLst>
-          </p:cNvPr>
-          <p:cNvSpPr/>
-          <p:nvPr/>
-        </p:nvSpPr>
-        <p:spPr>
-          <a:xfrm>
-            <a:off x="3517280" y="3797862"/>
-            <a:ext cx="770430" cy="359761"/>
-          </a:xfrm>
-          <a:prstGeom prst="rect">
-            <a:avLst/>
-          </a:prstGeom>
-          <a:solidFill>
-            <a:schemeClr val="bg1">
-              <a:lumMod val="95000"/>
-            </a:schemeClr>
-          </a:solidFill>
-          <a:ln>
-            <a:solidFill>
-              <a:schemeClr val="tx1"/>
-            </a:solidFill>
-          </a:ln>
-        </p:spPr>
-        <p:style>
-          <a:lnRef idx="2">
-            <a:schemeClr val="accent1">
-              <a:shade val="50000"/>
-            </a:schemeClr>
-          </a:lnRef>
-          <a:fillRef idx="1">
-            <a:schemeClr val="accent1"/>
-          </a:fillRef>
-          <a:effectRef idx="0">
-            <a:schemeClr val="accent1"/>
-          </a:effectRef>
-          <a:fontRef idx="minor">
-            <a:schemeClr val="lt1"/>
-          </a:fontRef>
-        </p:style>
-        <p:txBody>
-          <a:bodyPr rtlCol="0" anchor="ctr" anchorCtr="1"/>
-          <a:lstStyle/>
-          <a:p>
-            <a:pPr algn="ctr"/>
-            <a:r>
-              <a:rPr lang="en-US" sz="1000" dirty="0">
-                <a:solidFill>
-                  <a:schemeClr val="tx1"/>
-                </a:solidFill>
-                <a:latin typeface="LXGW WenKai" panose="02020500000000000000" pitchFamily="18" charset="-120"/>
-                <a:ea typeface="LXGW WenKai" panose="02020500000000000000" pitchFamily="18" charset="-120"/>
-              </a:rPr>
-              <a:t>Chat</a:t>
-            </a:r>
-          </a:p>
-          <a:p>
-            <a:pPr algn="ctr"/>
-            <a:r>
-              <a:rPr lang="en-US" sz="1000" dirty="0">
-                <a:solidFill>
-                  <a:schemeClr val="tx1"/>
-                </a:solidFill>
-                <a:latin typeface="LXGW WenKai" panose="02020500000000000000" pitchFamily="18" charset="-120"/>
-                <a:ea typeface="LXGW WenKai" panose="02020500000000000000" pitchFamily="18" charset="-120"/>
-              </a:rPr>
-              <a:t>History</a:t>
-            </a:r>
-            <a:endParaRPr lang="en-US" sz="1050" dirty="0">
-              <a:solidFill>
-                <a:schemeClr val="tx1"/>
-              </a:solidFill>
-              <a:latin typeface="LXGW WenKai" panose="02020500000000000000" pitchFamily="18" charset="-120"/>
-              <a:ea typeface="LXGW WenKai" panose="02020500000000000000" pitchFamily="18" charset="-120"/>
-            </a:endParaRPr>
+              <a:t>Tools</a:t>
+            </a:r>
           </a:p>
         </p:txBody>
       </p:sp>
       <p:cxnSp>
         <p:nvCxnSpPr>
-          <p:cNvPr id="147" name="Connector: Elbow 146">
-            <a:extLst>
-              <a:ext uri="{FF2B5EF4-FFF2-40B4-BE49-F238E27FC236}">
-                <a16:creationId xmlns:a16="http://schemas.microsoft.com/office/drawing/2014/main" id="{58ECAB7D-063C-3497-99B4-5752BD3EE406}"/>
+          <p:cNvPr id="41" name="Connector: Elbow 162">
+            <a:extLst>
+              <a:ext uri="{FF2B5EF4-FFF2-40B4-BE49-F238E27FC236}">
+                <a16:creationId xmlns:a16="http://schemas.microsoft.com/office/drawing/2014/main" id="{23383888-A16B-0A7F-68C7-D9ADC7842E52}"/>
               </a:ext>
             </a:extLst>
           </p:cNvPr>
           <p:cNvCxnSpPr>
             <a:cxnSpLocks/>
-            <a:stCxn id="77" idx="0"/>
-            <a:endCxn id="76" idx="0"/>
-          </p:cNvCxnSpPr>
-          <p:nvPr/>
-        </p:nvCxnSpPr>
-        <p:spPr>
-          <a:xfrm rot="16200000" flipV="1">
-            <a:off x="4563613" y="-366278"/>
-            <a:ext cx="610933" cy="3897996"/>
-          </a:xfrm>
-          <a:prstGeom prst="bentConnector3">
-            <a:avLst>
-              <a:gd name="adj1" fmla="val 143465"/>
-            </a:avLst>
-          </a:prstGeom>
-          <a:ln w="9525">
-            <a:solidFill>
-              <a:schemeClr val="tx1"/>
-            </a:solidFill>
-            <a:prstDash val="dash"/>
-            <a:headEnd type="triangle"/>
-            <a:tailEnd type="triangle"/>
-          </a:ln>
-        </p:spPr>
-        <p:style>
-          <a:lnRef idx="1">
-            <a:schemeClr val="accent1"/>
-          </a:lnRef>
-          <a:fillRef idx="0">
-            <a:schemeClr val="accent1"/>
-          </a:fillRef>
-          <a:effectRef idx="0">
-            <a:schemeClr val="accent1"/>
-          </a:effectRef>
-          <a:fontRef idx="minor">
-            <a:schemeClr val="tx1"/>
-          </a:fontRef>
-        </p:style>
-      </p:cxnSp>
-      <p:cxnSp>
-        <p:nvCxnSpPr>
-          <p:cNvPr id="152" name="Connector: Elbow 151">
-            <a:extLst>
-              <a:ext uri="{FF2B5EF4-FFF2-40B4-BE49-F238E27FC236}">
-                <a16:creationId xmlns:a16="http://schemas.microsoft.com/office/drawing/2014/main" id="{E0F8D9DA-5181-2F80-AF0D-1A1C1C83DD97}"/>
-              </a:ext>
-            </a:extLst>
-          </p:cNvPr>
-          <p:cNvCxnSpPr>
-            <a:cxnSpLocks/>
-            <a:stCxn id="77" idx="1"/>
-            <a:endCxn id="141" idx="0"/>
-          </p:cNvCxnSpPr>
-          <p:nvPr/>
-        </p:nvCxnSpPr>
-        <p:spPr>
-          <a:xfrm rot="10800000" flipV="1">
-            <a:off x="2920081" y="2208532"/>
-            <a:ext cx="3212196" cy="320345"/>
-          </a:xfrm>
-          <a:prstGeom prst="bentConnector2">
-            <a:avLst/>
-          </a:prstGeom>
-          <a:ln w="9525">
-            <a:solidFill>
-              <a:schemeClr val="tx1"/>
-            </a:solidFill>
-            <a:prstDash val="dash"/>
-            <a:headEnd type="triangle"/>
-            <a:tailEnd type="triangle"/>
-          </a:ln>
-        </p:spPr>
-        <p:style>
-          <a:lnRef idx="1">
-            <a:schemeClr val="accent1"/>
-          </a:lnRef>
-          <a:fillRef idx="0">
-            <a:schemeClr val="accent1"/>
-          </a:fillRef>
-          <a:effectRef idx="0">
-            <a:schemeClr val="accent1"/>
-          </a:effectRef>
-          <a:fontRef idx="minor">
-            <a:schemeClr val="tx1"/>
-          </a:fontRef>
-        </p:style>
-      </p:cxnSp>
-      <p:cxnSp>
-        <p:nvCxnSpPr>
-          <p:cNvPr id="155" name="Connector: Elbow 154">
-            <a:extLst>
-              <a:ext uri="{FF2B5EF4-FFF2-40B4-BE49-F238E27FC236}">
-                <a16:creationId xmlns:a16="http://schemas.microsoft.com/office/drawing/2014/main" id="{B610ECF4-E72B-70CD-6D29-99F74420E889}"/>
-              </a:ext>
-            </a:extLst>
-          </p:cNvPr>
-          <p:cNvCxnSpPr>
-            <a:cxnSpLocks/>
-            <a:stCxn id="77" idx="2"/>
-            <a:endCxn id="144" idx="0"/>
-          </p:cNvCxnSpPr>
-          <p:nvPr/>
-        </p:nvCxnSpPr>
-        <p:spPr>
-          <a:xfrm rot="5400000">
-            <a:off x="4234588" y="1214372"/>
-            <a:ext cx="1268983" cy="3897996"/>
-          </a:xfrm>
-          <a:prstGeom prst="bentConnector3">
-            <a:avLst>
-              <a:gd name="adj1" fmla="val 73291"/>
-            </a:avLst>
-          </a:prstGeom>
-          <a:ln w="9525">
-            <a:solidFill>
-              <a:schemeClr val="tx1"/>
-            </a:solidFill>
-            <a:prstDash val="dash"/>
-            <a:headEnd type="triangle"/>
-            <a:tailEnd type="triangle"/>
-          </a:ln>
-        </p:spPr>
-        <p:style>
-          <a:lnRef idx="1">
-            <a:schemeClr val="accent1"/>
-          </a:lnRef>
-          <a:fillRef idx="0">
-            <a:schemeClr val="accent1"/>
-          </a:fillRef>
-          <a:effectRef idx="0">
-            <a:schemeClr val="accent1"/>
-          </a:effectRef>
-          <a:fontRef idx="minor">
-            <a:schemeClr val="tx1"/>
-          </a:fontRef>
-        </p:style>
-      </p:cxnSp>
-      <p:cxnSp>
-        <p:nvCxnSpPr>
-          <p:cNvPr id="163" name="Connector: Elbow 162">
-            <a:extLst>
-              <a:ext uri="{FF2B5EF4-FFF2-40B4-BE49-F238E27FC236}">
-                <a16:creationId xmlns:a16="http://schemas.microsoft.com/office/drawing/2014/main" id="{0FE27888-A62C-8AE2-B24B-F57490930192}"/>
-              </a:ext>
-            </a:extLst>
-          </p:cNvPr>
-          <p:cNvCxnSpPr>
-            <a:cxnSpLocks/>
-            <a:stCxn id="77" idx="1"/>
-            <a:endCxn id="142" idx="0"/>
-          </p:cNvCxnSpPr>
-          <p:nvPr/>
-        </p:nvCxnSpPr>
-        <p:spPr>
-          <a:xfrm rot="10800000" flipV="1">
-            <a:off x="3902495" y="2208532"/>
-            <a:ext cx="2229782" cy="320345"/>
-          </a:xfrm>
-          <a:prstGeom prst="bentConnector2">
-            <a:avLst/>
-          </a:prstGeom>
-          <a:ln w="9525">
-            <a:solidFill>
-              <a:schemeClr val="tx1"/>
-            </a:solidFill>
-            <a:prstDash val="dash"/>
-            <a:headEnd type="triangle"/>
-            <a:tailEnd type="triangle"/>
-          </a:ln>
-        </p:spPr>
-        <p:style>
-          <a:lnRef idx="1">
-            <a:schemeClr val="accent1"/>
-          </a:lnRef>
-          <a:fillRef idx="0">
-            <a:schemeClr val="accent1"/>
-          </a:fillRef>
-          <a:effectRef idx="0">
-            <a:schemeClr val="accent1"/>
-          </a:effectRef>
-          <a:fontRef idx="minor">
-            <a:schemeClr val="tx1"/>
-          </a:fontRef>
-        </p:style>
-      </p:cxnSp>
-      <p:cxnSp>
-        <p:nvCxnSpPr>
-          <p:cNvPr id="167" name="Connector: Elbow 166">
-            <a:extLst>
-              <a:ext uri="{FF2B5EF4-FFF2-40B4-BE49-F238E27FC236}">
-                <a16:creationId xmlns:a16="http://schemas.microsoft.com/office/drawing/2014/main" id="{D88E1486-A9EA-09B1-DB52-912EF09BB8E6}"/>
-              </a:ext>
-            </a:extLst>
-          </p:cNvPr>
-          <p:cNvCxnSpPr>
-            <a:cxnSpLocks/>
-            <a:stCxn id="77" idx="2"/>
-            <a:endCxn id="145" idx="0"/>
-          </p:cNvCxnSpPr>
-          <p:nvPr/>
-        </p:nvCxnSpPr>
-        <p:spPr>
-          <a:xfrm rot="5400000">
-            <a:off x="4725795" y="1705579"/>
-            <a:ext cx="1268983" cy="2915582"/>
-          </a:xfrm>
-          <a:prstGeom prst="bentConnector3">
-            <a:avLst>
-              <a:gd name="adj1" fmla="val 73428"/>
-            </a:avLst>
-          </a:prstGeom>
-          <a:ln w="9525">
-            <a:solidFill>
-              <a:schemeClr val="tx1"/>
-            </a:solidFill>
-            <a:prstDash val="dash"/>
-            <a:headEnd type="triangle"/>
-            <a:tailEnd type="triangle"/>
-          </a:ln>
-        </p:spPr>
-        <p:style>
-          <a:lnRef idx="1">
-            <a:schemeClr val="accent1"/>
-          </a:lnRef>
-          <a:fillRef idx="0">
-            <a:schemeClr val="accent1"/>
-          </a:fillRef>
-          <a:effectRef idx="0">
-            <a:schemeClr val="accent1"/>
-          </a:effectRef>
-          <a:fontRef idx="minor">
-            <a:schemeClr val="tx1"/>
-          </a:fontRef>
-        </p:style>
-      </p:cxnSp>
-      <p:cxnSp>
-        <p:nvCxnSpPr>
-          <p:cNvPr id="170" name="Connector: Elbow 169">
-            <a:extLst>
-              <a:ext uri="{FF2B5EF4-FFF2-40B4-BE49-F238E27FC236}">
-                <a16:creationId xmlns:a16="http://schemas.microsoft.com/office/drawing/2014/main" id="{EBF495D6-F8BE-408D-9041-EF68C7867D46}"/>
-              </a:ext>
-            </a:extLst>
-          </p:cNvPr>
-          <p:cNvCxnSpPr>
-            <a:cxnSpLocks/>
-            <a:stCxn id="77" idx="0"/>
-            <a:endCxn id="139" idx="0"/>
-          </p:cNvCxnSpPr>
-          <p:nvPr/>
-        </p:nvCxnSpPr>
-        <p:spPr>
-          <a:xfrm rot="16200000" flipV="1">
-            <a:off x="5054820" y="124929"/>
-            <a:ext cx="610933" cy="2915582"/>
-          </a:xfrm>
-          <a:prstGeom prst="bentConnector3">
-            <a:avLst>
-              <a:gd name="adj1" fmla="val 143466"/>
-            </a:avLst>
-          </a:prstGeom>
-          <a:ln w="9525">
-            <a:solidFill>
-              <a:schemeClr val="tx1"/>
-            </a:solidFill>
-            <a:prstDash val="dash"/>
-            <a:headEnd type="triangle"/>
-            <a:tailEnd type="triangle"/>
-          </a:ln>
-        </p:spPr>
-        <p:style>
-          <a:lnRef idx="1">
-            <a:schemeClr val="accent1"/>
-          </a:lnRef>
-          <a:fillRef idx="0">
-            <a:schemeClr val="accent1"/>
-          </a:fillRef>
-          <a:effectRef idx="0">
-            <a:schemeClr val="accent1"/>
-          </a:effectRef>
-          <a:fontRef idx="minor">
-            <a:schemeClr val="tx1"/>
-          </a:fontRef>
-        </p:style>
-      </p:cxnSp>
-      <p:sp>
-        <p:nvSpPr>
-          <p:cNvPr id="2" name="Rectangle 138">
-            <a:extLst>
-              <a:ext uri="{FF2B5EF4-FFF2-40B4-BE49-F238E27FC236}">
-                <a16:creationId xmlns:a16="http://schemas.microsoft.com/office/drawing/2014/main" id="{82CC1FC8-E197-9C92-FFD6-369260E8C740}"/>
-              </a:ext>
-            </a:extLst>
-          </p:cNvPr>
-          <p:cNvSpPr/>
-          <p:nvPr/>
-        </p:nvSpPr>
-        <p:spPr>
-          <a:xfrm>
-            <a:off x="4499694" y="1258823"/>
-            <a:ext cx="906747" cy="359761"/>
-          </a:xfrm>
-          <a:prstGeom prst="rect">
-            <a:avLst/>
-          </a:prstGeom>
-          <a:solidFill>
-            <a:schemeClr val="bg1">
-              <a:lumMod val="95000"/>
-            </a:schemeClr>
-          </a:solidFill>
-          <a:ln>
-            <a:solidFill>
-              <a:schemeClr val="tx1"/>
-            </a:solidFill>
-          </a:ln>
-        </p:spPr>
-        <p:style>
-          <a:lnRef idx="2">
-            <a:schemeClr val="accent1">
-              <a:shade val="50000"/>
-            </a:schemeClr>
-          </a:lnRef>
-          <a:fillRef idx="1">
-            <a:schemeClr val="accent1"/>
-          </a:fillRef>
-          <a:effectRef idx="0">
-            <a:schemeClr val="accent1"/>
-          </a:effectRef>
-          <a:fontRef idx="minor">
-            <a:schemeClr val="lt1"/>
-          </a:fontRef>
-        </p:style>
-        <p:txBody>
-          <a:bodyPr rtlCol="0" anchor="ctr" anchorCtr="1"/>
-          <a:lstStyle/>
-          <a:p>
-            <a:pPr algn="ctr"/>
-            <a:r>
-              <a:rPr lang="en-US" altLang="zh-CN" sz="1000" dirty="0">
-                <a:solidFill>
-                  <a:schemeClr val="tx1"/>
-                </a:solidFill>
-                <a:latin typeface="LXGW WenKai" panose="02020500000000000000" pitchFamily="18" charset="-120"/>
-                <a:ea typeface="LXGW WenKai" panose="02020500000000000000" pitchFamily="18" charset="-120"/>
-              </a:rPr>
-              <a:t>Experience</a:t>
-            </a:r>
-            <a:br>
-              <a:rPr lang="en-US" altLang="zh-CN" sz="1000" dirty="0">
-                <a:solidFill>
-                  <a:schemeClr val="tx1"/>
-                </a:solidFill>
-                <a:latin typeface="LXGW WenKai" panose="02020500000000000000" pitchFamily="18" charset="-120"/>
-                <a:ea typeface="LXGW WenKai" panose="02020500000000000000" pitchFamily="18" charset="-120"/>
-              </a:rPr>
-            </a:br>
-            <a:r>
-              <a:rPr lang="en-US" altLang="zh-CN" sz="1050" dirty="0">
-                <a:solidFill>
-                  <a:schemeClr val="tx1"/>
-                </a:solidFill>
-                <a:latin typeface="LXGW WenKai" panose="02020500000000000000" pitchFamily="18" charset="-120"/>
-                <a:ea typeface="LXGW WenKai" panose="02020500000000000000" pitchFamily="18" charset="-120"/>
-              </a:rPr>
-              <a:t>Pre/Post</a:t>
-            </a:r>
-            <a:endParaRPr lang="en-US" altLang="zh-CN" sz="1100" dirty="0">
-              <a:solidFill>
-                <a:schemeClr val="tx1"/>
-              </a:solidFill>
-              <a:latin typeface="LXGW WenKai" panose="02020500000000000000" pitchFamily="18" charset="-120"/>
-              <a:ea typeface="LXGW WenKai" panose="02020500000000000000" pitchFamily="18" charset="-120"/>
-            </a:endParaRPr>
-          </a:p>
-        </p:txBody>
-      </p:sp>
-      <p:sp>
-        <p:nvSpPr>
-          <p:cNvPr id="3" name="Rectangle 138">
-            <a:extLst>
-              <a:ext uri="{FF2B5EF4-FFF2-40B4-BE49-F238E27FC236}">
-                <a16:creationId xmlns:a16="http://schemas.microsoft.com/office/drawing/2014/main" id="{CB0DC554-918C-44FA-DDFD-AA5496319B81}"/>
-              </a:ext>
-            </a:extLst>
-          </p:cNvPr>
-          <p:cNvSpPr/>
-          <p:nvPr/>
-        </p:nvSpPr>
-        <p:spPr>
-          <a:xfrm>
-            <a:off x="4501401" y="2538532"/>
-            <a:ext cx="906747" cy="359761"/>
-          </a:xfrm>
-          <a:prstGeom prst="rect">
-            <a:avLst/>
-          </a:prstGeom>
-          <a:solidFill>
-            <a:schemeClr val="bg1">
-              <a:lumMod val="95000"/>
-            </a:schemeClr>
-          </a:solidFill>
-          <a:ln>
-            <a:solidFill>
-              <a:schemeClr val="tx1"/>
-            </a:solidFill>
-          </a:ln>
-        </p:spPr>
-        <p:style>
-          <a:lnRef idx="2">
-            <a:schemeClr val="accent1">
-              <a:shade val="50000"/>
-            </a:schemeClr>
-          </a:lnRef>
-          <a:fillRef idx="1">
-            <a:schemeClr val="accent1"/>
-          </a:fillRef>
-          <a:effectRef idx="0">
-            <a:schemeClr val="accent1"/>
-          </a:effectRef>
-          <a:fontRef idx="minor">
-            <a:schemeClr val="lt1"/>
-          </a:fontRef>
-        </p:style>
-        <p:txBody>
-          <a:bodyPr rtlCol="0" anchor="ctr" anchorCtr="1"/>
-          <a:lstStyle/>
-          <a:p>
-            <a:pPr algn="ctr"/>
-            <a:r>
-              <a:rPr lang="en-US" altLang="zh-CN" sz="1000" dirty="0">
-                <a:solidFill>
-                  <a:schemeClr val="tx1"/>
-                </a:solidFill>
-                <a:latin typeface="LXGW WenKai" panose="02020500000000000000" pitchFamily="18" charset="-120"/>
-                <a:ea typeface="LXGW WenKai" panose="02020500000000000000" pitchFamily="18" charset="-120"/>
-              </a:rPr>
-              <a:t>Experience</a:t>
-            </a:r>
-          </a:p>
-          <a:p>
-            <a:pPr algn="ctr"/>
-            <a:r>
-              <a:rPr lang="en-US" sz="1000" dirty="0">
-                <a:solidFill>
-                  <a:schemeClr val="tx1"/>
-                </a:solidFill>
-                <a:latin typeface="LXGW WenKai" panose="02020500000000000000" pitchFamily="18" charset="-120"/>
-                <a:ea typeface="LXGW WenKai" panose="02020500000000000000" pitchFamily="18" charset="-120"/>
-              </a:rPr>
-              <a:t>Pre/Post</a:t>
-            </a:r>
-            <a:endParaRPr lang="en-US" sz="1050" dirty="0">
-              <a:solidFill>
-                <a:schemeClr val="tx1"/>
-              </a:solidFill>
-              <a:latin typeface="LXGW WenKai" panose="02020500000000000000" pitchFamily="18" charset="-120"/>
-              <a:ea typeface="LXGW WenKai" panose="02020500000000000000" pitchFamily="18" charset="-120"/>
-            </a:endParaRPr>
-          </a:p>
-        </p:txBody>
-      </p:sp>
-      <p:sp>
-        <p:nvSpPr>
-          <p:cNvPr id="5" name="Rectangle 138">
-            <a:extLst>
-              <a:ext uri="{FF2B5EF4-FFF2-40B4-BE49-F238E27FC236}">
-                <a16:creationId xmlns:a16="http://schemas.microsoft.com/office/drawing/2014/main" id="{C3B8A1E1-E06C-D45C-99A5-DE58E427384C}"/>
-              </a:ext>
-            </a:extLst>
-          </p:cNvPr>
-          <p:cNvSpPr/>
-          <p:nvPr/>
-        </p:nvSpPr>
-        <p:spPr>
-          <a:xfrm>
-            <a:off x="4499694" y="3807516"/>
-            <a:ext cx="906747" cy="359761"/>
-          </a:xfrm>
-          <a:prstGeom prst="rect">
-            <a:avLst/>
-          </a:prstGeom>
-          <a:solidFill>
-            <a:schemeClr val="bg1">
-              <a:lumMod val="95000"/>
-            </a:schemeClr>
-          </a:solidFill>
-          <a:ln>
-            <a:solidFill>
-              <a:schemeClr val="tx1"/>
-            </a:solidFill>
-          </a:ln>
-        </p:spPr>
-        <p:style>
-          <a:lnRef idx="2">
-            <a:schemeClr val="accent1">
-              <a:shade val="50000"/>
-            </a:schemeClr>
-          </a:lnRef>
-          <a:fillRef idx="1">
-            <a:schemeClr val="accent1"/>
-          </a:fillRef>
-          <a:effectRef idx="0">
-            <a:schemeClr val="accent1"/>
-          </a:effectRef>
-          <a:fontRef idx="minor">
-            <a:schemeClr val="lt1"/>
-          </a:fontRef>
-        </p:style>
-        <p:txBody>
-          <a:bodyPr rtlCol="0" anchor="ctr" anchorCtr="1"/>
-          <a:lstStyle/>
-          <a:p>
-            <a:pPr algn="ctr"/>
-            <a:r>
-              <a:rPr lang="en-US" altLang="zh-CN" sz="1000" dirty="0">
-                <a:solidFill>
-                  <a:schemeClr val="tx1"/>
-                </a:solidFill>
-                <a:latin typeface="LXGW WenKai" panose="02020500000000000000" pitchFamily="18" charset="-120"/>
-                <a:ea typeface="LXGW WenKai" panose="02020500000000000000" pitchFamily="18" charset="-120"/>
-              </a:rPr>
-              <a:t>Experience</a:t>
-            </a:r>
-          </a:p>
-          <a:p>
-            <a:pPr algn="ctr"/>
-            <a:r>
-              <a:rPr lang="en-US" sz="1000" dirty="0">
-                <a:solidFill>
-                  <a:schemeClr val="tx1"/>
-                </a:solidFill>
-                <a:latin typeface="LXGW WenKai" panose="02020500000000000000" pitchFamily="18" charset="-120"/>
-                <a:ea typeface="LXGW WenKai" panose="02020500000000000000" pitchFamily="18" charset="-120"/>
-              </a:rPr>
-              <a:t>Pre/Post</a:t>
-            </a:r>
-            <a:endParaRPr lang="en-US" sz="1050" dirty="0">
-              <a:solidFill>
-                <a:schemeClr val="tx1"/>
-              </a:solidFill>
-              <a:latin typeface="LXGW WenKai" panose="02020500000000000000" pitchFamily="18" charset="-120"/>
-              <a:ea typeface="LXGW WenKai" panose="02020500000000000000" pitchFamily="18" charset="-120"/>
-            </a:endParaRPr>
-          </a:p>
-        </p:txBody>
-      </p:sp>
-      <p:sp>
-        <p:nvSpPr>
-          <p:cNvPr id="6" name="Rectangle 74">
-            <a:extLst>
-              <a:ext uri="{FF2B5EF4-FFF2-40B4-BE49-F238E27FC236}">
-                <a16:creationId xmlns:a16="http://schemas.microsoft.com/office/drawing/2014/main" id="{23FA5171-0CC2-8DC8-242E-6812E56712FA}"/>
-              </a:ext>
-            </a:extLst>
-          </p:cNvPr>
-          <p:cNvSpPr/>
-          <p:nvPr/>
-        </p:nvSpPr>
-        <p:spPr>
-          <a:xfrm>
-            <a:off x="10252200" y="1700377"/>
-            <a:ext cx="1167764" cy="1018035"/>
-          </a:xfrm>
-          <a:prstGeom prst="rect">
-            <a:avLst/>
-          </a:prstGeom>
-          <a:solidFill>
-            <a:schemeClr val="accent6">
-              <a:lumMod val="20000"/>
-              <a:lumOff val="80000"/>
-            </a:schemeClr>
-          </a:solidFill>
-          <a:ln>
-            <a:solidFill>
-              <a:schemeClr val="tx1"/>
-            </a:solidFill>
-          </a:ln>
-        </p:spPr>
-        <p:style>
-          <a:lnRef idx="2">
-            <a:schemeClr val="accent1">
-              <a:shade val="50000"/>
-            </a:schemeClr>
-          </a:lnRef>
-          <a:fillRef idx="1">
-            <a:schemeClr val="accent1"/>
-          </a:fillRef>
-          <a:effectRef idx="0">
-            <a:schemeClr val="accent1"/>
-          </a:effectRef>
-          <a:fontRef idx="minor">
-            <a:schemeClr val="lt1"/>
-          </a:fontRef>
-        </p:style>
-        <p:txBody>
-          <a:bodyPr rtlCol="0" anchor="ctr" anchorCtr="1"/>
-          <a:lstStyle/>
-          <a:p>
-            <a:pPr algn="ctr"/>
-            <a:r>
-              <a:rPr lang="en-US" altLang="zh-CN" sz="1400" dirty="0">
-                <a:solidFill>
-                  <a:schemeClr val="tx1"/>
-                </a:solidFill>
-                <a:latin typeface="LXGW WenKai" panose="02020500000000000000" pitchFamily="18" charset="-120"/>
-                <a:ea typeface="LXGW WenKai" panose="02020500000000000000" pitchFamily="18" charset="-120"/>
-              </a:rPr>
-              <a:t>Database</a:t>
-            </a:r>
-            <a:endParaRPr lang="en-US" sz="1600" dirty="0">
-              <a:solidFill>
-                <a:schemeClr val="tx1"/>
-              </a:solidFill>
-              <a:latin typeface="LXGW WenKai" panose="02020500000000000000" pitchFamily="18" charset="-120"/>
-              <a:ea typeface="LXGW WenKai" panose="02020500000000000000" pitchFamily="18" charset="-120"/>
-            </a:endParaRPr>
-          </a:p>
-        </p:txBody>
-      </p:sp>
-      <p:cxnSp>
-        <p:nvCxnSpPr>
-          <p:cNvPr id="7" name="Connector: Elbow 166">
-            <a:extLst>
-              <a:ext uri="{FF2B5EF4-FFF2-40B4-BE49-F238E27FC236}">
-                <a16:creationId xmlns:a16="http://schemas.microsoft.com/office/drawing/2014/main" id="{C585E097-C6A4-1E4B-F859-B33CB52C72B1}"/>
-              </a:ext>
-            </a:extLst>
-          </p:cNvPr>
-          <p:cNvCxnSpPr>
-            <a:cxnSpLocks/>
-            <a:stCxn id="77" idx="2"/>
-            <a:endCxn id="5" idx="0"/>
-          </p:cNvCxnSpPr>
-          <p:nvPr/>
-        </p:nvCxnSpPr>
-        <p:spPr>
-          <a:xfrm rot="5400000">
-            <a:off x="5246255" y="2235693"/>
-            <a:ext cx="1278637" cy="1865009"/>
-          </a:xfrm>
-          <a:prstGeom prst="bentConnector3">
-            <a:avLst>
-              <a:gd name="adj1" fmla="val 72517"/>
-            </a:avLst>
-          </a:prstGeom>
-          <a:ln w="9525">
-            <a:solidFill>
-              <a:schemeClr val="tx1"/>
-            </a:solidFill>
-            <a:prstDash val="dash"/>
-            <a:headEnd type="triangle"/>
-            <a:tailEnd type="triangle"/>
-          </a:ln>
-        </p:spPr>
-        <p:style>
-          <a:lnRef idx="1">
-            <a:schemeClr val="accent1"/>
-          </a:lnRef>
-          <a:fillRef idx="0">
-            <a:schemeClr val="accent1"/>
-          </a:fillRef>
-          <a:effectRef idx="0">
-            <a:schemeClr val="accent1"/>
-          </a:effectRef>
-          <a:fontRef idx="minor">
-            <a:schemeClr val="tx1"/>
-          </a:fontRef>
-        </p:style>
-      </p:cxnSp>
-      <p:cxnSp>
-        <p:nvCxnSpPr>
-          <p:cNvPr id="10" name="Connector: Elbow 166">
-            <a:extLst>
-              <a:ext uri="{FF2B5EF4-FFF2-40B4-BE49-F238E27FC236}">
-                <a16:creationId xmlns:a16="http://schemas.microsoft.com/office/drawing/2014/main" id="{48E64060-BAF0-146A-B1D2-A56DF776CA0E}"/>
-              </a:ext>
-            </a:extLst>
-          </p:cNvPr>
-          <p:cNvCxnSpPr>
-            <a:cxnSpLocks/>
-            <a:stCxn id="77" idx="1"/>
-            <a:endCxn id="3" idx="0"/>
-          </p:cNvCxnSpPr>
-          <p:nvPr/>
-        </p:nvCxnSpPr>
-        <p:spPr>
-          <a:xfrm rot="10800000" flipV="1">
-            <a:off x="4954775" y="2208532"/>
-            <a:ext cx="1177502" cy="329999"/>
-          </a:xfrm>
-          <a:prstGeom prst="bentConnector2">
-            <a:avLst/>
-          </a:prstGeom>
-          <a:ln w="9525">
-            <a:solidFill>
-              <a:schemeClr val="tx1"/>
-            </a:solidFill>
-            <a:prstDash val="dash"/>
-            <a:headEnd type="triangle"/>
-            <a:tailEnd type="triangle"/>
-          </a:ln>
-        </p:spPr>
-        <p:style>
-          <a:lnRef idx="1">
-            <a:schemeClr val="accent1"/>
-          </a:lnRef>
-          <a:fillRef idx="0">
-            <a:schemeClr val="accent1"/>
-          </a:fillRef>
-          <a:effectRef idx="0">
-            <a:schemeClr val="accent1"/>
-          </a:effectRef>
-          <a:fontRef idx="minor">
-            <a:schemeClr val="tx1"/>
-          </a:fontRef>
-        </p:style>
-      </p:cxnSp>
-      <p:cxnSp>
-        <p:nvCxnSpPr>
-          <p:cNvPr id="13" name="Connector: Elbow 169">
-            <a:extLst>
-              <a:ext uri="{FF2B5EF4-FFF2-40B4-BE49-F238E27FC236}">
-                <a16:creationId xmlns:a16="http://schemas.microsoft.com/office/drawing/2014/main" id="{B9988024-2174-BB80-33D6-6780C0CB3F00}"/>
-              </a:ext>
-            </a:extLst>
-          </p:cNvPr>
-          <p:cNvCxnSpPr>
-            <a:cxnSpLocks/>
-            <a:stCxn id="77" idx="0"/>
-            <a:endCxn id="2" idx="0"/>
-          </p:cNvCxnSpPr>
-          <p:nvPr/>
-        </p:nvCxnSpPr>
-        <p:spPr>
-          <a:xfrm rot="16200000" flipV="1">
-            <a:off x="5570892" y="641000"/>
-            <a:ext cx="629363" cy="1865009"/>
-          </a:xfrm>
-          <a:prstGeom prst="bentConnector3">
-            <a:avLst>
-              <a:gd name="adj1" fmla="val 139257"/>
-            </a:avLst>
-          </a:prstGeom>
-          <a:ln w="9525">
-            <a:solidFill>
-              <a:schemeClr val="tx1"/>
-            </a:solidFill>
-            <a:prstDash val="dash"/>
-            <a:headEnd type="triangle"/>
-            <a:tailEnd type="triangle"/>
-          </a:ln>
-        </p:spPr>
-        <p:style>
-          <a:lnRef idx="1">
-            <a:schemeClr val="accent1"/>
-          </a:lnRef>
-          <a:fillRef idx="0">
-            <a:schemeClr val="accent1"/>
-          </a:fillRef>
-          <a:effectRef idx="0">
-            <a:schemeClr val="accent1"/>
-          </a:effectRef>
-          <a:fontRef idx="minor">
-            <a:schemeClr val="tx1"/>
-          </a:fontRef>
-        </p:style>
-      </p:cxnSp>
-      <p:cxnSp>
-        <p:nvCxnSpPr>
-          <p:cNvPr id="19" name="Connector: Elbow 169">
-            <a:extLst>
-              <a:ext uri="{FF2B5EF4-FFF2-40B4-BE49-F238E27FC236}">
-                <a16:creationId xmlns:a16="http://schemas.microsoft.com/office/drawing/2014/main" id="{09C567B4-51D1-C8F9-B8D3-FCE778CBE9E8}"/>
-              </a:ext>
-            </a:extLst>
-          </p:cNvPr>
-          <p:cNvCxnSpPr>
-            <a:cxnSpLocks/>
-            <a:stCxn id="6" idx="1"/>
-            <a:endCxn id="77" idx="3"/>
+            <a:stCxn id="38" idx="1"/>
+            <a:endCxn id="16" idx="3"/>
           </p:cNvCxnSpPr>
           <p:nvPr/>
         </p:nvCxnSpPr>
         <p:spPr>
           <a:xfrm rot="10800000">
-            <a:off x="7503878" y="2208533"/>
-            <a:ext cx="2748323" cy="862"/>
+            <a:off x="6801552" y="3507555"/>
+            <a:ext cx="774762" cy="252363"/>
           </a:xfrm>
           <a:prstGeom prst="bentConnector3">
             <a:avLst>
               <a:gd name="adj1" fmla="val 50000"/>
             </a:avLst>
           </a:prstGeom>
-          <a:ln w="9525" cmpd="sng">
+          <a:ln w="9525">
             <a:solidFill>
               <a:schemeClr val="tx1"/>
             </a:solidFill>
@@ -7899,425 +5751,83 @@
       </p:cxnSp>
       <p:sp>
         <p:nvSpPr>
-          <p:cNvPr id="22" name="Rectangle 76">
-            <a:extLst>
-              <a:ext uri="{FF2B5EF4-FFF2-40B4-BE49-F238E27FC236}">
-                <a16:creationId xmlns:a16="http://schemas.microsoft.com/office/drawing/2014/main" id="{E1ECA520-2118-C952-7E96-676DF37BB92A}"/>
-              </a:ext>
-            </a:extLst>
-          </p:cNvPr>
-          <p:cNvSpPr/>
+          <p:cNvPr id="59" name="文本框 58">
+            <a:extLst>
+              <a:ext uri="{FF2B5EF4-FFF2-40B4-BE49-F238E27FC236}">
+                <a16:creationId xmlns:a16="http://schemas.microsoft.com/office/drawing/2014/main" id="{0CA8B0DD-0612-E390-F51B-257F1B3F47FF}"/>
+              </a:ext>
+            </a:extLst>
+          </p:cNvPr>
+          <p:cNvSpPr txBox="1"/>
           <p:nvPr/>
         </p:nvSpPr>
         <p:spPr>
           <a:xfrm>
-            <a:off x="6418475" y="3923825"/>
-            <a:ext cx="1371600" cy="640693"/>
+            <a:off x="5994139" y="4433202"/>
+            <a:ext cx="2389611" cy="453183"/>
           </a:xfrm>
           <a:prstGeom prst="rect">
             <a:avLst/>
           </a:prstGeom>
-          <a:solidFill>
-            <a:schemeClr val="accent4">
-              <a:lumMod val="20000"/>
-              <a:lumOff val="80000"/>
-            </a:schemeClr>
-          </a:solidFill>
+          <a:noFill/>
           <a:ln>
             <a:solidFill>
-              <a:schemeClr val="tx1"/>
-            </a:solidFill>
-          </a:ln>
-        </p:spPr>
-        <p:style>
-          <a:lnRef idx="2">
-            <a:schemeClr val="accent1">
-              <a:shade val="50000"/>
-            </a:schemeClr>
-          </a:lnRef>
-          <a:fillRef idx="1">
-            <a:schemeClr val="accent1"/>
-          </a:fillRef>
-          <a:effectRef idx="0">
-            <a:schemeClr val="accent1"/>
-          </a:effectRef>
-          <a:fontRef idx="minor">
-            <a:schemeClr val="lt1"/>
-          </a:fontRef>
-        </p:style>
-        <p:txBody>
-          <a:bodyPr rtlCol="0" anchor="ctr" anchorCtr="1"/>
-          <a:lstStyle/>
-          <a:p>
-            <a:pPr algn="ctr"/>
-            <a:r>
-              <a:rPr lang="en-US" sz="1400" dirty="0">
-                <a:solidFill>
-                  <a:schemeClr val="tx1"/>
-                </a:solidFill>
-                <a:latin typeface="LXGW WenKai" panose="02020500000000000000" pitchFamily="18" charset="-120"/>
-                <a:ea typeface="LXGW WenKai" panose="02020500000000000000" pitchFamily="18" charset="-120"/>
-              </a:rPr>
-              <a:t>Intera</a:t>
-            </a:r>
-            <a:r>
-              <a:rPr lang="en-US" altLang="zh-CN" sz="1400" dirty="0">
-                <a:solidFill>
-                  <a:schemeClr val="tx1"/>
-                </a:solidFill>
-                <a:latin typeface="LXGW WenKai" panose="02020500000000000000" pitchFamily="18" charset="-120"/>
-                <a:ea typeface="LXGW WenKai" panose="02020500000000000000" pitchFamily="18" charset="-120"/>
-              </a:rPr>
-              <a:t>c</a:t>
-            </a:r>
-            <a:r>
-              <a:rPr lang="en-US" sz="1400" dirty="0">
-                <a:solidFill>
-                  <a:schemeClr val="tx1"/>
-                </a:solidFill>
-                <a:latin typeface="LXGW WenKai" panose="02020500000000000000" pitchFamily="18" charset="-120"/>
-                <a:ea typeface="LXGW WenKai" panose="02020500000000000000" pitchFamily="18" charset="-120"/>
-              </a:rPr>
-              <a:t>tive</a:t>
-            </a:r>
-          </a:p>
-          <a:p>
-            <a:pPr algn="ctr"/>
-            <a:r>
-              <a:rPr lang="en-US" sz="1400" dirty="0">
-                <a:solidFill>
-                  <a:schemeClr val="tx1"/>
-                </a:solidFill>
-                <a:latin typeface="LXGW WenKai" panose="02020500000000000000" pitchFamily="18" charset="-120"/>
-                <a:ea typeface="LXGW WenKai" panose="02020500000000000000" pitchFamily="18" charset="-120"/>
-              </a:rPr>
-              <a:t>Environment</a:t>
-            </a:r>
-          </a:p>
-        </p:txBody>
-      </p:sp>
-      <p:cxnSp>
-        <p:nvCxnSpPr>
-          <p:cNvPr id="23" name="Connector: Elbow 169">
-            <a:extLst>
-              <a:ext uri="{FF2B5EF4-FFF2-40B4-BE49-F238E27FC236}">
-                <a16:creationId xmlns:a16="http://schemas.microsoft.com/office/drawing/2014/main" id="{4DF70A14-F868-8D74-87E3-74CB68D5FDE0}"/>
-              </a:ext>
-            </a:extLst>
-          </p:cNvPr>
-          <p:cNvCxnSpPr>
-            <a:cxnSpLocks/>
-            <a:stCxn id="77" idx="3"/>
-            <a:endCxn id="22" idx="0"/>
-          </p:cNvCxnSpPr>
-          <p:nvPr/>
-        </p:nvCxnSpPr>
-        <p:spPr>
-          <a:xfrm flipH="1">
-            <a:off x="7104275" y="2208533"/>
-            <a:ext cx="399602" cy="1715292"/>
-          </a:xfrm>
-          <a:prstGeom prst="bentConnector4">
-            <a:avLst>
-              <a:gd name="adj1" fmla="val -57207"/>
-              <a:gd name="adj2" fmla="val 59338"/>
-            </a:avLst>
-          </a:prstGeom>
-          <a:ln w="9525">
-            <a:solidFill>
-              <a:schemeClr val="tx1"/>
-            </a:solidFill>
-            <a:prstDash val="dash"/>
-            <a:headEnd type="triangle"/>
-            <a:tailEnd type="triangle"/>
-          </a:ln>
-        </p:spPr>
-        <p:style>
-          <a:lnRef idx="1">
-            <a:schemeClr val="accent1"/>
-          </a:lnRef>
-          <a:fillRef idx="0">
-            <a:schemeClr val="accent1"/>
-          </a:fillRef>
-          <a:effectRef idx="0">
-            <a:schemeClr val="accent1"/>
-          </a:effectRef>
-          <a:fontRef idx="minor">
-            <a:schemeClr val="tx1"/>
-          </a:fontRef>
-        </p:style>
-      </p:cxnSp>
-      <p:sp>
-        <p:nvSpPr>
-          <p:cNvPr id="18" name="Rectangle 17">
-            <a:extLst>
-              <a:ext uri="{FF2B5EF4-FFF2-40B4-BE49-F238E27FC236}">
-                <a16:creationId xmlns:a16="http://schemas.microsoft.com/office/drawing/2014/main" id="{F9A13DD8-1A1B-732F-88E4-101524D7E147}"/>
-              </a:ext>
-            </a:extLst>
-          </p:cNvPr>
-          <p:cNvSpPr/>
-          <p:nvPr/>
-        </p:nvSpPr>
-        <p:spPr>
-          <a:xfrm>
-            <a:off x="8660843" y="4695185"/>
-            <a:ext cx="774000" cy="223200"/>
-          </a:xfrm>
-          <a:prstGeom prst="rect">
-            <a:avLst/>
-          </a:prstGeom>
-          <a:solidFill>
-            <a:schemeClr val="accent2">
-              <a:lumMod val="20000"/>
-              <a:lumOff val="80000"/>
-            </a:schemeClr>
-          </a:solidFill>
-          <a:ln>
-            <a:solidFill>
-              <a:schemeClr val="tx1"/>
+              <a:schemeClr val="accent1">
+                <a:lumMod val="75000"/>
+              </a:schemeClr>
             </a:solidFill>
             <a:prstDash val="dash"/>
           </a:ln>
         </p:spPr>
-        <p:style>
-          <a:lnRef idx="2">
-            <a:schemeClr val="accent1">
-              <a:shade val="50000"/>
-            </a:schemeClr>
-          </a:lnRef>
-          <a:fillRef idx="1">
-            <a:schemeClr val="accent1"/>
-          </a:fillRef>
-          <a:effectRef idx="0">
-            <a:schemeClr val="accent1"/>
-          </a:effectRef>
-          <a:fontRef idx="minor">
-            <a:schemeClr val="lt1"/>
-          </a:fontRef>
-        </p:style>
-        <p:txBody>
-          <a:bodyPr rtlCol="0" anchor="ctr" anchorCtr="1"/>
+        <p:txBody>
+          <a:bodyPr wrap="square" lIns="72000" tIns="72000" rIns="72000" bIns="72000" rtlCol="0">
+            <a:spAutoFit/>
+          </a:bodyPr>
           <a:lstStyle/>
           <a:p>
             <a:pPr algn="ctr"/>
             <a:r>
-              <a:rPr lang="en-US" sz="1000" dirty="0">
-                <a:solidFill>
-                  <a:schemeClr val="tx1"/>
-                </a:solidFill>
-                <a:latin typeface="LXGW WenKai" panose="02020500000000000000" pitchFamily="18" charset="-120"/>
-                <a:ea typeface="LXGW WenKai" panose="02020500000000000000" pitchFamily="18" charset="-120"/>
+              <a:rPr lang="en-US" altLang="zh-CN" sz="1000" dirty="0">
+                <a:latin typeface="LXGW WenKai Mono" panose="02020509000000000000" pitchFamily="49" charset="-122"/>
+                <a:ea typeface="LXGW WenKai Mono" panose="02020509000000000000" pitchFamily="49" charset="-122"/>
               </a:rPr>
-              <a:t>Manager</a:t>
-            </a:r>
-          </a:p>
-        </p:txBody>
-      </p:sp>
-      <p:sp>
-        <p:nvSpPr>
-          <p:cNvPr id="89" name="Rectangle 88">
-            <a:extLst>
-              <a:ext uri="{FF2B5EF4-FFF2-40B4-BE49-F238E27FC236}">
-                <a16:creationId xmlns:a16="http://schemas.microsoft.com/office/drawing/2014/main" id="{3DD37A8C-A716-0782-2384-2753C896E362}"/>
-              </a:ext>
-            </a:extLst>
-          </p:cNvPr>
-          <p:cNvSpPr/>
-          <p:nvPr/>
-        </p:nvSpPr>
-        <p:spPr>
-          <a:xfrm>
-            <a:off x="8344144" y="3896664"/>
-            <a:ext cx="1090700" cy="221755"/>
-          </a:xfrm>
-          <a:prstGeom prst="rect">
-            <a:avLst/>
-          </a:prstGeom>
-          <a:solidFill>
-            <a:schemeClr val="accent4">
-              <a:lumMod val="20000"/>
-              <a:lumOff val="80000"/>
-            </a:schemeClr>
-          </a:solidFill>
-          <a:ln>
-            <a:solidFill>
-              <a:schemeClr val="tx1"/>
-            </a:solidFill>
-            <a:prstDash val="dash"/>
-          </a:ln>
-        </p:spPr>
-        <p:style>
-          <a:lnRef idx="2">
-            <a:schemeClr val="accent1">
-              <a:shade val="50000"/>
-            </a:schemeClr>
-          </a:lnRef>
-          <a:fillRef idx="1">
-            <a:schemeClr val="accent1"/>
-          </a:fillRef>
-          <a:effectRef idx="0">
-            <a:schemeClr val="accent1"/>
-          </a:effectRef>
-          <a:fontRef idx="minor">
-            <a:schemeClr val="lt1"/>
-          </a:fontRef>
-        </p:style>
-        <p:txBody>
-          <a:bodyPr rtlCol="0" anchor="ctr" anchorCtr="1"/>
-          <a:lstStyle/>
+              <a:t>Reactors could be any entities that</a:t>
+            </a:r>
+          </a:p>
           <a:p>
             <a:pPr algn="ctr"/>
             <a:r>
-              <a:rPr lang="en-US" sz="1000" dirty="0">
-                <a:solidFill>
-                  <a:schemeClr val="tx1"/>
-                </a:solidFill>
-                <a:latin typeface="LXGW WenKai" panose="02020500000000000000" pitchFamily="18" charset="-120"/>
-                <a:ea typeface="LXGW WenKai" panose="02020500000000000000" pitchFamily="18" charset="-120"/>
+              <a:rPr lang="en-US" altLang="zh-CN" sz="1000" dirty="0">
+                <a:latin typeface="LXGW WenKai Mono" panose="02020509000000000000" pitchFamily="49" charset="-122"/>
+                <a:ea typeface="LXGW WenKai Mono" panose="02020509000000000000" pitchFamily="49" charset="-122"/>
               </a:rPr>
-              <a:t>Manager Data</a:t>
-            </a:r>
-          </a:p>
-        </p:txBody>
-      </p:sp>
-      <p:sp>
-        <p:nvSpPr>
-          <p:cNvPr id="108" name="Rectangle 107">
-            <a:extLst>
-              <a:ext uri="{FF2B5EF4-FFF2-40B4-BE49-F238E27FC236}">
-                <a16:creationId xmlns:a16="http://schemas.microsoft.com/office/drawing/2014/main" id="{DF6F82E6-1B4D-6F20-5C4A-BAC5F1A60D25}"/>
-              </a:ext>
-            </a:extLst>
-          </p:cNvPr>
-          <p:cNvSpPr/>
-          <p:nvPr/>
-        </p:nvSpPr>
-        <p:spPr>
-          <a:xfrm>
-            <a:off x="8344144" y="3492330"/>
-            <a:ext cx="1090699" cy="221754"/>
-          </a:xfrm>
-          <a:prstGeom prst="rect">
-            <a:avLst/>
-          </a:prstGeom>
-          <a:solidFill>
-            <a:schemeClr val="bg1">
-              <a:lumMod val="95000"/>
-            </a:schemeClr>
-          </a:solidFill>
-          <a:ln>
-            <a:solidFill>
-              <a:schemeClr val="tx1"/>
-            </a:solidFill>
-            <a:prstDash val="dash"/>
-          </a:ln>
-        </p:spPr>
-        <p:style>
-          <a:lnRef idx="2">
-            <a:schemeClr val="accent1">
-              <a:shade val="50000"/>
-            </a:schemeClr>
-          </a:lnRef>
-          <a:fillRef idx="1">
-            <a:schemeClr val="accent1"/>
-          </a:fillRef>
-          <a:effectRef idx="0">
-            <a:schemeClr val="accent1"/>
-          </a:effectRef>
-          <a:fontRef idx="minor">
-            <a:schemeClr val="lt1"/>
-          </a:fontRef>
-        </p:style>
-        <p:txBody>
-          <a:bodyPr rtlCol="0" anchor="ctr" anchorCtr="1"/>
-          <a:lstStyle/>
-          <a:p>
-            <a:pPr algn="ctr"/>
-            <a:r>
-              <a:rPr lang="en-US" sz="1000" dirty="0">
-                <a:solidFill>
-                  <a:schemeClr val="tx1"/>
-                </a:solidFill>
-                <a:latin typeface="LXGW WenKai" panose="02020500000000000000" pitchFamily="18" charset="-120"/>
-                <a:ea typeface="LXGW WenKai" panose="02020500000000000000" pitchFamily="18" charset="-120"/>
+              <a:t>generate </a:t>
+            </a:r>
+            <a:r>
+              <a:rPr lang="en-US" altLang="zh-CN" sz="1000" dirty="0" err="1">
+                <a:latin typeface="LXGW WenKai Mono" panose="02020509000000000000" pitchFamily="49" charset="-122"/>
+                <a:ea typeface="LXGW WenKai Mono" panose="02020509000000000000" pitchFamily="49" charset="-122"/>
               </a:rPr>
-              <a:t>Agent Data</a:t>
-            </a:r>
-          </a:p>
-        </p:txBody>
-      </p:sp>
-      <p:sp>
-        <p:nvSpPr>
-          <p:cNvPr id="146" name="Rectangle 145">
-            <a:extLst>
-              <a:ext uri="{FF2B5EF4-FFF2-40B4-BE49-F238E27FC236}">
-                <a16:creationId xmlns:a16="http://schemas.microsoft.com/office/drawing/2014/main" id="{2F241573-1DFB-B4E8-A247-315E4818D5AC}"/>
-              </a:ext>
-            </a:extLst>
-          </p:cNvPr>
-          <p:cNvSpPr/>
-          <p:nvPr/>
-        </p:nvSpPr>
-        <p:spPr>
-          <a:xfrm>
-            <a:off x="8660843" y="4300999"/>
-            <a:ext cx="774000" cy="223200"/>
-          </a:xfrm>
-          <a:prstGeom prst="rect">
-            <a:avLst/>
-          </a:prstGeom>
-          <a:solidFill>
-            <a:schemeClr val="accent2">
-              <a:lumMod val="40000"/>
-              <a:lumOff val="60000"/>
-            </a:schemeClr>
-          </a:solidFill>
-          <a:ln>
-            <a:solidFill>
-              <a:schemeClr val="tx1"/>
-            </a:solidFill>
-            <a:prstDash val="dash"/>
-          </a:ln>
-        </p:spPr>
-        <p:style>
-          <a:lnRef idx="2">
-            <a:schemeClr val="accent1">
-              <a:shade val="50000"/>
-            </a:schemeClr>
-          </a:lnRef>
-          <a:fillRef idx="1">
-            <a:schemeClr val="accent1"/>
-          </a:fillRef>
-          <a:effectRef idx="0">
-            <a:schemeClr val="accent1"/>
-          </a:effectRef>
-          <a:fontRef idx="minor">
-            <a:schemeClr val="lt1"/>
-          </a:fontRef>
-        </p:style>
-        <p:txBody>
-          <a:bodyPr rtlCol="0" anchor="ctr" anchorCtr="1"/>
-          <a:lstStyle/>
-          <a:p>
-            <a:pPr algn="ctr"/>
-            <a:r>
-              <a:rPr lang="en-US" sz="1000" dirty="0">
-                <a:solidFill>
-                  <a:schemeClr val="tx1"/>
-                </a:solidFill>
-                <a:latin typeface="LXGW WenKai" panose="02020500000000000000" pitchFamily="18" charset="-120"/>
-                <a:ea typeface="LXGW WenKai" panose="02020500000000000000" pitchFamily="18" charset="-120"/>
+              <a:t>infomration</a:t>
+            </a:r>
+            <a:r>
+              <a:rPr lang="en-US" altLang="zh-CN" sz="1000" dirty="0">
+                <a:latin typeface="LXGW WenKai Mono" panose="02020509000000000000" pitchFamily="49" charset="-122"/>
+                <a:ea typeface="LXGW WenKai Mono" panose="02020509000000000000" pitchFamily="49" charset="-122"/>
               </a:rPr>
-              <a:t>Agent</a:t>
-            </a:r>
+              <a:t> or do actions</a:t>
+            </a:r>
+            <a:endParaRPr lang="zh-CN" altLang="en-US" sz="1000" dirty="0">
+              <a:latin typeface="LXGW WenKai Mono" panose="02020509000000000000" pitchFamily="49" charset="-122"/>
+              <a:ea typeface="LXGW WenKai Mono" panose="02020509000000000000" pitchFamily="49" charset="-122"/>
+            </a:endParaRPr>
           </a:p>
         </p:txBody>
       </p:sp>
     </p:spTree>
     <p:extLst>
       <p:ext uri="{BB962C8B-B14F-4D97-AF65-F5344CB8AC3E}">
-        <p14:creationId xmlns:p14="http://schemas.microsoft.com/office/powerpoint/2010/main" val="2831052583"/>
+        <p14:creationId xmlns:p14="http://schemas.microsoft.com/office/powerpoint/2010/main" val="2097340981"/>
       </p:ext>
     </p:extLst>
   </p:cSld>
@@ -9181,20 +6691,20 @@
 </file>
 
 <file path=customXml/item2.xml><?xml version="1.0" encoding="utf-8"?>
-<p:properties xmlns:p="http://schemas.microsoft.com/office/2006/metadata/properties" xmlns:xsi="http://www.w3.org/2001/XMLSchema-instance" xmlns:pc="http://schemas.microsoft.com/office/infopath/2007/PartnerControls">
-  <documentManagement>
-    <_activity xmlns="b9c0df90-6177-490c-b060-567d6533c817" xsi:nil="true"/>
-  </documentManagement>
-</p:properties>
-</file>
-
-<file path=customXml/item3.xml><?xml version="1.0" encoding="utf-8"?>
 <?mso-contentType ?>
 <FormTemplates xmlns="http://schemas.microsoft.com/sharepoint/v3/contenttype/forms">
   <Display>DocumentLibraryForm</Display>
   <Edit>DocumentLibraryForm</Edit>
   <New>DocumentLibraryForm</New>
 </FormTemplates>
+</file>
+
+<file path=customXml/item3.xml><?xml version="1.0" encoding="utf-8"?>
+<p:properties xmlns:p="http://schemas.microsoft.com/office/2006/metadata/properties" xmlns:xsi="http://www.w3.org/2001/XMLSchema-instance" xmlns:pc="http://schemas.microsoft.com/office/infopath/2007/PartnerControls">
+  <documentManagement>
+    <_activity xmlns="b9c0df90-6177-490c-b060-567d6533c817" xsi:nil="true"/>
+  </documentManagement>
+</p:properties>
 </file>
 
 <file path=customXml/itemProps1.xml><?xml version="1.0" encoding="utf-8"?>
@@ -9217,6 +6727,14 @@
 </file>
 
 <file path=customXml/itemProps2.xml><?xml version="1.0" encoding="utf-8"?>
+<ds:datastoreItem xmlns:ds="http://schemas.openxmlformats.org/officeDocument/2006/customXml" ds:itemID="{86A9A6AE-A2D2-4466-B053-FEAA2AECCDAE}">
+  <ds:schemaRefs>
+    <ds:schemaRef ds:uri="http://schemas.microsoft.com/sharepoint/v3/contenttype/forms"/>
+  </ds:schemaRefs>
+</ds:datastoreItem>
+</file>
+
+<file path=customXml/itemProps3.xml><?xml version="1.0" encoding="utf-8"?>
 <ds:datastoreItem xmlns:ds="http://schemas.openxmlformats.org/officeDocument/2006/customXml" ds:itemID="{0988BE9C-0C90-420C-9DA9-636C0435E5D7}">
   <ds:schemaRefs>
     <ds:schemaRef ds:uri="http://schemas.microsoft.com/office/2006/documentManagement/types"/>
@@ -9233,14 +6751,6 @@
 </ds:datastoreItem>
 </file>
 
-<file path=customXml/itemProps3.xml><?xml version="1.0" encoding="utf-8"?>
-<ds:datastoreItem xmlns:ds="http://schemas.openxmlformats.org/officeDocument/2006/customXml" ds:itemID="{86A9A6AE-A2D2-4466-B053-FEAA2AECCDAE}">
-  <ds:schemaRefs>
-    <ds:schemaRef ds:uri="http://schemas.microsoft.com/sharepoint/v3/contenttype/forms"/>
-  </ds:schemaRefs>
-</ds:datastoreItem>
-</file>
-
 <file path=docMetadata/LabelInfo.xml><?xml version="1.0" encoding="utf-8"?>
 <clbl:labelList xmlns:clbl="http://schemas.microsoft.com/office/2020/mipLabelMetadata">
   <clbl:label id="{46c98d88-e344-4ed4-8496-4ed7712e255d}" enabled="0" method="" siteId="{46c98d88-e344-4ed4-8496-4ed7712e255d}" removed="1"/>

</xml_diff>